<commit_message>
Updated ESA project demonstration
</commit_message>
<xml_diff>
--- a/Presentations/ESA Project Demonstration.pptx
+++ b/Presentations/ESA Project Demonstration.pptx
@@ -272,7 +272,7 @@
             <a:spLocks noGrp="1" noChangeArrowheads="1"/>
             <a:extLst>
               <a:ext uri="smNativeData">
-                <pr:smNativeData xmlns="" xmlns:p14="http://schemas.microsoft.com/office/powerpoint/2010/main" xmlns:pr="smNativeData" val="SMDATA_13_aDXlXhMAAAAlAAAAZAAAAA0AAAAAAAAAAAAAAAAAAAAAAAAAAAAAAAAAAAAAAAAAAAEAAABQAAAAAAAAAAAA4D8AAAAAAADgPwAAAAAAAOA/AAAAAAAA4D8AAAAAAADgPwAAAAAAAOA/AAAAAAAA4D8AAAAAAADgPwAAAAAAAOA/AAAAAAAA4D8CAAAAjAAAAAAAAAAAAAAA////AP///wgAAAAAAAAAAAAAAAAAAAAAAAAAAAAAAAAAAAAAeAAAAAEAAABAAAAAAAAAAAAAAABaAAAAAAAAAAAAAAAAAAAAAAAAAAAAAAAAAAAAAAAAAAAAAAAAAAAAAAAAAAAAAAAAAAAAAAAAAAAAAAAAAAAAAAAAAAAAAAAAAAAAFAAAADwAAAAAAAAAAAAAAAAAAAAPAAAAAQAAACMAAAAjAAAAIwAAAB4AAAAAAAAAZAAAAGQAAAAAAAAAZAAAAGQAAAAVAAAAYAAAAAAAAAAAAAAADwAAACADAAAAAAAAAAAAAAEAAACgMgAAVgcAAKr4//8BAAAAf39/AAEAAABkAAAAAAAAABQAAABAHwAAAAAAACYAAAAAAAAAwOD//wAAAAAmAAAAZAAAABYAAABMAAAAAAAAAAAAAAAEAAAAAAAAAAEAAADu7OEKAAAAACgAAAAoAAAAZAAAAGQAAAAAAAAAzMzMAAAAAABQAAAAUAAAAGQAAABkAAAAAAAAABcAAAAUAAAAAAAAAAAAAAD/fwAA/38AAAAAAAAJAAAABAAAAAAAAAAMAAAAEAAAAAAAAAAAAAAAAAAAAAAAAAAeAAAAaAAAAAAAAAAAAAAAAAAAAAAAAAAAAAAAECcAABAnAAAAAAAAAAAAAAAAAAAAAAAAAAAAAAAAAAAAAAAAAAAAABQAAAAAAAAAwMD/AAAAAABkAAAAMgAAAAAAAABkAAAAAAAAAH9/fwAKAAAAHwAAAFQAAAD///8AAAAAAQAAAAAAAAAAAAAAAAAAAAAAAAAAAAAAAAAAAAAAAAAAAAAAAH9/fwAAAAADzMzMAMDA/wB/f38AAAAAAAAAAAAAAAAAAAAAAAAAAAAhAAAAGAAAABQAAACnBAAAPh8AANopAADWPAAAEAAAACYAAAAIAAAAPQ8AAAAAAAA="/>
+                <pr:smNativeData xmlns:pr="smNativeData" xmlns:p14="http://schemas.microsoft.com/office/powerpoint/2010/main" xmlns="" val="SMDATA_13_aDXlXhMAAAAlAAAAZAAAAA0AAAAAAAAAAAAAAAAAAAAAAAAAAAAAAAAAAAAAAAAAAAEAAABQAAAAAAAAAAAA4D8AAAAAAADgPwAAAAAAAOA/AAAAAAAA4D8AAAAAAADgPwAAAAAAAOA/AAAAAAAA4D8AAAAAAADgPwAAAAAAAOA/AAAAAAAA4D8CAAAAjAAAAAAAAAAAAAAA////AP///wgAAAAAAAAAAAAAAAAAAAAAAAAAAAAAAAAAAAAAeAAAAAEAAABAAAAAAAAAAAAAAABaAAAAAAAAAAAAAAAAAAAAAAAAAAAAAAAAAAAAAAAAAAAAAAAAAAAAAAAAAAAAAAAAAAAAAAAAAAAAAAAAAAAAAAAAAAAAAAAAAAAAFAAAADwAAAAAAAAAAAAAAAAAAAAPAAAAAQAAACMAAAAjAAAAIwAAAB4AAAAAAAAAZAAAAGQAAAAAAAAAZAAAAGQAAAAVAAAAYAAAAAAAAAAAAAAADwAAACADAAAAAAAAAAAAAAEAAACgMgAAVgcAAKr4//8BAAAAf39/AAEAAABkAAAAAAAAABQAAABAHwAAAAAAACYAAAAAAAAAwOD//wAAAAAmAAAAZAAAABYAAABMAAAAAAAAAAAAAAAEAAAAAAAAAAEAAADu7OEKAAAAACgAAAAoAAAAZAAAAGQAAAAAAAAAzMzMAAAAAABQAAAAUAAAAGQAAABkAAAAAAAAABcAAAAUAAAAAAAAAAAAAAD/fwAA/38AAAAAAAAJAAAABAAAAAAAAAAMAAAAEAAAAAAAAAAAAAAAAAAAAAAAAAAeAAAAaAAAAAAAAAAAAAAAAAAAAAAAAAAAAAAAECcAABAnAAAAAAAAAAAAAAAAAAAAAAAAAAAAAAAAAAAAAAAAAAAAABQAAAAAAAAAwMD/AAAAAABkAAAAMgAAAAAAAABkAAAAAAAAAH9/fwAKAAAAHwAAAFQAAAD///8AAAAAAQAAAAAAAAAAAAAAAAAAAAAAAAAAAAAAAAAAAAAAAAAAAAAAAH9/fwAAAAADzMzMAMDA/wB/f38AAAAAAAAAAAAAAAAAAAAAAAAAAAAhAAAAGAAAABQAAACnBAAAPh8AANopAADWPAAAEAAAACYAAAAIAAAAPQ8AAAAAAAA="/>
               </a:ext>
             </a:extLst>
           </p:cNvSpPr>
@@ -313,7 +313,7 @@
             <a:spLocks noGrp="1" noChangeArrowheads="1"/>
             <a:extLst>
               <a:ext uri="smNativeData">
-                <pr:smNativeData xmlns="" xmlns:p14="http://schemas.microsoft.com/office/powerpoint/2010/main" xmlns:pr="smNativeData" val="SMDATA_13_aDXlXhMAAAAlAAAAZAAAAA0AAAAAAAAAAAAAAAAAAAAAAAAAAAAAAAAAAAAAAAAAAAEAAABQAAAAAAAAAAAA4D8AAAAAAADgPwAAAAAAAOA/AAAAAAAA4D8AAAAAAADgPwAAAAAAAOA/AAAAAAAA4D8AAAAAAADgPwAAAAAAAOA/AAAAAAAA4D8CAAAAjAAAAAAAAAAAAAAA////AP///wgAAAAAAAAAAAAAAAAAAAAAAAAAAAAAAAAAAAAAeAAAAAEAAABAAAAAAAAAAAAAAABaAAAAAAAAAAAAAAAAAAAAAAAAAAAAAAAAAAAAAAAAAAAAAAAAAAAAAAAAAAAAAAAAAAAAAAAAAAAAAAAAAAAAAAAAAAAAAAAAAAAAFAAAADwAAAAAAAAAAAAAAAAAAAAPAAAAAQAAACMAAAAjAAAAIwAAAB4AAAAAAAAAZAAAAGQAAAAAAAAAZAAAAGQAAAAVAAAAYAAAAAAAAAAAAAAADwAAACADAAAAAAAAAAAAAAEAAACgMgAAVgcAAKr4//8BAAAAf39/AAEAAABkAAAAAAAAABQAAABAHwAAAAAAACYAAAAAAAAAwOD//wAAAAAmAAAAZAAAABYAAABMAAAAAAAAAAAAAAAEAAAAAAAAAAEAAADu7OEKAAAAACgAAAAoAAAAZAAAAGQAAAAAAAAAzMzMAAAAAABQAAAAUAAAAGQAAABkAAAAAAAAABcAAAAUAAAAAAAAAAAAAAD/fwAA/38AAAAAAAAJAAAABAAAAAAAAAAMAAAAEAAAAAAAAAAAAAAAAAAAAAAAAAAeAAAAaAAAAAAAAAAAAAAAAAAAAAAAAAAAAAAAECcAABAnAAAAAAAAAAAAAAAAAAAAAAAAAAAAAAAAAAAAAAAAAAAAABQAAAAAAAAAwMD/AAAAAABkAAAAMgAAAAAAAABkAAAAAAAAAH9/fwAKAAAAHwAAAFQAAAD///8AAAAAAQAAAAAAAAAAAAAAAAAAAAAAAAAAAAAAAAAAAAAAAAAAAAAAAH9/fwAAAAADzMzMAMDA/wB/f38AAAAAAAAAAAAAAAAAAAAAAAAAAAAhAAAAGAAAABQAAAAAAAAAAAAAAC4UAABJAwAAEAAAACYAAAAIAAAAPQ8AAAAAAAA="/>
+                <pr:smNativeData xmlns:pr="smNativeData" xmlns:p14="http://schemas.microsoft.com/office/powerpoint/2010/main" xmlns="" val="SMDATA_13_aDXlXhMAAAAlAAAAZAAAAA0AAAAAAAAAAAAAAAAAAAAAAAAAAAAAAAAAAAAAAAAAAAEAAABQAAAAAAAAAAAA4D8AAAAAAADgPwAAAAAAAOA/AAAAAAAA4D8AAAAAAADgPwAAAAAAAOA/AAAAAAAA4D8AAAAAAADgPwAAAAAAAOA/AAAAAAAA4D8CAAAAjAAAAAAAAAAAAAAA////AP///wgAAAAAAAAAAAAAAAAAAAAAAAAAAAAAAAAAAAAAeAAAAAEAAABAAAAAAAAAAAAAAABaAAAAAAAAAAAAAAAAAAAAAAAAAAAAAAAAAAAAAAAAAAAAAAAAAAAAAAAAAAAAAAAAAAAAAAAAAAAAAAAAAAAAAAAAAAAAAAAAAAAAFAAAADwAAAAAAAAAAAAAAAAAAAAPAAAAAQAAACMAAAAjAAAAIwAAAB4AAAAAAAAAZAAAAGQAAAAAAAAAZAAAAGQAAAAVAAAAYAAAAAAAAAAAAAAADwAAACADAAAAAAAAAAAAAAEAAACgMgAAVgcAAKr4//8BAAAAf39/AAEAAABkAAAAAAAAABQAAABAHwAAAAAAACYAAAAAAAAAwOD//wAAAAAmAAAAZAAAABYAAABMAAAAAAAAAAAAAAAEAAAAAAAAAAEAAADu7OEKAAAAACgAAAAoAAAAZAAAAGQAAAAAAAAAzMzMAAAAAABQAAAAUAAAAGQAAABkAAAAAAAAABcAAAAUAAAAAAAAAAAAAAD/fwAA/38AAAAAAAAJAAAABAAAAAAAAAAMAAAAEAAAAAAAAAAAAAAAAAAAAAAAAAAeAAAAaAAAAAAAAAAAAAAAAAAAAAAAAAAAAAAAECcAABAnAAAAAAAAAAAAAAAAAAAAAAAAAAAAAAAAAAAAAAAAAAAAABQAAAAAAAAAwMD/AAAAAABkAAAAMgAAAAAAAABkAAAAAAAAAH9/fwAKAAAAHwAAAFQAAAD///8AAAAAAQAAAAAAAAAAAAAAAAAAAAAAAAAAAAAAAAAAAAAAAAAAAAAAAH9/fwAAAAADzMzMAMDA/wB/f38AAAAAAAAAAAAAAAAAAAAAAAAAAAAhAAAAGAAAABQAAAAAAAAAAAAAAC4UAABJAwAAEAAAACYAAAAIAAAAPQ8AAAAAAAA="/>
               </a:ext>
             </a:extLst>
           </p:cNvSpPr>
@@ -359,7 +359,7 @@
             <a:spLocks noGrp="1" noChangeArrowheads="1"/>
             <a:extLst>
               <a:ext uri="smNativeData">
-                <pr:smNativeData xmlns="" xmlns:p14="http://schemas.microsoft.com/office/powerpoint/2010/main" xmlns:pr="smNativeData" val="SMDATA_13_aDXlXhMAAAAlAAAAZAAAAA0AAAAAAAAAAAAAAAAAAAAAAAAAAAAAAAAAAAAAAAAAAAEAAABQAAAAAAAAAAAA4D8AAAAAAADgPwAAAAAAAOA/AAAAAAAA4D8AAAAAAADgPwAAAAAAAOA/AAAAAAAA4D8AAAAAAADgPwAAAAAAAOA/AAAAAAAA4D8CAAAAjAAAAAAAAAAAAAAA////AP///wgAAAAAAAAAAAAAAAAAAAAAAAAAAAAAAAAAAAAAeAAAAAEAAABAAAAAAAAAAAAAAABaAAAAAAAAAAAAAAAAAAAAAAAAAAAAAAAAAAAAAAAAAAAAAAAAAAAAAAAAAAAAAAAAAAAAAAAAAAAAAAAAAAAAAAAAAAAAAAAAAAAAFAAAADwAAAAAAAAAAAAAAAAAAAAPAAAAAQAAACMAAAAjAAAAIwAAAB4AAAAAAAAAZAAAAGQAAAAAAAAAZAAAAGQAAAAVAAAAYAAAAAAAAAAAAAAADwAAACADAAAAAAAAAAAAAAEAAACgMgAAVgcAAKr4//8BAAAAf39/AAEAAABkAAAAAAAAABQAAABAHwAAAAAAACYAAAAAAAAAwOD//wAAAAAmAAAAZAAAABYAAABMAAAAAAAAAAAAAAAEAAAAAAAAAAEAAADu7OEKAAAAACgAAAAoAAAAZAAAAGQAAAAAAAAAzMzMAAAAAABQAAAAUAAAAGQAAABkAAAAAAAAABcAAAAUAAAAAAAAAAAAAAD/fwAA/38AAAAAAAAJAAAABAAAAMXaymkMAAAAEAAAAAAAAAAAAAAAAAAAAAAAAAAeAAAAaAAAAAAAAAAAAAAAAAAAAAAAAAAAAAAAECcAABAnAAAAAAAAAAAAAAAAAAAAAAAAAAAAAAAAAAAAAAAAAAAAABQAAAAAAAAAwMD/AAAAAABkAAAAMgAAAAAAAABkAAAAAAAAAH9/fwAKAAAAHwAAAFQAAAD///8AAAAAAQAAAAAAAAAAAAAAAAAAAAAAAAAAAAAAAAAAAAAAAAAAAAAAAH9/fwAAAAADzMzMAMDA/wB/f38AAAAAAAAAAAAAAAAAAAAAAAAAAAAhAAAAGAAAABQAAABTGgAAAAAAAIEuAABJAwAAEAAAACYAAAAIAAAAPQ8AAAAAAAA="/>
+                <pr:smNativeData xmlns:pr="smNativeData" xmlns:p14="http://schemas.microsoft.com/office/powerpoint/2010/main" xmlns="" val="SMDATA_13_aDXlXhMAAAAlAAAAZAAAAA0AAAAAAAAAAAAAAAAAAAAAAAAAAAAAAAAAAAAAAAAAAAEAAABQAAAAAAAAAAAA4D8AAAAAAADgPwAAAAAAAOA/AAAAAAAA4D8AAAAAAADgPwAAAAAAAOA/AAAAAAAA4D8AAAAAAADgPwAAAAAAAOA/AAAAAAAA4D8CAAAAjAAAAAAAAAAAAAAA////AP///wgAAAAAAAAAAAAAAAAAAAAAAAAAAAAAAAAAAAAAeAAAAAEAAABAAAAAAAAAAAAAAABaAAAAAAAAAAAAAAAAAAAAAAAAAAAAAAAAAAAAAAAAAAAAAAAAAAAAAAAAAAAAAAAAAAAAAAAAAAAAAAAAAAAAAAAAAAAAAAAAAAAAFAAAADwAAAAAAAAAAAAAAAAAAAAPAAAAAQAAACMAAAAjAAAAIwAAAB4AAAAAAAAAZAAAAGQAAAAAAAAAZAAAAGQAAAAVAAAAYAAAAAAAAAAAAAAADwAAACADAAAAAAAAAAAAAAEAAACgMgAAVgcAAKr4//8BAAAAf39/AAEAAABkAAAAAAAAABQAAABAHwAAAAAAACYAAAAAAAAAwOD//wAAAAAmAAAAZAAAABYAAABMAAAAAAAAAAAAAAAEAAAAAAAAAAEAAADu7OEKAAAAACgAAAAoAAAAZAAAAGQAAAAAAAAAzMzMAAAAAABQAAAAUAAAAGQAAABkAAAAAAAAABcAAAAUAAAAAAAAAAAAAAD/fwAA/38AAAAAAAAJAAAABAAAAMXaymkMAAAAEAAAAAAAAAAAAAAAAAAAAAAAAAAeAAAAaAAAAAAAAAAAAAAAAAAAAAAAAAAAAAAAECcAABAnAAAAAAAAAAAAAAAAAAAAAAAAAAAAAAAAAAAAAAAAAAAAABQAAAAAAAAAwMD/AAAAAABkAAAAMgAAAAAAAABkAAAAAAAAAH9/fwAKAAAAHwAAAFQAAAD///8AAAAAAQAAAAAAAAAAAAAAAAAAAAAAAAAAAAAAAAAAAAAAAAAAAAAAAH9/fwAAAAADzMzMAMDA/wB/f38AAAAAAAAAAAAAAAAAAAAAAAAAAAAhAAAAGAAAABQAAABTGgAAAAAAAIEuAABJAwAAEAAAACYAAAAIAAAAPQ8AAAAAAAA="/>
               </a:ext>
             </a:extLst>
           </p:cNvSpPr>
@@ -405,7 +405,7 @@
             <a:spLocks noGrp="1" noChangeArrowheads="1"/>
             <a:extLst>
               <a:ext uri="smNativeData">
-                <pr:smNativeData xmlns="" xmlns:p14="http://schemas.microsoft.com/office/powerpoint/2010/main" xmlns:pr="smNativeData" val="SMDATA_13_aDXlXhMAAAAlAAAAZAAAAA0AAAAAAAAAAAAAAAAAAAAAAAAAAAAAAAACAAAAAAAAAAEAAABQAAAAAAAAAAAA4D8AAAAAAADgPwAAAAAAAOA/AAAAAAAA4D8AAAAAAADgPwAAAAAAAOA/AAAAAAAA4D8AAAAAAADgPwAAAAAAAOA/AAAAAAAA4D8CAAAAjAAAAAAAAAAAAAAA////AP///wgAAAAAAAAAAAAAAAAAAAAAAAAAAAAAAAAAAAAAeAAAAAEAAABAAAAAAAAAAAAAAABaAAAAAAAAAAAAAAAAAAAAAAAAAAAAAAAAAAAAAAAAAAAAAAAAAAAAAAAAAAAAAAAAAAAAAAAAAAAAAAAAAAAAAAAAAAAAAAAAAAAAFAAAADwAAAAAAAAAAAAAAAAAAAAPAAAAAQAAACMAAAAjAAAAIwAAAB4AAAAAAAAAZAAAAGQAAAAAAAAAZAAAAGQAAAAVAAAAYAAAAAAAAAAAAAAADwAAACADAAAAAAAAAAAAAAEAAACgMgAAVgcAAKr4//8BAAAAf39/AAEAAABkAAAAAAAAABQAAABAHwAAAAAAACYAAAAAAAAAwOD//wAAAAAmAAAAZAAAABYAAABMAAAAAAAAAAAAAAAEAAAAAAAAAAEAAADu7OEKAAAAACgAAAAoAAAAZAAAAGQAAAAAAAAAzMzMAAAAAABQAAAAUAAAAGQAAABkAAAAAAAAABcAAAAUAAAAAAAAAAAAAAD/fwAA/38AAAAAAAAJAAAABAAAALC4iAcMAAAAEAAAAAAAAAAAAAAAAAAAAAAAAAAeAAAAaAAAAAAAAAAAAAAAAAAAAAAAAAAAAAAAECcAABAnAAAAAAAAAAAAAAAAAAAAAAAAAAAAAAAAAAAAAAAAAAAAABQAAAAAAAAAwMD/AAAAAABkAAAAMgAAAAAAAABkAAAAAAAAAH9/fwAKAAAAHwAAAFQAAAD///8AAAAAAQAAAAAAAAAAAAAAAAAAAAAAAAAAAAAAAAAAAAAAAAAAAAAAAH9/fwAAAAADzMzMAMDA/wB/f38AAAAAAAAAAAAAAAAAAAAAAAAAAAAhAAAAGAAAABQAAAAAAAAAfD4AAC4UAADFQQAAEAAAACYAAAAIAAAAvQ8AAAAAAAA="/>
+                <pr:smNativeData xmlns:pr="smNativeData" xmlns:p14="http://schemas.microsoft.com/office/powerpoint/2010/main" xmlns="" val="SMDATA_13_aDXlXhMAAAAlAAAAZAAAAA0AAAAAAAAAAAAAAAAAAAAAAAAAAAAAAAACAAAAAAAAAAEAAABQAAAAAAAAAAAA4D8AAAAAAADgPwAAAAAAAOA/AAAAAAAA4D8AAAAAAADgPwAAAAAAAOA/AAAAAAAA4D8AAAAAAADgPwAAAAAAAOA/AAAAAAAA4D8CAAAAjAAAAAAAAAAAAAAA////AP///wgAAAAAAAAAAAAAAAAAAAAAAAAAAAAAAAAAAAAAeAAAAAEAAABAAAAAAAAAAAAAAABaAAAAAAAAAAAAAAAAAAAAAAAAAAAAAAAAAAAAAAAAAAAAAAAAAAAAAAAAAAAAAAAAAAAAAAAAAAAAAAAAAAAAAAAAAAAAAAAAAAAAFAAAADwAAAAAAAAAAAAAAAAAAAAPAAAAAQAAACMAAAAjAAAAIwAAAB4AAAAAAAAAZAAAAGQAAAAAAAAAZAAAAGQAAAAVAAAAYAAAAAAAAAAAAAAADwAAACADAAAAAAAAAAAAAAEAAACgMgAAVgcAAKr4//8BAAAAf39/AAEAAABkAAAAAAAAABQAAABAHwAAAAAAACYAAAAAAAAAwOD//wAAAAAmAAAAZAAAABYAAABMAAAAAAAAAAAAAAAEAAAAAAAAAAEAAADu7OEKAAAAACgAAAAoAAAAZAAAAGQAAAAAAAAAzMzMAAAAAABQAAAAUAAAAGQAAABkAAAAAAAAABcAAAAUAAAAAAAAAAAAAAD/fwAA/38AAAAAAAAJAAAABAAAALC4iAcMAAAAEAAAAAAAAAAAAAAAAAAAAAAAAAAeAAAAaAAAAAAAAAAAAAAAAAAAAAAAAAAAAAAAECcAABAnAAAAAAAAAAAAAAAAAAAAAAAAAAAAAAAAAAAAAAAAAAAAABQAAAAAAAAAwMD/AAAAAABkAAAAMgAAAAAAAABkAAAAAAAAAH9/fwAKAAAAHwAAAFQAAAD///8AAAAAAQAAAAAAAAAAAAAAAAAAAAAAAAAAAAAAAAAAAAAAAAAAAAAAAH9/fwAAAAADzMzMAMDA/wB/f38AAAAAAAAAAAAAAAAAAAAAAAAAAAAhAAAAGAAAABQAAAAAAAAAfD4AAC4UAADFQQAAEAAAACYAAAAIAAAAvQ8AAAAAAAA="/>
               </a:ext>
             </a:extLst>
           </p:cNvSpPr>
@@ -451,7 +451,7 @@
             <a:spLocks noGrp="1" noChangeArrowheads="1"/>
             <a:extLst>
               <a:ext uri="smNativeData">
-                <pr:smNativeData xmlns="" xmlns:p14="http://schemas.microsoft.com/office/powerpoint/2010/main" xmlns:pr="smNativeData" val="SMDATA_13_aDXlXhMAAAAlAAAAZAAAAA0AAAAAAAAAAAAAAAAAAAAAAAAAAAAAAAACAAAAAAAAAAEAAABQAAAAAAAAAAAA4D8AAAAAAADgPwAAAAAAAOA/AAAAAAAA4D8AAAAAAADgPwAAAAAAAOA/AAAAAAAA4D8AAAAAAADgPwAAAAAAAOA/AAAAAAAA4D8CAAAAjAAAAAAAAAAAAAAA////AP///wgAAAAAAAAAAAAAAAAAAAAAAAAAAAAAAAAAAAAAeAAAAAEAAABAAAAAAAAAAAAAAABaAAAAAAAAAAAAAAAAAAAAAAAAAAAAAAAAAAAAAAAAAAAAAAAAAAAAAAAAAAAAAAAAAAAAAAAAAAAAAAAAAAAAAAAAAAAAAAAAAAAAFAAAADwAAAAAAAAAAAAAAAAAAAAPAAAAAQAAACMAAAAjAAAAIwAAAB4AAAAAAAAAZAAAAGQAAAAAAAAAZAAAAGQAAAAVAAAAYAAAAAAAAAAAAAAADwAAACADAAAAAAAAAAAAAAEAAACgMgAAVgcAAKr4//8BAAAAf39/AAEAAABkAAAAAAAAABQAAABAHwAAAAAAACYAAAAAAAAAwOD//wAAAAAmAAAAZAAAABYAAABMAAAAAAAAAAAAAAAEAAAAAAAAAAEAAADu7OEKAAAAACgAAAAoAAAAZAAAAGQAAAAAAAAAzMzMAAAAAABQAAAAUAAAAGQAAABkAAAAAAAAABcAAAAUAAAAAAAAAAAAAAD/fwAA/38AAAAAAAAJAAAABAAAABKT4LgMAAAAEAAAAAAAAAAAAAAAAAAAAAAAAAAeAAAAaAAAAAAAAAAAAAAAAAAAAAAAAAAAAAAAECcAABAnAAAAAAAAAAAAAAAAAAAAAAAAAAAAAAAAAAAAAAAAAAAAABQAAAAAAAAAwMD/AAAAAABkAAAAMgAAAAAAAABkAAAAAAAAAH9/fwAKAAAAHwAAAFQAAAD///8AAAAAAQAAAAAAAAAAAAAAAAAAAAAAAAAAAAAAAAAAAAAAAAAAAAAAAH9/fwAAAAADzMzMAMDA/wB/f38AAAAAAAAAAAAAAAAAAAAAAAAAAAAhAAAAGAAAABQAAABTGgAAfD4AAIEuAADFQQAAEAAAACYAAAAIAAAAvQ8AAAAAAAA="/>
+                <pr:smNativeData xmlns:pr="smNativeData" xmlns:p14="http://schemas.microsoft.com/office/powerpoint/2010/main" xmlns="" val="SMDATA_13_aDXlXhMAAAAlAAAAZAAAAA0AAAAAAAAAAAAAAAAAAAAAAAAAAAAAAAACAAAAAAAAAAEAAABQAAAAAAAAAAAA4D8AAAAAAADgPwAAAAAAAOA/AAAAAAAA4D8AAAAAAADgPwAAAAAAAOA/AAAAAAAA4D8AAAAAAADgPwAAAAAAAOA/AAAAAAAA4D8CAAAAjAAAAAAAAAAAAAAA////AP///wgAAAAAAAAAAAAAAAAAAAAAAAAAAAAAAAAAAAAAeAAAAAEAAABAAAAAAAAAAAAAAABaAAAAAAAAAAAAAAAAAAAAAAAAAAAAAAAAAAAAAAAAAAAAAAAAAAAAAAAAAAAAAAAAAAAAAAAAAAAAAAAAAAAAAAAAAAAAAAAAAAAAFAAAADwAAAAAAAAAAAAAAAAAAAAPAAAAAQAAACMAAAAjAAAAIwAAAB4AAAAAAAAAZAAAAGQAAAAAAAAAZAAAAGQAAAAVAAAAYAAAAAAAAAAAAAAADwAAACADAAAAAAAAAAAAAAEAAACgMgAAVgcAAKr4//8BAAAAf39/AAEAAABkAAAAAAAAABQAAABAHwAAAAAAACYAAAAAAAAAwOD//wAAAAAmAAAAZAAAABYAAABMAAAAAAAAAAAAAAAEAAAAAAAAAAEAAADu7OEKAAAAACgAAAAoAAAAZAAAAGQAAAAAAAAAzMzMAAAAAABQAAAAUAAAAGQAAABkAAAAAAAAABcAAAAUAAAAAAAAAAAAAAD/fwAA/38AAAAAAAAJAAAABAAAABKT4LgMAAAAEAAAAAAAAAAAAAAAAAAAAAAAAAAeAAAAaAAAAAAAAAAAAAAAAAAAAAAAAAAAAAAAECcAABAnAAAAAAAAAAAAAAAAAAAAAAAAAAAAAAAAAAAAAAAAAAAAABQAAAAAAAAAwMD/AAAAAABkAAAAMgAAAAAAAABkAAAAAAAAAH9/fwAKAAAAHwAAAFQAAAD///8AAAAAAQAAAAAAAAAAAAAAAAAAAAAAAAAAAAAAAAAAAAAAAAAAAAAAAH9/fwAAAAADzMzMAMDA/wB/f38AAAAAAAAAAAAAAAAAAAAAAAAAAAAhAAAAGAAAABQAAABTGgAAfD4AAIEuAADFQQAAEAAAACYAAAAIAAAAvQ8AAAAAAAA="/>
               </a:ext>
             </a:extLst>
           </p:cNvSpPr>
@@ -734,7 +734,7 @@
             <a:spLocks noGrp="1" noChangeArrowheads="1"/>
             <a:extLst>
               <a:ext uri="smNativeData">
-                <pr:smNativeData xmlns="" xmlns:p14="http://schemas.microsoft.com/office/powerpoint/2010/main" xmlns:pr="smNativeData" val="SMDATA_13_aDXlXhMAAAAlAAAAZAAAAA0AAAAAAAAAAAAAAAAAAAAAAAAAAAAAAAAAAAAAAAAAAAEAAABQAAAAAAAAAAAA4D8AAAAAAADgPwAAAAAAAOA/AAAAAAAA4D8AAAAAAADgPwAAAAAAAOA/AAAAAAAA4D8AAAAAAADgPwAAAAAAAOA/AAAAAAAA4D8CAAAAjAAAAAAAAAAAAAAAT4G9DP///wgAAAAAAAAAAAAAAAAAAAAAAAAAAAAAAAAAAAAAZAAAAAEAAABAAAAAAAAAAAAAAAAAAAAAAAAAAAAAAAAAAAAAAAAAAAAAAAAAAAAAAAAAAAAAAAAAAAAAAAAAAAAAAAAAAAAAAAAAAAAAAAAAAAAAAAAAAAAAAAAAAAAAFAAAADwAAAAAAAAAAAAAAAAAAAkUAAAAAQAAABQAAAAUAAAAFAAAAAEAAAAAAAAAZAAAAGQAAAAAAAAAZAAAAGQAAAAVAAAAYAAAAAAAAAAAAAAADwAAACADAAAAAAAAAAAAAAEAAACgMgAAVgcAAKr4//8BAAAAf39/AAEAAABkAAAAAAAAABQAAABAHwAAAAAAACYAAAAAAAAAwOD//wAAAAAmAAAAZAAAABYAAABMAAAAAAAAAAAAAAAEAAAAAAAAAAEAAADu7OEKAAAAACgAAAAoAAAAZAAAAGQAAAAAAAAAzMzMAAAAAABQAAAAUAAAAGQAAABkAAAAAAAAABcAAAAUAAAAAAAAAAAAAAD/fwAA/38AAAAAAAAJAAAABAAAAAAAAAAMAAAAEAAAAAAAAAAAAAAAAAAAAAAAAAAeAAAAaAAAAAAAAAAAAAAAAAAAAAAAAAAAAAAAECcAABAnAAAAAAAAAAAAAAAAAAAAAAAAAAAAAAAAAAAAAAAAAAAAABQAAAAAAAAAwMD/AAAAAABkAAAAMgAAAAAAAABkAAAAAAAAAH9/fwAKAAAAHwAAAFQAAAAAAAAFAAAAAQAAAAAAAAAAAAAAAAAAAAAAAAAAAAAAAAAAAAAAAAAAAAAAAn9/fwAAAAADzMzMAMDA/wB/f38AAAAAAAAAAAAAAAAAAAAAAAAAAAAhAAAAGAAAABQAAAAvBAAA2xwAAKIlAAAuOAAAEAAAACYAAAAIAAAAPQ8AAAAAAAA="/>
+                <pr:smNativeData xmlns:pr="smNativeData" xmlns:p14="http://schemas.microsoft.com/office/powerpoint/2010/main" xmlns="" val="SMDATA_13_aDXlXhMAAAAlAAAAZAAAAA0AAAAAAAAAAAAAAAAAAAAAAAAAAAAAAAAAAAAAAAAAAAEAAABQAAAAAAAAAAAA4D8AAAAAAADgPwAAAAAAAOA/AAAAAAAA4D8AAAAAAADgPwAAAAAAAOA/AAAAAAAA4D8AAAAAAADgPwAAAAAAAOA/AAAAAAAA4D8CAAAAjAAAAAAAAAAAAAAAT4G9DP///wgAAAAAAAAAAAAAAAAAAAAAAAAAAAAAAAAAAAAAZAAAAAEAAABAAAAAAAAAAAAAAAAAAAAAAAAAAAAAAAAAAAAAAAAAAAAAAAAAAAAAAAAAAAAAAAAAAAAAAAAAAAAAAAAAAAAAAAAAAAAAAAAAAAAAAAAAAAAAAAAAAAAAFAAAADwAAAAAAAAAAAAAAAAAAAkUAAAAAQAAABQAAAAUAAAAFAAAAAEAAAAAAAAAZAAAAGQAAAAAAAAAZAAAAGQAAAAVAAAAYAAAAAAAAAAAAAAADwAAACADAAAAAAAAAAAAAAEAAACgMgAAVgcAAKr4//8BAAAAf39/AAEAAABkAAAAAAAAABQAAABAHwAAAAAAACYAAAAAAAAAwOD//wAAAAAmAAAAZAAAABYAAABMAAAAAAAAAAAAAAAEAAAAAAAAAAEAAADu7OEKAAAAACgAAAAoAAAAZAAAAGQAAAAAAAAAzMzMAAAAAABQAAAAUAAAAGQAAABkAAAAAAAAABcAAAAUAAAAAAAAAAAAAAD/fwAA/38AAAAAAAAJAAAABAAAAAAAAAAMAAAAEAAAAAAAAAAAAAAAAAAAAAAAAAAeAAAAaAAAAAAAAAAAAAAAAAAAAAAAAAAAAAAAECcAABAnAAAAAAAAAAAAAAAAAAAAAAAAAAAAAAAAAAAAAAAAAAAAABQAAAAAAAAAwMD/AAAAAABkAAAAMgAAAAAAAABkAAAAAAAAAH9/fwAKAAAAHwAAAFQAAAAAAAAFAAAAAQAAAAAAAAAAAAAAAAAAAAAAAAAAAAAAAAAAAAAAAAAAAAAAAn9/fwAAAAADzMzMAMDA/wB/f38AAAAAAAAAAAAAAAAAAAAAAAAAAAAhAAAAGAAAABQAAAAvBAAA2xwAAKIlAAAuOAAAEAAAACYAAAAIAAAAPQ8AAAAAAAA="/>
               </a:ext>
             </a:extLst>
           </p:cNvSpPr>
@@ -772,7 +772,7 @@
           <p:cNvSpPr>
             <a:extLst>
               <a:ext uri="smNativeData">
-                <pr:smNativeData xmlns="" xmlns:p14="http://schemas.microsoft.com/office/powerpoint/2010/main" xmlns:pr="smNativeData" val="SMDATA_13_aDXlXhMAAAAlAAAAZAAAAA0AAAAAjgAAAEcAAACOAAAARwAAAAAAAAACAAAAAAAAAAEAAABQAAAAAAAAAAAA4D8AAAAAAADgPwAAAAAAAOA/AAAAAAAA4D8AAAAAAADgPwAAAAAAAOA/AAAAAAAA4D8AAAAAAADgPwAAAAAAAOA/AAAAAAAA4D8CAAAAjAAAAAAAAAAAAAAAT4G9DP///wgAAAAAAAAAAAAAAAAAAAAAAAAAAAAAAAAAAAAAZAAAAAEAAABAAAAAAAAAAAAAAAAAAAAAAAAAAAAAAAAAAAAAAAAAAAAAAAAAAAAAAAAAAAAAAAAAAAAAAAAAAAAAAAAAAAAAAAAAAAAAAAAAAAAAAAAAAAAAAAAAAAAAFAAAADwAAAAAAAAAAAAAAAAAAAkUAAAAAQAAABQAAAAUAAAAFAAAAAEAAAAAAAAAZAAAAGQAAAAAAAAAZAAAAGQAAAAVAAAAYAAAAAAAAAAAAAAADwAAACADAAAAAAAAAAAAAAEAAACgMgAAVgcAAKr4//8BAAAAf39/AAEAAABkAAAAAAAAABQAAABAHwAAAAAAACYAAAAAAAAAwOD//wAAAAAmAAAAZAAAABYAAABMAAAAAAAAAAAAAAAEAAAAAAAAAAEAAADu7OEKAAAAACgAAAAoAAAAZAAAAGQAAAAAAAAAzMzMAAAAAABQAAAAUAAAAGQAAABkAAAAAAAAABcAAAAUAAAAAAAAAAAAAAD/fwAA/38AAAAAAAAJAAAABAAAAAAAAAAMAAAAEAAAAAAAAAAAAAAAAAAAAAAAAAAeAAAAaAAAAAAAAAAAAAAAAAAAAAAAAAAAAAAAECcAABAnAAAAAAAAAAAAAAAAAAAAAAAAAAAAAAAAAAAAAAAAAAAAABQAAAAAAAAAwMD/AAAAAABkAAAAMgAAAAAAAABkAAAAAAAAAH9/fwAKAAAAHwAAAFQAAAAAAAAFAAAAAQAAAAAAAAAAAAAAAAAAAAAAAAAAAAAAAAAAAAAAAAAAAAAAAn9/fwAAAAADzMzMAMDA/wB/f38AAAAAAAAAAAAAAAAAAAAAAAAAAAAhAAAAGAAAABQAAACvFwAAsTkAAM0pAAC6PAAAEAAAACYAAAAIAAAA//////////8="/>
+                <pr:smNativeData xmlns:pr="smNativeData" xmlns:p14="http://schemas.microsoft.com/office/powerpoint/2010/main" xmlns="" val="SMDATA_13_aDXlXhMAAAAlAAAAZAAAAA0AAAAAjgAAAEcAAACOAAAARwAAAAAAAAACAAAAAAAAAAEAAABQAAAAAAAAAAAA4D8AAAAAAADgPwAAAAAAAOA/AAAAAAAA4D8AAAAAAADgPwAAAAAAAOA/AAAAAAAA4D8AAAAAAADgPwAAAAAAAOA/AAAAAAAA4D8CAAAAjAAAAAAAAAAAAAAAT4G9DP///wgAAAAAAAAAAAAAAAAAAAAAAAAAAAAAAAAAAAAAZAAAAAEAAABAAAAAAAAAAAAAAAAAAAAAAAAAAAAAAAAAAAAAAAAAAAAAAAAAAAAAAAAAAAAAAAAAAAAAAAAAAAAAAAAAAAAAAAAAAAAAAAAAAAAAAAAAAAAAAAAAAAAAFAAAADwAAAAAAAAAAAAAAAAAAAkUAAAAAQAAABQAAAAUAAAAFAAAAAEAAAAAAAAAZAAAAGQAAAAAAAAAZAAAAGQAAAAVAAAAYAAAAAAAAAAAAAAADwAAACADAAAAAAAAAAAAAAEAAACgMgAAVgcAAKr4//8BAAAAf39/AAEAAABkAAAAAAAAABQAAABAHwAAAAAAACYAAAAAAAAAwOD//wAAAAAmAAAAZAAAABYAAABMAAAAAAAAAAAAAAAEAAAAAAAAAAEAAADu7OEKAAAAACgAAAAoAAAAZAAAAGQAAAAAAAAAzMzMAAAAAABQAAAAUAAAAGQAAABkAAAAAAAAABcAAAAUAAAAAAAAAAAAAAD/fwAA/38AAAAAAAAJAAAABAAAAAAAAAAMAAAAEAAAAAAAAAAAAAAAAAAAAAAAAAAeAAAAaAAAAAAAAAAAAAAAAAAAAAAAAAAAAAAAECcAABAnAAAAAAAAAAAAAAAAAAAAAAAAAAAAAAAAAAAAAAAAAAAAABQAAAAAAAAAwMD/AAAAAABkAAAAMgAAAAAAAABkAAAAAAAAAH9/fwAKAAAAHwAAAFQAAAAAAAAFAAAAAQAAAAAAAAAAAAAAAAAAAAAAAAAAAAAAAAAAAAAAAAAAAAAAAn9/fwAAAAADzMzMAMDA/wB/f38AAAAAAAAAAAAAAAAAAAAAAAAAAAAhAAAAGAAAABQAAACvFwAAsTkAAM0pAAC6PAAAEAAAACYAAAAIAAAA//////////8="/>
               </a:ext>
             </a:extLst>
           </p:cNvSpPr>
@@ -864,7 +864,7 @@
             <a:spLocks noGrp="1" noChangeArrowheads="1"/>
             <a:extLst>
               <a:ext uri="smNativeData">
-                <pr:smNativeData xmlns="" xmlns:p14="http://schemas.microsoft.com/office/powerpoint/2010/main" xmlns:pr="smNativeData" val="SMDATA_13_aDXlXhMAAAAlAAAAZAAAAA0AAAAAAAAAAAAAAAAAAAAAAAAAAAAAAAAAAAAAAAAAAAEAAABQAAAAAAAAAAAA4D8AAAAAAADgPwAAAAAAAOA/AAAAAAAA4D8AAAAAAADgPwAAAAAAAOA/AAAAAAAA4D8AAAAAAADgPwAAAAAAAOA/AAAAAAAA4D8CAAAAjAAAAAAAAAAAAAAAT4G9DP///wgAAAAAAAAAAAAAAAAAAAAAAAAAAAAAAAAAAAAAZAAAAAEAAABAAAAAAAAAAAAAAAAAAAAAAAAAAAAAAAAAAAAAAAAAAAAAAAAAAAAAAAAAAAAAAAAAAAAAAAAAAAAAAAAAAAAAAAAAAAAAAAAAAAAAAAAAAAAAAAAAAAAAFAAAADwAAAAAAAAAAAAAAAAAAAkUAAAAAQAAABQAAAAUAAAAFAAAAAEAAAAAAAAAZAAAAGQAAAAAAAAAZAAAAGQAAAAVAAAAYAAAAAAAAAAAAAAADwAAACADAAAAAAAAAAAAAAEAAACgMgAAVgcAAKr4//8BAAAAf39/AAEAAABkAAAAAAAAABQAAABAHwAAAAAAACYAAAAAAAAAwOD//wAAAAAmAAAAZAAAABYAAABMAAAAAAAAAAAAAAAEAAAAAAAAAAEAAADu7OEKAAAAACgAAAAoAAAAZAAAAGQAAAAAAAAAzMzMAAAAAABQAAAAUAAAAGQAAABkAAAAAAAAABcAAAAUAAAAAAAAAAAAAAD/fwAA/38AAAAAAAAJAAAABAAAAAAAAAAMAAAAEAAAAAAAAAAAAAAAAAAAAAAAAAAeAAAAaAAAAAAAAAAAAAAAAAAAAAAAAAAAAAAAECcAABAnAAAAAAAAAAAAAAAAAAAAAAAAAAAAAAAAAAAAAAAAAAAAABQAAAAAAAAAwMD/AAAAAABkAAAAMgAAAAAAAABkAAAAAAAAAH9/fwAKAAAAHwAAAFQAAAAAAAAFAAAAAQAAAAAAAAAAAAAAAAAAAAAAAAAAAAAAAAAAAAAAAAAAAAAAAn9/fwAAAAADzMzMAMDA/wB/f38AAAAAAAAAAAAAAAAAAAAAAAAAAAAhAAAAGAAAABQAAAAvBAAA2xwAAKIlAAAuOAAAEAAAACYAAAAIAAAAPQ8AAAAAAAA="/>
+                <pr:smNativeData xmlns:pr="smNativeData" xmlns:p14="http://schemas.microsoft.com/office/powerpoint/2010/main" xmlns="" val="SMDATA_13_aDXlXhMAAAAlAAAAZAAAAA0AAAAAAAAAAAAAAAAAAAAAAAAAAAAAAAAAAAAAAAAAAAEAAABQAAAAAAAAAAAA4D8AAAAAAADgPwAAAAAAAOA/AAAAAAAA4D8AAAAAAADgPwAAAAAAAOA/AAAAAAAA4D8AAAAAAADgPwAAAAAAAOA/AAAAAAAA4D8CAAAAjAAAAAAAAAAAAAAAT4G9DP///wgAAAAAAAAAAAAAAAAAAAAAAAAAAAAAAAAAAAAAZAAAAAEAAABAAAAAAAAAAAAAAAAAAAAAAAAAAAAAAAAAAAAAAAAAAAAAAAAAAAAAAAAAAAAAAAAAAAAAAAAAAAAAAAAAAAAAAAAAAAAAAAAAAAAAAAAAAAAAAAAAAAAAFAAAADwAAAAAAAAAAAAAAAAAAAkUAAAAAQAAABQAAAAUAAAAFAAAAAEAAAAAAAAAZAAAAGQAAAAAAAAAZAAAAGQAAAAVAAAAYAAAAAAAAAAAAAAADwAAACADAAAAAAAAAAAAAAEAAACgMgAAVgcAAKr4//8BAAAAf39/AAEAAABkAAAAAAAAABQAAABAHwAAAAAAACYAAAAAAAAAwOD//wAAAAAmAAAAZAAAABYAAABMAAAAAAAAAAAAAAAEAAAAAAAAAAEAAADu7OEKAAAAACgAAAAoAAAAZAAAAGQAAAAAAAAAzMzMAAAAAABQAAAAUAAAAGQAAABkAAAAAAAAABcAAAAUAAAAAAAAAAAAAAD/fwAA/38AAAAAAAAJAAAABAAAAAAAAAAMAAAAEAAAAAAAAAAAAAAAAAAAAAAAAAAeAAAAaAAAAAAAAAAAAAAAAAAAAAAAAAAAAAAAECcAABAnAAAAAAAAAAAAAAAAAAAAAAAAAAAAAAAAAAAAAAAAAAAAABQAAAAAAAAAwMD/AAAAAABkAAAAMgAAAAAAAABkAAAAAAAAAH9/fwAKAAAAHwAAAFQAAAAAAAAFAAAAAQAAAAAAAAAAAAAAAAAAAAAAAAAAAAAAAAAAAAAAAAAAAAAAAn9/fwAAAAADzMzMAMDA/wB/f38AAAAAAAAAAAAAAAAAAAAAAAAAAAAhAAAAGAAAABQAAAAvBAAA2xwAAKIlAAAuOAAAEAAAACYAAAAIAAAAPQ8AAAAAAAA="/>
               </a:ext>
             </a:extLst>
           </p:cNvSpPr>
@@ -902,7 +902,7 @@
           <p:cNvSpPr>
             <a:extLst>
               <a:ext uri="smNativeData">
-                <pr:smNativeData xmlns="" xmlns:p14="http://schemas.microsoft.com/office/powerpoint/2010/main" xmlns:pr="smNativeData" val="SMDATA_13_aDXlXhMAAAAlAAAAZAAAAA0AAAAAjgAAAEcAAACOAAAARwAAAAAAAAACAAAAAAAAAAEAAABQAAAAAAAAAAAA4D8AAAAAAADgPwAAAAAAAOA/AAAAAAAA4D8AAAAAAADgPwAAAAAAAOA/AAAAAAAA4D8AAAAAAADgPwAAAAAAAOA/AAAAAAAA4D8CAAAAjAAAAAAAAAAAAAAAT4G9DP///wgAAAAAAAAAAAAAAAAAAAAAAAAAAAAAAAAAAAAAZAAAAAEAAABAAAAAAAAAAAAAAAAAAAAAAAAAAAAAAAAAAAAAAAAAAAAAAAAAAAAAAAAAAAAAAAAAAAAAAAAAAAAAAAAAAAAAAAAAAAAAAAAAAAAAAAAAAAAAAAAAAAAAFAAAADwAAAAAAAAAAAAAAAAAAAkUAAAAAQAAABQAAAAUAAAAFAAAAAEAAAAAAAAAZAAAAGQAAAAAAAAAZAAAAGQAAAAVAAAAYAAAAAAAAAAAAAAADwAAACADAAAAAAAAAAAAAAEAAACgMgAAVgcAAKr4//8BAAAAf39/AAEAAABkAAAAAAAAABQAAABAHwAAAAAAACYAAAAAAAAAwOD//wAAAAAmAAAAZAAAABYAAABMAAAAAAAAAAAAAAAEAAAAAAAAAAEAAADu7OEKAAAAACgAAAAoAAAAZAAAAGQAAAAAAAAAzMzMAAAAAABQAAAAUAAAAGQAAABkAAAAAAAAABcAAAAUAAAAAAAAAAAAAAD/fwAA/38AAAAAAAAJAAAABAAAAAAAAAAMAAAAEAAAAAAAAAAAAAAAAAAAAAAAAAAeAAAAaAAAAAAAAAAAAAAAAAAAAAAAAAAAAAAAECcAABAnAAAAAAAAAAAAAAAAAAAAAAAAAAAAAAAAAAAAAAAAAAAAABQAAAAAAAAAwMD/AAAAAABkAAAAMgAAAAAAAABkAAAAAAAAAH9/fwAKAAAAHwAAAFQAAAAAAAAFAAAAAQAAAAAAAAAAAAAAAAAAAAAAAAAAAAAAAAAAAAAAAAAAAAAAAn9/fwAAAAADzMzMAMDA/wB/f38AAAAAAAAAAAAAAAAAAAAAAAAAAAAhAAAAGAAAABQAAACvFwAAsTkAAM0pAAC6PAAAEAAAACYAAAAIAAAA//////////8="/>
+                <pr:smNativeData xmlns:pr="smNativeData" xmlns:p14="http://schemas.microsoft.com/office/powerpoint/2010/main" xmlns="" val="SMDATA_13_aDXlXhMAAAAlAAAAZAAAAA0AAAAAjgAAAEcAAACOAAAARwAAAAAAAAACAAAAAAAAAAEAAABQAAAAAAAAAAAA4D8AAAAAAADgPwAAAAAAAOA/AAAAAAAA4D8AAAAAAADgPwAAAAAAAOA/AAAAAAAA4D8AAAAAAADgPwAAAAAAAOA/AAAAAAAA4D8CAAAAjAAAAAAAAAAAAAAAT4G9DP///wgAAAAAAAAAAAAAAAAAAAAAAAAAAAAAAAAAAAAAZAAAAAEAAABAAAAAAAAAAAAAAAAAAAAAAAAAAAAAAAAAAAAAAAAAAAAAAAAAAAAAAAAAAAAAAAAAAAAAAAAAAAAAAAAAAAAAAAAAAAAAAAAAAAAAAAAAAAAAAAAAAAAAFAAAADwAAAAAAAAAAAAAAAAAAAkUAAAAAQAAABQAAAAUAAAAFAAAAAEAAAAAAAAAZAAAAGQAAAAAAAAAZAAAAGQAAAAVAAAAYAAAAAAAAAAAAAAADwAAACADAAAAAAAAAAAAAAEAAACgMgAAVgcAAKr4//8BAAAAf39/AAEAAABkAAAAAAAAABQAAABAHwAAAAAAACYAAAAAAAAAwOD//wAAAAAmAAAAZAAAABYAAABMAAAAAAAAAAAAAAAEAAAAAAAAAAEAAADu7OEKAAAAACgAAAAoAAAAZAAAAGQAAAAAAAAAzMzMAAAAAABQAAAAUAAAAGQAAABkAAAAAAAAABcAAAAUAAAAAAAAAAAAAAD/fwAA/38AAAAAAAAJAAAABAAAAAAAAAAMAAAAEAAAAAAAAAAAAAAAAAAAAAAAAAAeAAAAaAAAAAAAAAAAAAAAAAAAAAAAAAAAAAAAECcAABAnAAAAAAAAAAAAAAAAAAAAAAAAAAAAAAAAAAAAAAAAAAAAABQAAAAAAAAAwMD/AAAAAABkAAAAMgAAAAAAAABkAAAAAAAAAH9/fwAKAAAAHwAAAFQAAAAAAAAFAAAAAQAAAAAAAAAAAAAAAAAAAAAAAAAAAAAAAAAAAAAAAAAAAAAAAn9/fwAAAAADzMzMAMDA/wB/f38AAAAAAAAAAAAAAAAAAAAAAAAAAAAhAAAAGAAAABQAAACvFwAAsTkAAM0pAAC6PAAAEAAAACYAAAAIAAAA//////////8="/>
               </a:ext>
             </a:extLst>
           </p:cNvSpPr>
@@ -999,7 +999,7 @@
             <a:spLocks noGrp="1" noChangeArrowheads="1"/>
             <a:extLst>
               <a:ext uri="smNativeData">
-                <pr:smNativeData xmlns="" xmlns:p14="http://schemas.microsoft.com/office/powerpoint/2010/main" xmlns:pr="smNativeData" val="SMDATA_13_aDXlXhMAAAAlAAAAZAAAAA0AAAAAAAAAAAAAAAAAAAAAAAAAAAAAAAAAAAAAAAAAAAEAAABQAAAAAAAAAAAA4D8AAAAAAADgPwAAAAAAAOA/AAAAAAAA4D8AAAAAAADgPwAAAAAAAOA/AAAAAAAA4D8AAAAAAADgPwAAAAAAAOA/AAAAAAAA4D8CAAAAjAAAAAAAAAAAAAAAT4G9DP///wgAAAAAAAAAAAAAAAAAAAAAAAAAAAAAAAAAAAAAZAAAAAEAAABAAAAAAAAAAAAAAAAAAAAAAAAAAAAAAAAAAAAAAAAAAAAAAAAAAAAAAAAAAAAAAAAAAAAAAAAAAAAAAAAAAAAAAAAAAAAAAAAAAAAAAAAAAAAAAAAAAAAAFAAAADwAAAAAAAAAAAAAAAAAAAkUAAAAAQAAABQAAAAUAAAAFAAAAAEAAAAAAAAAZAAAAGQAAAAAAAAAZAAAAGQAAAAVAAAAYAAAAAAAAAAAAAAADwAAACADAAAAAAAAAAAAAAEAAACgMgAAVgcAAKr4//8BAAAAf39/AAEAAABkAAAAAAAAABQAAABAHwAAAAAAACYAAAAAAAAAwOD//wAAAAAmAAAAZAAAABYAAABMAAAAAAAAAAAAAAAEAAAAAAAAAAEAAADu7OEKAAAAACgAAAAoAAAAZAAAAGQAAAAAAAAAzMzMAAAAAABQAAAAUAAAAGQAAABkAAAAAAAAABcAAAAUAAAAAAAAAAAAAAD/fwAA/38AAAAAAAAJAAAABAAAAAAAAAAMAAAAEAAAAAAAAAAAAAAAAAAAAAAAAAAeAAAAaAAAAAAAAAAAAAAAAAAAAAAAAAAAAAAAECcAABAnAAAAAAAAAAAAAAAAAAAAAAAAAAAAAAAAAAAAAAAAAAAAABQAAAAAAAAAwMD/AAAAAABkAAAAMgAAAAAAAABkAAAAAAAAAH9/fwAKAAAAHwAAAFQAAAAAAAAFAAAAAQAAAAAAAAAAAAAAAAAAAAAAAAAAAAAAAAAAAAAAAAAAAAAAAn9/fwAAAAADzMzMAMDA/wB/f38AAAAAAAAAAAAAAAAAAAAAAAAAAAAhAAAAGAAAABQAAAAvBAAA2xwAAKIlAAAuOAAAEAAAACYAAAAIAAAAPQ8AAAAAAAA="/>
+                <pr:smNativeData xmlns:pr="smNativeData" xmlns:p14="http://schemas.microsoft.com/office/powerpoint/2010/main" xmlns="" val="SMDATA_13_aDXlXhMAAAAlAAAAZAAAAA0AAAAAAAAAAAAAAAAAAAAAAAAAAAAAAAAAAAAAAAAAAAEAAABQAAAAAAAAAAAA4D8AAAAAAADgPwAAAAAAAOA/AAAAAAAA4D8AAAAAAADgPwAAAAAAAOA/AAAAAAAA4D8AAAAAAADgPwAAAAAAAOA/AAAAAAAA4D8CAAAAjAAAAAAAAAAAAAAAT4G9DP///wgAAAAAAAAAAAAAAAAAAAAAAAAAAAAAAAAAAAAAZAAAAAEAAABAAAAAAAAAAAAAAAAAAAAAAAAAAAAAAAAAAAAAAAAAAAAAAAAAAAAAAAAAAAAAAAAAAAAAAAAAAAAAAAAAAAAAAAAAAAAAAAAAAAAAAAAAAAAAAAAAAAAAFAAAADwAAAAAAAAAAAAAAAAAAAkUAAAAAQAAABQAAAAUAAAAFAAAAAEAAAAAAAAAZAAAAGQAAAAAAAAAZAAAAGQAAAAVAAAAYAAAAAAAAAAAAAAADwAAACADAAAAAAAAAAAAAAEAAACgMgAAVgcAAKr4//8BAAAAf39/AAEAAABkAAAAAAAAABQAAABAHwAAAAAAACYAAAAAAAAAwOD//wAAAAAmAAAAZAAAABYAAABMAAAAAAAAAAAAAAAEAAAAAAAAAAEAAADu7OEKAAAAACgAAAAoAAAAZAAAAGQAAAAAAAAAzMzMAAAAAABQAAAAUAAAAGQAAABkAAAAAAAAABcAAAAUAAAAAAAAAAAAAAD/fwAA/38AAAAAAAAJAAAABAAAAAAAAAAMAAAAEAAAAAAAAAAAAAAAAAAAAAAAAAAeAAAAaAAAAAAAAAAAAAAAAAAAAAAAAAAAAAAAECcAABAnAAAAAAAAAAAAAAAAAAAAAAAAAAAAAAAAAAAAAAAAAAAAABQAAAAAAAAAwMD/AAAAAABkAAAAMgAAAAAAAABkAAAAAAAAAH9/fwAKAAAAHwAAAFQAAAAAAAAFAAAAAQAAAAAAAAAAAAAAAAAAAAAAAAAAAAAAAAAAAAAAAAAAAAAAAn9/fwAAAAADzMzMAMDA/wB/f38AAAAAAAAAAAAAAAAAAAAAAAAAAAAhAAAAGAAAABQAAAAvBAAA2xwAAKIlAAAuOAAAEAAAACYAAAAIAAAAPQ8AAAAAAAA="/>
               </a:ext>
             </a:extLst>
           </p:cNvSpPr>
@@ -1037,7 +1037,7 @@
           <p:cNvSpPr>
             <a:extLst>
               <a:ext uri="smNativeData">
-                <pr:smNativeData xmlns="" xmlns:p14="http://schemas.microsoft.com/office/powerpoint/2010/main" xmlns:pr="smNativeData" val="SMDATA_13_aDXlXhMAAAAlAAAAZAAAAA0AAAAAjgAAAEcAAACOAAAARwAAAAAAAAACAAAAAAAAAAEAAABQAAAAAAAAAAAA4D8AAAAAAADgPwAAAAAAAOA/AAAAAAAA4D8AAAAAAADgPwAAAAAAAOA/AAAAAAAA4D8AAAAAAADgPwAAAAAAAOA/AAAAAAAA4D8CAAAAjAAAAAAAAAAAAAAAT4G9DP///wgAAAAAAAAAAAAAAAAAAAAAAAAAAAAAAAAAAAAAZAAAAAEAAABAAAAAAAAAAAAAAAAAAAAAAAAAAAAAAAAAAAAAAAAAAAAAAAAAAAAAAAAAAAAAAAAAAAAAAAAAAAAAAAAAAAAAAAAAAAAAAAAAAAAAAAAAAAAAAAAAAAAAFAAAADwAAAAAAAAAAAAAAAAAAAkUAAAAAQAAABQAAAAUAAAAFAAAAAEAAAAAAAAAZAAAAGQAAAAAAAAAZAAAAGQAAAAVAAAAYAAAAAAAAAAAAAAADwAAACADAAAAAAAAAAAAAAEAAACgMgAAVgcAAKr4//8BAAAAf39/AAEAAABkAAAAAAAAABQAAABAHwAAAAAAACYAAAAAAAAAwOD//wAAAAAmAAAAZAAAABYAAABMAAAAAAAAAAAAAAAEAAAAAAAAAAEAAADu7OEKAAAAACgAAAAoAAAAZAAAAGQAAAAAAAAAzMzMAAAAAABQAAAAUAAAAGQAAABkAAAAAAAAABcAAAAUAAAAAAAAAAAAAAD/fwAA/38AAAAAAAAJAAAABAAAAAAAAAAMAAAAEAAAAAAAAAAAAAAAAAAAAAAAAAAeAAAAaAAAAAAAAAAAAAAAAAAAAAAAAAAAAAAAECcAABAnAAAAAAAAAAAAAAAAAAAAAAAAAAAAAAAAAAAAAAAAAAAAABQAAAAAAAAAwMD/AAAAAABkAAAAMgAAAAAAAABkAAAAAAAAAH9/fwAKAAAAHwAAAFQAAAAAAAAFAAAAAQAAAAAAAAAAAAAAAAAAAAAAAAAAAAAAAAAAAAAAAAAAAAAAAn9/fwAAAAADzMzMAMDA/wB/f38AAAAAAAAAAAAAAAAAAAAAAAAAAAAhAAAAGAAAABQAAACvFwAAsTkAAM0pAAC6PAAAEAAAACYAAAAIAAAA//////////8="/>
+                <pr:smNativeData xmlns:pr="smNativeData" xmlns:p14="http://schemas.microsoft.com/office/powerpoint/2010/main" xmlns="" val="SMDATA_13_aDXlXhMAAAAlAAAAZAAAAA0AAAAAjgAAAEcAAACOAAAARwAAAAAAAAACAAAAAAAAAAEAAABQAAAAAAAAAAAA4D8AAAAAAADgPwAAAAAAAOA/AAAAAAAA4D8AAAAAAADgPwAAAAAAAOA/AAAAAAAA4D8AAAAAAADgPwAAAAAAAOA/AAAAAAAA4D8CAAAAjAAAAAAAAAAAAAAAT4G9DP///wgAAAAAAAAAAAAAAAAAAAAAAAAAAAAAAAAAAAAAZAAAAAEAAABAAAAAAAAAAAAAAAAAAAAAAAAAAAAAAAAAAAAAAAAAAAAAAAAAAAAAAAAAAAAAAAAAAAAAAAAAAAAAAAAAAAAAAAAAAAAAAAAAAAAAAAAAAAAAAAAAAAAAFAAAADwAAAAAAAAAAAAAAAAAAAkUAAAAAQAAABQAAAAUAAAAFAAAAAEAAAAAAAAAZAAAAGQAAAAAAAAAZAAAAGQAAAAVAAAAYAAAAAAAAAAAAAAADwAAACADAAAAAAAAAAAAAAEAAACgMgAAVgcAAKr4//8BAAAAf39/AAEAAABkAAAAAAAAABQAAABAHwAAAAAAACYAAAAAAAAAwOD//wAAAAAmAAAAZAAAABYAAABMAAAAAAAAAAAAAAAEAAAAAAAAAAEAAADu7OEKAAAAACgAAAAoAAAAZAAAAGQAAAAAAAAAzMzMAAAAAABQAAAAUAAAAGQAAABkAAAAAAAAABcAAAAUAAAAAAAAAAAAAAD/fwAA/38AAAAAAAAJAAAABAAAAAAAAAAMAAAAEAAAAAAAAAAAAAAAAAAAAAAAAAAeAAAAaAAAAAAAAAAAAAAAAAAAAAAAAAAAAAAAECcAABAnAAAAAAAAAAAAAAAAAAAAAAAAAAAAAAAAAAAAAAAAAAAAABQAAAAAAAAAwMD/AAAAAABkAAAAMgAAAAAAAABkAAAAAAAAAH9/fwAKAAAAHwAAAFQAAAAAAAAFAAAAAQAAAAAAAAAAAAAAAAAAAAAAAAAAAAAAAAAAAAAAAAAAAAAAAn9/fwAAAAADzMzMAMDA/wB/f38AAAAAAAAAAAAAAAAAAAAAAAAAAAAhAAAAGAAAABQAAACvFwAAsTkAAM0pAAC6PAAAEAAAACYAAAAIAAAA//////////8="/>
               </a:ext>
             </a:extLst>
           </p:cNvSpPr>
@@ -1129,7 +1129,7 @@
             <a:spLocks noGrp="1" noChangeArrowheads="1"/>
             <a:extLst>
               <a:ext uri="smNativeData">
-                <pr:smNativeData xmlns="" xmlns:p14="http://schemas.microsoft.com/office/powerpoint/2010/main" xmlns:pr="smNativeData" val="SMDATA_13_aDXlXhMAAAAlAAAAZAAAAA0AAAAAAAAAAAAAAAAAAAAAAAAAAAAAAAAAAAAAAAAAAAEAAABQAAAAAAAAAAAA4D8AAAAAAADgPwAAAAAAAOA/AAAAAAAA4D8AAAAAAADgPwAAAAAAAOA/AAAAAAAA4D8AAAAAAADgPwAAAAAAAOA/AAAAAAAA4D8CAAAAjAAAAAAAAAAAAAAAT4G9DP///wgAAAAAAAAAAAAAAAAAAAAAAAAAAAAAAAAAAAAAZAAAAAEAAABAAAAAAAAAAAAAAAAAAAAAAAAAAAAAAAAAAAAAAAAAAAAAAAAAAAAAAAAAAAAAAAAAAAAAAAAAAAAAAAAAAAAAAAAAAAAAAAAAAAAAAAAAAAAAAAAAAAAAFAAAADwAAAAAAAAAAAAAAAAAAAkUAAAAAQAAABQAAAAUAAAAFAAAAAEAAAAAAAAAZAAAAGQAAAAAAAAAZAAAAGQAAAAVAAAAYAAAAAAAAAAAAAAADwAAACADAAAAAAAAAAAAAAEAAACgMgAAVgcAAKr4//8BAAAAf39/AAEAAABkAAAAAAAAABQAAABAHwAAAAAAACYAAAAAAAAAwOD//wAAAAAmAAAAZAAAABYAAABMAAAAAAAAAAAAAAAEAAAAAAAAAAEAAADu7OEKAAAAACgAAAAoAAAAZAAAAGQAAAAAAAAAzMzMAAAAAABQAAAAUAAAAGQAAABkAAAAAAAAABcAAAAUAAAAAAAAAAAAAAD/fwAA/38AAAAAAAAJAAAABAAAAAAAAAAMAAAAEAAAAAAAAAAAAAAAAAAAAAAAAAAeAAAAaAAAAAAAAAAAAAAAAAAAAAAAAAAAAAAAECcAABAnAAAAAAAAAAAAAAAAAAAAAAAAAAAAAAAAAAAAAAAAAAAAABQAAAAAAAAAwMD/AAAAAABkAAAAMgAAAAAAAABkAAAAAAAAAH9/fwAKAAAAHwAAAFQAAAAAAAAFAAAAAQAAAAAAAAAAAAAAAAAAAAAAAAAAAAAAAAAAAAAAAAAAAAAAAn9/fwAAAAADzMzMAMDA/wB/f38AAAAAAAAAAAAAAAAAAAAAAAAAAAAhAAAAGAAAABQAAAAvBAAA2xwAAKIlAAAuOAAAEAAAACYAAAAIAAAAPQ8AAAAAAAA="/>
+                <pr:smNativeData xmlns:pr="smNativeData" xmlns:p14="http://schemas.microsoft.com/office/powerpoint/2010/main" xmlns="" val="SMDATA_13_aDXlXhMAAAAlAAAAZAAAAA0AAAAAAAAAAAAAAAAAAAAAAAAAAAAAAAAAAAAAAAAAAAEAAABQAAAAAAAAAAAA4D8AAAAAAADgPwAAAAAAAOA/AAAAAAAA4D8AAAAAAADgPwAAAAAAAOA/AAAAAAAA4D8AAAAAAADgPwAAAAAAAOA/AAAAAAAA4D8CAAAAjAAAAAAAAAAAAAAAT4G9DP///wgAAAAAAAAAAAAAAAAAAAAAAAAAAAAAAAAAAAAAZAAAAAEAAABAAAAAAAAAAAAAAAAAAAAAAAAAAAAAAAAAAAAAAAAAAAAAAAAAAAAAAAAAAAAAAAAAAAAAAAAAAAAAAAAAAAAAAAAAAAAAAAAAAAAAAAAAAAAAAAAAAAAAFAAAADwAAAAAAAAAAAAAAAAAAAkUAAAAAQAAABQAAAAUAAAAFAAAAAEAAAAAAAAAZAAAAGQAAAAAAAAAZAAAAGQAAAAVAAAAYAAAAAAAAAAAAAAADwAAACADAAAAAAAAAAAAAAEAAACgMgAAVgcAAKr4//8BAAAAf39/AAEAAABkAAAAAAAAABQAAABAHwAAAAAAACYAAAAAAAAAwOD//wAAAAAmAAAAZAAAABYAAABMAAAAAAAAAAAAAAAEAAAAAAAAAAEAAADu7OEKAAAAACgAAAAoAAAAZAAAAGQAAAAAAAAAzMzMAAAAAABQAAAAUAAAAGQAAABkAAAAAAAAABcAAAAUAAAAAAAAAAAAAAD/fwAA/38AAAAAAAAJAAAABAAAAAAAAAAMAAAAEAAAAAAAAAAAAAAAAAAAAAAAAAAeAAAAaAAAAAAAAAAAAAAAAAAAAAAAAAAAAAAAECcAABAnAAAAAAAAAAAAAAAAAAAAAAAAAAAAAAAAAAAAAAAAAAAAABQAAAAAAAAAwMD/AAAAAABkAAAAMgAAAAAAAABkAAAAAAAAAH9/fwAKAAAAHwAAAFQAAAAAAAAFAAAAAQAAAAAAAAAAAAAAAAAAAAAAAAAAAAAAAAAAAAAAAAAAAAAAAn9/fwAAAAADzMzMAMDA/wB/f38AAAAAAAAAAAAAAAAAAAAAAAAAAAAhAAAAGAAAABQAAAAvBAAA2xwAAKIlAAAuOAAAEAAAACYAAAAIAAAAPQ8AAAAAAAA="/>
               </a:ext>
             </a:extLst>
           </p:cNvSpPr>
@@ -1167,7 +1167,7 @@
           <p:cNvSpPr>
             <a:extLst>
               <a:ext uri="smNativeData">
-                <pr:smNativeData xmlns="" xmlns:p14="http://schemas.microsoft.com/office/powerpoint/2010/main" xmlns:pr="smNativeData" val="SMDATA_13_aDXlXhMAAAAlAAAAZAAAAA0AAAAAjgAAAEcAAACOAAAARwAAAAAAAAACAAAAAAAAAAEAAABQAAAAAAAAAAAA4D8AAAAAAADgPwAAAAAAAOA/AAAAAAAA4D8AAAAAAADgPwAAAAAAAOA/AAAAAAAA4D8AAAAAAADgPwAAAAAAAOA/AAAAAAAA4D8CAAAAjAAAAAAAAAAAAAAAT4G9DP///wgAAAAAAAAAAAAAAAAAAAAAAAAAAAAAAAAAAAAAZAAAAAEAAABAAAAAAAAAAAAAAAAAAAAAAAAAAAAAAAAAAAAAAAAAAAAAAAAAAAAAAAAAAAAAAAAAAAAAAAAAAAAAAAAAAAAAAAAAAAAAAAAAAAAAAAAAAAAAAAAAAAAAFAAAADwAAAAAAAAAAAAAAAAAAAkUAAAAAQAAABQAAAAUAAAAFAAAAAEAAAAAAAAAZAAAAGQAAAAAAAAAZAAAAGQAAAAVAAAAYAAAAAAAAAAAAAAADwAAACADAAAAAAAAAAAAAAEAAACgMgAAVgcAAKr4//8BAAAAf39/AAEAAABkAAAAAAAAABQAAABAHwAAAAAAACYAAAAAAAAAwOD//wAAAAAmAAAAZAAAABYAAABMAAAAAAAAAAAAAAAEAAAAAAAAAAEAAADu7OEKAAAAACgAAAAoAAAAZAAAAGQAAAAAAAAAzMzMAAAAAABQAAAAUAAAAGQAAABkAAAAAAAAABcAAAAUAAAAAAAAAAAAAAD/fwAA/38AAAAAAAAJAAAABAAAAAAAAAAMAAAAEAAAAAAAAAAAAAAAAAAAAAAAAAAeAAAAaAAAAAAAAAAAAAAAAAAAAAAAAAAAAAAAECcAABAnAAAAAAAAAAAAAAAAAAAAAAAAAAAAAAAAAAAAAAAAAAAAABQAAAAAAAAAwMD/AAAAAABkAAAAMgAAAAAAAABkAAAAAAAAAH9/fwAKAAAAHwAAAFQAAAAAAAAFAAAAAQAAAAAAAAAAAAAAAAAAAAAAAAAAAAAAAAAAAAAAAAAAAAAAAn9/fwAAAAADzMzMAMDA/wB/f38AAAAAAAAAAAAAAAAAAAAAAAAAAAAhAAAAGAAAABQAAACvFwAAsTkAAM0pAAC6PAAAEAAAACYAAAAIAAAA//////////8="/>
+                <pr:smNativeData xmlns:pr="smNativeData" xmlns:p14="http://schemas.microsoft.com/office/powerpoint/2010/main" xmlns="" val="SMDATA_13_aDXlXhMAAAAlAAAAZAAAAA0AAAAAjgAAAEcAAACOAAAARwAAAAAAAAACAAAAAAAAAAEAAABQAAAAAAAAAAAA4D8AAAAAAADgPwAAAAAAAOA/AAAAAAAA4D8AAAAAAADgPwAAAAAAAOA/AAAAAAAA4D8AAAAAAADgPwAAAAAAAOA/AAAAAAAA4D8CAAAAjAAAAAAAAAAAAAAAT4G9DP///wgAAAAAAAAAAAAAAAAAAAAAAAAAAAAAAAAAAAAAZAAAAAEAAABAAAAAAAAAAAAAAAAAAAAAAAAAAAAAAAAAAAAAAAAAAAAAAAAAAAAAAAAAAAAAAAAAAAAAAAAAAAAAAAAAAAAAAAAAAAAAAAAAAAAAAAAAAAAAAAAAAAAAFAAAADwAAAAAAAAAAAAAAAAAAAkUAAAAAQAAABQAAAAUAAAAFAAAAAEAAAAAAAAAZAAAAGQAAAAAAAAAZAAAAGQAAAAVAAAAYAAAAAAAAAAAAAAADwAAACADAAAAAAAAAAAAAAEAAACgMgAAVgcAAKr4//8BAAAAf39/AAEAAABkAAAAAAAAABQAAABAHwAAAAAAACYAAAAAAAAAwOD//wAAAAAmAAAAZAAAABYAAABMAAAAAAAAAAAAAAAEAAAAAAAAAAEAAADu7OEKAAAAACgAAAAoAAAAZAAAAGQAAAAAAAAAzMzMAAAAAABQAAAAUAAAAGQAAABkAAAAAAAAABcAAAAUAAAAAAAAAAAAAAD/fwAA/38AAAAAAAAJAAAABAAAAAAAAAAMAAAAEAAAAAAAAAAAAAAAAAAAAAAAAAAeAAAAaAAAAAAAAAAAAAAAAAAAAAAAAAAAAAAAECcAABAnAAAAAAAAAAAAAAAAAAAAAAAAAAAAAAAAAAAAAAAAAAAAABQAAAAAAAAAwMD/AAAAAABkAAAAMgAAAAAAAABkAAAAAAAAAH9/fwAKAAAAHwAAAFQAAAAAAAAFAAAAAQAAAAAAAAAAAAAAAAAAAAAAAAAAAAAAAAAAAAAAAAAAAAAAAn9/fwAAAAADzMzMAMDA/wB/f38AAAAAAAAAAAAAAAAAAAAAAAAAAAAhAAAAGAAAABQAAACvFwAAsTkAAM0pAAC6PAAAEAAAACYAAAAIAAAA//////////8="/>
               </a:ext>
             </a:extLst>
           </p:cNvSpPr>
@@ -1281,7 +1281,7 @@
             <a:spLocks noGrp="1" noChangeArrowheads="1"/>
             <a:extLst>
               <a:ext uri="smNativeData">
-                <pr:smNativeData xmlns="" xmlns:p14="http://schemas.microsoft.com/office/powerpoint/2010/main" xmlns:pr="smNativeData" val="SMDATA_13_aDXlXhMAAAAlAAAAZAAAAA0AAAAAAAAAAAAAAAAAAAAAAAAAAAAAAAABAAAAAAAAAAEAAABQAAAAAAAAAAAA4D8AAAAAAADgPwAAAAAAAOA/AAAAAAAA4D8AAAAAAADgPwAAAAAAAOA/AAAAAAAA4D8AAAAAAADgPwAAAAAAAOA/AAAAAAAA4D8CAAAAjAAAAAAAAAAAAAAA////AP///wgAAAAAAAAAAAAAAAAAAAAAAAAAAAAAAAAAAAAAeAAAAAEAAABAAAAAAAAAAAAAAABaAAAAAAAAAAAAAAAAAAAAAAAAAAAAAAAAAAAAAAAAAAAAAAAAAAAAAAAAAAAAAAAAAAAAAAAAAAAAAAAAAAAAAAAAAAAAAAAAAAAAFAAAADwAAAAAAAAAAAAAAAAAAAAPAAAAAQAAACMAAAAjAAAAIwAAAB4AAAAAAAAAZAAAAGQAAAAAAAAAZAAAAGQAAAAVAAAAYAAAAAAAAAAAAAAADwAAACADAAAAAAAAAAAAAAEAAACgMgAAVgcAAKr4//8BAAAAf39/AAEAAABkAAAAAAAAABQAAABAHwAAAAAAACYAAAAAAAAAwOD//wAAAAAmAAAAZAAAABYAAABMAAAAAAAAAAAAAAAEAAAAAAAAAAEAAADu7OEKAAAAACgAAAAoAAAAZAAAAGQAAAAAAAAAzMzMAAAAAABQAAAAUAAAAGQAAABkAAAAAAAAABcAAAAUAAAAAAAAAAAAAAD/fwAA/38AAAAAAAAJAAAABAAAAAAAAAAMAAAAEAAAAAAAAAAAAAAAAAAAAAAAAAAeAAAAaAAAAAAAAAAAAAAAAAAAAAAAAAAAAAAAECcAABAnAAAAAAAAAAAAAAAAAAAAAAAAAAAAAAAAAAAAAAAAAAAAABQAAAAAAAAAwMD/AAAAAABkAAAAMgAAAAAAAABkAAAAAAAAAH9/fwAKAAAAHwAAAFQAAAD///8AAAAAAQAAAAAAAAAAAAAAAAAAAAAAAAAAAAAAAAAAAAAAAAAAAAAAAH9/fwAAAAADzMzMAMDA/wB/f38AAAAAAAAAAAAAAAAAAAAAAAAAAAAhAAAAGAAAABQAAADQAgAArwEAAG81AAC6CAAAEAAAACYAAAAIAAAAPAAAAAAAAAA="/>
+                <pr:smNativeData xmlns:pr="smNativeData" xmlns:p14="http://schemas.microsoft.com/office/powerpoint/2010/main" xmlns="" val="SMDATA_13_aDXlXhMAAAAlAAAAZAAAAA0AAAAAAAAAAAAAAAAAAAAAAAAAAAAAAAABAAAAAAAAAAEAAABQAAAAAAAAAAAA4D8AAAAAAADgPwAAAAAAAOA/AAAAAAAA4D8AAAAAAADgPwAAAAAAAOA/AAAAAAAA4D8AAAAAAADgPwAAAAAAAOA/AAAAAAAA4D8CAAAAjAAAAAAAAAAAAAAA////AP///wgAAAAAAAAAAAAAAAAAAAAAAAAAAAAAAAAAAAAAeAAAAAEAAABAAAAAAAAAAAAAAABaAAAAAAAAAAAAAAAAAAAAAAAAAAAAAAAAAAAAAAAAAAAAAAAAAAAAAAAAAAAAAAAAAAAAAAAAAAAAAAAAAAAAAAAAAAAAAAAAAAAAFAAAADwAAAAAAAAAAAAAAAAAAAAPAAAAAQAAACMAAAAjAAAAIwAAAB4AAAAAAAAAZAAAAGQAAAAAAAAAZAAAAGQAAAAVAAAAYAAAAAAAAAAAAAAADwAAACADAAAAAAAAAAAAAAEAAACgMgAAVgcAAKr4//8BAAAAf39/AAEAAABkAAAAAAAAABQAAABAHwAAAAAAACYAAAAAAAAAwOD//wAAAAAmAAAAZAAAABYAAABMAAAAAAAAAAAAAAAEAAAAAAAAAAEAAADu7OEKAAAAACgAAAAoAAAAZAAAAGQAAAAAAAAAzMzMAAAAAABQAAAAUAAAAGQAAABkAAAAAAAAABcAAAAUAAAAAAAAAAAAAAD/fwAA/38AAAAAAAAJAAAABAAAAAAAAAAMAAAAEAAAAAAAAAAAAAAAAAAAAAAAAAAeAAAAaAAAAAAAAAAAAAAAAAAAAAAAAAAAAAAAECcAABAnAAAAAAAAAAAAAAAAAAAAAAAAAAAAAAAAAAAAAAAAAAAAABQAAAAAAAAAwMD/AAAAAABkAAAAMgAAAAAAAABkAAAAAAAAAH9/fwAKAAAAHwAAAFQAAAD///8AAAAAAQAAAAAAAAAAAAAAAAAAAAAAAAAAAAAAAAAAAAAAAAAAAAAAAH9/fwAAAAADzMzMAMDA/wB/f38AAAAAAAAAAAAAAAAAAAAAAAAAAAAhAAAAGAAAABQAAADQAgAArwEAAG81AAC6CAAAEAAAACYAAAAIAAAAPAAAAAAAAAA="/>
               </a:ext>
             </a:extLst>
           </p:cNvSpPr>
@@ -1312,7 +1312,7 @@
             <a:spLocks noGrp="1" noChangeArrowheads="1"/>
             <a:extLst>
               <a:ext uri="smNativeData">
-                <pr:smNativeData xmlns="" xmlns:p14="http://schemas.microsoft.com/office/powerpoint/2010/main" xmlns:pr="smNativeData" val="SMDATA_13_aDXlXhMAAAAlAAAAZAAAAA0AAAAAAAAAAAAAAAAAAAAAAAAAAAAAAAAAAAAAAAAAAAEAAABQAAAAAAAAAAAA4D8AAAAAAADgPwAAAAAAAOA/AAAAAAAA4D8AAAAAAADgPwAAAAAAAOA/AAAAAAAA4D8AAAAAAADgPwAAAAAAAOA/AAAAAAAA4D8CAAAAjAAAAAAAAAAAAAAA////AP///wgAAAAAAAAAAAAAAAAAAAAAAAAAAAAAAAAAAAAAeAAAAAEAAABAAAAAAAAAAAAAAABaAAAAAAAAAAAAAAAAAAAAAAAAAAAAAAAAAAAAAAAAAAAAAAAAAAAAAAAAAAAAAAAAAAAAAAAAAAAAAAAAAAAAAAAAAAAAAAAAAAAAFAAAADwAAAAAAAAAAAAAAAAAAAAPAAAAAQAAACMAAAAjAAAAIwAAAB4AAAAAAAAAZAAAAGQAAAAAAAAAZAAAAGQAAAAVAAAAYAAAAAAAAAAAAAAADwAAACADAAAAAAAAAAAAAAEAAACgMgAAVgcAAKr4//8BAAAAf39/AAEAAABkAAAAAAAAABQAAABAHwAAAAAAACYAAAAAAAAAwOD//wAAAAAmAAAAZAAAABYAAABMAAAAAAAAAAAAAAAEAAAAAAAAAAEAAADu7OEKAAAAACgAAAAoAAAAZAAAAGQAAAAAAAAAzMzMAAAAAABQAAAAUAAAAGQAAABkAAAAAAAAABcAAAAUAAAAAAAAAAAAAAD/fwAA/38AAAAAAAAJAAAABAAAAAAAAAAMAAAAEAAAAAAAAAAAAAAAAAAAAAAAAAAeAAAAaAAAAAAAAAAAAAAAAAAAAAAAAAAAAAAAECcAABAnAAAAAAAAAAAAAAAAAAAAAAAAAAAAAAAAAAAAAAAAAAAAABQAAAAAAAAAwMD/AAAAAABkAAAAMgAAAAAAAABkAAAAAAAAAH9/fwAKAAAAHwAAAFQAAAD///8AAAAAAQAAAAAAAAAAAAAAAAAAAAAAAAAAAAAAAAAAAAAAAAAAAAAAAH9/fwAAAAADzMzMAMDA/wB/f38AAAAAAAAAAAAAAAAAAAAAAAAAAAAhAAAAGAAAABQAAADQAgAA3wkAAG81AACKFQAAEAAAACYAAAAIAAAAPQAAAAAAAAA="/>
+                <pr:smNativeData xmlns:pr="smNativeData" xmlns:p14="http://schemas.microsoft.com/office/powerpoint/2010/main" xmlns="" val="SMDATA_13_aDXlXhMAAAAlAAAAZAAAAA0AAAAAAAAAAAAAAAAAAAAAAAAAAAAAAAAAAAAAAAAAAAEAAABQAAAAAAAAAAAA4D8AAAAAAADgPwAAAAAAAOA/AAAAAAAA4D8AAAAAAADgPwAAAAAAAOA/AAAAAAAA4D8AAAAAAADgPwAAAAAAAOA/AAAAAAAA4D8CAAAAjAAAAAAAAAAAAAAA////AP///wgAAAAAAAAAAAAAAAAAAAAAAAAAAAAAAAAAAAAAeAAAAAEAAABAAAAAAAAAAAAAAABaAAAAAAAAAAAAAAAAAAAAAAAAAAAAAAAAAAAAAAAAAAAAAAAAAAAAAAAAAAAAAAAAAAAAAAAAAAAAAAAAAAAAAAAAAAAAAAAAAAAAFAAAADwAAAAAAAAAAAAAAAAAAAAPAAAAAQAAACMAAAAjAAAAIwAAAB4AAAAAAAAAZAAAAGQAAAAAAAAAZAAAAGQAAAAVAAAAYAAAAAAAAAAAAAAADwAAACADAAAAAAAAAAAAAAEAAACgMgAAVgcAAKr4//8BAAAAf39/AAEAAABkAAAAAAAAABQAAABAHwAAAAAAACYAAAAAAAAAwOD//wAAAAAmAAAAZAAAABYAAABMAAAAAAAAAAAAAAAEAAAAAAAAAAEAAADu7OEKAAAAACgAAAAoAAAAZAAAAGQAAAAAAAAAzMzMAAAAAABQAAAAUAAAAGQAAABkAAAAAAAAABcAAAAUAAAAAAAAAAAAAAD/fwAA/38AAAAAAAAJAAAABAAAAAAAAAAMAAAAEAAAAAAAAAAAAAAAAAAAAAAAAAAeAAAAaAAAAAAAAAAAAAAAAAAAAAAAAAAAAAAAECcAABAnAAAAAAAAAAAAAAAAAAAAAAAAAAAAAAAAAAAAAAAAAAAAABQAAAAAAAAAwMD/AAAAAABkAAAAMgAAAAAAAABkAAAAAAAAAH9/fwAKAAAAHwAAAFQAAAD///8AAAAAAQAAAAAAAAAAAAAAAAAAAAAAAAAAAAAAAAAAAAAAAAAAAAAAAH9/fwAAAAADzMzMAMDA/wB/f38AAAAAAAAAAAAAAAAAAAAAAAAAAAAhAAAAGAAAABQAAADQAgAA3wkAAG81AACKFQAAEAAAACYAAAAIAAAAPQAAAAAAAAA="/>
               </a:ext>
             </a:extLst>
           </p:cNvSpPr>
@@ -1348,7 +1348,7 @@
             <a:spLocks noGrp="1" noChangeArrowheads="1"/>
             <a:extLst>
               <a:ext uri="smNativeData">
-                <pr:smNativeData xmlns="" xmlns:p14="http://schemas.microsoft.com/office/powerpoint/2010/main" xmlns:pr="smNativeData" val="SMDATA_13_aDXlXhMAAAAlAAAAZAAAAA0AAAAAAAAAAAAAAAAAAAAAAAAAAAAAAAAAAAAAAAAAAAEAAABQAAAAAAAAAAAA4D8AAAAAAADgPwAAAAAAAOA/AAAAAAAA4D8AAAAAAADgPwAAAAAAAOA/AAAAAAAA4D8AAAAAAADgPwAAAAAAAOA/AAAAAAAA4D8CAAAAjAAAAAAAAAAAAAAA////AP///wgAAAAAAAAAAAAAAAAAAAAAAAAAAAAAAAAAAAAAeAAAAAEAAABAAAAAAAAAAAAAAABaAAAAAAAAAAAAAAAAAAAAAAAAAAAAAAAAAAAAAAAAAAAAAAAAAAAAAAAAAAAAAAAAAAAAAAAAAAAAAAAAAAAAAAAAAAAAAAAAAAAAFAAAADwAAAAAAAAAAAAAAAAAAAAPAAAAAQAAACMAAAAjAAAAIwAAAB4AAAAAAAAAZAAAAGQAAAAAAAAAZAAAAGQAAAAVAAAAYAAAAAAAAAAAAAAADwAAACADAAAAAAAAAAAAAAEAAACgMgAAVgcAAKr4//8BAAAAf39/AAEAAABkAAAAAAAAABQAAABAHwAAAAAAACYAAAAAAAAAwOD//wAAAAAmAAAAZAAAABYAAABMAAAAAAAAAAAAAAAEAAAAAAAAAAEAAADu7OEKAAAAACgAAAAoAAAAZAAAAGQAAAAAAAAAzMzMAAAAAABQAAAAUAAAAGQAAABkAAAAAAAAABcAAAAUAAAAAAAAAAAAAAD/fwAA/38AAAAAAAAJAAAABAAAAAAAAAAMAAAAEAAAAAAAAAAAAAAAAAAAAAAAAAAeAAAAaAAAAAAAAAAAAAAAAAAAAAAAAAAAAAAAECcAABAnAAAAAAAAAAAAAAAAAAAAAAAAAAAAAAAAAAAAAAAAAAAAABQAAAAAAAAAwMD/AAAAAABkAAAAMgAAAAAAAABkAAAAAAAAAH9/fwAKAAAAHwAAAFQAAAD///8AAAAAAQAAAAAAAAAAAAAAAAAAAAAAAAAAAAAAAAAAAAAAAAAAAAAAAH9/fwAAAAADzMzMAMDA/wB/f38AAAAAAAAAAAAAAAAAAAAAAAAAAAAhAAAAGAAAABQAAADQAgAApxYAAG81AABSIgAAEAAAACYAAAAIAAAAPQAAAAAAAAA="/>
+                <pr:smNativeData xmlns:pr="smNativeData" xmlns:p14="http://schemas.microsoft.com/office/powerpoint/2010/main" xmlns="" val="SMDATA_13_aDXlXhMAAAAlAAAAZAAAAA0AAAAAAAAAAAAAAAAAAAAAAAAAAAAAAAAAAAAAAAAAAAEAAABQAAAAAAAAAAAA4D8AAAAAAADgPwAAAAAAAOA/AAAAAAAA4D8AAAAAAADgPwAAAAAAAOA/AAAAAAAA4D8AAAAAAADgPwAAAAAAAOA/AAAAAAAA4D8CAAAAjAAAAAAAAAAAAAAA////AP///wgAAAAAAAAAAAAAAAAAAAAAAAAAAAAAAAAAAAAAeAAAAAEAAABAAAAAAAAAAAAAAABaAAAAAAAAAAAAAAAAAAAAAAAAAAAAAAAAAAAAAAAAAAAAAAAAAAAAAAAAAAAAAAAAAAAAAAAAAAAAAAAAAAAAAAAAAAAAAAAAAAAAFAAAADwAAAAAAAAAAAAAAAAAAAAPAAAAAQAAACMAAAAjAAAAIwAAAB4AAAAAAAAAZAAAAGQAAAAAAAAAZAAAAGQAAAAVAAAAYAAAAAAAAAAAAAAADwAAACADAAAAAAAAAAAAAAEAAACgMgAAVgcAAKr4//8BAAAAf39/AAEAAABkAAAAAAAAABQAAABAHwAAAAAAACYAAAAAAAAAwOD//wAAAAAmAAAAZAAAABYAAABMAAAAAAAAAAAAAAAEAAAAAAAAAAEAAADu7OEKAAAAACgAAAAoAAAAZAAAAGQAAAAAAAAAzMzMAAAAAABQAAAAUAAAAGQAAABkAAAAAAAAABcAAAAUAAAAAAAAAAAAAAD/fwAA/38AAAAAAAAJAAAABAAAAAAAAAAMAAAAEAAAAAAAAAAAAAAAAAAAAAAAAAAeAAAAaAAAAAAAAAAAAAAAAAAAAAAAAAAAAAAAECcAABAnAAAAAAAAAAAAAAAAAAAAAAAAAAAAAAAAAAAAAAAAAAAAABQAAAAAAAAAwMD/AAAAAABkAAAAMgAAAAAAAABkAAAAAAAAAH9/fwAKAAAAHwAAAFQAAAD///8AAAAAAQAAAAAAAAAAAAAAAAAAAAAAAAAAAAAAAAAAAAAAAAAAAAAAAH9/fwAAAAADzMzMAMDA/wB/f38AAAAAAAAAAAAAAAAAAAAAAAAAAAAhAAAAGAAAABQAAADQAgAApxYAAG81AABSIgAAEAAAACYAAAAIAAAAPQAAAAAAAAA="/>
               </a:ext>
             </a:extLst>
           </p:cNvSpPr>
@@ -1409,7 +1409,7 @@
             <a:spLocks noGrp="1" noChangeArrowheads="1"/>
             <a:extLst>
               <a:ext uri="smNativeData">
-                <pr:smNativeData xmlns="" xmlns:p14="http://schemas.microsoft.com/office/powerpoint/2010/main" xmlns:pr="smNativeData" val="SMDATA_13_aDXlXhMAAAAlAAAAZAAAAA0AAAAAAAAAAAAAAAAAAAAAAAAAAAAAAAABAAAAAAAAAAEAAABQAAAAAAAAAAAA4D8AAAAAAADgPwAAAAAAAOA/AAAAAAAA4D8AAAAAAADgPwAAAAAAAOA/AAAAAAAA4D8AAAAAAADgPwAAAAAAAOA/AAAAAAAA4D8CAAAAjAAAAAAAAAAAAAAA////AP///wgAAAAAAAAAAAAAAAAAAAAAAAAAAAAAAAAAAAAAeAAAAAEAAABAAAAAAAAAAAAAAABaAAAAAAAAAAAAAAAAAAAAAAAAAAAAAAAAAAAAAAAAAAAAAAAAAAAAAAAAAAAAAAAAAAAAAAAAAAAAAAAAAAAAAAAAAAAAAAAAAAAAFAAAADwAAAAAAAAAAAAAAAAAAAAPAAAAAQAAACMAAAAjAAAAIwAAAB4AAAAAAAAAZAAAAGQAAAAAAAAAZAAAAGQAAAAVAAAAYAAAAAAAAAAAAAAADwAAACADAAAAAAAAAAAAAAEAAACgMgAAVgcAAKr4//8BAAAAf39/AAEAAABkAAAAAAAAABQAAABAHwAAAAAAACYAAAAAAAAAwOD//wAAAAAmAAAAZAAAABYAAABMAAAAAAAAAAAAAAAEAAAAAAAAAAEAAADu7OEKAAAAACgAAAAoAAAAZAAAAGQAAAAAAAAAzMzMAAAAAABQAAAAUAAAAGQAAABkAAAAAAAAABcAAAAUAAAAAAAAAAAAAAD/fwAA/38AAAAAAAAJAAAABAAAAAAAAAAMAAAAEAAAAAAAAAAAAAAAAAAAAAAAAAAeAAAAaAAAAAAAAAAAAAAAAAAAAAAAAAAAAAAAECcAABAnAAAAAAAAAAAAAAAAAAAAAAAAAAAAAAAAAAAAAAAAAAAAABQAAAAAAAAAwMD/AAAAAABkAAAAMgAAAAAAAABkAAAAAAAAAH9/fwAKAAAAHwAAAFQAAAD///8AAAAAAQAAAAAAAAAAAAAAAAAAAAAAAAAAAAAAAAAAAAAAAAAAAAAAAH9/fwAAAAADzMzMAMDA/wB/f38AAAAAAAAAAAAAAAAAAAAAAAAAAAAhAAAAGAAAABQAAADQAgAArwEAAG81AAC6CAAAEAAAACYAAAAIAAAAPAAAAAAAAAA="/>
+                <pr:smNativeData xmlns:pr="smNativeData" xmlns:p14="http://schemas.microsoft.com/office/powerpoint/2010/main" xmlns="" val="SMDATA_13_aDXlXhMAAAAlAAAAZAAAAA0AAAAAAAAAAAAAAAAAAAAAAAAAAAAAAAABAAAAAAAAAAEAAABQAAAAAAAAAAAA4D8AAAAAAADgPwAAAAAAAOA/AAAAAAAA4D8AAAAAAADgPwAAAAAAAOA/AAAAAAAA4D8AAAAAAADgPwAAAAAAAOA/AAAAAAAA4D8CAAAAjAAAAAAAAAAAAAAA////AP///wgAAAAAAAAAAAAAAAAAAAAAAAAAAAAAAAAAAAAAeAAAAAEAAABAAAAAAAAAAAAAAABaAAAAAAAAAAAAAAAAAAAAAAAAAAAAAAAAAAAAAAAAAAAAAAAAAAAAAAAAAAAAAAAAAAAAAAAAAAAAAAAAAAAAAAAAAAAAAAAAAAAAFAAAADwAAAAAAAAAAAAAAAAAAAAPAAAAAQAAACMAAAAjAAAAIwAAAB4AAAAAAAAAZAAAAGQAAAAAAAAAZAAAAGQAAAAVAAAAYAAAAAAAAAAAAAAADwAAACADAAAAAAAAAAAAAAEAAACgMgAAVgcAAKr4//8BAAAAf39/AAEAAABkAAAAAAAAABQAAABAHwAAAAAAACYAAAAAAAAAwOD//wAAAAAmAAAAZAAAABYAAABMAAAAAAAAAAAAAAAEAAAAAAAAAAEAAADu7OEKAAAAACgAAAAoAAAAZAAAAGQAAAAAAAAAzMzMAAAAAABQAAAAUAAAAGQAAABkAAAAAAAAABcAAAAUAAAAAAAAAAAAAAD/fwAA/38AAAAAAAAJAAAABAAAAAAAAAAMAAAAEAAAAAAAAAAAAAAAAAAAAAAAAAAeAAAAaAAAAAAAAAAAAAAAAAAAAAAAAAAAAAAAECcAABAnAAAAAAAAAAAAAAAAAAAAAAAAAAAAAAAAAAAAAAAAAAAAABQAAAAAAAAAwMD/AAAAAABkAAAAMgAAAAAAAABkAAAAAAAAAH9/fwAKAAAAHwAAAFQAAAD///8AAAAAAQAAAAAAAAAAAAAAAAAAAAAAAAAAAAAAAAAAAAAAAAAAAAAAAH9/fwAAAAADzMzMAMDA/wB/f38AAAAAAAAAAAAAAAAAAAAAAAAAAAAhAAAAGAAAABQAAADQAgAArwEAAG81AAC6CAAAEAAAACYAAAAIAAAAPAAAAAAAAAA="/>
               </a:ext>
             </a:extLst>
           </p:cNvSpPr>
@@ -1440,7 +1440,7 @@
             <a:spLocks noGrp="1" noChangeArrowheads="1"/>
             <a:extLst>
               <a:ext uri="smNativeData">
-                <pr:smNativeData xmlns="" xmlns:p14="http://schemas.microsoft.com/office/powerpoint/2010/main" xmlns:pr="smNativeData" val="SMDATA_13_aDXlXhMAAAAlAAAAZAAAAA0AAAAAAAAAAAAAAAAAAAAAAAAAAAAAAAAAAAAAAAAAAAEAAABQAAAAAAAAAAAA4D8AAAAAAADgPwAAAAAAAOA/AAAAAAAA4D8AAAAAAADgPwAAAAAAAOA/AAAAAAAA4D8AAAAAAADgPwAAAAAAAOA/AAAAAAAA4D8CAAAAjAAAAAAAAAAAAAAA////AP///wgAAAAAAAAAAAAAAAAAAAAAAAAAAAAAAAAAAAAAeAAAAAEAAABAAAAAAAAAAAAAAABaAAAAAAAAAAAAAAAAAAAAAAAAAAAAAAAAAAAAAAAAAAAAAAAAAAAAAAAAAAAAAAAAAAAAAAAAAAAAAAAAAAAAAAAAAAAAAAAAAAAAFAAAADwAAAAAAAAAAAAAAAAAAAAPAAAAAQAAACMAAAAjAAAAIwAAAB4AAAAAAAAAZAAAAGQAAAAAAAAAZAAAAGQAAAAVAAAAYAAAAAAAAAAAAAAADwAAACADAAAAAAAAAAAAAAEAAACgMgAAVgcAAKr4//8BAAAAf39/AAEAAABkAAAAAAAAABQAAABAHwAAAAAAACYAAAAAAAAAwOD//wAAAAAmAAAAZAAAABYAAABMAAAAAAAAAAAAAAAEAAAAAAAAAAEAAADu7OEKAAAAACgAAAAoAAAAZAAAAGQAAAAAAAAAzMzMAAAAAABQAAAAUAAAAGQAAABkAAAAAAAAABcAAAAUAAAAAAAAAAAAAAD/fwAA/38AAAAAAAAJAAAABAAAAAAAAAAMAAAAEAAAAAAAAAAAAAAAAAAAAAAAAAAeAAAAaAAAAAAAAAAAAAAAAAAAAAAAAAAAAAAAECcAABAnAAAAAAAAAAAAAAAAAAAAAAAAAAAAAAAAAAAAAAAAAAAAABQAAAAAAAAAwMD/AAAAAABkAAAAMgAAAAAAAABkAAAAAAAAAH9/fwAKAAAAHwAAAFQAAAD///8AAAAAAQAAAAAAAAAAAAAAAAAAAAAAAAAAAAAAAAAAAAAAAAAAAAAAAH9/fwAAAAADzMzMAMDA/wB/f38AAAAAAAAAAAAAAAAAAAAAAAAAAAAhAAAAGAAAABQAAADQAgAA3wkAAIQbAACKFQAAEAAAACYAAAAIAAAAPQAAAAAAAAA="/>
+                <pr:smNativeData xmlns:pr="smNativeData" xmlns:p14="http://schemas.microsoft.com/office/powerpoint/2010/main" xmlns="" val="SMDATA_13_aDXlXhMAAAAlAAAAZAAAAA0AAAAAAAAAAAAAAAAAAAAAAAAAAAAAAAAAAAAAAAAAAAEAAABQAAAAAAAAAAAA4D8AAAAAAADgPwAAAAAAAOA/AAAAAAAA4D8AAAAAAADgPwAAAAAAAOA/AAAAAAAA4D8AAAAAAADgPwAAAAAAAOA/AAAAAAAA4D8CAAAAjAAAAAAAAAAAAAAA////AP///wgAAAAAAAAAAAAAAAAAAAAAAAAAAAAAAAAAAAAAeAAAAAEAAABAAAAAAAAAAAAAAABaAAAAAAAAAAAAAAAAAAAAAAAAAAAAAAAAAAAAAAAAAAAAAAAAAAAAAAAAAAAAAAAAAAAAAAAAAAAAAAAAAAAAAAAAAAAAAAAAAAAAFAAAADwAAAAAAAAAAAAAAAAAAAAPAAAAAQAAACMAAAAjAAAAIwAAAB4AAAAAAAAAZAAAAGQAAAAAAAAAZAAAAGQAAAAVAAAAYAAAAAAAAAAAAAAADwAAACADAAAAAAAAAAAAAAEAAACgMgAAVgcAAKr4//8BAAAAf39/AAEAAABkAAAAAAAAABQAAABAHwAAAAAAACYAAAAAAAAAwOD//wAAAAAmAAAAZAAAABYAAABMAAAAAAAAAAAAAAAEAAAAAAAAAAEAAADu7OEKAAAAACgAAAAoAAAAZAAAAGQAAAAAAAAAzMzMAAAAAABQAAAAUAAAAGQAAABkAAAAAAAAABcAAAAUAAAAAAAAAAAAAAD/fwAA/38AAAAAAAAJAAAABAAAAAAAAAAMAAAAEAAAAAAAAAAAAAAAAAAAAAAAAAAeAAAAaAAAAAAAAAAAAAAAAAAAAAAAAAAAAAAAECcAABAnAAAAAAAAAAAAAAAAAAAAAAAAAAAAAAAAAAAAAAAAAAAAABQAAAAAAAAAwMD/AAAAAABkAAAAMgAAAAAAAABkAAAAAAAAAH9/fwAKAAAAHwAAAFQAAAD///8AAAAAAQAAAAAAAAAAAAAAAAAAAAAAAAAAAAAAAAAAAAAAAAAAAAAAAH9/fwAAAAADzMzMAMDA/wB/f38AAAAAAAAAAAAAAAAAAAAAAAAAAAAhAAAAGAAAABQAAADQAgAA3wkAAIQbAACKFQAAEAAAACYAAAAIAAAAPQAAAAAAAAA="/>
               </a:ext>
             </a:extLst>
           </p:cNvSpPr>
@@ -1476,7 +1476,7 @@
             <a:spLocks noGrp="1" noChangeArrowheads="1"/>
             <a:extLst>
               <a:ext uri="smNativeData">
-                <pr:smNativeData xmlns="" xmlns:p14="http://schemas.microsoft.com/office/powerpoint/2010/main" xmlns:pr="smNativeData" val="SMDATA_13_aDXlXhMAAAAlAAAAZAAAAA0AAAAAAAAAAAAAAAAAAAAAAAAAAAAAAAAAAAAAAAAAAAEAAABQAAAAAAAAAAAA4D8AAAAAAADgPwAAAAAAAOA/AAAAAAAA4D8AAAAAAADgPwAAAAAAAOA/AAAAAAAA4D8AAAAAAADgPwAAAAAAAOA/AAAAAAAA4D8CAAAAjAAAAAAAAAAAAAAA////AP///wgAAAAAAAAAAAAAAAAAAAAAAAAAAAAAAAAAAAAAeAAAAAEAAABAAAAAAAAAAAAAAABaAAAAAAAAAAAAAAAAAAAAAAAAAAAAAAAAAAAAAAAAAAAAAAAAAAAAAAAAAAAAAAAAAAAAAAAAAAAAAAAAAAAAAAAAAAAAAAAAAAAAFAAAADwAAAAAAAAAAAAAAAAAAAAPAAAAAQAAACMAAAAjAAAAIwAAAB4AAAAAAAAAZAAAAGQAAAAAAAAAZAAAAGQAAAAVAAAAYAAAAAAAAAAAAAAADwAAACADAAAAAAAAAAAAAAEAAACgMgAAVgcAAKr4//8BAAAAf39/AAEAAABkAAAAAAAAABQAAABAHwAAAAAAACYAAAAAAAAAwOD//wAAAAAmAAAAZAAAABYAAABMAAAAAAAAAAAAAAAEAAAAAAAAAAEAAADu7OEKAAAAACgAAAAoAAAAZAAAAGQAAAAAAAAAzMzMAAAAAABQAAAAUAAAAGQAAABkAAAAAAAAABcAAAAUAAAAAAAAAAAAAAD/fwAA/38AAAAAAAAJAAAABAAAAAAAAAAMAAAAEAAAAAAAAAAAAAAAAAAAAAAAAAAeAAAAaAAAAAAAAAAAAAAAAAAAAAAAAAAAAAAAECcAABAnAAAAAAAAAAAAAAAAAAAAAAAAAAAAAAAAAAAAAAAAAAAAABQAAAAAAAAAwMD/AAAAAABkAAAAMgAAAAAAAABkAAAAAAAAAH9/fwAKAAAAHwAAAFQAAAD///8AAAAAAQAAAAAAAAAAAAAAAAAAAAAAAAAAAAAAAAAAAAAAAAAAAAAAAH9/fwAAAAADzMzMAMDA/wB/f38AAAAAAAAAAAAAAAAAAAAAAAAAAAAhAAAAGAAAABQAAADBHAAA3wkAAHU1AACKFQAAEAAAACYAAAAIAAAAPQAAAAAAAAA="/>
+                <pr:smNativeData xmlns:pr="smNativeData" xmlns:p14="http://schemas.microsoft.com/office/powerpoint/2010/main" xmlns="" val="SMDATA_13_aDXlXhMAAAAlAAAAZAAAAA0AAAAAAAAAAAAAAAAAAAAAAAAAAAAAAAAAAAAAAAAAAAEAAABQAAAAAAAAAAAA4D8AAAAAAADgPwAAAAAAAOA/AAAAAAAA4D8AAAAAAADgPwAAAAAAAOA/AAAAAAAA4D8AAAAAAADgPwAAAAAAAOA/AAAAAAAA4D8CAAAAjAAAAAAAAAAAAAAA////AP///wgAAAAAAAAAAAAAAAAAAAAAAAAAAAAAAAAAAAAAeAAAAAEAAABAAAAAAAAAAAAAAABaAAAAAAAAAAAAAAAAAAAAAAAAAAAAAAAAAAAAAAAAAAAAAAAAAAAAAAAAAAAAAAAAAAAAAAAAAAAAAAAAAAAAAAAAAAAAAAAAAAAAFAAAADwAAAAAAAAAAAAAAAAAAAAPAAAAAQAAACMAAAAjAAAAIwAAAB4AAAAAAAAAZAAAAGQAAAAAAAAAZAAAAGQAAAAVAAAAYAAAAAAAAAAAAAAADwAAACADAAAAAAAAAAAAAAEAAACgMgAAVgcAAKr4//8BAAAAf39/AAEAAABkAAAAAAAAABQAAABAHwAAAAAAACYAAAAAAAAAwOD//wAAAAAmAAAAZAAAABYAAABMAAAAAAAAAAAAAAAEAAAAAAAAAAEAAADu7OEKAAAAACgAAAAoAAAAZAAAAGQAAAAAAAAAzMzMAAAAAABQAAAAUAAAAGQAAABkAAAAAAAAABcAAAAUAAAAAAAAAAAAAAD/fwAA/38AAAAAAAAJAAAABAAAAAAAAAAMAAAAEAAAAAAAAAAAAAAAAAAAAAAAAAAeAAAAaAAAAAAAAAAAAAAAAAAAAAAAAAAAAAAAECcAABAnAAAAAAAAAAAAAAAAAAAAAAAAAAAAAAAAAAAAAAAAAAAAABQAAAAAAAAAwMD/AAAAAABkAAAAMgAAAAAAAABkAAAAAAAAAH9/fwAKAAAAHwAAAFQAAAD///8AAAAAAQAAAAAAAAAAAAAAAAAAAAAAAAAAAAAAAAAAAAAAAAAAAAAAAH9/fwAAAAADzMzMAMDA/wB/f38AAAAAAAAAAAAAAAAAAAAAAAAAAAAhAAAAGAAAABQAAADBHAAA3wkAAHU1AACKFQAAEAAAACYAAAAIAAAAPQAAAAAAAAA="/>
               </a:ext>
             </a:extLst>
           </p:cNvSpPr>
@@ -1512,7 +1512,7 @@
             <a:spLocks noGrp="1" noChangeArrowheads="1"/>
             <a:extLst>
               <a:ext uri="smNativeData">
-                <pr:smNativeData xmlns="" xmlns:p14="http://schemas.microsoft.com/office/powerpoint/2010/main" xmlns:pr="smNativeData" val="SMDATA_13_aDXlXhMAAAAlAAAAZAAAAA0AAAAAAAAAAAAAAAAAAAAAAAAAAAAAAAAAAAAAAAAAAAEAAABQAAAAAAAAAAAA4D8AAAAAAADgPwAAAAAAAOA/AAAAAAAA4D8AAAAAAADgPwAAAAAAAOA/AAAAAAAA4D8AAAAAAADgPwAAAAAAAOA/AAAAAAAA4D8CAAAAjAAAAAAAAAAAAAAA////AP///wgAAAAAAAAAAAAAAAAAAAAAAAAAAAAAAAAAAAAAeAAAAAEAAABAAAAAAAAAAAAAAABaAAAAAAAAAAAAAAAAAAAAAAAAAAAAAAAAAAAAAAAAAAAAAAAAAAAAAAAAAAAAAAAAAAAAAAAAAAAAAAAAAAAAAAAAAAAAAAAAAAAAFAAAADwAAAAAAAAAAAAAAAAAAAAPAAAAAQAAACMAAAAjAAAAIwAAAB4AAAAAAAAAZAAAAGQAAAAAAAAAZAAAAGQAAAAVAAAAYAAAAAAAAAAAAAAADwAAACADAAAAAAAAAAAAAAEAAACgMgAAVgcAAKr4//8BAAAAf39/AAEAAABkAAAAAAAAABQAAABAHwAAAAAAACYAAAAAAAAAwOD//wAAAAAmAAAAZAAAABYAAABMAAAAAAAAAAAAAAAEAAAAAAAAAAEAAADu7OEKAAAAACgAAAAoAAAAZAAAAGQAAAAAAAAAzMzMAAAAAABQAAAAUAAAAGQAAABkAAAAAAAAABcAAAAUAAAAAAAAAAAAAAD/fwAA/38AAAAAAAAJAAAABAAAAAAAAAAMAAAAEAAAAAAAAAAAAAAAAAAAAAAAAAAeAAAAaAAAAAAAAAAAAAAAAAAAAAAAAAAAAAAAECcAABAnAAAAAAAAAAAAAAAAAAAAAAAAAAAAAAAAAAAAAAAAAAAAABQAAAAAAAAAwMD/AAAAAABkAAAAMgAAAAAAAABkAAAAAAAAAH9/fwAKAAAAHwAAAFQAAAD///8AAAAAAQAAAAAAAAAAAAAAAAAAAAAAAAAAAAAAAAAAAAAAAAAAAAAAAH9/fwAAAAADzMzMAMDA/wB/f38AAAAAAAAAAAAAAAAAAAAAAAAAAAAhAAAAGAAAABQAAADBHAAApxYAAHU1AABSIgAAEAAAACYAAAAIAAAAPQAAAAAAAAA="/>
+                <pr:smNativeData xmlns:pr="smNativeData" xmlns:p14="http://schemas.microsoft.com/office/powerpoint/2010/main" xmlns="" val="SMDATA_13_aDXlXhMAAAAlAAAAZAAAAA0AAAAAAAAAAAAAAAAAAAAAAAAAAAAAAAAAAAAAAAAAAAEAAABQAAAAAAAAAAAA4D8AAAAAAADgPwAAAAAAAOA/AAAAAAAA4D8AAAAAAADgPwAAAAAAAOA/AAAAAAAA4D8AAAAAAADgPwAAAAAAAOA/AAAAAAAA4D8CAAAAjAAAAAAAAAAAAAAA////AP///wgAAAAAAAAAAAAAAAAAAAAAAAAAAAAAAAAAAAAAeAAAAAEAAABAAAAAAAAAAAAAAABaAAAAAAAAAAAAAAAAAAAAAAAAAAAAAAAAAAAAAAAAAAAAAAAAAAAAAAAAAAAAAAAAAAAAAAAAAAAAAAAAAAAAAAAAAAAAAAAAAAAAFAAAADwAAAAAAAAAAAAAAAAAAAAPAAAAAQAAACMAAAAjAAAAIwAAAB4AAAAAAAAAZAAAAGQAAAAAAAAAZAAAAGQAAAAVAAAAYAAAAAAAAAAAAAAADwAAACADAAAAAAAAAAAAAAEAAACgMgAAVgcAAKr4//8BAAAAf39/AAEAAABkAAAAAAAAABQAAABAHwAAAAAAACYAAAAAAAAAwOD//wAAAAAmAAAAZAAAABYAAABMAAAAAAAAAAAAAAAEAAAAAAAAAAEAAADu7OEKAAAAACgAAAAoAAAAZAAAAGQAAAAAAAAAzMzMAAAAAABQAAAAUAAAAGQAAABkAAAAAAAAABcAAAAUAAAAAAAAAAAAAAD/fwAA/38AAAAAAAAJAAAABAAAAAAAAAAMAAAAEAAAAAAAAAAAAAAAAAAAAAAAAAAeAAAAaAAAAAAAAAAAAAAAAAAAAAAAAAAAAAAAECcAABAnAAAAAAAAAAAAAAAAAAAAAAAAAAAAAAAAAAAAAAAAAAAAABQAAAAAAAAAwMD/AAAAAABkAAAAMgAAAAAAAABkAAAAAAAAAH9/fwAKAAAAHwAAAFQAAAD///8AAAAAAQAAAAAAAAAAAAAAAAAAAAAAAAAAAAAAAAAAAAAAAAAAAAAAAH9/fwAAAAADzMzMAMDA/wB/f38AAAAAAAAAAAAAAAAAAAAAAAAAAAAhAAAAGAAAABQAAADBHAAApxYAAHU1AABSIgAAEAAAACYAAAAIAAAAPQAAAAAAAAA="/>
               </a:ext>
             </a:extLst>
           </p:cNvSpPr>
@@ -1548,7 +1548,7 @@
             <a:spLocks noGrp="1" noChangeArrowheads="1"/>
             <a:extLst>
               <a:ext uri="smNativeData">
-                <pr:smNativeData xmlns="" xmlns:p14="http://schemas.microsoft.com/office/powerpoint/2010/main" xmlns:pr="smNativeData" val="SMDATA_13_aDXlXhMAAAAlAAAAZAAAAA0AAAAAAAAAAAAAAAAAAAAAAAAAAAAAAAAAAAAAAAAAAAEAAABQAAAAAAAAAAAA4D8AAAAAAADgPwAAAAAAAOA/AAAAAAAA4D8AAAAAAADgPwAAAAAAAOA/AAAAAAAA4D8AAAAAAADgPwAAAAAAAOA/AAAAAAAA4D8CAAAAjAAAAAAAAAAAAAAA////AP///wgAAAAAAAAAAAAAAAAAAAAAAAAAAAAAAAAAAAAAeAAAAAEAAABAAAAAAAAAAAAAAABaAAAAAAAAAAAAAAAAAAAAAAAAAAAAAAAAAAAAAAAAAAAAAAAAAAAAAAAAAAAAAAAAAAAAAAAAAAAAAAAAAAAAAAAAAAAAAAAAAAAAFAAAADwAAAAAAAAAAAAAAAAAAAAPAAAAAQAAACMAAAAjAAAAIwAAAB4AAAAAAAAAZAAAAGQAAAAAAAAAZAAAAGQAAAAVAAAAYAAAAAAAAAAAAAAADwAAACADAAAAAAAAAAAAAAEAAACgMgAAVgcAAKr4//8BAAAAf39/AAEAAABkAAAAAAAAABQAAABAHwAAAAAAACYAAAAAAAAAwOD//wAAAAAmAAAAZAAAABYAAABMAAAAAAAAAAAAAAAEAAAAAAAAAAEAAADu7OEKAAAAACgAAAAoAAAAZAAAAGQAAAAAAAAAzMzMAAAAAABQAAAAUAAAAGQAAABkAAAAAAAAABcAAAAUAAAAAAAAAAAAAAD/fwAA/38AAAAAAAAJAAAABAAAAAAAAAAMAAAAEAAAAAAAAAAAAAAAAAAAAAAAAAAeAAAAaAAAAAAAAAAAAAAAAAAAAAAAAAAAAAAAECcAABAnAAAAAAAAAAAAAAAAAAAAAAAAAAAAAAAAAAAAAAAAAAAAABQAAAAAAAAAwMD/AAAAAABkAAAAMgAAAAAAAABkAAAAAAAAAH9/fwAKAAAAHwAAAFQAAAD///8AAAAAAQAAAAAAAAAAAAAAAAAAAAAAAAAAAAAAAAAAAAAAAAAAAAAAAH9/fwAAAAADzMzMAMDA/wB/f38AAAAAAAAAAAAAAAAAAAAAAAAAAAAhAAAAGAAAABQAAADQAgAApxYAAIQbAABSIgAAEAAAACYAAAAIAAAAPQAAAAAAAAA="/>
+                <pr:smNativeData xmlns:pr="smNativeData" xmlns:p14="http://schemas.microsoft.com/office/powerpoint/2010/main" xmlns="" val="SMDATA_13_aDXlXhMAAAAlAAAAZAAAAA0AAAAAAAAAAAAAAAAAAAAAAAAAAAAAAAAAAAAAAAAAAAEAAABQAAAAAAAAAAAA4D8AAAAAAADgPwAAAAAAAOA/AAAAAAAA4D8AAAAAAADgPwAAAAAAAOA/AAAAAAAA4D8AAAAAAADgPwAAAAAAAOA/AAAAAAAA4D8CAAAAjAAAAAAAAAAAAAAA////AP///wgAAAAAAAAAAAAAAAAAAAAAAAAAAAAAAAAAAAAAeAAAAAEAAABAAAAAAAAAAAAAAABaAAAAAAAAAAAAAAAAAAAAAAAAAAAAAAAAAAAAAAAAAAAAAAAAAAAAAAAAAAAAAAAAAAAAAAAAAAAAAAAAAAAAAAAAAAAAAAAAAAAAFAAAADwAAAAAAAAAAAAAAAAAAAAPAAAAAQAAACMAAAAjAAAAIwAAAB4AAAAAAAAAZAAAAGQAAAAAAAAAZAAAAGQAAAAVAAAAYAAAAAAAAAAAAAAADwAAACADAAAAAAAAAAAAAAEAAACgMgAAVgcAAKr4//8BAAAAf39/AAEAAABkAAAAAAAAABQAAABAHwAAAAAAACYAAAAAAAAAwOD//wAAAAAmAAAAZAAAABYAAABMAAAAAAAAAAAAAAAEAAAAAAAAAAEAAADu7OEKAAAAACgAAAAoAAAAZAAAAGQAAAAAAAAAzMzMAAAAAABQAAAAUAAAAGQAAABkAAAAAAAAABcAAAAUAAAAAAAAAAAAAAD/fwAA/38AAAAAAAAJAAAABAAAAAAAAAAMAAAAEAAAAAAAAAAAAAAAAAAAAAAAAAAeAAAAaAAAAAAAAAAAAAAAAAAAAAAAAAAAAAAAECcAABAnAAAAAAAAAAAAAAAAAAAAAAAAAAAAAAAAAAAAAAAAAAAAABQAAAAAAAAAwMD/AAAAAABkAAAAMgAAAAAAAABkAAAAAAAAAH9/fwAKAAAAHwAAAFQAAAD///8AAAAAAQAAAAAAAAAAAAAAAAAAAAAAAAAAAAAAAAAAAAAAAAAAAAAAAH9/fwAAAAADzMzMAMDA/wB/f38AAAAAAAAAAAAAAAAAAAAAAAAAAAAhAAAAGAAAABQAAADQAgAApxYAAIQbAABSIgAAEAAAACYAAAAIAAAAPQAAAAAAAAA="/>
               </a:ext>
             </a:extLst>
           </p:cNvSpPr>
@@ -1609,7 +1609,7 @@
             <a:spLocks noGrp="1" noChangeArrowheads="1"/>
             <a:extLst>
               <a:ext uri="smNativeData">
-                <pr:smNativeData xmlns="" xmlns:p14="http://schemas.microsoft.com/office/powerpoint/2010/main" xmlns:pr="smNativeData" val="SMDATA_13_aDXlXhMAAAAlAAAAZAAAAA0AAAAAAAAAAAAAAAAAAAAAAAAAAAAAAAABAAAAAAAAAAEAAABQAAAAAAAAAAAA4D8AAAAAAADgPwAAAAAAAOA/AAAAAAAA4D8AAAAAAADgPwAAAAAAAOA/AAAAAAAA4D8AAAAAAADgPwAAAAAAAOA/AAAAAAAA4D8CAAAAjAAAAAAAAAAAAAAA////AP///wgAAAAAAAAAAAAAAAAAAAAAAAAAAAAAAAAAAAAAeAAAAAEAAABAAAAAAAAAAAAAAABaAAAAAAAAAAAAAAAAAAAAAAAAAAAAAAAAAAAAAAAAAAAAAAAAAAAAAAAAAAAAAAAAAAAAAAAAAAAAAAAAAAAAAAAAAAAAAAAAAAAAFAAAADwAAAAAAAAAAAAAAAAAAAAPAAAAAQAAACMAAAAjAAAAIwAAAB4AAAAAAAAAZAAAAGQAAAAAAAAAZAAAAGQAAAAVAAAAYAAAAAAAAAAAAAAADwAAACADAAAAAAAAAAAAAAEAAACgMgAAVgcAAKr4//8BAAAAf39/AAEAAABkAAAAAAAAABQAAABAHwAAAAAAACYAAAAAAAAAwOD//wAAAAAmAAAAZAAAABYAAABMAAAAAAAAAAAAAAAEAAAAAAAAAAEAAADu7OEKAAAAACgAAAAoAAAAZAAAAGQAAAAAAAAAzMzMAAAAAABQAAAAUAAAAGQAAABkAAAAAAAAABcAAAAUAAAAAAAAAAAAAAD/fwAA/38AAAAAAAAJAAAABAAAAAAAAAAMAAAAEAAAAAAAAAAAAAAAAAAAAAAAAAAeAAAAaAAAAAAAAAAAAAAAAAAAAAAAAAAAAAAAECcAABAnAAAAAAAAAAAAAAAAAAAAAAAAAAAAAAAAAAAAAAAAAAAAABQAAAAAAAAAwMD/AAAAAABkAAAAMgAAAAAAAABkAAAAAAAAAH9/fwAKAAAAHwAAAFQAAAD///8AAAAAAQAAAAAAAAAAAAAAAAAAAAAAAAAAAAAAAAAAAAAAAAAAAAAAAH9/fwAAAAADzMzMAMDA/wB/f38AAAAAAAAAAAAAAAAAAAAAAAAAAAAhAAAAGAAAABQAAADQAgAArwEAAG81AAC6CAAAEAAAACYAAAAIAAAAPAAAAAAAAAA="/>
+                <pr:smNativeData xmlns:pr="smNativeData" xmlns:p14="http://schemas.microsoft.com/office/powerpoint/2010/main" xmlns="" val="SMDATA_13_aDXlXhMAAAAlAAAAZAAAAA0AAAAAAAAAAAAAAAAAAAAAAAAAAAAAAAABAAAAAAAAAAEAAABQAAAAAAAAAAAA4D8AAAAAAADgPwAAAAAAAOA/AAAAAAAA4D8AAAAAAADgPwAAAAAAAOA/AAAAAAAA4D8AAAAAAADgPwAAAAAAAOA/AAAAAAAA4D8CAAAAjAAAAAAAAAAAAAAA////AP///wgAAAAAAAAAAAAAAAAAAAAAAAAAAAAAAAAAAAAAeAAAAAEAAABAAAAAAAAAAAAAAABaAAAAAAAAAAAAAAAAAAAAAAAAAAAAAAAAAAAAAAAAAAAAAAAAAAAAAAAAAAAAAAAAAAAAAAAAAAAAAAAAAAAAAAAAAAAAAAAAAAAAFAAAADwAAAAAAAAAAAAAAAAAAAAPAAAAAQAAACMAAAAjAAAAIwAAAB4AAAAAAAAAZAAAAGQAAAAAAAAAZAAAAGQAAAAVAAAAYAAAAAAAAAAAAAAADwAAACADAAAAAAAAAAAAAAEAAACgMgAAVgcAAKr4//8BAAAAf39/AAEAAABkAAAAAAAAABQAAABAHwAAAAAAACYAAAAAAAAAwOD//wAAAAAmAAAAZAAAABYAAABMAAAAAAAAAAAAAAAEAAAAAAAAAAEAAADu7OEKAAAAACgAAAAoAAAAZAAAAGQAAAAAAAAAzMzMAAAAAABQAAAAUAAAAGQAAABkAAAAAAAAABcAAAAUAAAAAAAAAAAAAAD/fwAA/38AAAAAAAAJAAAABAAAAAAAAAAMAAAAEAAAAAAAAAAAAAAAAAAAAAAAAAAeAAAAaAAAAAAAAAAAAAAAAAAAAAAAAAAAAAAAECcAABAnAAAAAAAAAAAAAAAAAAAAAAAAAAAAAAAAAAAAAAAAAAAAABQAAAAAAAAAwMD/AAAAAABkAAAAMgAAAAAAAABkAAAAAAAAAH9/fwAKAAAAHwAAAFQAAAD///8AAAAAAQAAAAAAAAAAAAAAAAAAAAAAAAAAAAAAAAAAAAAAAAAAAAAAAH9/fwAAAAADzMzMAMDA/wB/f38AAAAAAAAAAAAAAAAAAAAAAAAAAAAhAAAAGAAAABQAAADQAgAArwEAAG81AAC6CAAAEAAAACYAAAAIAAAAPAAAAAAAAAA="/>
               </a:ext>
             </a:extLst>
           </p:cNvSpPr>
@@ -1640,7 +1640,7 @@
             <a:spLocks noGrp="1" noChangeArrowheads="1"/>
             <a:extLst>
               <a:ext uri="smNativeData">
-                <pr:smNativeData xmlns="" xmlns:p14="http://schemas.microsoft.com/office/powerpoint/2010/main" xmlns:pr="smNativeData" val="SMDATA_13_aDXlXhMAAAAlAAAAZAAAAA0AAAAAAAAAAAAAAAAAAAAAAAAAAAAAAAAAAAAAAAAAAAEAAABQAAAAAAAAAAAA4D8AAAAAAADgPwAAAAAAAOA/AAAAAAAA4D8AAAAAAADgPwAAAAAAAOA/AAAAAAAA4D8AAAAAAADgPwAAAAAAAOA/AAAAAAAA4D8CAAAAjAAAAAAAAAAAAAAA////AP///wgAAAAAAAAAAAAAAAAAAAAAAAAAAAAAAAAAAAAAeAAAAAEAAABAAAAAAAAAAAAAAABaAAAAAAAAAAAAAAAAAAAAAAAAAAAAAAAAAAAAAAAAAAAAAAAAAAAAAAAAAAAAAAAAAAAAAAAAAAAAAAAAAAAAAAAAAAAAAAAAAAAAFAAAADwAAAAAAAAAAAAAAAAAAAAPAAAAAQAAACMAAAAjAAAAIwAAAB4AAAAAAAAAZAAAAGQAAAAAAAAAZAAAAGQAAAAVAAAAYAAAAAAAAAAAAAAADwAAACADAAAAAAAAAAAAAAEAAACgMgAAVgcAAKr4//8BAAAAf39/AAEAAABkAAAAAAAAABQAAABAHwAAAAAAACYAAAAAAAAAwOD//wAAAAAmAAAAZAAAABYAAABMAAAAAAAAAAAAAAAEAAAAAAAAAAEAAADu7OEKAAAAACgAAAAoAAAAZAAAAGQAAAAAAAAAzMzMAAAAAABQAAAAUAAAAGQAAABkAAAAAAAAABcAAAAUAAAAAAAAAAAAAAD/fwAA/38AAAAAAAAJAAAABAAAAAAAAAAMAAAAEAAAAAAAAAAAAAAAAAAAAAAAAAAeAAAAaAAAAAAAAAAAAAAAAAAAAAAAAAAAAAAAECcAABAnAAAAAAAAAAAAAAAAAAAAAAAAAAAAAAAAAAAAAAAAAAAAABQAAAAAAAAAwMD/AAAAAABkAAAAMgAAAAAAAABkAAAAAAAAAH9/fwAKAAAAHwAAAFQAAAD///8AAAAAAQAAAAAAAAAAAAAAAAAAAAAAAAAAAAAAAAAAAAAAAAAAAAAAAH9/fwAAAAADzMzMAMDA/wB/f38AAAAAAAAAAAAAAAAAAAAAAAAAAAAhAAAAGAAAABQAAADQAgAA3wkAAG81AABWIgAAEAAAACYAAAAIAAAAPAAAAAAAAAA="/>
+                <pr:smNativeData xmlns:pr="smNativeData" xmlns:p14="http://schemas.microsoft.com/office/powerpoint/2010/main" xmlns="" val="SMDATA_13_aDXlXhMAAAAlAAAAZAAAAA0AAAAAAAAAAAAAAAAAAAAAAAAAAAAAAAAAAAAAAAAAAAEAAABQAAAAAAAAAAAA4D8AAAAAAADgPwAAAAAAAOA/AAAAAAAA4D8AAAAAAADgPwAAAAAAAOA/AAAAAAAA4D8AAAAAAADgPwAAAAAAAOA/AAAAAAAA4D8CAAAAjAAAAAAAAAAAAAAA////AP///wgAAAAAAAAAAAAAAAAAAAAAAAAAAAAAAAAAAAAAeAAAAAEAAABAAAAAAAAAAAAAAABaAAAAAAAAAAAAAAAAAAAAAAAAAAAAAAAAAAAAAAAAAAAAAAAAAAAAAAAAAAAAAAAAAAAAAAAAAAAAAAAAAAAAAAAAAAAAAAAAAAAAFAAAADwAAAAAAAAAAAAAAAAAAAAPAAAAAQAAACMAAAAjAAAAIwAAAB4AAAAAAAAAZAAAAGQAAAAAAAAAZAAAAGQAAAAVAAAAYAAAAAAAAAAAAAAADwAAACADAAAAAAAAAAAAAAEAAACgMgAAVgcAAKr4//8BAAAAf39/AAEAAABkAAAAAAAAABQAAABAHwAAAAAAACYAAAAAAAAAwOD//wAAAAAmAAAAZAAAABYAAABMAAAAAAAAAAAAAAAEAAAAAAAAAAEAAADu7OEKAAAAACgAAAAoAAAAZAAAAGQAAAAAAAAAzMzMAAAAAABQAAAAUAAAAGQAAABkAAAAAAAAABcAAAAUAAAAAAAAAAAAAAD/fwAA/38AAAAAAAAJAAAABAAAAAAAAAAMAAAAEAAAAAAAAAAAAAAAAAAAAAAAAAAeAAAAaAAAAAAAAAAAAAAAAAAAAAAAAAAAAAAAECcAABAnAAAAAAAAAAAAAAAAAAAAAAAAAAAAAAAAAAAAAAAAAAAAABQAAAAAAAAAwMD/AAAAAABkAAAAMgAAAAAAAABkAAAAAAAAAH9/fwAKAAAAHwAAAFQAAAD///8AAAAAAQAAAAAAAAAAAAAAAAAAAAAAAAAAAAAAAAAAAAAAAAAAAAAAAH9/fwAAAAADzMzMAMDA/wB/f38AAAAAAAAAAAAAAAAAAAAAAAAAAAAhAAAAGAAAABQAAADQAgAA3wkAAG81AABWIgAAEAAAACYAAAAIAAAAPAAAAAAAAAA="/>
               </a:ext>
             </a:extLst>
           </p:cNvSpPr>
@@ -1671,7 +1671,7 @@
             <a:spLocks noGrp="1" noChangeArrowheads="1"/>
             <a:extLst>
               <a:ext uri="smNativeData">
-                <pr:smNativeData xmlns="" xmlns:p14="http://schemas.microsoft.com/office/powerpoint/2010/main" xmlns:pr="smNativeData" val="SMDATA_13_aDXlXhMAAAAlAAAAZAAAAA0AAAAAAAAAAAAAAAAAAAAAAAAAAAAAAAAAAAAAAAAAAAEAAABQAAAAAAAAAAAA4D8AAAAAAADgPwAAAAAAAOA/AAAAAAAA4D8AAAAAAADgPwAAAAAAAOA/AAAAAAAA4D8AAAAAAADgPwAAAAAAAOA/AAAAAAAA4D8CAAAAjAAAAAAAAAAAAAAA////AP///wgAAAAAAAAAAAAAAAAAAAAAAAAAAAAAAAAAAAAAeAAAAAEAAABAAAAAAAAAAAAAAABaAAAAAAAAAAAAAAAAAAAAAAAAAAAAAAAAAAAAAAAAAAAAAAAAAAAAAAAAAAAAAAAAAAAAAAAAAAAAAAAAAAAAAAAAAAAAAAAAAAAAFAAAADwAAAAAAAAAAAAAAAAAAAAPAAAAAQAAACMAAAAjAAAAIwAAAB4AAAAAAAAAZAAAAGQAAAAAAAAAZAAAAGQAAAAVAAAAYAAAAAAAAAAAAAAADwAAACADAAAAAAAAAAAAAAEAAACgMgAAVgcAAKr4//8BAAAAf39/AAEAAABkAAAAAAAAABQAAABAHwAAAAAAACYAAAAAAAAAwOD//wAAAAAmAAAAZAAAABYAAABMAAAAAAAAAAAAAAAEAAAAAAAAAAEAAADu7OEKAAAAACgAAAAoAAAAZAAAAGQAAAAAAAAAzMzMAAAAAABQAAAAUAAAAGQAAABkAAAAAAAAABcAAAAUAAAAAAAAAAAAAAD/fwAA/38AAAAAAAAJAAAABAAAAAAAAAAMAAAAEAAAAAAAAAAAAAAAAAAAAAAAAAAeAAAAaAAAAAAAAAAAAAAAAAAAAAAAAAAAAAAAECcAABAnAAAAAAAAAAAAAAAAAAAAAAAAAAAAAAAAAAAAAAAAAAAAABQAAAAAAAAAwMD/AAAAAABkAAAAMgAAAAAAAABkAAAAAAAAAH9/fwAKAAAAHwAAAFQAAAD///8AAAAAAQAAAAAAAAAAAAAAAAAAAAAAAAAAAAAAAAAAAAAAAAAAAAAAAH9/fwAAAAADzMzMAMDA/wB/f38AAAAAAAAAAAAAAAAAAAAAAAAAAAAhAAAAGAAAABQAAADQAgAA3wkAAG81AABWIgAAEAAAACYAAAAIAAAAPAAAAAAAAAA="/>
+                <pr:smNativeData xmlns:pr="smNativeData" xmlns:p14="http://schemas.microsoft.com/office/powerpoint/2010/main" xmlns="" val="SMDATA_13_aDXlXhMAAAAlAAAAZAAAAA0AAAAAAAAAAAAAAAAAAAAAAAAAAAAAAAAAAAAAAAAAAAEAAABQAAAAAAAAAAAA4D8AAAAAAADgPwAAAAAAAOA/AAAAAAAA4D8AAAAAAADgPwAAAAAAAOA/AAAAAAAA4D8AAAAAAADgPwAAAAAAAOA/AAAAAAAA4D8CAAAAjAAAAAAAAAAAAAAA////AP///wgAAAAAAAAAAAAAAAAAAAAAAAAAAAAAAAAAAAAAeAAAAAEAAABAAAAAAAAAAAAAAABaAAAAAAAAAAAAAAAAAAAAAAAAAAAAAAAAAAAAAAAAAAAAAAAAAAAAAAAAAAAAAAAAAAAAAAAAAAAAAAAAAAAAAAAAAAAAAAAAAAAAFAAAADwAAAAAAAAAAAAAAAAAAAAPAAAAAQAAACMAAAAjAAAAIwAAAB4AAAAAAAAAZAAAAGQAAAAAAAAAZAAAAGQAAAAVAAAAYAAAAAAAAAAAAAAADwAAACADAAAAAAAAAAAAAAEAAACgMgAAVgcAAKr4//8BAAAAf39/AAEAAABkAAAAAAAAABQAAABAHwAAAAAAACYAAAAAAAAAwOD//wAAAAAmAAAAZAAAABYAAABMAAAAAAAAAAAAAAAEAAAAAAAAAAEAAADu7OEKAAAAACgAAAAoAAAAZAAAAGQAAAAAAAAAzMzMAAAAAABQAAAAUAAAAGQAAABkAAAAAAAAABcAAAAUAAAAAAAAAAAAAAD/fwAA/38AAAAAAAAJAAAABAAAAAAAAAAMAAAAEAAAAAAAAAAAAAAAAAAAAAAAAAAeAAAAaAAAAAAAAAAAAAAAAAAAAAAAAAAAAAAAECcAABAnAAAAAAAAAAAAAAAAAAAAAAAAAAAAAAAAAAAAAAAAAAAAABQAAAAAAAAAwMD/AAAAAABkAAAAMgAAAAAAAABkAAAAAAAAAH9/fwAKAAAAHwAAAFQAAAD///8AAAAAAQAAAAAAAAAAAAAAAAAAAAAAAAAAAAAAAAAAAAAAAAAAAAAAAH9/fwAAAAADzMzMAMDA/wB/f38AAAAAAAAAAAAAAAAAAAAAAAAAAAAhAAAAGAAAABQAAADQAgAA3wkAAG81AABWIgAAEAAAACYAAAAIAAAAPAAAAAAAAAA="/>
               </a:ext>
             </a:extLst>
           </p:cNvSpPr>
@@ -1701,7 +1701,7 @@
           <p:cNvPicPr>
             <a:extLst>
               <a:ext uri="smNativeData">
-                <pr:smNativeData xmlns="" xmlns:p14="http://schemas.microsoft.com/office/powerpoint/2010/main" xmlns:pr="smNativeData" val="SMDATA_15_aDXlXhMAAAAlAAAAEQAAAA0AAAAAkAAAAEgAAACQAAAASAAAAAAAAAAAAAAAAAAAAAEAAABQAAAAAAAAAAAA4D8AAAAAAADgPwAAAAAAAOA/AAAAAAAA4D8AAAAAAADgPwAAAAAAAOA/AAAAAAAA4D8AAAAAAADgPwAAAAAAAOA/AAAAAAAA4D8CAAAAjAAAAAAAAAAAAAAAT4G9DP///wgAAAAAAAAAAAAAAAAAAAAAAAAAAAAAAAAAAAAAZAAAAAEAAABAAAAAAAAAAAAAAAAAAAAAAAAAAAAAAAAAAAAAAAAAAAAAAAAAAAAAAAAAAAAAAAAAAAAAAAAAAAAAAAAAAAAAAAAAAAAAAAAAAAAAAAAAAAAAAAAAAAAAFAAAADwAAAAAAAAAAAAAAAAAAAkUAAAAAQAAABQAAAAUAAAAFAAAAAEAAAAAAAAAZAAAAGQAAAAAAAAAZAAAAGQAAAAVAAAAYAAAAAAAAAAAAAAADwAAACADAAAAAAAAAAAAAAEAAACgMgAAVgcAAKr4//8BAAAAf39/AAEAAABkAAAAAAAAABQAAABAHwAAAAAAACYAAAAAAAAAwOD//wAAAAAmAAAAZAAAABYAAABMAAAAAAAAAAAAAAAEAAAAAAAAAAEAAADu7OEKAAAAACgAAAAoAAAAZAAAAGQAAAAAAAAAzMzMAAAAAABQAAAAUAAAAGQAAABkAAAAAAAAAAcAAAA4AAAAAAAAAAAAAAAAAAAA////AAAAAAAAAAAAAAAAAAAAAAAAAAAAAAAAAAAAAABkAAAAZAAAAAAAAAAjAAAABAAAAGQAAAAXAAAAFAAAAAAAAAAAAAAA/38AAP9/AAAAAAAACQAAAAQAAAAAAAAADAAAABAAAAAAAAAAAAAAAAAAAAAAAAAAHgAAAGgAAAAAAAAAAAAAAAAAAAAAAAAAAAAAABAnAAAQJwAAAAAAAAAAAAAAAAAAAAAAAAAAAAAAAAAAAAAAAAAAAAAUAAAAAAAAAMDA/wAAAAAAZAAAADIAAAAAAAAAZAAAAAAAAAB/f38ACgAAAB8AAABUAAAAAAAABQAAAAEAAAAAAAAAAAAAAAAAAAAAAAAAAAAAAAAAAAAAAAAAAAAAAAJ/f38AAAAAA8zMzADAwP8Af39/AAAAAAAAAAAAAAAAAP///wAAAAAAIQAAABgAAAAUAAAAygwAAN8JAAB0KwAAViIAABAAAAAmAAAACAAAAP//////////"/>
+                <pr:smNativeData xmlns:pr="smNativeData" xmlns:p14="http://schemas.microsoft.com/office/powerpoint/2010/main" xmlns="" val="SMDATA_15_aDXlXhMAAAAlAAAAEQAAAA0AAAAAkAAAAEgAAACQAAAASAAAAAAAAAAAAAAAAAAAAAEAAABQAAAAAAAAAAAA4D8AAAAAAADgPwAAAAAAAOA/AAAAAAAA4D8AAAAAAADgPwAAAAAAAOA/AAAAAAAA4D8AAAAAAADgPwAAAAAAAOA/AAAAAAAA4D8CAAAAjAAAAAAAAAAAAAAAT4G9DP///wgAAAAAAAAAAAAAAAAAAAAAAAAAAAAAAAAAAAAAZAAAAAEAAABAAAAAAAAAAAAAAAAAAAAAAAAAAAAAAAAAAAAAAAAAAAAAAAAAAAAAAAAAAAAAAAAAAAAAAAAAAAAAAAAAAAAAAAAAAAAAAAAAAAAAAAAAAAAAAAAAAAAAFAAAADwAAAAAAAAAAAAAAAAAAAkUAAAAAQAAABQAAAAUAAAAFAAAAAEAAAAAAAAAZAAAAGQAAAAAAAAAZAAAAGQAAAAVAAAAYAAAAAAAAAAAAAAADwAAACADAAAAAAAAAAAAAAEAAACgMgAAVgcAAKr4//8BAAAAf39/AAEAAABkAAAAAAAAABQAAABAHwAAAAAAACYAAAAAAAAAwOD//wAAAAAmAAAAZAAAABYAAABMAAAAAAAAAAAAAAAEAAAAAAAAAAEAAADu7OEKAAAAACgAAAAoAAAAZAAAAGQAAAAAAAAAzMzMAAAAAABQAAAAUAAAAGQAAABkAAAAAAAAAAcAAAA4AAAAAAAAAAAAAAAAAAAA////AAAAAAAAAAAAAAAAAAAAAAAAAAAAAAAAAAAAAABkAAAAZAAAAAAAAAAjAAAABAAAAGQAAAAXAAAAFAAAAAAAAAAAAAAA/38AAP9/AAAAAAAACQAAAAQAAAAAAAAADAAAABAAAAAAAAAAAAAAAAAAAAAAAAAAHgAAAGgAAAAAAAAAAAAAAAAAAAAAAAAAAAAAABAnAAAQJwAAAAAAAAAAAAAAAAAAAAAAAAAAAAAAAAAAAAAAAAAAAAAUAAAAAAAAAMDA/wAAAAAAZAAAADIAAAAAAAAAZAAAAAAAAAB/f38ACgAAAB8AAABUAAAAAAAABQAAAAEAAAAAAAAAAAAAAAAAAAAAAAAAAAAAAAAAAAAAAAAAAAAAAAJ/f38AAAAAA8zMzADAwP8Af39/AAAAAAAAAAAAAAAAAP///wAAAAAAIQAAABgAAAAUAAAAygwAAN8JAAB0KwAAViIAABAAAAAmAAAACAAAAP//////////"/>
               </a:ext>
             </a:extLst>
           </p:cNvPicPr>
@@ -1734,7 +1734,7 @@
           <p:cNvPicPr>
             <a:extLst>
               <a:ext uri="smNativeData">
-                <pr:smNativeData xmlns="" xmlns:p14="http://schemas.microsoft.com/office/powerpoint/2010/main" xmlns:pr="smNativeData" val="SMDATA_15_aDXlXhMAAAAlAAAAEQAAAA0AAAAAkAAAAEgAAACQAAAASAAAAAAAAAAAAAAAAAAAAAEAAABQAAAAAAAAAAAA4D8AAAAAAADgPwAAAAAAAOA/AAAAAAAA4D8AAAAAAADgPwAAAAAAAOA/AAAAAAAA4D8AAAAAAADgPwAAAAAAAOA/AAAAAAAA4D8CAAAAjAAAAAAAAAAAAAAAT4G9DP///wgAAAAAAAAAAAAAAAAAAAAAAAAAAAAAAAAAAAAAZAAAAAEAAABAAAAAAAAAAAAAAAAAAAAAAAAAAAAAAAAAAAAAAAAAAAAAAAAAAAAAAAAAAAAAAAAAAAAAAAAAAAAAAAAAAAAAAAAAAAAAAAAAAAAAAAAAAAAAAAAAAAAAFAAAADwAAAAAAAAAAAAAAAAAAAkUAAAAAQAAABQAAAAUAAAAFAAAAAEAAAAAAAAAZAAAAGQAAAAAAAAAZAAAAGQAAAAVAAAAYAAAAAAAAAAAAAAADwAAACADAAAAAAAAAAAAAAEAAACgMgAAVgcAAKr4//8BAAAAf39/AAEAAABkAAAAAAAAABQAAABAHwAAAAAAACYAAAAAAAAAwOD//wAAAAAmAAAAZAAAABYAAABMAAAAAAAAAAAAAAAEAAAAAAAAAAEAAADu7OEKAAAAACgAAAAoAAAAZAAAAGQAAAAAAAAAzMzMAAAAAABQAAAAUAAAAGQAAABkAAAAAAAAAAcAAAA4AAAAAAAAAAAAAAAAAAAA////AAAAAAAAAAAAAAAAAAAAAAAAAAAAAAAAAAAAAABkAAAAZAAAAAAAAAAjAAAABAAAAGQAAAAXAAAAFAAAAAAAAAAAAAAA/38AAP9/AAAAAAAACQAAAAQAAAAAAAAADAAAABAAAAAAAAAAAAAAAAAAAAAAAAAAHgAAAGgAAAAAAAAAAAAAAAAAAAAAAAAAAAAAABAnAAAQJwAAAAAAAAAAAAAAAAAAAAAAAAAAAAAAAAAAAAAAAAAAAAAUAAAAAAAAAMDA/wAAAAAAZAAAADIAAAAAAAAAZAAAAAAAAAB/f38ACgAAAB8AAABUAAAAAAAABQAAAAEAAAAAAAAAAAAAAAAAAAAAAAAAAAAAAAAAAAAAAAAAAAAAAAJ/f38AAAAAA8zMzADAwP8Af39/AAAAAAAAAAAAAAAAAP///wAAAAAAIQAAABgAAAAUAAAAygwAAN8JAAB0KwAAViIAABAAAAAmAAAACAAAAP//////////"/>
+                <pr:smNativeData xmlns:pr="smNativeData" xmlns:p14="http://schemas.microsoft.com/office/powerpoint/2010/main" xmlns="" val="SMDATA_15_aDXlXhMAAAAlAAAAEQAAAA0AAAAAkAAAAEgAAACQAAAASAAAAAAAAAAAAAAAAAAAAAEAAABQAAAAAAAAAAAA4D8AAAAAAADgPwAAAAAAAOA/AAAAAAAA4D8AAAAAAADgPwAAAAAAAOA/AAAAAAAA4D8AAAAAAADgPwAAAAAAAOA/AAAAAAAA4D8CAAAAjAAAAAAAAAAAAAAAT4G9DP///wgAAAAAAAAAAAAAAAAAAAAAAAAAAAAAAAAAAAAAZAAAAAEAAABAAAAAAAAAAAAAAAAAAAAAAAAAAAAAAAAAAAAAAAAAAAAAAAAAAAAAAAAAAAAAAAAAAAAAAAAAAAAAAAAAAAAAAAAAAAAAAAAAAAAAAAAAAAAAAAAAAAAAFAAAADwAAAAAAAAAAAAAAAAAAAkUAAAAAQAAABQAAAAUAAAAFAAAAAEAAAAAAAAAZAAAAGQAAAAAAAAAZAAAAGQAAAAVAAAAYAAAAAAAAAAAAAAADwAAACADAAAAAAAAAAAAAAEAAACgMgAAVgcAAKr4//8BAAAAf39/AAEAAABkAAAAAAAAABQAAABAHwAAAAAAACYAAAAAAAAAwOD//wAAAAAmAAAAZAAAABYAAABMAAAAAAAAAAAAAAAEAAAAAAAAAAEAAADu7OEKAAAAACgAAAAoAAAAZAAAAGQAAAAAAAAAzMzMAAAAAABQAAAAUAAAAGQAAABkAAAAAAAAAAcAAAA4AAAAAAAAAAAAAAAAAAAA////AAAAAAAAAAAAAAAAAAAAAAAAAAAAAAAAAAAAAABkAAAAZAAAAAAAAAAjAAAABAAAAGQAAAAXAAAAFAAAAAAAAAAAAAAA/38AAP9/AAAAAAAACQAAAAQAAAAAAAAADAAAABAAAAAAAAAAAAAAAAAAAAAAAAAAHgAAAGgAAAAAAAAAAAAAAAAAAAAAAAAAAAAAABAnAAAQJwAAAAAAAAAAAAAAAAAAAAAAAAAAAAAAAAAAAAAAAAAAAAAUAAAAAAAAAMDA/wAAAAAAZAAAADIAAAAAAAAAZAAAAAAAAAB/f38ACgAAAB8AAABUAAAAAAAABQAAAAEAAAAAAAAAAAAAAAAAAAAAAAAAAAAAAAAAAAAAAAAAAAAAAAJ/f38AAAAAA8zMzADAwP8Af39/AAAAAAAAAAAAAAAAAP///wAAAAAAIQAAABgAAAAUAAAAygwAAN8JAAB0KwAAViIAABAAAAAmAAAACAAAAP//////////"/>
               </a:ext>
             </a:extLst>
           </p:cNvPicPr>
@@ -1793,7 +1793,7 @@
             <a:spLocks noGrp="1" noChangeArrowheads="1"/>
             <a:extLst>
               <a:ext uri="smNativeData">
-                <pr:smNativeData xmlns="" xmlns:p14="http://schemas.microsoft.com/office/powerpoint/2010/main" xmlns:pr="smNativeData" val="SMDATA_13_aDXlXhMAAAAlAAAAZAAAAA0AAAAAAAAAAAAAAAAAAAAAAAAAAAAAAAABAAAAAAAAAAEAAABQAAAAAAAAAAAA4D8AAAAAAADgPwAAAAAAAOA/AAAAAAAA4D8AAAAAAADgPwAAAAAAAOA/AAAAAAAA4D8AAAAAAADgPwAAAAAAAOA/AAAAAAAA4D8CAAAAjAAAAAAAAAAAAAAA////AP///wgAAAAAAAAAAAAAAAAAAAAAAAAAAAAAAAAAAAAAeAAAAAEAAABAAAAAAAAAAAAAAABaAAAAAAAAAAAAAAAAAAAAAAAAAAAAAAAAAAAAAAAAAAAAAAAAAAAAAAAAAAAAAAAAAAAAAAAAAAAAAAAAAAAAAAAAAAAAAAAAAAAAFAAAADwAAAAAAAAAAAAAAAAAAAAPAAAAAQAAACMAAAAjAAAAIwAAAB4AAAAAAAAAZAAAAGQAAAAAAAAAZAAAAGQAAAAVAAAAYAAAAAAAAAAAAAAADwAAACADAAAAAAAAAAAAAAEAAACgMgAAVgcAAKr4//8BAAAAf39/AAEAAABkAAAAAAAAABQAAABAHwAAAAAAACYAAAAAAAAAwOD//wAAAAAmAAAAZAAAABYAAABMAAAAAAAAAAAAAAAEAAAAAAAAAAEAAADu7OEKAAAAACgAAAAoAAAAZAAAAGQAAAAAAAAAzMzMAAAAAABQAAAAUAAAAGQAAABkAAAAAAAAABcAAAAUAAAAAAAAAAAAAAD/fwAA/38AAAAAAAAJAAAABAAAAAAAAAAMAAAAEAAAAAAAAAAAAAAAAAAAAAAAAAAeAAAAaAAAAAAAAAAAAAAAAAAAAAAAAAAAAAAAECcAABAnAAAAAAAAAAAAAAAAAAAAAAAAAAAAAAAAAAAAAAAAAAAAABQAAAAAAAAAwMD/AAAAAABkAAAAMgAAAAAAAABkAAAAAAAAAH9/fwAKAAAAHwAAAFQAAAD///8AAAAAAQAAAAAAAAAAAAAAAAAAAAAAAAAAAAAAAAAAAAAAAAAAAAAAAH9/fwAAAAADzMzMAMDA/wB/f38AAAAAAAAAAAAAAAAAAAAAAAAAAAAhAAAAGAAAABQAAADQAgAArwEAAG81AAC6CAAAEAAAACYAAAAIAAAAPAAAAAAAAAA="/>
+                <pr:smNativeData xmlns:pr="smNativeData" xmlns:p14="http://schemas.microsoft.com/office/powerpoint/2010/main" xmlns="" val="SMDATA_13_aDXlXhMAAAAlAAAAZAAAAA0AAAAAAAAAAAAAAAAAAAAAAAAAAAAAAAABAAAAAAAAAAEAAABQAAAAAAAAAAAA4D8AAAAAAADgPwAAAAAAAOA/AAAAAAAA4D8AAAAAAADgPwAAAAAAAOA/AAAAAAAA4D8AAAAAAADgPwAAAAAAAOA/AAAAAAAA4D8CAAAAjAAAAAAAAAAAAAAA////AP///wgAAAAAAAAAAAAAAAAAAAAAAAAAAAAAAAAAAAAAeAAAAAEAAABAAAAAAAAAAAAAAABaAAAAAAAAAAAAAAAAAAAAAAAAAAAAAAAAAAAAAAAAAAAAAAAAAAAAAAAAAAAAAAAAAAAAAAAAAAAAAAAAAAAAAAAAAAAAAAAAAAAAFAAAADwAAAAAAAAAAAAAAAAAAAAPAAAAAQAAACMAAAAjAAAAIwAAAB4AAAAAAAAAZAAAAGQAAAAAAAAAZAAAAGQAAAAVAAAAYAAAAAAAAAAAAAAADwAAACADAAAAAAAAAAAAAAEAAACgMgAAVgcAAKr4//8BAAAAf39/AAEAAABkAAAAAAAAABQAAABAHwAAAAAAACYAAAAAAAAAwOD//wAAAAAmAAAAZAAAABYAAABMAAAAAAAAAAAAAAAEAAAAAAAAAAEAAADu7OEKAAAAACgAAAAoAAAAZAAAAGQAAAAAAAAAzMzMAAAAAABQAAAAUAAAAGQAAABkAAAAAAAAABcAAAAUAAAAAAAAAAAAAAD/fwAA/38AAAAAAAAJAAAABAAAAAAAAAAMAAAAEAAAAAAAAAAAAAAAAAAAAAAAAAAeAAAAaAAAAAAAAAAAAAAAAAAAAAAAAAAAAAAAECcAABAnAAAAAAAAAAAAAAAAAAAAAAAAAAAAAAAAAAAAAAAAAAAAABQAAAAAAAAAwMD/AAAAAABkAAAAMgAAAAAAAABkAAAAAAAAAH9/fwAKAAAAHwAAAFQAAAD///8AAAAAAQAAAAAAAAAAAAAAAAAAAAAAAAAAAAAAAAAAAAAAAAAAAAAAAH9/fwAAAAADzMzMAMDA/wB/f38AAAAAAAAAAAAAAAAAAAAAAAAAAAAhAAAAGAAAABQAAADQAgAArwEAAG81AAC6CAAAEAAAACYAAAAIAAAAPAAAAAAAAAA="/>
               </a:ext>
             </a:extLst>
           </p:cNvSpPr>
@@ -1824,7 +1824,7 @@
             <a:spLocks noGrp="1" noChangeArrowheads="1"/>
             <a:extLst>
               <a:ext uri="smNativeData">
-                <pr:smNativeData xmlns="" xmlns:p14="http://schemas.microsoft.com/office/powerpoint/2010/main" xmlns:pr="smNativeData" val="SMDATA_13_aDXlXhMAAAAlAAAAZAAAAA0AAAAAAAAAAAAAAAAAAAAAAAAAAAAAAAABAAAAAAAAAAEAAABQAAAAAAAAAAAA4D8AAAAAAADgPwAAAAAAAOA/AAAAAAAA4D8AAAAAAADgPwAAAAAAAOA/AAAAAAAA4D8AAAAAAADgPwAAAAAAAOA/AAAAAAAA4D8CAAAAjAAAAAAAAAAAAAAA////AP///wgAAAAAAAAAAAAAAAAAAAAAAAAAAAAAAAAAAAAAeAAAAAEAAABAAAAAAAAAAAAAAABaAAAAAAAAAAAAAAAAAAAAAAAAAAAAAAAAAAAAAAAAAAAAAAAAAAAAAAAAAAAAAAAAAAAAAAAAAAAAAAAAAAAAAAAAAAAAAAAAAAAAFAAAADwAAAAAAAAAAAAAAAAAAAAPAAAAAQAAACMAAAAjAAAAIwAAAB4AAAAAAAAAZAAAAGQAAAAAAAAAZAAAAGQAAAAVAAAAYAAAAAAAAAAAAAAADwAAACADAAAAAAAAAAAAAAEAAACgMgAAVgcAAKr4//8BAAAAf39/AAEAAABkAAAAAAAAABQAAABAHwAAAAAAACYAAAAAAAAAwOD//wAAAAAmAAAAZAAAABYAAABMAAAAAAAAAAAAAAAEAAAAAAAAAAEAAADu7OEKAAAAACgAAAAoAAAAZAAAAGQAAAAAAAAAzMzMAAAAAABQAAAAUAAAAGQAAABkAAAAAAAAABcAAAAUAAAAAAAAAAAAAAD/fwAA/38AAAAAAAAJAAAABAAAAAAAAAAMAAAAEAAAAAAAAAAAAAAAAAAAAAAAAAAeAAAAaAAAAAAAAAAAAAAAAAAAAAAAAAAAAAAAECcAABAnAAAAAAAAAAAAAAAAAAAAAAAAAAAAAAAAAAAAAAAAAAAAABQAAAAAAAAAwMD/AAAAAABkAAAAMgAAAAAAAABkAAAAAAAAAH9/fwAKAAAAHwAAAFQAAAD///8AAAAAAQAAAAAAAAAAAAAAAAAAAAAAAAAAAAAAAAAAAAAAAAAAAAAAAH9/fwAAAAADzMzMAMDA/wB/f38AAAAAAAAAAAAAAAAAAAAAAAAAAAAhAAAAGAAAABQAAADQAgAA3wkAAG81AABXIgAAEAAAACYAAAAIAAAAvYAAAAAAAAA="/>
+                <pr:smNativeData xmlns:pr="smNativeData" xmlns:p14="http://schemas.microsoft.com/office/powerpoint/2010/main" xmlns="" val="SMDATA_13_aDXlXhMAAAAlAAAAZAAAAA0AAAAAAAAAAAAAAAAAAAAAAAAAAAAAAAABAAAAAAAAAAEAAABQAAAAAAAAAAAA4D8AAAAAAADgPwAAAAAAAOA/AAAAAAAA4D8AAAAAAADgPwAAAAAAAOA/AAAAAAAA4D8AAAAAAADgPwAAAAAAAOA/AAAAAAAA4D8CAAAAjAAAAAAAAAAAAAAA////AP///wgAAAAAAAAAAAAAAAAAAAAAAAAAAAAAAAAAAAAAeAAAAAEAAABAAAAAAAAAAAAAAABaAAAAAAAAAAAAAAAAAAAAAAAAAAAAAAAAAAAAAAAAAAAAAAAAAAAAAAAAAAAAAAAAAAAAAAAAAAAAAAAAAAAAAAAAAAAAAAAAAAAAFAAAADwAAAAAAAAAAAAAAAAAAAAPAAAAAQAAACMAAAAjAAAAIwAAAB4AAAAAAAAAZAAAAGQAAAAAAAAAZAAAAGQAAAAVAAAAYAAAAAAAAAAAAAAADwAAACADAAAAAAAAAAAAAAEAAACgMgAAVgcAAKr4//8BAAAAf39/AAEAAABkAAAAAAAAABQAAABAHwAAAAAAACYAAAAAAAAAwOD//wAAAAAmAAAAZAAAABYAAABMAAAAAAAAAAAAAAAEAAAAAAAAAAEAAADu7OEKAAAAACgAAAAoAAAAZAAAAGQAAAAAAAAAzMzMAAAAAABQAAAAUAAAAGQAAABkAAAAAAAAABcAAAAUAAAAAAAAAAAAAAD/fwAA/38AAAAAAAAJAAAABAAAAAAAAAAMAAAAEAAAAAAAAAAAAAAAAAAAAAAAAAAeAAAAaAAAAAAAAAAAAAAAAAAAAAAAAAAAAAAAECcAABAnAAAAAAAAAAAAAAAAAAAAAAAAAAAAAAAAAAAAAAAAAAAAABQAAAAAAAAAwMD/AAAAAABkAAAAMgAAAAAAAABkAAAAAAAAAH9/fwAKAAAAHwAAAFQAAAD///8AAAAAAQAAAAAAAAAAAAAAAAAAAAAAAAAAAAAAAAAAAAAAAAAAAAAAAH9/fwAAAAADzMzMAMDA/wB/f38AAAAAAAAAAAAAAAAAAAAAAAAAAAAhAAAAGAAAABQAAADQAgAA3wkAAG81AABXIgAAEAAAACYAAAAIAAAAvYAAAAAAAAA="/>
               </a:ext>
             </a:extLst>
           </p:cNvSpPr>
@@ -1913,7 +1913,7 @@
             <a:spLocks noGrp="1" noChangeArrowheads="1"/>
             <a:extLst>
               <a:ext uri="smNativeData">
-                <pr:smNativeData xmlns="" xmlns:p14="http://schemas.microsoft.com/office/powerpoint/2010/main" xmlns:pr="smNativeData" val="SMDATA_13_aDXlXhMAAAAlAAAAZAAAAA0AAAAAAAAAAAAAAAAAAAAAAAAAAAAAAAABAAAAAAAAAAEAAABQAAAAAAAAAAAA4D8AAAAAAADgPwAAAAAAAOA/AAAAAAAA4D8AAAAAAADgPwAAAAAAAOA/AAAAAAAA4D8AAAAAAADgPwAAAAAAAOA/AAAAAAAA4D8CAAAAjAAAAAAAAAAAAAAA////AP///wgAAAAAAAAAAAAAAAAAAAAAAAAAAAAAAAAAAAAAeAAAAAEAAABAAAAAAAAAAAAAAABaAAAAAAAAAAAAAAAAAAAAAAAAAAAAAAAAAAAAAAAAAAAAAAAAAAAAAAAAAAAAAAAAAAAAAAAAAAAAAAAAAAAAAAAAAAAAAAAAAAAAFAAAADwAAAAAAAAAAAAAAAAAAAAPAAAAAQAAACMAAAAjAAAAIwAAAB4AAAAAAAAAZAAAAGQAAAAAAAAAZAAAAGQAAAAVAAAAYAAAAAAAAAAAAAAADwAAACADAAAAAAAAAAAAAAEAAACgMgAAVgcAAKr4//8BAAAAf39/AAEAAABkAAAAAAAAABQAAABAHwAAAAAAACYAAAAAAAAAwOD//wAAAAAmAAAAZAAAABYAAABMAAAAAAAAAAAAAAAEAAAAAAAAAAEAAADu7OEKAAAAACgAAAAoAAAAZAAAAGQAAAAAAAAAzMzMAAAAAABQAAAAUAAAAGQAAABkAAAAAAAAABcAAAAUAAAAAAAAAAAAAAD/fwAA/38AAAAAAAAJAAAABAAAACDNVAIMAAAAEAAAAAAAAAAAAAAAAAAAAAAAAAAeAAAAaAAAAAAAAAAAAAAAAAAAAAAAAAAAAAAAECcAABAnAAAAAAAAAAAAAAAAAAAAAAAAAAAAAAAAAAAAAAAAAAAAABQAAAAAAAAAwMD/AAAAAABkAAAAMgAAAAAAAABkAAAAAAAAAH9/fwAKAAAAHwAAAFQAAAD///8AAAAAAQAAAAAAAAAAAAAAAAAAAAAAAAAAAAAAAAAAAAAAAAAAAAAAAH9/fwAAAAADzMzMAMDA/wB/f38AAAAAAAAAAAAAAAAAAAAAAAAAAAAhAAAAGAAAABQAAADQAgAArwEAAG81AAC6CAAAEAAAACYAAAAIAAAAPAAAAAAAAAA="/>
+                <pr:smNativeData xmlns:pr="smNativeData" xmlns:p14="http://schemas.microsoft.com/office/powerpoint/2010/main" xmlns="" val="SMDATA_13_aDXlXhMAAAAlAAAAZAAAAA0AAAAAAAAAAAAAAAAAAAAAAAAAAAAAAAABAAAAAAAAAAEAAABQAAAAAAAAAAAA4D8AAAAAAADgPwAAAAAAAOA/AAAAAAAA4D8AAAAAAADgPwAAAAAAAOA/AAAAAAAA4D8AAAAAAADgPwAAAAAAAOA/AAAAAAAA4D8CAAAAjAAAAAAAAAAAAAAA////AP///wgAAAAAAAAAAAAAAAAAAAAAAAAAAAAAAAAAAAAAeAAAAAEAAABAAAAAAAAAAAAAAABaAAAAAAAAAAAAAAAAAAAAAAAAAAAAAAAAAAAAAAAAAAAAAAAAAAAAAAAAAAAAAAAAAAAAAAAAAAAAAAAAAAAAAAAAAAAAAAAAAAAAFAAAADwAAAAAAAAAAAAAAAAAAAAPAAAAAQAAACMAAAAjAAAAIwAAAB4AAAAAAAAAZAAAAGQAAAAAAAAAZAAAAGQAAAAVAAAAYAAAAAAAAAAAAAAADwAAACADAAAAAAAAAAAAAAEAAACgMgAAVgcAAKr4//8BAAAAf39/AAEAAABkAAAAAAAAABQAAABAHwAAAAAAACYAAAAAAAAAwOD//wAAAAAmAAAAZAAAABYAAABMAAAAAAAAAAAAAAAEAAAAAAAAAAEAAADu7OEKAAAAACgAAAAoAAAAZAAAAGQAAAAAAAAAzMzMAAAAAABQAAAAUAAAAGQAAABkAAAAAAAAABcAAAAUAAAAAAAAAAAAAAD/fwAA/38AAAAAAAAJAAAABAAAACDNVAIMAAAAEAAAAAAAAAAAAAAAAAAAAAAAAAAeAAAAaAAAAAAAAAAAAAAAAAAAAAAAAAAAAAAAECcAABAnAAAAAAAAAAAAAAAAAAAAAAAAAAAAAAAAAAAAAAAAAAAAABQAAAAAAAAAwMD/AAAAAABkAAAAMgAAAAAAAABkAAAAAAAAAH9/fwAKAAAAHwAAAFQAAAD///8AAAAAAQAAAAAAAAAAAAAAAAAAAAAAAAAAAAAAAAAAAAAAAAAAAAAAAH9/fwAAAAADzMzMAMDA/wB/f38AAAAAAAAAAAAAAAAAAAAAAAAAAAAhAAAAGAAAABQAAADQAgAArwEAAG81AAC6CAAAEAAAACYAAAAIAAAAPAAAAAAAAAA="/>
               </a:ext>
             </a:extLst>
           </p:cNvSpPr>
@@ -1944,7 +1944,7 @@
             <a:spLocks noGrp="1" noChangeArrowheads="1"/>
             <a:extLst>
               <a:ext uri="smNativeData">
-                <pr:smNativeData xmlns="" xmlns:p14="http://schemas.microsoft.com/office/powerpoint/2010/main" xmlns:pr="smNativeData" val="SMDATA_13_aDXlXhMAAAAlAAAAZAAAAA0AAAAAAAAAAAAAAAAAAAAAAAAAAAAAAAAAAAAAAAAAAAEAAABQAAAAAAAAAAAA4D8AAAAAAADgPwAAAAAAAOA/AAAAAAAA4D8AAAAAAADgPwAAAAAAAOA/AAAAAAAA4D8AAAAAAADgPwAAAAAAAOA/AAAAAAAA4D8CAAAAjAAAAAAAAAAAAAAA////AP///wgAAAAAAAAAAAAAAAAAAAAAAAAAAAAAAAAAAAAAeAAAAAEAAABAAAAAAAAAAAAAAABaAAAAAAAAAAAAAAAAAAAAAAAAAAAAAAAAAAAAAAAAAAAAAAAAAAAAAAAAAAAAAAAAAAAAAAAAAAAAAAAAAAAAAAAAAAAAAAAAAAAAFAAAADwAAAAAAAAAAAAAAAAAAAAPAAAAAQAAACMAAAAjAAAAIwAAAB4AAAAAAAAAZAAAAGQAAAAAAAAAZAAAAGQAAAAVAAAAYAAAAAAAAAAAAAAADwAAACADAAAAAAAAAAAAAAEAAACgMgAAVgcAAKr4//8BAAAAf39/AAEAAABkAAAAAAAAABQAAABAHwAAAAAAACYAAAAAAAAAwOD//wAAAAAmAAAAZAAAABYAAABMAAAAAAAAAAAAAAAEAAAAAAAAAAEAAADu7OEKAAAAACgAAAAoAAAAZAAAAGQAAAAAAAAAzMzMAAAAAABQAAAAUAAAAGQAAABkAAAAAAAAABcAAAAUAAAAAAAAAAAAAAD/fwAA/38AAAAAAAAJAAAABAAAAAAAAAAMAAAAEAAAAAAAAAAAAAAAAAAAAAAAAAAeAAAAaAAAAAAAAAAAAAAAAAAAAAAAAAAAAAAAECcAABAnAAAAAAAAAAAAAAAAAAAAAAAAAAAAAAAAAAAAAAAAAAAAABQAAAAAAAAAwMD/AAAAAABkAAAAMgAAAAAAAABkAAAAAAAAAH9/fwAKAAAAHwAAAFQAAAD///8AAAAAAQAAAAAAAAAAAAAAAAAAAAAAAAAAAAAAAAAAAAAAAAAAAAAAAH9/fwAAAAADzMzMAMDA/wB/f38AAAAAAAAAAAAAAAAAAAAAAAAAAAAhAAAAGAAAABQAAADQAgAA3wkAAG81AABWIgAAEAAAACYAAAAIAAAAPAAAAAAAAAA="/>
+                <pr:smNativeData xmlns:pr="smNativeData" xmlns:p14="http://schemas.microsoft.com/office/powerpoint/2010/main" xmlns="" val="SMDATA_13_aDXlXhMAAAAlAAAAZAAAAA0AAAAAAAAAAAAAAAAAAAAAAAAAAAAAAAAAAAAAAAAAAAEAAABQAAAAAAAAAAAA4D8AAAAAAADgPwAAAAAAAOA/AAAAAAAA4D8AAAAAAADgPwAAAAAAAOA/AAAAAAAA4D8AAAAAAADgPwAAAAAAAOA/AAAAAAAA4D8CAAAAjAAAAAAAAAAAAAAA////AP///wgAAAAAAAAAAAAAAAAAAAAAAAAAAAAAAAAAAAAAeAAAAAEAAABAAAAAAAAAAAAAAABaAAAAAAAAAAAAAAAAAAAAAAAAAAAAAAAAAAAAAAAAAAAAAAAAAAAAAAAAAAAAAAAAAAAAAAAAAAAAAAAAAAAAAAAAAAAAAAAAAAAAFAAAADwAAAAAAAAAAAAAAAAAAAAPAAAAAQAAACMAAAAjAAAAIwAAAB4AAAAAAAAAZAAAAGQAAAAAAAAAZAAAAGQAAAAVAAAAYAAAAAAAAAAAAAAADwAAACADAAAAAAAAAAAAAAEAAACgMgAAVgcAAKr4//8BAAAAf39/AAEAAABkAAAAAAAAABQAAABAHwAAAAAAACYAAAAAAAAAwOD//wAAAAAmAAAAZAAAABYAAABMAAAAAAAAAAAAAAAEAAAAAAAAAAEAAADu7OEKAAAAACgAAAAoAAAAZAAAAGQAAAAAAAAAzMzMAAAAAABQAAAAUAAAAGQAAABkAAAAAAAAABcAAAAUAAAAAAAAAAAAAAD/fwAA/38AAAAAAAAJAAAABAAAAAAAAAAMAAAAEAAAAAAAAAAAAAAAAAAAAAAAAAAeAAAAaAAAAAAAAAAAAAAAAAAAAAAAAAAAAAAAECcAABAnAAAAAAAAAAAAAAAAAAAAAAAAAAAAAAAAAAAAAAAAAAAAABQAAAAAAAAAwMD/AAAAAABkAAAAMgAAAAAAAABkAAAAAAAAAH9/fwAKAAAAHwAAAFQAAAD///8AAAAAAQAAAAAAAAAAAAAAAAAAAAAAAAAAAAAAAAAAAAAAAAAAAAAAAH9/fwAAAAADzMzMAMDA/wB/f38AAAAAAAAAAAAAAAAAAAAAAAAAAAAhAAAAGAAAABQAAADQAgAA3wkAAG81AABWIgAAEAAAACYAAAAIAAAAPAAAAAAAAAA="/>
               </a:ext>
             </a:extLst>
           </p:cNvSpPr>
@@ -2000,7 +2000,7 @@
             <a:spLocks noGrp="1" noChangeArrowheads="1"/>
             <a:extLst>
               <a:ext uri="smNativeData">
-                <pr:smNativeData xmlns="" xmlns:p14="http://schemas.microsoft.com/office/powerpoint/2010/main" xmlns:pr="smNativeData" val="SMDATA_13_aDXlXhMAAAAlAAAAZAAAAA0AAAAAAAAAAAAAAAAAAAAAAAAAAAAAAAABAAAAAAAAAAEAAABQAAAAAAAAAAAA4D8AAAAAAADgPwAAAAAAAOA/AAAAAAAA4D8AAAAAAADgPwAAAAAAAOA/AAAAAAAA4D8AAAAAAADgPwAAAAAAAOA/AAAAAAAA4D8CAAAAjAAAAAAAAAAAAAAA////AP///wgAAAAAAAAAAAAAAAAAAAAAAAAAAAAAAAAAAAAAeAAAAAEAAABAAAAAAAAAAAAAAABaAAAAAAAAAAAAAAAAAAAAAAAAAAAAAAAAAAAAAAAAAAAAAAAAAAAAAAAAAAAAAAAAAAAAAAAAAAAAAAAAAAAAAAAAAAAAAAAAAAAAFAAAADwAAAAAAAAAAAAAAAAAAAAPAAAAAQAAACMAAAAjAAAAIwAAAB4AAAAAAAAAZAAAAGQAAAAAAAAAZAAAAGQAAAAVAAAAYAAAAAAAAAAAAAAADwAAACADAAAAAAAAAAAAAAEAAACgMgAAVgcAAKr4//8BAAAAf39/AAEAAABkAAAAAAAAABQAAABAHwAAAAAAACYAAAAAAAAAwOD//wAAAAAmAAAAZAAAABYAAABMAAAAAAAAAAAAAAAEAAAAAAAAAAEAAADu7OEKAAAAACgAAAAoAAAAZAAAAGQAAAAAAAAAzMzMAAAAAABQAAAAUAAAAGQAAABkAAAAAAAAABcAAAAUAAAAAAAAAAAAAAD/fwAA/38AAAAAAAAJAAAABAAAAAAAAAAMAAAAEAAAAAAAAAAAAAAAAAAAAAAAAAAeAAAAaAAAAAAAAAAAAAAAAAAAAAAAAAAAAAAAECcAABAnAAAAAAAAAAAAAAAAAAAAAAAAAAAAAAAAAAAAAAAAAAAAABQAAAAAAAAAwMD/AAAAAABkAAAAMgAAAAAAAABkAAAAAAAAAH9/fwAKAAAAHwAAAFQAAAD///8AAAAAAQAAAAAAAAAAAAAAAAAAAAAAAAAAAAAAAAAAAAAAAAAAAAAAAH9/fwAAAAADzMzMAMDA/wB/f38AAAAAAAAAAAAAAAAAAAAAAAAAAAAhAAAAGAAAABQAAADQAgAArwEAAG81AAC6CAAAEAAAACYAAAAIAAAAPAAAAAAAAAA="/>
+                <pr:smNativeData xmlns:pr="smNativeData" xmlns:p14="http://schemas.microsoft.com/office/powerpoint/2010/main" xmlns="" val="SMDATA_13_aDXlXhMAAAAlAAAAZAAAAA0AAAAAAAAAAAAAAAAAAAAAAAAAAAAAAAABAAAAAAAAAAEAAABQAAAAAAAAAAAA4D8AAAAAAADgPwAAAAAAAOA/AAAAAAAA4D8AAAAAAADgPwAAAAAAAOA/AAAAAAAA4D8AAAAAAADgPwAAAAAAAOA/AAAAAAAA4D8CAAAAjAAAAAAAAAAAAAAA////AP///wgAAAAAAAAAAAAAAAAAAAAAAAAAAAAAAAAAAAAAeAAAAAEAAABAAAAAAAAAAAAAAABaAAAAAAAAAAAAAAAAAAAAAAAAAAAAAAAAAAAAAAAAAAAAAAAAAAAAAAAAAAAAAAAAAAAAAAAAAAAAAAAAAAAAAAAAAAAAAAAAAAAAFAAAADwAAAAAAAAAAAAAAAAAAAAPAAAAAQAAACMAAAAjAAAAIwAAAB4AAAAAAAAAZAAAAGQAAAAAAAAAZAAAAGQAAAAVAAAAYAAAAAAAAAAAAAAADwAAACADAAAAAAAAAAAAAAEAAACgMgAAVgcAAKr4//8BAAAAf39/AAEAAABkAAAAAAAAABQAAABAHwAAAAAAACYAAAAAAAAAwOD//wAAAAAmAAAAZAAAABYAAABMAAAAAAAAAAAAAAAEAAAAAAAAAAEAAADu7OEKAAAAACgAAAAoAAAAZAAAAGQAAAAAAAAAzMzMAAAAAABQAAAAUAAAAGQAAABkAAAAAAAAABcAAAAUAAAAAAAAAAAAAAD/fwAA/38AAAAAAAAJAAAABAAAAAAAAAAMAAAAEAAAAAAAAAAAAAAAAAAAAAAAAAAeAAAAaAAAAAAAAAAAAAAAAAAAAAAAAAAAAAAAECcAABAnAAAAAAAAAAAAAAAAAAAAAAAAAAAAAAAAAAAAAAAAAAAAABQAAAAAAAAAwMD/AAAAAABkAAAAMgAAAAAAAABkAAAAAAAAAH9/fwAKAAAAHwAAAFQAAAD///8AAAAAAQAAAAAAAAAAAAAAAAAAAAAAAAAAAAAAAAAAAAAAAAAAAAAAAH9/fwAAAAADzMzMAMDA/wB/f38AAAAAAAAAAAAAAAAAAAAAAAAAAAAhAAAAGAAAABQAAADQAgAArwEAAG81AAC6CAAAEAAAACYAAAAIAAAAPAAAAAAAAAA="/>
               </a:ext>
             </a:extLst>
           </p:cNvSpPr>
@@ -2031,7 +2031,7 @@
             <a:spLocks noGrp="1" noChangeArrowheads="1"/>
             <a:extLst>
               <a:ext uri="smNativeData">
-                <pr:smNativeData xmlns="" xmlns:p14="http://schemas.microsoft.com/office/powerpoint/2010/main" xmlns:pr="smNativeData" val="SMDATA_13_aDXlXhMAAAAlAAAAZAAAAA0AAAAAAAAAAAAAAAAAAAAAAAAAAAAAAAAAAAAAAAAAAAEAAABQAAAAAAAAAAAA4D8AAAAAAADgPwAAAAAAAOA/AAAAAAAA4D8AAAAAAADgPwAAAAAAAOA/AAAAAAAA4D8AAAAAAADgPwAAAAAAAOA/AAAAAAAA4D8CAAAAjAAAAAAAAAAAAAAA////AP///wgAAAAAAAAAAAAAAAAAAAAAAAAAAAAAAAAAAAAAeAAAAAEAAABAAAAAAAAAAAAAAABaAAAAAAAAAAAAAAAAAAAAAAAAAAAAAAAAAAAAAAAAAAAAAAAAAAAAAAAAAAAAAAAAAAAAAAAAAAAAAAAAAAAAAAAAAAAAAAAAAAAAFAAAADwAAAAAAAAAAAAAAAAAAAAPAAAAAQAAACMAAAAjAAAAIwAAAB4AAAAAAAAAZAAAAGQAAAAAAAAAZAAAAGQAAAAVAAAAYAAAAAAAAAAAAAAADwAAACADAAAAAAAAAAAAAAEAAACgMgAAVgcAAKr4//8BAAAAf39/AAEAAABkAAAAAAAAABQAAABAHwAAAAAAACYAAAAAAAAAwOD//wAAAAAmAAAAZAAAABYAAABMAAAAAAAAAAAAAAAEAAAAAAAAAAEAAADu7OEKAAAAACgAAAAoAAAAZAAAAGQAAAAAAAAAzMzMAAAAAABQAAAAUAAAAGQAAABkAAAAAAAAABcAAAAUAAAAAAAAAAAAAAD/fwAA/38AAAAAAAAJAAAABAAAAAAAAAAMAAAAEAAAAAAAAAAAAAAAAAAAAAAAAAAeAAAAaAAAAAAAAAAAAAAAAAAAAAAAAAAAAAAAECcAABAnAAAAAAAAAAAAAAAAAAAAAAAAAAAAAAAAAAAAAAAAAAAAABQAAAAAAAAAwMD/AAAAAABkAAAAMgAAAAAAAABkAAAAAAAAAH9/fwAKAAAAHwAAAFQAAAD///8AAAAAAQAAAAAAAAAAAAAAAAAAAAAAAAAAAAAAAAAAAAAAAAAAAAAAAH9/fwAAAAADzMzMAMDA/wB/f38AAAAAAAAAAAAAAAAAAAAAAAAAAAAhAAAAGAAAABQAAADQAgAA3wkAAIQbAABWIgAAEAAAACYAAAAIAAAAPQAAAAAAAAA="/>
+                <pr:smNativeData xmlns:pr="smNativeData" xmlns:p14="http://schemas.microsoft.com/office/powerpoint/2010/main" xmlns="" val="SMDATA_13_aDXlXhMAAAAlAAAAZAAAAA0AAAAAAAAAAAAAAAAAAAAAAAAAAAAAAAAAAAAAAAAAAAEAAABQAAAAAAAAAAAA4D8AAAAAAADgPwAAAAAAAOA/AAAAAAAA4D8AAAAAAADgPwAAAAAAAOA/AAAAAAAA4D8AAAAAAADgPwAAAAAAAOA/AAAAAAAA4D8CAAAAjAAAAAAAAAAAAAAA////AP///wgAAAAAAAAAAAAAAAAAAAAAAAAAAAAAAAAAAAAAeAAAAAEAAABAAAAAAAAAAAAAAABaAAAAAAAAAAAAAAAAAAAAAAAAAAAAAAAAAAAAAAAAAAAAAAAAAAAAAAAAAAAAAAAAAAAAAAAAAAAAAAAAAAAAAAAAAAAAAAAAAAAAFAAAADwAAAAAAAAAAAAAAAAAAAAPAAAAAQAAACMAAAAjAAAAIwAAAB4AAAAAAAAAZAAAAGQAAAAAAAAAZAAAAGQAAAAVAAAAYAAAAAAAAAAAAAAADwAAACADAAAAAAAAAAAAAAEAAACgMgAAVgcAAKr4//8BAAAAf39/AAEAAABkAAAAAAAAABQAAABAHwAAAAAAACYAAAAAAAAAwOD//wAAAAAmAAAAZAAAABYAAABMAAAAAAAAAAAAAAAEAAAAAAAAAAEAAADu7OEKAAAAACgAAAAoAAAAZAAAAGQAAAAAAAAAzMzMAAAAAABQAAAAUAAAAGQAAABkAAAAAAAAABcAAAAUAAAAAAAAAAAAAAD/fwAA/38AAAAAAAAJAAAABAAAAAAAAAAMAAAAEAAAAAAAAAAAAAAAAAAAAAAAAAAeAAAAaAAAAAAAAAAAAAAAAAAAAAAAAAAAAAAAECcAABAnAAAAAAAAAAAAAAAAAAAAAAAAAAAAAAAAAAAAAAAAAAAAABQAAAAAAAAAwMD/AAAAAABkAAAAMgAAAAAAAABkAAAAAAAAAH9/fwAKAAAAHwAAAFQAAAD///8AAAAAAQAAAAAAAAAAAAAAAAAAAAAAAAAAAAAAAAAAAAAAAAAAAAAAAH9/fwAAAAADzMzMAMDA/wB/f38AAAAAAAAAAAAAAAAAAAAAAAAAAAAhAAAAGAAAABQAAADQAgAA3wkAAIQbAABWIgAAEAAAACYAAAAIAAAAPQAAAAAAAAA="/>
               </a:ext>
             </a:extLst>
           </p:cNvSpPr>
@@ -2067,7 +2067,7 @@
             <a:spLocks noGrp="1" noChangeArrowheads="1"/>
             <a:extLst>
               <a:ext uri="smNativeData">
-                <pr:smNativeData xmlns="" xmlns:p14="http://schemas.microsoft.com/office/powerpoint/2010/main" xmlns:pr="smNativeData" val="SMDATA_13_aDXlXhMAAAAlAAAAZAAAAA0AAAAAAAAAAAAAAAAAAAAAAAAAAAAAAAAAAAAAAAAAAAEAAABQAAAAAAAAAAAA4D8AAAAAAADgPwAAAAAAAOA/AAAAAAAA4D8AAAAAAADgPwAAAAAAAOA/AAAAAAAA4D8AAAAAAADgPwAAAAAAAOA/AAAAAAAA4D8CAAAAjAAAAAAAAAAAAAAA////AP///wgAAAAAAAAAAAAAAAAAAAAAAAAAAAAAAAAAAAAAeAAAAAEAAABAAAAAAAAAAAAAAABaAAAAAAAAAAAAAAAAAAAAAAAAAAAAAAAAAAAAAAAAAAAAAAAAAAAAAAAAAAAAAAAAAAAAAAAAAAAAAAAAAAAAAAAAAAAAAAAAAAAAFAAAADwAAAAAAAAAAAAAAAAAAAAPAAAAAQAAACMAAAAjAAAAIwAAAB4AAAAAAAAAZAAAAGQAAAAAAAAAZAAAAGQAAAAVAAAAYAAAAAAAAAAAAAAADwAAACADAAAAAAAAAAAAAAEAAACgMgAAVgcAAKr4//8BAAAAf39/AAEAAABkAAAAAAAAABQAAABAHwAAAAAAACYAAAAAAAAAwOD//wAAAAAmAAAAZAAAABYAAABMAAAAAAAAAAAAAAAEAAAAAAAAAAEAAADu7OEKAAAAACgAAAAoAAAAZAAAAGQAAAAAAAAAzMzMAAAAAABQAAAAUAAAAGQAAABkAAAAAAAAABcAAAAUAAAAAAAAAAAAAAD/fwAA/38AAAAAAAAJAAAABAAAAAAAAAAMAAAAEAAAAAAAAAAAAAAAAAAAAAAAAAAeAAAAaAAAAAAAAAAAAAAAAAAAAAAAAAAAAAAAECcAABAnAAAAAAAAAAAAAAAAAAAAAAAAAAAAAAAAAAAAAAAAAAAAABQAAAAAAAAAwMD/AAAAAABkAAAAMgAAAAAAAABkAAAAAAAAAH9/fwAKAAAAHwAAAFQAAAD///8AAAAAAQAAAAAAAAAAAAAAAAAAAAAAAAAAAAAAAAAAAAAAAAAAAAAAAH9/fwAAAAADzMzMAMDA/wB/f38AAAAAAAAAAAAAAAAAAAAAAAAAAAAhAAAAGAAAABQAAADBHAAA3wkAAHU1AABWIgAAEAAAACYAAAAIAAAAPQAAAAAAAAA="/>
+                <pr:smNativeData xmlns:pr="smNativeData" xmlns:p14="http://schemas.microsoft.com/office/powerpoint/2010/main" xmlns="" val="SMDATA_13_aDXlXhMAAAAlAAAAZAAAAA0AAAAAAAAAAAAAAAAAAAAAAAAAAAAAAAAAAAAAAAAAAAEAAABQAAAAAAAAAAAA4D8AAAAAAADgPwAAAAAAAOA/AAAAAAAA4D8AAAAAAADgPwAAAAAAAOA/AAAAAAAA4D8AAAAAAADgPwAAAAAAAOA/AAAAAAAA4D8CAAAAjAAAAAAAAAAAAAAA////AP///wgAAAAAAAAAAAAAAAAAAAAAAAAAAAAAAAAAAAAAeAAAAAEAAABAAAAAAAAAAAAAAABaAAAAAAAAAAAAAAAAAAAAAAAAAAAAAAAAAAAAAAAAAAAAAAAAAAAAAAAAAAAAAAAAAAAAAAAAAAAAAAAAAAAAAAAAAAAAAAAAAAAAFAAAADwAAAAAAAAAAAAAAAAAAAAPAAAAAQAAACMAAAAjAAAAIwAAAB4AAAAAAAAAZAAAAGQAAAAAAAAAZAAAAGQAAAAVAAAAYAAAAAAAAAAAAAAADwAAACADAAAAAAAAAAAAAAEAAACgMgAAVgcAAKr4//8BAAAAf39/AAEAAABkAAAAAAAAABQAAABAHwAAAAAAACYAAAAAAAAAwOD//wAAAAAmAAAAZAAAABYAAABMAAAAAAAAAAAAAAAEAAAAAAAAAAEAAADu7OEKAAAAACgAAAAoAAAAZAAAAGQAAAAAAAAAzMzMAAAAAABQAAAAUAAAAGQAAABkAAAAAAAAABcAAAAUAAAAAAAAAAAAAAD/fwAA/38AAAAAAAAJAAAABAAAAAAAAAAMAAAAEAAAAAAAAAAAAAAAAAAAAAAAAAAeAAAAaAAAAAAAAAAAAAAAAAAAAAAAAAAAAAAAECcAABAnAAAAAAAAAAAAAAAAAAAAAAAAAAAAAAAAAAAAAAAAAAAAABQAAAAAAAAAwMD/AAAAAABkAAAAMgAAAAAAAABkAAAAAAAAAH9/fwAKAAAAHwAAAFQAAAD///8AAAAAAQAAAAAAAAAAAAAAAAAAAAAAAAAAAAAAAAAAAAAAAAAAAAAAAH9/fwAAAAADzMzMAMDA/wB/f38AAAAAAAAAAAAAAAAAAAAAAAAAAAAhAAAAGAAAABQAAADBHAAA3wkAAHU1AABWIgAAEAAAACYAAAAIAAAAPQAAAAAAAAA="/>
               </a:ext>
             </a:extLst>
           </p:cNvSpPr>
@@ -2128,7 +2128,7 @@
             <a:spLocks noGrp="1" noChangeArrowheads="1"/>
             <a:extLst>
               <a:ext uri="smNativeData">
-                <pr:smNativeData xmlns="" xmlns:p14="http://schemas.microsoft.com/office/powerpoint/2010/main" xmlns:pr="smNativeData" val="SMDATA_13_aDXlXhMAAAAlAAAAZAAAAA0AAAAAAAAAAAAAAAAAAAAAAAAAAAAAAAABAAAAAAAAAAEAAABQAAAAAAAAAAAA4D8AAAAAAADgPwAAAAAAAOA/AAAAAAAA4D8AAAAAAADgPwAAAAAAAOA/AAAAAAAA4D8AAAAAAADgPwAAAAAAAOA/AAAAAAAA4D8CAAAAjAAAAAAAAAAAAAAA////AP///wgAAAAAAAAAAAAAAAAAAAAAAAAAAAAAAAAAAAAAeAAAAAEAAABAAAAAAAAAAAAAAABaAAAAAAAAAAAAAAAAAAAAAAAAAAAAAAAAAAAAAAAAAAAAAAAAAAAAAAAAAAAAAAAAAAAAAAAAAAAAAAAAAAAAAAAAAAAAAAAAAAAAFAAAADwAAAAAAAAAAAAAAAAAAAAPAAAAAQAAACMAAAAjAAAAIwAAAB4AAAAAAAAAZAAAAGQAAAAAAAAAZAAAAGQAAAAVAAAAYAAAAAAAAAAAAAAADwAAACADAAAAAAAAAAAAAAEAAACgMgAAVgcAAKr4//8BAAAAf39/AAEAAABkAAAAAAAAABQAAABAHwAAAAAAACYAAAAAAAAAwOD//wAAAAAmAAAAZAAAABYAAABMAAAAAAAAAAAAAAAEAAAAAAAAAAEAAADu7OEKAAAAACgAAAAoAAAAZAAAAGQAAAAAAAAAzMzMAAAAAABQAAAAUAAAAGQAAABkAAAAAAAAABcAAAAUAAAAAAAAAAAAAAD/fwAA/38AAAAAAAAJAAAABAAAAAAAAAAMAAAAEAAAAAAAAAAAAAAAAAAAAAAAAAAeAAAAaAAAAAAAAAAAAAAAAAAAAAAAAAAAAAAAECcAABAnAAAAAAAAAAAAAAAAAAAAAAAAAAAAAAAAAAAAAAAAAAAAABQAAAAAAAAAwMD/AAAAAABkAAAAMgAAAAAAAABkAAAAAAAAAH9/fwAKAAAAHwAAAFQAAAD///8AAAAAAQAAAAAAAAAAAAAAAAAAAAAAAAAAAAAAAAAAAAAAAAAAAAAAAH9/fwAAAAADzMzMAMDA/wB/f38AAAAAAAAAAAAAAAAAAAAAAAAAAAAhAAAAGAAAABQAAADQAgAArwEAAG81AAC6CAAAEAAAACYAAAAIAAAAPAAAAAAAAAA="/>
+                <pr:smNativeData xmlns:pr="smNativeData" xmlns:p14="http://schemas.microsoft.com/office/powerpoint/2010/main" xmlns="" val="SMDATA_13_aDXlXhMAAAAlAAAAZAAAAA0AAAAAAAAAAAAAAAAAAAAAAAAAAAAAAAABAAAAAAAAAAEAAABQAAAAAAAAAAAA4D8AAAAAAADgPwAAAAAAAOA/AAAAAAAA4D8AAAAAAADgPwAAAAAAAOA/AAAAAAAA4D8AAAAAAADgPwAAAAAAAOA/AAAAAAAA4D8CAAAAjAAAAAAAAAAAAAAA////AP///wgAAAAAAAAAAAAAAAAAAAAAAAAAAAAAAAAAAAAAeAAAAAEAAABAAAAAAAAAAAAAAABaAAAAAAAAAAAAAAAAAAAAAAAAAAAAAAAAAAAAAAAAAAAAAAAAAAAAAAAAAAAAAAAAAAAAAAAAAAAAAAAAAAAAAAAAAAAAAAAAAAAAFAAAADwAAAAAAAAAAAAAAAAAAAAPAAAAAQAAACMAAAAjAAAAIwAAAB4AAAAAAAAAZAAAAGQAAAAAAAAAZAAAAGQAAAAVAAAAYAAAAAAAAAAAAAAADwAAACADAAAAAAAAAAAAAAEAAACgMgAAVgcAAKr4//8BAAAAf39/AAEAAABkAAAAAAAAABQAAABAHwAAAAAAACYAAAAAAAAAwOD//wAAAAAmAAAAZAAAABYAAABMAAAAAAAAAAAAAAAEAAAAAAAAAAEAAADu7OEKAAAAACgAAAAoAAAAZAAAAGQAAAAAAAAAzMzMAAAAAABQAAAAUAAAAGQAAABkAAAAAAAAABcAAAAUAAAAAAAAAAAAAAD/fwAA/38AAAAAAAAJAAAABAAAAAAAAAAMAAAAEAAAAAAAAAAAAAAAAAAAAAAAAAAeAAAAaAAAAAAAAAAAAAAAAAAAAAAAAAAAAAAAECcAABAnAAAAAAAAAAAAAAAAAAAAAAAAAAAAAAAAAAAAAAAAAAAAABQAAAAAAAAAwMD/AAAAAABkAAAAMgAAAAAAAABkAAAAAAAAAH9/fwAKAAAAHwAAAFQAAAD///8AAAAAAQAAAAAAAAAAAAAAAAAAAAAAAAAAAAAAAAAAAAAAAAAAAAAAAH9/fwAAAAADzMzMAMDA/wB/f38AAAAAAAAAAAAAAAAAAAAAAAAAAAAhAAAAGAAAABQAAADQAgAArwEAAG81AAC6CAAAEAAAACYAAAAIAAAAPAAAAAAAAAA="/>
               </a:ext>
             </a:extLst>
           </p:cNvSpPr>
@@ -2184,7 +2184,7 @@
             <a:spLocks noGrp="1" noChangeArrowheads="1"/>
             <a:extLst>
               <a:ext uri="smNativeData">
-                <pr:smNativeData xmlns="" xmlns:p14="http://schemas.microsoft.com/office/powerpoint/2010/main" xmlns:pr="smNativeData" val="SMDATA_13_aDXlXhMAAAAlAAAAZAAAAA0AAAAAAAAAAAAAAAAAAAAAAAAAAAAAAAABAAAAAAAAAAEAAABQAAAAAAAAAAAA4D8AAAAAAADgPwAAAAAAAOA/AAAAAAAA4D8AAAAAAADgPwAAAAAAAOA/AAAAAAAA4D8AAAAAAADgPwAAAAAAAOA/AAAAAAAA4D8CAAAAjAAAAAAAAAAAAAAA////AP///wgAAAAAAAAAAAAAAAAAAAAAAAAAAAAAAAAAAAAAeAAAAAEAAABAAAAAAAAAAAAAAABaAAAAAAAAAAAAAAAAAAAAAAAAAAAAAAAAAAAAAAAAAAAAAAAAAAAAAAAAAAAAAAAAAAAAAAAAAAAAAAAAAAAAAAAAAAAAAAAAAAAAFAAAADwAAAAAAAAAAAAAAAAAAAAPAAAAAQAAACMAAAAjAAAAIwAAAB4AAAAAAAAAZAAAAGQAAAAAAAAAZAAAAGQAAAAVAAAAYAAAAAAAAAAAAAAADwAAACADAAAAAAAAAAAAAAEAAACgMgAAVgcAAKr4//8BAAAAf39/AAEAAABkAAAAAAAAABQAAABAHwAAAAAAACYAAAAAAAAAwOD//wAAAAAmAAAAZAAAABYAAABMAAAAAAAAAAAAAAAEAAAAAAAAAAEAAADu7OEKAAAAACgAAAAoAAAAZAAAAGQAAAAAAAAAzMzMAAAAAABQAAAAUAAAAGQAAABkAAAAAAAAABcAAAAUAAAAAAAAAAAAAAD/fwAA/38AAAAAAAAJAAAABAAAAAAAAAAMAAAAEAAAAAAAAAAAAAAAAAAAAAAAAAAeAAAAaAAAAAAAAAAAAAAAAAAAAAAAAAAAAAAAECcAABAnAAAAAAAAAAAAAAAAAAAAAAAAAAAAAAAAAAAAAAAAAAAAABQAAAAAAAAAwMD/AAAAAABkAAAAMgAAAAAAAABkAAAAAAAAAH9/fwAKAAAAHwAAAFQAAAD///8AAAAAAQAAAAAAAAAAAAAAAAAAAAAAAAAAAAAAAAAAAAAAAAAAAAAAAH9/fwAAAAADzMzMAMDA/wB/f38AAAAAAAAAAAAAAAAAAAAAAAAAAAAhAAAAGAAAABQAAADQAgAArwEAAG81AABWIgAAEAAAACYAAAAIAAAAvYAAAAAAAAA="/>
+                <pr:smNativeData xmlns:pr="smNativeData" xmlns:p14="http://schemas.microsoft.com/office/powerpoint/2010/main" xmlns="" val="SMDATA_13_aDXlXhMAAAAlAAAAZAAAAA0AAAAAAAAAAAAAAAAAAAAAAAAAAAAAAAABAAAAAAAAAAEAAABQAAAAAAAAAAAA4D8AAAAAAADgPwAAAAAAAOA/AAAAAAAA4D8AAAAAAADgPwAAAAAAAOA/AAAAAAAA4D8AAAAAAADgPwAAAAAAAOA/AAAAAAAA4D8CAAAAjAAAAAAAAAAAAAAA////AP///wgAAAAAAAAAAAAAAAAAAAAAAAAAAAAAAAAAAAAAeAAAAAEAAABAAAAAAAAAAAAAAABaAAAAAAAAAAAAAAAAAAAAAAAAAAAAAAAAAAAAAAAAAAAAAAAAAAAAAAAAAAAAAAAAAAAAAAAAAAAAAAAAAAAAAAAAAAAAAAAAAAAAFAAAADwAAAAAAAAAAAAAAAAAAAAPAAAAAQAAACMAAAAjAAAAIwAAAB4AAAAAAAAAZAAAAGQAAAAAAAAAZAAAAGQAAAAVAAAAYAAAAAAAAAAAAAAADwAAACADAAAAAAAAAAAAAAEAAACgMgAAVgcAAKr4//8BAAAAf39/AAEAAABkAAAAAAAAABQAAABAHwAAAAAAACYAAAAAAAAAwOD//wAAAAAmAAAAZAAAABYAAABMAAAAAAAAAAAAAAAEAAAAAAAAAAEAAADu7OEKAAAAACgAAAAoAAAAZAAAAGQAAAAAAAAAzMzMAAAAAABQAAAAUAAAAGQAAABkAAAAAAAAABcAAAAUAAAAAAAAAAAAAAD/fwAA/38AAAAAAAAJAAAABAAAAAAAAAAMAAAAEAAAAAAAAAAAAAAAAAAAAAAAAAAeAAAAaAAAAAAAAAAAAAAAAAAAAAAAAAAAAAAAECcAABAnAAAAAAAAAAAAAAAAAAAAAAAAAAAAAAAAAAAAAAAAAAAAABQAAAAAAAAAwMD/AAAAAABkAAAAMgAAAAAAAABkAAAAAAAAAH9/fwAKAAAAHwAAAFQAAAD///8AAAAAAQAAAAAAAAAAAAAAAAAAAAAAAAAAAAAAAAAAAAAAAAAAAAAAAH9/fwAAAAADzMzMAMDA/wB/f38AAAAAAAAAAAAAAAAAAAAAAAAAAAAhAAAAGAAAABQAAADQAgAArwEAAG81AABWIgAAEAAAACYAAAAIAAAAvYAAAAAAAAA="/>
               </a:ext>
             </a:extLst>
           </p:cNvSpPr>
@@ -2273,7 +2273,7 @@
             <a:spLocks noGrp="1" noChangeArrowheads="1"/>
             <a:extLst>
               <a:ext uri="smNativeData">
-                <pr:smNativeData xmlns="" xmlns:p14="http://schemas.microsoft.com/office/powerpoint/2010/main" xmlns:pr="smNativeData" val="SMDATA_13_aDXlXhMAAAAlAAAAZAAAAA0AAAAAAAAAAAAAAAAAAAAAAAAAAAAAAAABAAAAAAAAAAEAAABQAAAAAAAAAAAA4D8AAAAAAADgPwAAAAAAAOA/AAAAAAAA4D8AAAAAAADgPwAAAAAAAOA/AAAAAAAA4D8AAAAAAADgPwAAAAAAAOA/AAAAAAAA4D8CAAAAjAAAAAAAAAAAAAAA////AP///wgAAAAAAAAAAAAAAAAAAAAAAAAAAAAAAAAAAAAAeAAAAAEAAABAAAAAAAAAAAAAAABaAAAAAAAAAAAAAAAAAAAAAAAAAAAAAAAAAAAAAAAAAAAAAAAAAAAAAAAAAAAAAAAAAAAAAAAAAAAAAAAAAAAAAAAAAAAAAAAAAAAAFAAAADwAAAAAAAAAAAAAAAAAAAAPAAAAAQAAACMAAAAjAAAAIwAAAB4AAAAAAAAAZAAAAGQAAAAAAAAAZAAAAGQAAAAVAAAAYAAAAAAAAAAAAAAADwAAACADAAAAAAAAAAAAAAEAAACgMgAAVgcAAKr4//8BAAAAf39/AAEAAABkAAAAAAAAABQAAABAHwAAAAAAACYAAAAAAAAAwOD//wAAAAAmAAAAZAAAABYAAABMAAAAAAAAAAAAAAAEAAAAAAAAAAEAAADu7OEKAAAAACgAAAAoAAAAZAAAAGQAAAAAAAAAzMzMAAAAAABQAAAAUAAAAGQAAABkAAAAAAAAABcAAAAUAAAAAAAAAAAAAAD/fwAA/38AAAAAAAAJAAAABAAAAAAAAAAMAAAAEAAAAAAAAAAAAAAAAAAAAAAAAAAeAAAAaAAAAAAAAAAAAAAAAAAAAAAAAAAAAAAAECcAABAnAAAAAAAAAAAAAAAAAAAAAAAAAAAAAAAAAAAAAAAAAAAAABQAAAAAAAAAwMD/AAAAAABkAAAAMgAAAAAAAABkAAAAAAAAAH9/fwAKAAAAHwAAAFQAAAD///8AAAAAAQAAAAAAAAAAAAAAAAAAAAAAAAAAAAAAAAAAAAAAAAAAAAAAAH9/fwAAAAADzMzMAMDA/wB/f38AAAAAAAAAAAAAAAAAAAAAAAAAAAAhAAAAGAAAABQAAADQAgAArwEAAG81AAC6CAAAEAAAACYAAAAIAAAAPAAAAAAAAAA="/>
+                <pr:smNativeData xmlns:pr="smNativeData" xmlns:p14="http://schemas.microsoft.com/office/powerpoint/2010/main" xmlns="" val="SMDATA_13_aDXlXhMAAAAlAAAAZAAAAA0AAAAAAAAAAAAAAAAAAAAAAAAAAAAAAAABAAAAAAAAAAEAAABQAAAAAAAAAAAA4D8AAAAAAADgPwAAAAAAAOA/AAAAAAAA4D8AAAAAAADgPwAAAAAAAOA/AAAAAAAA4D8AAAAAAADgPwAAAAAAAOA/AAAAAAAA4D8CAAAAjAAAAAAAAAAAAAAA////AP///wgAAAAAAAAAAAAAAAAAAAAAAAAAAAAAAAAAAAAAeAAAAAEAAABAAAAAAAAAAAAAAABaAAAAAAAAAAAAAAAAAAAAAAAAAAAAAAAAAAAAAAAAAAAAAAAAAAAAAAAAAAAAAAAAAAAAAAAAAAAAAAAAAAAAAAAAAAAAAAAAAAAAFAAAADwAAAAAAAAAAAAAAAAAAAAPAAAAAQAAACMAAAAjAAAAIwAAAB4AAAAAAAAAZAAAAGQAAAAAAAAAZAAAAGQAAAAVAAAAYAAAAAAAAAAAAAAADwAAACADAAAAAAAAAAAAAAEAAACgMgAAVgcAAKr4//8BAAAAf39/AAEAAABkAAAAAAAAABQAAABAHwAAAAAAACYAAAAAAAAAwOD//wAAAAAmAAAAZAAAABYAAABMAAAAAAAAAAAAAAAEAAAAAAAAAAEAAADu7OEKAAAAACgAAAAoAAAAZAAAAGQAAAAAAAAAzMzMAAAAAABQAAAAUAAAAGQAAABkAAAAAAAAABcAAAAUAAAAAAAAAAAAAAD/fwAA/38AAAAAAAAJAAAABAAAAAAAAAAMAAAAEAAAAAAAAAAAAAAAAAAAAAAAAAAeAAAAaAAAAAAAAAAAAAAAAAAAAAAAAAAAAAAAECcAABAnAAAAAAAAAAAAAAAAAAAAAAAAAAAAAAAAAAAAAAAAAAAAABQAAAAAAAAAwMD/AAAAAABkAAAAMgAAAAAAAABkAAAAAAAAAH9/fwAKAAAAHwAAAFQAAAD///8AAAAAAQAAAAAAAAAAAAAAAAAAAAAAAAAAAAAAAAAAAAAAAAAAAAAAAH9/fwAAAAADzMzMAMDA/wB/f38AAAAAAAAAAAAAAAAAAAAAAAAAAAAhAAAAGAAAABQAAADQAgAArwEAAG81AAC6CAAAEAAAACYAAAAIAAAAPAAAAAAAAAA="/>
               </a:ext>
             </a:extLst>
           </p:cNvSpPr>
@@ -2304,7 +2304,7 @@
             <a:spLocks noGrp="1" noChangeArrowheads="1"/>
             <a:extLst>
               <a:ext uri="smNativeData">
-                <pr:smNativeData xmlns="" xmlns:p14="http://schemas.microsoft.com/office/powerpoint/2010/main" xmlns:pr="smNativeData" val="SMDATA_13_aDXlXhMAAAAlAAAAZAAAAA0AAAAAAAAAAAAAAAAAAAAAAAAAAAAAAAAAAAAAAAAAAAEAAABQAAAAAAAAAAAA4D8AAAAAAADgPwAAAAAAAOA/AAAAAAAA4D8AAAAAAADgPwAAAAAAAOA/AAAAAAAA4D8AAAAAAADgPwAAAAAAAOA/AAAAAAAA4D8CAAAAjAAAAAAAAAAAAAAA////AP///wgAAAAAAAAAAAAAAAAAAAAAAAAAAAAAAAAAAAAAeAAAAAEAAABAAAAAAAAAAAAAAABaAAAAAAAAAAAAAAAAAAAAAAAAAAAAAAAAAAAAAAAAAAAAAAAAAAAAAAAAAAAAAAAAAAAAAAAAAAAAAAAAAAAAAAAAAAAAAAAAAAAAFAAAADwAAAAAAAAAAAAAAAAAAAAPAAAAAQAAACMAAAAjAAAAIwAAAB4AAAAAAAAAZAAAAGQAAAAAAAAAZAAAAGQAAAAVAAAAYAAAAAAAAAAAAAAADwAAACADAAAAAAAAAAAAAAEAAACgMgAAVgcAAKr4//8BAAAAf39/AAEAAABkAAAAAAAAABQAAABAHwAAAAAAACYAAAAAAAAAwOD//wAAAAAmAAAAZAAAABYAAABMAAAAAAAAAAAAAAAEAAAAAAAAAAEAAADu7OEKAAAAACgAAAAoAAAAZAAAAGQAAAAAAAAAzMzMAAAAAABQAAAAUAAAAGQAAABkAAAAAAAAABcAAAAUAAAAAAAAAAAAAAD/fwAA/38AAAAAAAAJAAAABAAAAAAAAAAMAAAAEAAAAAAAAAAAAAAAAAAAAAAAAAAeAAAAaAAAAAAAAAAAAAAAAAAAAAAAAAAAAAAAECcAABAnAAAAAAAAAAAAAAAAAAAAAAAAAAAAAAAAAAAAAAAAAAAAABQAAAAAAAAAwMD/AAAAAABkAAAAMgAAAAAAAABkAAAAAAAAAH9/fwAKAAAAHwAAAFQAAAD///8AAAAAAQAAAAAAAAAAAAAAAAAAAAAAAAAAAAAAAAAAAAAAAAAAAAAAAH9/fwAAAAADzMzMAMDA/wB/f38AAAAAAAAAAAAAAAAAAAAAAAAAAAAhAAAAGAAAABQAAADQAgAA3wkAAIQbAACKFQAAEAAAACYAAAAIAAAAPQAAAAAAAAA="/>
+                <pr:smNativeData xmlns:pr="smNativeData" xmlns:p14="http://schemas.microsoft.com/office/powerpoint/2010/main" xmlns="" val="SMDATA_13_aDXlXhMAAAAlAAAAZAAAAA0AAAAAAAAAAAAAAAAAAAAAAAAAAAAAAAAAAAAAAAAAAAEAAABQAAAAAAAAAAAA4D8AAAAAAADgPwAAAAAAAOA/AAAAAAAA4D8AAAAAAADgPwAAAAAAAOA/AAAAAAAA4D8AAAAAAADgPwAAAAAAAOA/AAAAAAAA4D8CAAAAjAAAAAAAAAAAAAAA////AP///wgAAAAAAAAAAAAAAAAAAAAAAAAAAAAAAAAAAAAAeAAAAAEAAABAAAAAAAAAAAAAAABaAAAAAAAAAAAAAAAAAAAAAAAAAAAAAAAAAAAAAAAAAAAAAAAAAAAAAAAAAAAAAAAAAAAAAAAAAAAAAAAAAAAAAAAAAAAAAAAAAAAAFAAAADwAAAAAAAAAAAAAAAAAAAAPAAAAAQAAACMAAAAjAAAAIwAAAB4AAAAAAAAAZAAAAGQAAAAAAAAAZAAAAGQAAAAVAAAAYAAAAAAAAAAAAAAADwAAACADAAAAAAAAAAAAAAEAAACgMgAAVgcAAKr4//8BAAAAf39/AAEAAABkAAAAAAAAABQAAABAHwAAAAAAACYAAAAAAAAAwOD//wAAAAAmAAAAZAAAABYAAABMAAAAAAAAAAAAAAAEAAAAAAAAAAEAAADu7OEKAAAAACgAAAAoAAAAZAAAAGQAAAAAAAAAzMzMAAAAAABQAAAAUAAAAGQAAABkAAAAAAAAABcAAAAUAAAAAAAAAAAAAAD/fwAA/38AAAAAAAAJAAAABAAAAAAAAAAMAAAAEAAAAAAAAAAAAAAAAAAAAAAAAAAeAAAAaAAAAAAAAAAAAAAAAAAAAAAAAAAAAAAAECcAABAnAAAAAAAAAAAAAAAAAAAAAAAAAAAAAAAAAAAAAAAAAAAAABQAAAAAAAAAwMD/AAAAAABkAAAAMgAAAAAAAABkAAAAAAAAAH9/fwAKAAAAHwAAAFQAAAD///8AAAAAAQAAAAAAAAAAAAAAAAAAAAAAAAAAAAAAAAAAAAAAAAAAAAAAAH9/fwAAAAADzMzMAMDA/wB/f38AAAAAAAAAAAAAAAAAAAAAAAAAAAAhAAAAGAAAABQAAADQAgAA3wkAAIQbAACKFQAAEAAAACYAAAAIAAAAPQAAAAAAAAA="/>
               </a:ext>
             </a:extLst>
           </p:cNvSpPr>
@@ -2340,7 +2340,7 @@
             <a:spLocks noGrp="1" noChangeArrowheads="1"/>
             <a:extLst>
               <a:ext uri="smNativeData">
-                <pr:smNativeData xmlns="" xmlns:p14="http://schemas.microsoft.com/office/powerpoint/2010/main" xmlns:pr="smNativeData" val="SMDATA_13_aDXlXhMAAAAlAAAAZAAAAA0AAAAAAAAAAAAAAAAAAAAAAAAAAAAAAAAAAAAAAAAAAAEAAABQAAAAAAAAAAAA4D8AAAAAAADgPwAAAAAAAOA/AAAAAAAA4D8AAAAAAADgPwAAAAAAAOA/AAAAAAAA4D8AAAAAAADgPwAAAAAAAOA/AAAAAAAA4D8CAAAAjAAAAAAAAAAAAAAA////AP///wgAAAAAAAAAAAAAAAAAAAAAAAAAAAAAAAAAAAAAeAAAAAEAAABAAAAAAAAAAAAAAABaAAAAAAAAAAAAAAAAAAAAAAAAAAAAAAAAAAAAAAAAAAAAAAAAAAAAAAAAAAAAAAAAAAAAAAAAAAAAAAAAAAAAAAAAAAAAAAAAAAAAFAAAADwAAAAAAAAAAAAAAAAAAAAPAAAAAQAAACMAAAAjAAAAIwAAAB4AAAAAAAAAZAAAAGQAAAAAAAAAZAAAAGQAAAAVAAAAYAAAAAAAAAAAAAAADwAAACADAAAAAAAAAAAAAAEAAACgMgAAVgcAAKr4//8BAAAAf39/AAEAAABkAAAAAAAAABQAAABAHwAAAAAAACYAAAAAAAAAwOD//wAAAAAmAAAAZAAAABYAAABMAAAAAAAAAAAAAAAEAAAAAAAAAAEAAADu7OEKAAAAACgAAAAoAAAAZAAAAGQAAAAAAAAAzMzMAAAAAABQAAAAUAAAAGQAAABkAAAAAAAAABcAAAAUAAAAAAAAAAAAAAD/fwAA/38AAAAAAAAJAAAABAAAAAAAAAAMAAAAEAAAAAAAAAAAAAAAAAAAAAAAAAAeAAAAaAAAAAAAAAAAAAAAAAAAAAAAAAAAAAAAECcAABAnAAAAAAAAAAAAAAAAAAAAAAAAAAAAAAAAAAAAAAAAAAAAABQAAAAAAAAAwMD/AAAAAABkAAAAMgAAAAAAAABkAAAAAAAAAH9/fwAKAAAAHwAAAFQAAAD///8AAAAAAQAAAAAAAAAAAAAAAAAAAAAAAAAAAAAAAAAAAAAAAAAAAAAAAH9/fwAAAAADzMzMAMDA/wB/f38AAAAAAAAAAAAAAAAAAAAAAAAAAAAhAAAAGAAAABQAAADQAgAApxYAAIQbAABSIgAAEAAAACYAAAAIAAAAPQAAAAAAAAA="/>
+                <pr:smNativeData xmlns:pr="smNativeData" xmlns:p14="http://schemas.microsoft.com/office/powerpoint/2010/main" xmlns="" val="SMDATA_13_aDXlXhMAAAAlAAAAZAAAAA0AAAAAAAAAAAAAAAAAAAAAAAAAAAAAAAAAAAAAAAAAAAEAAABQAAAAAAAAAAAA4D8AAAAAAADgPwAAAAAAAOA/AAAAAAAA4D8AAAAAAADgPwAAAAAAAOA/AAAAAAAA4D8AAAAAAADgPwAAAAAAAOA/AAAAAAAA4D8CAAAAjAAAAAAAAAAAAAAA////AP///wgAAAAAAAAAAAAAAAAAAAAAAAAAAAAAAAAAAAAAeAAAAAEAAABAAAAAAAAAAAAAAABaAAAAAAAAAAAAAAAAAAAAAAAAAAAAAAAAAAAAAAAAAAAAAAAAAAAAAAAAAAAAAAAAAAAAAAAAAAAAAAAAAAAAAAAAAAAAAAAAAAAAFAAAADwAAAAAAAAAAAAAAAAAAAAPAAAAAQAAACMAAAAjAAAAIwAAAB4AAAAAAAAAZAAAAGQAAAAAAAAAZAAAAGQAAAAVAAAAYAAAAAAAAAAAAAAADwAAACADAAAAAAAAAAAAAAEAAACgMgAAVgcAAKr4//8BAAAAf39/AAEAAABkAAAAAAAAABQAAABAHwAAAAAAACYAAAAAAAAAwOD//wAAAAAmAAAAZAAAABYAAABMAAAAAAAAAAAAAAAEAAAAAAAAAAEAAADu7OEKAAAAACgAAAAoAAAAZAAAAGQAAAAAAAAAzMzMAAAAAABQAAAAUAAAAGQAAABkAAAAAAAAABcAAAAUAAAAAAAAAAAAAAD/fwAA/38AAAAAAAAJAAAABAAAAAAAAAAMAAAAEAAAAAAAAAAAAAAAAAAAAAAAAAAeAAAAaAAAAAAAAAAAAAAAAAAAAAAAAAAAAAAAECcAABAnAAAAAAAAAAAAAAAAAAAAAAAAAAAAAAAAAAAAAAAAAAAAABQAAAAAAAAAwMD/AAAAAABkAAAAMgAAAAAAAABkAAAAAAAAAH9/fwAKAAAAHwAAAFQAAAD///8AAAAAAQAAAAAAAAAAAAAAAAAAAAAAAAAAAAAAAAAAAAAAAAAAAAAAAH9/fwAAAAADzMzMAMDA/wB/f38AAAAAAAAAAAAAAAAAAAAAAAAAAAAhAAAAGAAAABQAAADQAgAApxYAAIQbAABSIgAAEAAAACYAAAAIAAAAPQAAAAAAAAA="/>
               </a:ext>
             </a:extLst>
           </p:cNvSpPr>
@@ -2376,7 +2376,7 @@
             <a:spLocks noGrp="1" noChangeArrowheads="1"/>
             <a:extLst>
               <a:ext uri="smNativeData">
-                <pr:smNativeData xmlns="" xmlns:p14="http://schemas.microsoft.com/office/powerpoint/2010/main" xmlns:pr="smNativeData" val="SMDATA_13_aDXlXhMAAAAlAAAAZAAAAA0AAAAAAAAAAAAAAAAAAAAAAAAAAAAAAAAAAAAAAAAAAAEAAABQAAAAAAAAAAAA4D8AAAAAAADgPwAAAAAAAOA/AAAAAAAA4D8AAAAAAADgPwAAAAAAAOA/AAAAAAAA4D8AAAAAAADgPwAAAAAAAOA/AAAAAAAA4D8CAAAAjAAAAAAAAAAAAAAA////AP///wgAAAAAAAAAAAAAAAAAAAAAAAAAAAAAAAAAAAAAeAAAAAEAAABAAAAAAAAAAAAAAABaAAAAAAAAAAAAAAAAAAAAAAAAAAAAAAAAAAAAAAAAAAAAAAAAAAAAAAAAAAAAAAAAAAAAAAAAAAAAAAAAAAAAAAAAAAAAAAAAAAAAFAAAADwAAAAAAAAAAAAAAAAAAAAPAAAAAQAAACMAAAAjAAAAIwAAAB4AAAAAAAAAZAAAAGQAAAAAAAAAZAAAAGQAAAAVAAAAYAAAAAAAAAAAAAAADwAAACADAAAAAAAAAAAAAAEAAACgMgAAVgcAAKr4//8BAAAAf39/AAEAAABkAAAAAAAAABQAAABAHwAAAAAAACYAAAAAAAAAwOD//wAAAAAmAAAAZAAAABYAAABMAAAAAAAAAAAAAAAEAAAAAAAAAAEAAADu7OEKAAAAACgAAAAoAAAAZAAAAGQAAAAAAAAAzMzMAAAAAABQAAAAUAAAAGQAAABkAAAAAAAAABcAAAAUAAAAAAAAAAAAAAD/fwAA/38AAAAAAAAJAAAABAAAAAAAAAAMAAAAEAAAAAAAAAAAAAAAAAAAAAAAAAAeAAAAaAAAAAAAAAAAAAAAAAAAAAAAAAAAAAAAECcAABAnAAAAAAAAAAAAAAAAAAAAAAAAAAAAAAAAAAAAAAAAAAAAABQAAAAAAAAAwMD/AAAAAABkAAAAMgAAAAAAAABkAAAAAAAAAH9/fwAKAAAAHwAAAFQAAAD///8AAAAAAQAAAAAAAAAAAAAAAAAAAAAAAAAAAAAAAAAAAAAAAAAAAAAAAH9/fwAAAAADzMzMAMDA/wB/f38AAAAAAAAAAAAAAAAAAAAAAAAAAAAhAAAAGAAAABQAAADBHAAA3wkAAHU1AABWIgAAEAAAACYAAAAIAAAAPQAAAAAAAAA="/>
+                <pr:smNativeData xmlns:pr="smNativeData" xmlns:p14="http://schemas.microsoft.com/office/powerpoint/2010/main" xmlns="" val="SMDATA_13_aDXlXhMAAAAlAAAAZAAAAA0AAAAAAAAAAAAAAAAAAAAAAAAAAAAAAAAAAAAAAAAAAAEAAABQAAAAAAAAAAAA4D8AAAAAAADgPwAAAAAAAOA/AAAAAAAA4D8AAAAAAADgPwAAAAAAAOA/AAAAAAAA4D8AAAAAAADgPwAAAAAAAOA/AAAAAAAA4D8CAAAAjAAAAAAAAAAAAAAA////AP///wgAAAAAAAAAAAAAAAAAAAAAAAAAAAAAAAAAAAAAeAAAAAEAAABAAAAAAAAAAAAAAABaAAAAAAAAAAAAAAAAAAAAAAAAAAAAAAAAAAAAAAAAAAAAAAAAAAAAAAAAAAAAAAAAAAAAAAAAAAAAAAAAAAAAAAAAAAAAAAAAAAAAFAAAADwAAAAAAAAAAAAAAAAAAAAPAAAAAQAAACMAAAAjAAAAIwAAAB4AAAAAAAAAZAAAAGQAAAAAAAAAZAAAAGQAAAAVAAAAYAAAAAAAAAAAAAAADwAAACADAAAAAAAAAAAAAAEAAACgMgAAVgcAAKr4//8BAAAAf39/AAEAAABkAAAAAAAAABQAAABAHwAAAAAAACYAAAAAAAAAwOD//wAAAAAmAAAAZAAAABYAAABMAAAAAAAAAAAAAAAEAAAAAAAAAAEAAADu7OEKAAAAACgAAAAoAAAAZAAAAGQAAAAAAAAAzMzMAAAAAABQAAAAUAAAAGQAAABkAAAAAAAAABcAAAAUAAAAAAAAAAAAAAD/fwAA/38AAAAAAAAJAAAABAAAAAAAAAAMAAAAEAAAAAAAAAAAAAAAAAAAAAAAAAAeAAAAaAAAAAAAAAAAAAAAAAAAAAAAAAAAAAAAECcAABAnAAAAAAAAAAAAAAAAAAAAAAAAAAAAAAAAAAAAAAAAAAAAABQAAAAAAAAAwMD/AAAAAABkAAAAMgAAAAAAAABkAAAAAAAAAH9/fwAKAAAAHwAAAFQAAAD///8AAAAAAQAAAAAAAAAAAAAAAAAAAAAAAAAAAAAAAAAAAAAAAAAAAAAAAH9/fwAAAAADzMzMAMDA/wB/f38AAAAAAAAAAAAAAAAAAAAAAAAAAAAhAAAAGAAAABQAAADBHAAA3wkAAHU1AABWIgAAEAAAACYAAAAIAAAAPQAAAAAAAAA="/>
               </a:ext>
             </a:extLst>
           </p:cNvSpPr>
@@ -2437,7 +2437,7 @@
             <a:spLocks noGrp="1" noChangeArrowheads="1"/>
             <a:extLst>
               <a:ext uri="smNativeData">
-                <pr:smNativeData xmlns="" xmlns:p14="http://schemas.microsoft.com/office/powerpoint/2010/main" xmlns:pr="smNativeData" val="SMDATA_13_aDXlXhMAAAAlAAAAZAAAAA0AAAAAAAAAAAAAAAAAAAAAAAAAAAAAAAABAAAAAAAAAAEAAABQAAAAAAAAAAAA4D8AAAAAAADgPwAAAAAAAOA/AAAAAAAA4D8AAAAAAADgPwAAAAAAAOA/AAAAAAAA4D8AAAAAAADgPwAAAAAAAOA/AAAAAAAA4D8CAAAAjAAAAAAAAAAAAAAA////AP///wgAAAAAAAAAAAAAAAAAAAAAAAAAAAAAAAAAAAAAeAAAAAEAAABAAAAAAAAAAAAAAABaAAAAAAAAAAAAAAAAAAAAAAAAAAAAAAAAAAAAAAAAAAAAAAAAAAAAAAAAAAAAAAAAAAAAAAAAAAAAAAAAAAAAAAAAAAAAAAAAAAAAFAAAADwAAAAAAAAAAAAAAAAAAAAPAAAAAQAAACMAAAAjAAAAIwAAAB4AAAAAAAAAZAAAAGQAAAAAAAAAZAAAAGQAAAAVAAAAYAAAAAAAAAAAAAAADwAAACADAAAAAAAAAAAAAAEAAACgMgAAVgcAAKr4//8BAAAAf39/AAEAAABkAAAAAAAAABQAAABAHwAAAAAAACYAAAAAAAAAwOD//wAAAAAmAAAAZAAAABYAAABMAAAAAAAAAAAAAAAEAAAAAAAAAAEAAADu7OEKAAAAACgAAAAoAAAAZAAAAGQAAAAAAAAAzMzMAAAAAABQAAAAUAAAAGQAAABkAAAAAAAAABcAAAAUAAAAAAAAAAAAAAD/fwAA/38AAAAAAAAJAAAABAAAAAAAAAAMAAAAEAAAAAAAAAAAAAAAAAAAAAAAAAAeAAAAaAAAAAAAAAAAAAAAAAAAAAAAAAAAAAAAECcAABAnAAAAAAAAAAAAAAAAAAAAAAAAAAAAAAAAAAAAAAAAAAAAABQAAAAAAAAAwMD/AAAAAABkAAAAMgAAAAAAAABkAAAAAAAAAH9/fwAKAAAAHwAAAFQAAAD///8AAAAAAQAAAAAAAAAAAAAAAAAAAAAAAAAAAAAAAAAAAAAAAAAAAAAAAH9/fwAAAAADzMzMAMDA/wB/f38AAAAAAAAAAAAAAAAAAAAAAAAAAAAhAAAAGAAAABQAAADQAgAArwEAAG81AAC6CAAAEAAAACYAAAAIAAAAPAAAAAAAAAA="/>
+                <pr:smNativeData xmlns:pr="smNativeData" xmlns:p14="http://schemas.microsoft.com/office/powerpoint/2010/main" xmlns="" val="SMDATA_13_aDXlXhMAAAAlAAAAZAAAAA0AAAAAAAAAAAAAAAAAAAAAAAAAAAAAAAABAAAAAAAAAAEAAABQAAAAAAAAAAAA4D8AAAAAAADgPwAAAAAAAOA/AAAAAAAA4D8AAAAAAADgPwAAAAAAAOA/AAAAAAAA4D8AAAAAAADgPwAAAAAAAOA/AAAAAAAA4D8CAAAAjAAAAAAAAAAAAAAA////AP///wgAAAAAAAAAAAAAAAAAAAAAAAAAAAAAAAAAAAAAeAAAAAEAAABAAAAAAAAAAAAAAABaAAAAAAAAAAAAAAAAAAAAAAAAAAAAAAAAAAAAAAAAAAAAAAAAAAAAAAAAAAAAAAAAAAAAAAAAAAAAAAAAAAAAAAAAAAAAAAAAAAAAFAAAADwAAAAAAAAAAAAAAAAAAAAPAAAAAQAAACMAAAAjAAAAIwAAAB4AAAAAAAAAZAAAAGQAAAAAAAAAZAAAAGQAAAAVAAAAYAAAAAAAAAAAAAAADwAAACADAAAAAAAAAAAAAAEAAACgMgAAVgcAAKr4//8BAAAAf39/AAEAAABkAAAAAAAAABQAAABAHwAAAAAAACYAAAAAAAAAwOD//wAAAAAmAAAAZAAAABYAAABMAAAAAAAAAAAAAAAEAAAAAAAAAAEAAADu7OEKAAAAACgAAAAoAAAAZAAAAGQAAAAAAAAAzMzMAAAAAABQAAAAUAAAAGQAAABkAAAAAAAAABcAAAAUAAAAAAAAAAAAAAD/fwAA/38AAAAAAAAJAAAABAAAAAAAAAAMAAAAEAAAAAAAAAAAAAAAAAAAAAAAAAAeAAAAaAAAAAAAAAAAAAAAAAAAAAAAAAAAAAAAECcAABAnAAAAAAAAAAAAAAAAAAAAAAAAAAAAAAAAAAAAAAAAAAAAABQAAAAAAAAAwMD/AAAAAABkAAAAMgAAAAAAAABkAAAAAAAAAH9/fwAKAAAAHwAAAFQAAAD///8AAAAAAQAAAAAAAAAAAAAAAAAAAAAAAAAAAAAAAAAAAAAAAAAAAAAAAH9/fwAAAAADzMzMAMDA/wB/f38AAAAAAAAAAAAAAAAAAAAAAAAAAAAhAAAAGAAAABQAAADQAgAArwEAAG81AAC6CAAAEAAAACYAAAAIAAAAPAAAAAAAAAA="/>
               </a:ext>
             </a:extLst>
           </p:cNvSpPr>
@@ -2468,7 +2468,7 @@
             <a:spLocks noGrp="1" noChangeArrowheads="1"/>
             <a:extLst>
               <a:ext uri="smNativeData">
-                <pr:smNativeData xmlns="" xmlns:p14="http://schemas.microsoft.com/office/powerpoint/2010/main" xmlns:pr="smNativeData" val="SMDATA_13_aDXlXhMAAAAlAAAAZAAAAA0AAAAAAAAAAAAAAAAAAAAAAAAAAAAAAAAAAAAAAAAAAAEAAABQAAAAAAAAAAAA4D8AAAAAAADgPwAAAAAAAOA/AAAAAAAA4D8AAAAAAADgPwAAAAAAAOA/AAAAAAAA4D8AAAAAAADgPwAAAAAAAOA/AAAAAAAA4D8CAAAAjAAAAAAAAAAAAAAA////AP///wgAAAAAAAAAAAAAAAAAAAAAAAAAAAAAAAAAAAAAeAAAAAEAAABAAAAAAAAAAAAAAABaAAAAAAAAAAAAAAAAAAAAAAAAAAAAAAAAAAAAAAAAAAAAAAAAAAAAAAAAAAAAAAAAAAAAAAAAAAAAAAAAAAAAAAAAAAAAAAAAAAAAFAAAADwAAAAAAAAAAAAAAAAAAAAPAAAAAQAAACMAAAAjAAAAIwAAAB4AAAAAAAAAZAAAAGQAAAAAAAAAZAAAAGQAAAAVAAAAYAAAAAAAAAAAAAAADwAAACADAAAAAAAAAAAAAAEAAACgMgAAVgcAAKr4//8BAAAAf39/AAEAAABkAAAAAAAAABQAAABAHwAAAAAAACYAAAAAAAAAwOD//wAAAAAmAAAAZAAAABYAAABMAAAAAAAAAAAAAAAEAAAAAAAAAAEAAADu7OEKAAAAACgAAAAoAAAAZAAAAGQAAAAAAAAAzMzMAAAAAABQAAAAUAAAAGQAAABkAAAAAAAAABcAAAAUAAAAAAAAAAAAAAD/fwAA/38AAAAAAAAJAAAABAAAAAAAAAAMAAAAEAAAAAAAAAAAAAAAAAAAAAAAAAAeAAAAaAAAAAAAAAAAAAAAAAAAAAAAAAAAAAAAECcAABAnAAAAAAAAAAAAAAAAAAAAAAAAAAAAAAAAAAAAAAAAAAAAABQAAAAAAAAAwMD/AAAAAABkAAAAMgAAAAAAAABkAAAAAAAAAH9/fwAKAAAAHwAAAFQAAAD///8AAAAAAQAAAAAAAAAAAAAAAAAAAAAAAAAAAAAAAAAAAAAAAAAAAAAAAH9/fwAAAAADzMzMAMDA/wB/f38AAAAAAAAAAAAAAAAAAAAAAAAAAAAhAAAAGAAAABQAAADQAgAA3wkAAIQbAABWIgAAEAAAACYAAAAIAAAAPQAAAAAAAAA="/>
+                <pr:smNativeData xmlns:pr="smNativeData" xmlns:p14="http://schemas.microsoft.com/office/powerpoint/2010/main" xmlns="" val="SMDATA_13_aDXlXhMAAAAlAAAAZAAAAA0AAAAAAAAAAAAAAAAAAAAAAAAAAAAAAAAAAAAAAAAAAAEAAABQAAAAAAAAAAAA4D8AAAAAAADgPwAAAAAAAOA/AAAAAAAA4D8AAAAAAADgPwAAAAAAAOA/AAAAAAAA4D8AAAAAAADgPwAAAAAAAOA/AAAAAAAA4D8CAAAAjAAAAAAAAAAAAAAA////AP///wgAAAAAAAAAAAAAAAAAAAAAAAAAAAAAAAAAAAAAeAAAAAEAAABAAAAAAAAAAAAAAABaAAAAAAAAAAAAAAAAAAAAAAAAAAAAAAAAAAAAAAAAAAAAAAAAAAAAAAAAAAAAAAAAAAAAAAAAAAAAAAAAAAAAAAAAAAAAAAAAAAAAFAAAADwAAAAAAAAAAAAAAAAAAAAPAAAAAQAAACMAAAAjAAAAIwAAAB4AAAAAAAAAZAAAAGQAAAAAAAAAZAAAAGQAAAAVAAAAYAAAAAAAAAAAAAAADwAAACADAAAAAAAAAAAAAAEAAACgMgAAVgcAAKr4//8BAAAAf39/AAEAAABkAAAAAAAAABQAAABAHwAAAAAAACYAAAAAAAAAwOD//wAAAAAmAAAAZAAAABYAAABMAAAAAAAAAAAAAAAEAAAAAAAAAAEAAADu7OEKAAAAACgAAAAoAAAAZAAAAGQAAAAAAAAAzMzMAAAAAABQAAAAUAAAAGQAAABkAAAAAAAAABcAAAAUAAAAAAAAAAAAAAD/fwAA/38AAAAAAAAJAAAABAAAAAAAAAAMAAAAEAAAAAAAAAAAAAAAAAAAAAAAAAAeAAAAaAAAAAAAAAAAAAAAAAAAAAAAAAAAAAAAECcAABAnAAAAAAAAAAAAAAAAAAAAAAAAAAAAAAAAAAAAAAAAAAAAABQAAAAAAAAAwMD/AAAAAABkAAAAMgAAAAAAAABkAAAAAAAAAH9/fwAKAAAAHwAAAFQAAAD///8AAAAAAQAAAAAAAAAAAAAAAAAAAAAAAAAAAAAAAAAAAAAAAAAAAAAAAH9/fwAAAAADzMzMAMDA/wB/f38AAAAAAAAAAAAAAAAAAAAAAAAAAAAhAAAAGAAAABQAAADQAgAA3wkAAIQbAABWIgAAEAAAACYAAAAIAAAAPQAAAAAAAAA="/>
               </a:ext>
             </a:extLst>
           </p:cNvSpPr>
@@ -2504,7 +2504,7 @@
             <a:spLocks noGrp="1" noChangeArrowheads="1"/>
             <a:extLst>
               <a:ext uri="smNativeData">
-                <pr:smNativeData xmlns="" xmlns:p14="http://schemas.microsoft.com/office/powerpoint/2010/main" xmlns:pr="smNativeData" val="SMDATA_13_aDXlXhMAAAAlAAAAZAAAAA0AAAAAAAAAAAAAAAAAAAAAAAAAAAAAAAAAAAAAAAAAAAEAAABQAAAAAAAAAAAA4D8AAAAAAADgPwAAAAAAAOA/AAAAAAAA4D8AAAAAAADgPwAAAAAAAOA/AAAAAAAA4D8AAAAAAADgPwAAAAAAAOA/AAAAAAAA4D8CAAAAjAAAAAAAAAAAAAAA////AP///wgAAAAAAAAAAAAAAAAAAAAAAAAAAAAAAAAAAAAAeAAAAAEAAABAAAAAAAAAAAAAAABaAAAAAAAAAAAAAAAAAAAAAAAAAAAAAAAAAAAAAAAAAAAAAAAAAAAAAAAAAAAAAAAAAAAAAAAAAAAAAAAAAAAAAAAAAAAAAAAAAAAAFAAAADwAAAAAAAAAAAAAAAAAAAAPAAAAAQAAACMAAAAjAAAAIwAAAB4AAAAAAAAAZAAAAGQAAAAAAAAAZAAAAGQAAAAVAAAAYAAAAAAAAAAAAAAADwAAACADAAAAAAAAAAAAAAEAAACgMgAAVgcAAKr4//8BAAAAf39/AAEAAABkAAAAAAAAABQAAABAHwAAAAAAACYAAAAAAAAAwOD//wAAAAAmAAAAZAAAABYAAABMAAAAAAAAAAAAAAAEAAAAAAAAAAEAAADu7OEKAAAAACgAAAAoAAAAZAAAAGQAAAAAAAAAzMzMAAAAAABQAAAAUAAAAGQAAABkAAAAAAAAABcAAAAUAAAAAAAAAAAAAAD/fwAA/38AAAAAAAAJAAAABAAAAAAAAAAMAAAAEAAAAAAAAAAAAAAAAAAAAAAAAAAeAAAAaAAAAAAAAAAAAAAAAAAAAAAAAAAAAAAAECcAABAnAAAAAAAAAAAAAAAAAAAAAAAAAAAAAAAAAAAAAAAAAAAAABQAAAAAAAAAwMD/AAAAAABkAAAAMgAAAAAAAABkAAAAAAAAAH9/fwAKAAAAHwAAAFQAAAD///8AAAAAAQAAAAAAAAAAAAAAAAAAAAAAAAAAAAAAAAAAAAAAAAAAAAAAAH9/fwAAAAADzMzMAMDA/wB/f38AAAAAAAAAAAAAAAAAAAAAAAAAAAAhAAAAGAAAABQAAADBHAAA3wkAAHU1AACKFQAAEAAAACYAAAAIAAAAPQAAAAAAAAA="/>
+                <pr:smNativeData xmlns:pr="smNativeData" xmlns:p14="http://schemas.microsoft.com/office/powerpoint/2010/main" xmlns="" val="SMDATA_13_aDXlXhMAAAAlAAAAZAAAAA0AAAAAAAAAAAAAAAAAAAAAAAAAAAAAAAAAAAAAAAAAAAEAAABQAAAAAAAAAAAA4D8AAAAAAADgPwAAAAAAAOA/AAAAAAAA4D8AAAAAAADgPwAAAAAAAOA/AAAAAAAA4D8AAAAAAADgPwAAAAAAAOA/AAAAAAAA4D8CAAAAjAAAAAAAAAAAAAAA////AP///wgAAAAAAAAAAAAAAAAAAAAAAAAAAAAAAAAAAAAAeAAAAAEAAABAAAAAAAAAAAAAAABaAAAAAAAAAAAAAAAAAAAAAAAAAAAAAAAAAAAAAAAAAAAAAAAAAAAAAAAAAAAAAAAAAAAAAAAAAAAAAAAAAAAAAAAAAAAAAAAAAAAAFAAAADwAAAAAAAAAAAAAAAAAAAAPAAAAAQAAACMAAAAjAAAAIwAAAB4AAAAAAAAAZAAAAGQAAAAAAAAAZAAAAGQAAAAVAAAAYAAAAAAAAAAAAAAADwAAACADAAAAAAAAAAAAAAEAAACgMgAAVgcAAKr4//8BAAAAf39/AAEAAABkAAAAAAAAABQAAABAHwAAAAAAACYAAAAAAAAAwOD//wAAAAAmAAAAZAAAABYAAABMAAAAAAAAAAAAAAAEAAAAAAAAAAEAAADu7OEKAAAAACgAAAAoAAAAZAAAAGQAAAAAAAAAzMzMAAAAAABQAAAAUAAAAGQAAABkAAAAAAAAABcAAAAUAAAAAAAAAAAAAAD/fwAA/38AAAAAAAAJAAAABAAAAAAAAAAMAAAAEAAAAAAAAAAAAAAAAAAAAAAAAAAeAAAAaAAAAAAAAAAAAAAAAAAAAAAAAAAAAAAAECcAABAnAAAAAAAAAAAAAAAAAAAAAAAAAAAAAAAAAAAAAAAAAAAAABQAAAAAAAAAwMD/AAAAAABkAAAAMgAAAAAAAABkAAAAAAAAAH9/fwAKAAAAHwAAAFQAAAD///8AAAAAAQAAAAAAAAAAAAAAAAAAAAAAAAAAAAAAAAAAAAAAAAAAAAAAAH9/fwAAAAADzMzMAMDA/wB/f38AAAAAAAAAAAAAAAAAAAAAAAAAAAAhAAAAGAAAABQAAADBHAAA3wkAAHU1AACKFQAAEAAAACYAAAAIAAAAPQAAAAAAAAA="/>
               </a:ext>
             </a:extLst>
           </p:cNvSpPr>
@@ -2540,7 +2540,7 @@
             <a:spLocks noGrp="1" noChangeArrowheads="1"/>
             <a:extLst>
               <a:ext uri="smNativeData">
-                <pr:smNativeData xmlns="" xmlns:p14="http://schemas.microsoft.com/office/powerpoint/2010/main" xmlns:pr="smNativeData" val="SMDATA_13_aDXlXhMAAAAlAAAAZAAAAA0AAAAAAAAAAAAAAAAAAAAAAAAAAAAAAAAAAAAAAAAAAAEAAABQAAAAAAAAAAAA4D8AAAAAAADgPwAAAAAAAOA/AAAAAAAA4D8AAAAAAADgPwAAAAAAAOA/AAAAAAAA4D8AAAAAAADgPwAAAAAAAOA/AAAAAAAA4D8CAAAAjAAAAAAAAAAAAAAA////AP///wgAAAAAAAAAAAAAAAAAAAAAAAAAAAAAAAAAAAAAeAAAAAEAAABAAAAAAAAAAAAAAABaAAAAAAAAAAAAAAAAAAAAAAAAAAAAAAAAAAAAAAAAAAAAAAAAAAAAAAAAAAAAAAAAAAAAAAAAAAAAAAAAAAAAAAAAAAAAAAAAAAAAFAAAADwAAAAAAAAAAAAAAAAAAAAPAAAAAQAAACMAAAAjAAAAIwAAAB4AAAAAAAAAZAAAAGQAAAAAAAAAZAAAAGQAAAAVAAAAYAAAAAAAAAAAAAAADwAAACADAAAAAAAAAAAAAAEAAACgMgAAVgcAAKr4//8BAAAAf39/AAEAAABkAAAAAAAAABQAAABAHwAAAAAAACYAAAAAAAAAwOD//wAAAAAmAAAAZAAAABYAAABMAAAAAAAAAAAAAAAEAAAAAAAAAAEAAADu7OEKAAAAACgAAAAoAAAAZAAAAGQAAAAAAAAAzMzMAAAAAABQAAAAUAAAAGQAAABkAAAAAAAAABcAAAAUAAAAAAAAAAAAAAD/fwAA/38AAAAAAAAJAAAABAAAAAAAAAAMAAAAEAAAAAAAAAAAAAAAAAAAAAAAAAAeAAAAaAAAAAAAAAAAAAAAAAAAAAAAAAAAAAAAECcAABAnAAAAAAAAAAAAAAAAAAAAAAAAAAAAAAAAAAAAAAAAAAAAABQAAAAAAAAAwMD/AAAAAABkAAAAMgAAAAAAAABkAAAAAAAAAH9/fwAKAAAAHwAAAFQAAAD///8AAAAAAQAAAAAAAAAAAAAAAAAAAAAAAAAAAAAAAAAAAAAAAAAAAAAAAH9/fwAAAAADzMzMAMDA/wB/f38AAAAAAAAAAAAAAAAAAAAAAAAAAAAhAAAAGAAAABQAAADBHAAApxYAAHU1AABSIgAAEAAAACYAAAAIAAAAPQAAAAAAAAA="/>
+                <pr:smNativeData xmlns:pr="smNativeData" xmlns:p14="http://schemas.microsoft.com/office/powerpoint/2010/main" xmlns="" val="SMDATA_13_aDXlXhMAAAAlAAAAZAAAAA0AAAAAAAAAAAAAAAAAAAAAAAAAAAAAAAAAAAAAAAAAAAEAAABQAAAAAAAAAAAA4D8AAAAAAADgPwAAAAAAAOA/AAAAAAAA4D8AAAAAAADgPwAAAAAAAOA/AAAAAAAA4D8AAAAAAADgPwAAAAAAAOA/AAAAAAAA4D8CAAAAjAAAAAAAAAAAAAAA////AP///wgAAAAAAAAAAAAAAAAAAAAAAAAAAAAAAAAAAAAAeAAAAAEAAABAAAAAAAAAAAAAAABaAAAAAAAAAAAAAAAAAAAAAAAAAAAAAAAAAAAAAAAAAAAAAAAAAAAAAAAAAAAAAAAAAAAAAAAAAAAAAAAAAAAAAAAAAAAAAAAAAAAAFAAAADwAAAAAAAAAAAAAAAAAAAAPAAAAAQAAACMAAAAjAAAAIwAAAB4AAAAAAAAAZAAAAGQAAAAAAAAAZAAAAGQAAAAVAAAAYAAAAAAAAAAAAAAADwAAACADAAAAAAAAAAAAAAEAAACgMgAAVgcAAKr4//8BAAAAf39/AAEAAABkAAAAAAAAABQAAABAHwAAAAAAACYAAAAAAAAAwOD//wAAAAAmAAAAZAAAABYAAABMAAAAAAAAAAAAAAAEAAAAAAAAAAEAAADu7OEKAAAAACgAAAAoAAAAZAAAAGQAAAAAAAAAzMzMAAAAAABQAAAAUAAAAGQAAABkAAAAAAAAABcAAAAUAAAAAAAAAAAAAAD/fwAA/38AAAAAAAAJAAAABAAAAAAAAAAMAAAAEAAAAAAAAAAAAAAAAAAAAAAAAAAeAAAAaAAAAAAAAAAAAAAAAAAAAAAAAAAAAAAAECcAABAnAAAAAAAAAAAAAAAAAAAAAAAAAAAAAAAAAAAAAAAAAAAAABQAAAAAAAAAwMD/AAAAAABkAAAAMgAAAAAAAABkAAAAAAAAAH9/fwAKAAAAHwAAAFQAAAD///8AAAAAAQAAAAAAAAAAAAAAAAAAAAAAAAAAAAAAAAAAAAAAAAAAAAAAAH9/fwAAAAADzMzMAMDA/wB/f38AAAAAAAAAAAAAAAAAAAAAAAAAAAAhAAAAGAAAABQAAADBHAAApxYAAHU1AABSIgAAEAAAACYAAAAIAAAAPQAAAAAAAAA="/>
               </a:ext>
             </a:extLst>
           </p:cNvSpPr>
@@ -2601,7 +2601,7 @@
             <a:spLocks noGrp="1" noChangeArrowheads="1"/>
             <a:extLst>
               <a:ext uri="smNativeData">
-                <pr:smNativeData xmlns="" xmlns:p14="http://schemas.microsoft.com/office/powerpoint/2010/main" xmlns:pr="smNativeData" val="SMDATA_13_aDXlXhMAAAAlAAAAZAAAAA0AAAAAAAAAAAAAAAAAAAAAAAAAAAAAAAABAAAAAAAAAAEAAABQAAAAAAAAAAAA4D8AAAAAAADgPwAAAAAAAOA/AAAAAAAA4D8AAAAAAADgPwAAAAAAAOA/AAAAAAAA4D8AAAAAAADgPwAAAAAAAOA/AAAAAAAA4D8CAAAAjAAAAAAAAAAAAAAA////AP///wgAAAAAAAAAAAAAAAAAAAAAAAAAAAAAAAAAAAAAeAAAAAEAAABAAAAAAAAAAAAAAABaAAAAAAAAAAAAAAAAAAAAAAAAAAAAAAAAAAAAAAAAAAAAAAAAAAAAAAAAAAAAAAAAAAAAAAAAAAAAAAAAAAAAAAAAAAAAAAAAAAAAFAAAADwAAAAAAAAAAAAAAAAAAAAPAAAAAQAAACMAAAAjAAAAIwAAAB4AAAAAAAAAZAAAAGQAAAAAAAAAZAAAAGQAAAAVAAAAYAAAAAAAAAAAAAAADwAAACADAAAAAAAAAAAAAAEAAACgMgAAVgcAAKr4//8BAAAAf39/AAEAAABkAAAAAAAAABQAAABAHwAAAAAAACYAAAAAAAAAwOD//wAAAAAmAAAAZAAAABYAAABMAAAAAAAAAAAAAAAEAAAAAAAAAAEAAADu7OEKAAAAACgAAAAoAAAAZAAAAGQAAAAAAAAAzMzMAAAAAABQAAAAUAAAAGQAAABkAAAAAAAAABcAAAAUAAAAAAAAAAAAAAD/fwAA/38AAAAAAAAJAAAABAAAAAAAAAAMAAAAEAAAAAAAAAAAAAAAAAAAAAAAAAAeAAAAaAAAAAAAAAAAAAAAAAAAAAAAAAAAAAAAECcAABAnAAAAAAAAAAAAAAAAAAAAAAAAAAAAAAAAAAAAAAAAAAAAABQAAAAAAAAAwMD/AAAAAABkAAAAMgAAAAAAAABkAAAAAAAAAH9/fwAKAAAAHwAAAFQAAAD///8AAAAAAQAAAAAAAAAAAAAAAAAAAAAAAAAAAAAAAAAAAAAAAAAAAAAAAH9/fwAAAAADzMzMAMDA/wB/f38AAAAAAAAAAAAAAAAAAAAAAAAAAAAhAAAAGAAAABQAAADQAgAArwEAAG81AAC6CAAAEAAAACYAAAAIAAAAPAAAAAAAAAA="/>
+                <pr:smNativeData xmlns:pr="smNativeData" xmlns:p14="http://schemas.microsoft.com/office/powerpoint/2010/main" xmlns="" val="SMDATA_13_aDXlXhMAAAAlAAAAZAAAAA0AAAAAAAAAAAAAAAAAAAAAAAAAAAAAAAABAAAAAAAAAAEAAABQAAAAAAAAAAAA4D8AAAAAAADgPwAAAAAAAOA/AAAAAAAA4D8AAAAAAADgPwAAAAAAAOA/AAAAAAAA4D8AAAAAAADgPwAAAAAAAOA/AAAAAAAA4D8CAAAAjAAAAAAAAAAAAAAA////AP///wgAAAAAAAAAAAAAAAAAAAAAAAAAAAAAAAAAAAAAeAAAAAEAAABAAAAAAAAAAAAAAABaAAAAAAAAAAAAAAAAAAAAAAAAAAAAAAAAAAAAAAAAAAAAAAAAAAAAAAAAAAAAAAAAAAAAAAAAAAAAAAAAAAAAAAAAAAAAAAAAAAAAFAAAADwAAAAAAAAAAAAAAAAAAAAPAAAAAQAAACMAAAAjAAAAIwAAAB4AAAAAAAAAZAAAAGQAAAAAAAAAZAAAAGQAAAAVAAAAYAAAAAAAAAAAAAAADwAAACADAAAAAAAAAAAAAAEAAACgMgAAVgcAAKr4//8BAAAAf39/AAEAAABkAAAAAAAAABQAAABAHwAAAAAAACYAAAAAAAAAwOD//wAAAAAmAAAAZAAAABYAAABMAAAAAAAAAAAAAAAEAAAAAAAAAAEAAADu7OEKAAAAACgAAAAoAAAAZAAAAGQAAAAAAAAAzMzMAAAAAABQAAAAUAAAAGQAAABkAAAAAAAAABcAAAAUAAAAAAAAAAAAAAD/fwAA/38AAAAAAAAJAAAABAAAAAAAAAAMAAAAEAAAAAAAAAAAAAAAAAAAAAAAAAAeAAAAaAAAAAAAAAAAAAAAAAAAAAAAAAAAAAAAECcAABAnAAAAAAAAAAAAAAAAAAAAAAAAAAAAAAAAAAAAAAAAAAAAABQAAAAAAAAAwMD/AAAAAABkAAAAMgAAAAAAAABkAAAAAAAAAH9/fwAKAAAAHwAAAFQAAAD///8AAAAAAQAAAAAAAAAAAAAAAAAAAAAAAAAAAAAAAAAAAAAAAAAAAAAAAH9/fwAAAAADzMzMAMDA/wB/f38AAAAAAAAAAAAAAAAAAAAAAAAAAAAhAAAAGAAAABQAAADQAgAArwEAAG81AAC6CAAAEAAAACYAAAAIAAAAPAAAAAAAAAA="/>
               </a:ext>
             </a:extLst>
           </p:cNvSpPr>
@@ -2632,7 +2632,7 @@
             <a:spLocks noGrp="1" noChangeArrowheads="1"/>
             <a:extLst>
               <a:ext uri="smNativeData">
-                <pr:smNativeData xmlns="" xmlns:p14="http://schemas.microsoft.com/office/powerpoint/2010/main" xmlns:pr="smNativeData" val="SMDATA_13_aDXlXhMAAAAlAAAAZAAAAA0AAAAAAAAAAAAAAAAAAAAAAAAAAAAAAAAAAAAAAAAAAAEAAABQAAAAAAAAAAAA4D8AAAAAAADgPwAAAAAAAOA/AAAAAAAA4D8AAAAAAADgPwAAAAAAAOA/AAAAAAAA4D8AAAAAAADgPwAAAAAAAOA/AAAAAAAA4D8CAAAAjAAAAAAAAAAAAAAA////AP///wgAAAAAAAAAAAAAAAAAAAAAAAAAAAAAAAAAAAAAeAAAAAEAAABAAAAAAAAAAAAAAABaAAAAAAAAAAAAAAAAAAAAAAAAAAAAAAAAAAAAAAAAAAAAAAAAAAAAAAAAAAAAAAAAAAAAAAAAAAAAAAAAAAAAAAAAAAAAAAAAAAAAFAAAADwAAAAAAAAAAAAAAAAAAAAPAAAAAQAAACMAAAAjAAAAIwAAAB4AAAAAAAAAZAAAAGQAAAAAAAAAZAAAAGQAAAAVAAAAYAAAAAAAAAAAAAAADwAAACADAAAAAAAAAAAAAAEAAACgMgAAVgcAAKr4//8BAAAAf39/AAEAAABkAAAAAAAAABQAAABAHwAAAAAAACYAAAAAAAAAwOD//wAAAAAmAAAAZAAAABYAAABMAAAAAAAAAAAAAAAEAAAAAAAAAAEAAADu7OEKAAAAACgAAAAoAAAAZAAAAGQAAAAAAAAAzMzMAAAAAABQAAAAUAAAAGQAAABkAAAAAAAAABcAAAAUAAAAAAAAAAAAAAD/fwAA/38AAAAAAAAJAAAABAAAAAAAAAAMAAAAEAAAAAAAAAAAAAAAAAAAAAAAAAAeAAAAaAAAAAAAAAAAAAAAAAAAAAAAAAAAAAAAECcAABAnAAAAAAAAAAAAAAAAAAAAAAAAAAAAAAAAAAAAAAAAAAAAABQAAAAAAAAAwMD/AAAAAABkAAAAMgAAAAAAAABkAAAAAAAAAH9/fwAKAAAAHwAAAFQAAAD///8AAAAAAQAAAAAAAAAAAAAAAAAAAAAAAAAAAAAAAAAAAAAAAAAAAAAAAH9/fwAAAAADzMzMAMDA/wB/f38AAAAAAAAAAAAAAAAAAAAAAAAAAAAhAAAAGAAAABQAAADQAgAA3wkAAIQbAACKFQAAEAAAACYAAAAIAAAAPQAAAAAAAAA="/>
+                <pr:smNativeData xmlns:pr="smNativeData" xmlns:p14="http://schemas.microsoft.com/office/powerpoint/2010/main" xmlns="" val="SMDATA_13_aDXlXhMAAAAlAAAAZAAAAA0AAAAAAAAAAAAAAAAAAAAAAAAAAAAAAAAAAAAAAAAAAAEAAABQAAAAAAAAAAAA4D8AAAAAAADgPwAAAAAAAOA/AAAAAAAA4D8AAAAAAADgPwAAAAAAAOA/AAAAAAAA4D8AAAAAAADgPwAAAAAAAOA/AAAAAAAA4D8CAAAAjAAAAAAAAAAAAAAA////AP///wgAAAAAAAAAAAAAAAAAAAAAAAAAAAAAAAAAAAAAeAAAAAEAAABAAAAAAAAAAAAAAABaAAAAAAAAAAAAAAAAAAAAAAAAAAAAAAAAAAAAAAAAAAAAAAAAAAAAAAAAAAAAAAAAAAAAAAAAAAAAAAAAAAAAAAAAAAAAAAAAAAAAFAAAADwAAAAAAAAAAAAAAAAAAAAPAAAAAQAAACMAAAAjAAAAIwAAAB4AAAAAAAAAZAAAAGQAAAAAAAAAZAAAAGQAAAAVAAAAYAAAAAAAAAAAAAAADwAAACADAAAAAAAAAAAAAAEAAACgMgAAVgcAAKr4//8BAAAAf39/AAEAAABkAAAAAAAAABQAAABAHwAAAAAAACYAAAAAAAAAwOD//wAAAAAmAAAAZAAAABYAAABMAAAAAAAAAAAAAAAEAAAAAAAAAAEAAADu7OEKAAAAACgAAAAoAAAAZAAAAGQAAAAAAAAAzMzMAAAAAABQAAAAUAAAAGQAAABkAAAAAAAAABcAAAAUAAAAAAAAAAAAAAD/fwAA/38AAAAAAAAJAAAABAAAAAAAAAAMAAAAEAAAAAAAAAAAAAAAAAAAAAAAAAAeAAAAaAAAAAAAAAAAAAAAAAAAAAAAAAAAAAAAECcAABAnAAAAAAAAAAAAAAAAAAAAAAAAAAAAAAAAAAAAAAAAAAAAABQAAAAAAAAAwMD/AAAAAABkAAAAMgAAAAAAAABkAAAAAAAAAH9/fwAKAAAAHwAAAFQAAAD///8AAAAAAQAAAAAAAAAAAAAAAAAAAAAAAAAAAAAAAAAAAAAAAAAAAAAAAH9/fwAAAAADzMzMAMDA/wB/f38AAAAAAAAAAAAAAAAAAAAAAAAAAAAhAAAAGAAAABQAAADQAgAA3wkAAIQbAACKFQAAEAAAACYAAAAIAAAAPQAAAAAAAAA="/>
               </a:ext>
             </a:extLst>
           </p:cNvSpPr>
@@ -2668,7 +2668,7 @@
             <a:spLocks noGrp="1" noChangeArrowheads="1"/>
             <a:extLst>
               <a:ext uri="smNativeData">
-                <pr:smNativeData xmlns="" xmlns:p14="http://schemas.microsoft.com/office/powerpoint/2010/main" xmlns:pr="smNativeData" val="SMDATA_13_aDXlXhMAAAAlAAAAZAAAAA0AAAAAAAAAAAAAAAAAAAAAAAAAAAAAAAAAAAAAAAAAAAEAAABQAAAAAAAAAAAA4D8AAAAAAADgPwAAAAAAAOA/AAAAAAAA4D8AAAAAAADgPwAAAAAAAOA/AAAAAAAA4D8AAAAAAADgPwAAAAAAAOA/AAAAAAAA4D8CAAAAjAAAAAAAAAAAAAAA////AP///wgAAAAAAAAAAAAAAAAAAAAAAAAAAAAAAAAAAAAAeAAAAAEAAABAAAAAAAAAAAAAAABaAAAAAAAAAAAAAAAAAAAAAAAAAAAAAAAAAAAAAAAAAAAAAAAAAAAAAAAAAAAAAAAAAAAAAAAAAAAAAAAAAAAAAAAAAAAAAAAAAAAAFAAAADwAAAAAAAAAAAAAAAAAAAAPAAAAAQAAACMAAAAjAAAAIwAAAB4AAAAAAAAAZAAAAGQAAAAAAAAAZAAAAGQAAAAVAAAAYAAAAAAAAAAAAAAADwAAACADAAAAAAAAAAAAAAEAAACgMgAAVgcAAKr4//8BAAAAf39/AAEAAABkAAAAAAAAABQAAABAHwAAAAAAACYAAAAAAAAAwOD//wAAAAAmAAAAZAAAABYAAABMAAAAAAAAAAAAAAAEAAAAAAAAAAEAAADu7OEKAAAAACgAAAAoAAAAZAAAAGQAAAAAAAAAzMzMAAAAAABQAAAAUAAAAGQAAABkAAAAAAAAABcAAAAUAAAAAAAAAAAAAAD/fwAA/38AAAAAAAAJAAAABAAAAAAAAAAMAAAAEAAAAAAAAAAAAAAAAAAAAAAAAAAeAAAAaAAAAAAAAAAAAAAAAAAAAAAAAAAAAAAAECcAABAnAAAAAAAAAAAAAAAAAAAAAAAAAAAAAAAAAAAAAAAAAAAAABQAAAAAAAAAwMD/AAAAAABkAAAAMgAAAAAAAABkAAAAAAAAAH9/fwAKAAAAHwAAAFQAAAD///8AAAAAAQAAAAAAAAAAAAAAAAAAAAAAAAAAAAAAAAAAAAAAAAAAAAAAAH9/fwAAAAADzMzMAMDA/wB/f38AAAAAAAAAAAAAAAAAAAAAAAAAAAAhAAAAGAAAABQAAADBHAAA3wkAAHU1AACKFQAAEAAAACYAAAAIAAAAPQAAAAAAAAA="/>
+                <pr:smNativeData xmlns:pr="smNativeData" xmlns:p14="http://schemas.microsoft.com/office/powerpoint/2010/main" xmlns="" val="SMDATA_13_aDXlXhMAAAAlAAAAZAAAAA0AAAAAAAAAAAAAAAAAAAAAAAAAAAAAAAAAAAAAAAAAAAEAAABQAAAAAAAAAAAA4D8AAAAAAADgPwAAAAAAAOA/AAAAAAAA4D8AAAAAAADgPwAAAAAAAOA/AAAAAAAA4D8AAAAAAADgPwAAAAAAAOA/AAAAAAAA4D8CAAAAjAAAAAAAAAAAAAAA////AP///wgAAAAAAAAAAAAAAAAAAAAAAAAAAAAAAAAAAAAAeAAAAAEAAABAAAAAAAAAAAAAAABaAAAAAAAAAAAAAAAAAAAAAAAAAAAAAAAAAAAAAAAAAAAAAAAAAAAAAAAAAAAAAAAAAAAAAAAAAAAAAAAAAAAAAAAAAAAAAAAAAAAAFAAAADwAAAAAAAAAAAAAAAAAAAAPAAAAAQAAACMAAAAjAAAAIwAAAB4AAAAAAAAAZAAAAGQAAAAAAAAAZAAAAGQAAAAVAAAAYAAAAAAAAAAAAAAADwAAACADAAAAAAAAAAAAAAEAAACgMgAAVgcAAKr4//8BAAAAf39/AAEAAABkAAAAAAAAABQAAABAHwAAAAAAACYAAAAAAAAAwOD//wAAAAAmAAAAZAAAABYAAABMAAAAAAAAAAAAAAAEAAAAAAAAAAEAAADu7OEKAAAAACgAAAAoAAAAZAAAAGQAAAAAAAAAzMzMAAAAAABQAAAAUAAAAGQAAABkAAAAAAAAABcAAAAUAAAAAAAAAAAAAAD/fwAA/38AAAAAAAAJAAAABAAAAAAAAAAMAAAAEAAAAAAAAAAAAAAAAAAAAAAAAAAeAAAAaAAAAAAAAAAAAAAAAAAAAAAAAAAAAAAAECcAABAnAAAAAAAAAAAAAAAAAAAAAAAAAAAAAAAAAAAAAAAAAAAAABQAAAAAAAAAwMD/AAAAAABkAAAAMgAAAAAAAABkAAAAAAAAAH9/fwAKAAAAHwAAAFQAAAD///8AAAAAAQAAAAAAAAAAAAAAAAAAAAAAAAAAAAAAAAAAAAAAAAAAAAAAAH9/fwAAAAADzMzMAMDA/wB/f38AAAAAAAAAAAAAAAAAAAAAAAAAAAAhAAAAGAAAABQAAADBHAAA3wkAAHU1AACKFQAAEAAAACYAAAAIAAAAPQAAAAAAAAA="/>
               </a:ext>
             </a:extLst>
           </p:cNvSpPr>
@@ -2704,7 +2704,7 @@
             <a:spLocks noGrp="1" noChangeArrowheads="1"/>
             <a:extLst>
               <a:ext uri="smNativeData">
-                <pr:smNativeData xmlns="" xmlns:p14="http://schemas.microsoft.com/office/powerpoint/2010/main" xmlns:pr="smNativeData" val="SMDATA_13_aDXlXhMAAAAlAAAAZAAAAA0AAAAAAAAAAAAAAAAAAAAAAAAAAAAAAAAAAAAAAAAAAAEAAABQAAAAAAAAAAAA4D8AAAAAAADgPwAAAAAAAOA/AAAAAAAA4D8AAAAAAADgPwAAAAAAAOA/AAAAAAAA4D8AAAAAAADgPwAAAAAAAOA/AAAAAAAA4D8CAAAAjAAAAAAAAAAAAAAA////AP///wgAAAAAAAAAAAAAAAAAAAAAAAAAAAAAAAAAAAAAeAAAAAEAAABAAAAAAAAAAAAAAABaAAAAAAAAAAAAAAAAAAAAAAAAAAAAAAAAAAAAAAAAAAAAAAAAAAAAAAAAAAAAAAAAAAAAAAAAAAAAAAAAAAAAAAAAAAAAAAAAAAAAFAAAADwAAAAAAAAAAAAAAAAAAAAPAAAAAQAAACMAAAAjAAAAIwAAAB4AAAAAAAAAZAAAAGQAAAAAAAAAZAAAAGQAAAAVAAAAYAAAAAAAAAAAAAAADwAAACADAAAAAAAAAAAAAAEAAACgMgAAVgcAAKr4//8BAAAAf39/AAEAAABkAAAAAAAAABQAAABAHwAAAAAAACYAAAAAAAAAwOD//wAAAAAmAAAAZAAAABYAAABMAAAAAAAAAAAAAAAEAAAAAAAAAAEAAADu7OEKAAAAACgAAAAoAAAAZAAAAGQAAAAAAAAAzMzMAAAAAABQAAAAUAAAAGQAAABkAAAAAAAAABcAAAAUAAAAAAAAAAAAAAD/fwAA/38AAAAAAAAJAAAABAAAAAAAAAAMAAAAEAAAAAAAAAAAAAAAAAAAAAAAAAAeAAAAaAAAAAAAAAAAAAAAAAAAAAAAAAAAAAAAECcAABAnAAAAAAAAAAAAAAAAAAAAAAAAAAAAAAAAAAAAAAAAAAAAABQAAAAAAAAAwMD/AAAAAABkAAAAMgAAAAAAAABkAAAAAAAAAH9/fwAKAAAAHwAAAFQAAAD///8AAAAAAQAAAAAAAAAAAAAAAAAAAAAAAAAAAAAAAAAAAAAAAAAAAAAAAH9/fwAAAAADzMzMAMDA/wB/f38AAAAAAAAAAAAAAAAAAAAAAAAAAAAhAAAAGAAAABQAAADQAgAApxYAAG81AABSIgAAEAAAACYAAAAIAAAAPQAAAAAAAAA="/>
+                <pr:smNativeData xmlns:pr="smNativeData" xmlns:p14="http://schemas.microsoft.com/office/powerpoint/2010/main" xmlns="" val="SMDATA_13_aDXlXhMAAAAlAAAAZAAAAA0AAAAAAAAAAAAAAAAAAAAAAAAAAAAAAAAAAAAAAAAAAAEAAABQAAAAAAAAAAAA4D8AAAAAAADgPwAAAAAAAOA/AAAAAAAA4D8AAAAAAADgPwAAAAAAAOA/AAAAAAAA4D8AAAAAAADgPwAAAAAAAOA/AAAAAAAA4D8CAAAAjAAAAAAAAAAAAAAA////AP///wgAAAAAAAAAAAAAAAAAAAAAAAAAAAAAAAAAAAAAeAAAAAEAAABAAAAAAAAAAAAAAABaAAAAAAAAAAAAAAAAAAAAAAAAAAAAAAAAAAAAAAAAAAAAAAAAAAAAAAAAAAAAAAAAAAAAAAAAAAAAAAAAAAAAAAAAAAAAAAAAAAAAFAAAADwAAAAAAAAAAAAAAAAAAAAPAAAAAQAAACMAAAAjAAAAIwAAAB4AAAAAAAAAZAAAAGQAAAAAAAAAZAAAAGQAAAAVAAAAYAAAAAAAAAAAAAAADwAAACADAAAAAAAAAAAAAAEAAACgMgAAVgcAAKr4//8BAAAAf39/AAEAAABkAAAAAAAAABQAAABAHwAAAAAAACYAAAAAAAAAwOD//wAAAAAmAAAAZAAAABYAAABMAAAAAAAAAAAAAAAEAAAAAAAAAAEAAADu7OEKAAAAACgAAAAoAAAAZAAAAGQAAAAAAAAAzMzMAAAAAABQAAAAUAAAAGQAAABkAAAAAAAAABcAAAAUAAAAAAAAAAAAAAD/fwAA/38AAAAAAAAJAAAABAAAAAAAAAAMAAAAEAAAAAAAAAAAAAAAAAAAAAAAAAAeAAAAaAAAAAAAAAAAAAAAAAAAAAAAAAAAAAAAECcAABAnAAAAAAAAAAAAAAAAAAAAAAAAAAAAAAAAAAAAAAAAAAAAABQAAAAAAAAAwMD/AAAAAABkAAAAMgAAAAAAAABkAAAAAAAAAH9/fwAKAAAAHwAAAFQAAAD///8AAAAAAQAAAAAAAAAAAAAAAAAAAAAAAAAAAAAAAAAAAAAAAAAAAAAAAH9/fwAAAAADzMzMAMDA/wB/f38AAAAAAAAAAAAAAAAAAAAAAAAAAAAhAAAAGAAAABQAAADQAgAApxYAAG81AABSIgAAEAAAACYAAAAIAAAAPQAAAAAAAAA="/>
               </a:ext>
             </a:extLst>
           </p:cNvSpPr>
@@ -2772,7 +2772,7 @@
           <p:cNvPicPr>
             <a:extLst>
               <a:ext uri="smNativeData">
-                <pr:smNativeData xmlns="" xmlns:p14="http://schemas.microsoft.com/office/powerpoint/2010/main" xmlns:pr="smNativeData" val="SMDATA_15_aDXlXhMAAAAlAAAAEQAAAA0AAAAAkAAAAEgAAACQAAAASAAAAAAAAAAAAAAAAAAAAAEAAABQAAAAAAAAAAAA4D8AAAAAAADgPwAAAAAAAOA/AAAAAAAA4D8AAAAAAADgPwAAAAAAAOA/AAAAAAAA4D8AAAAAAADgPwAAAAAAAOA/AAAAAAAA4D8CAAAAjAAAAAAAAAAAAAAAT4G9DP///wgAAAAAAAAAAAAAAAAAAAAAAAAAAAAAAAAAAAAAZAAAAAEAAABAAAAAAAAAAAAAAAAAAAAAAAAAAAAAAAAAAAAAAAAAAAAAAAAAAAAAAAAAAAAAAAAAAAAAAAAAAAAAAAAAAAAAAAAAAAAAAAAAAAAAAAAAAAAAAAAAAAAAFAAAADwAAAAAAAAAAAAAAAAAAAkUAAAAAQAAABQAAAAUAAAAFAAAAAEAAAAAAAAAZAAAAGQAAAAAAAAAZAAAAGQAAAAVAAAAYAAAAAAAAAAAAAAADwAAACADAAAAAAAAAAAAAAEAAACgMgAAVgcAAKr4//8BAAAAf39/AAEAAABkAAAAAAAAABQAAABAHwAAAAAAACYAAAAAAAAAwOD//wAAAAAmAAAAZAAAABYAAABMAAAAAAAAAAAAAAAEAAAAAAAAAAEAAADu7OEKAAAAACgAAAAoAAAAZAAAAGQAAAAAAAAAzMzMAAAAAABQAAAAUAAAAGQAAABkAAAAAAAAAAcAAAA4AAAAAAAAAAAAAAAAAAAA////AAAAAAAAAAAAAAAAAAAAAAAAAAAAAAAAAAAAAABkAAAAZAAAAAAAAAAjAAAABAAAAGQAAAAXAAAAFAAAAAAAAAAAAAAA/38AAP9/AAAAAAAACQAAAAQAAAAAAAAADAAAABAAAAAAAAAAAAAAAAAAAAAAAAAAHgAAAGgAAAAAAAAAAAAAAAAAAAAAAAAAAAAAABAnAAAQJwAAAAAAAAAAAAAAAAAAAAAAAAAAAAAAAAAAAAAAAAAAAAAUAAAAAAAAAMDA/wAAAAAAZAAAADIAAAAAAAAAZAAAAAAAAAB/f38ACgAAAB8AAABUAAAAT4G9Bf///wEAAAAAAAAAAAAAAAAAAAAAAAAAAAAAAAAAAAAAAAAAAAAAAAJ/f38A7uzhA8zMzADAwP8Af39/AAAAAAAAAAAAAAAAAP///wAAAAAAIQAAABgAAAAUAAAAAAAAAMj///8+OAAAbyoAABAAAAAmAAAACAAAAP//////////"/>
+                <pr:smNativeData xmlns:pr="smNativeData" xmlns:p14="http://schemas.microsoft.com/office/powerpoint/2010/main" xmlns="" val="SMDATA_15_aDXlXhMAAAAlAAAAEQAAAA0AAAAAkAAAAEgAAACQAAAASAAAAAAAAAAAAAAAAAAAAAEAAABQAAAAAAAAAAAA4D8AAAAAAADgPwAAAAAAAOA/AAAAAAAA4D8AAAAAAADgPwAAAAAAAOA/AAAAAAAA4D8AAAAAAADgPwAAAAAAAOA/AAAAAAAA4D8CAAAAjAAAAAAAAAAAAAAAT4G9DP///wgAAAAAAAAAAAAAAAAAAAAAAAAAAAAAAAAAAAAAZAAAAAEAAABAAAAAAAAAAAAAAAAAAAAAAAAAAAAAAAAAAAAAAAAAAAAAAAAAAAAAAAAAAAAAAAAAAAAAAAAAAAAAAAAAAAAAAAAAAAAAAAAAAAAAAAAAAAAAAAAAAAAAFAAAADwAAAAAAAAAAAAAAAAAAAkUAAAAAQAAABQAAAAUAAAAFAAAAAEAAAAAAAAAZAAAAGQAAAAAAAAAZAAAAGQAAAAVAAAAYAAAAAAAAAAAAAAADwAAACADAAAAAAAAAAAAAAEAAACgMgAAVgcAAKr4//8BAAAAf39/AAEAAABkAAAAAAAAABQAAABAHwAAAAAAACYAAAAAAAAAwOD//wAAAAAmAAAAZAAAABYAAABMAAAAAAAAAAAAAAAEAAAAAAAAAAEAAADu7OEKAAAAACgAAAAoAAAAZAAAAGQAAAAAAAAAzMzMAAAAAABQAAAAUAAAAGQAAABkAAAAAAAAAAcAAAA4AAAAAAAAAAAAAAAAAAAA////AAAAAAAAAAAAAAAAAAAAAAAAAAAAAAAAAAAAAABkAAAAZAAAAAAAAAAjAAAABAAAAGQAAAAXAAAAFAAAAAAAAAAAAAAA/38AAP9/AAAAAAAACQAAAAQAAAAAAAAADAAAABAAAAAAAAAAAAAAAAAAAAAAAAAAHgAAAGgAAAAAAAAAAAAAAAAAAAAAAAAAAAAAABAnAAAQJwAAAAAAAAAAAAAAAAAAAAAAAAAAAAAAAAAAAAAAAAAAAAAUAAAAAAAAAMDA/wAAAAAAZAAAADIAAAAAAAAAZAAAAAAAAAB/f38ACgAAAB8AAABUAAAAT4G9Bf///wEAAAAAAAAAAAAAAAAAAAAAAAAAAAAAAAAAAAAAAAAAAAAAAAJ/f38A7uzhA8zMzADAwP8Af39/AAAAAAAAAAAAAAAAAP///wAAAAAAIQAAABgAAAAUAAAAAAAAAMj///8+OAAAbyoAABAAAAAmAAAACAAAAP//////////"/>
               </a:ext>
             </a:extLst>
           </p:cNvPicPr>
@@ -2805,7 +2805,7 @@
           <p:cNvSpPr>
             <a:extLst>
               <a:ext uri="smNativeData">
-                <pr:smNativeData xmlns="" xmlns:p14="http://schemas.microsoft.com/office/powerpoint/2010/main" xmlns:pr="smNativeData" val="SMDATA_13_aDXlXhMAAAAlAAAAZAAAAA0AAAAAjgAAAEcAAACOAAAARwAAAAAAAAAAAAAAAAAAAAEAAABQAAAAAAAAAAAA4D8AAAAAAADgPwAAAAAAAOA/AAAAAAAA4D8AAAAAAADgPwAAAAAAAOA/AAAAAAAA4D8AAAAAAADgPwAAAAAAAOA/AAAAAAAA4D8CAAAAjAAAAAEAAAAAAAAA////AP///wgAAAAAAAAAAAAAAAAAAAAAAAAAAAAAAAAAAAAAeAAAAAEAAABAAAAAAAAAAAAAAABaAAAAAAAAAAAAAAAAAAAAAAAAAAAAAAAAAAAAAAAAAAAAAAAAAAAAAAAAAAAAAAAAAAAAAAAAAAAAAAAAAAAAAAAAAAAAAAAAAAAAFAAAADwAAAAAAAAAAAAAAAAAAAkUAAAAAQAAABQAAAAUAAAAFAAAAAEAAAAAAAAAZAAAAGQAAAAAAAAAZAAAAGQAAAAVAAAAYAAAAAAAAAAAAAAADwAAACADAAAAAAAAAAAAAAEAAACgMgAAVgcAAKr4//8BAAAAf39/AAEAAABkAAAAAAAAABQAAABAHwAAAAAAACYAAAAAAAAAwOD//wAAAAAmAAAAZAAAABYAAABMAAAAAAAAAAAAAAAEAAAAAAAAAAEAAADu7OEKAAAAACgAAAAoAAAAZAAAAGQAAAAAAAAAzMzMAAAAAABQAAAAUAAAAGQAAABkAAAAAAAAABcAAAAUAAAAAAAAAAAAAAD/fwAA/38AAAAAAAAJAAAABAAAAAAAAAAMAAAAEAAAAAAAAAAAAAAAAAAAAAAAAAAeAAAAaAAAAAAAAAAAAAAAAAAAAAAAAAAAAAAAECcAABAnAAAAAAAAAAAAAAAAAAAAAAAAAAAAAAAAAAAAAAAAAAAAABQAAAAAAAAAwMD/AAAAAABkAAAAMgAAAAAAAABkAAAAAAAAAH9/fwAKAAAAHwAAAFQAAAD///8A////AQAAAAAAAAAAAAAAAAAAAAAAAAAAAAAAAAAAAAAAAAAAAAAAAn9/fwDu7OEDzMzMAMDA/wB/f38AAAAAAAAAAAAAAAAAAAAAAAAAAAAhAAAAGAAAABQAAAAAAAAA8AAAAOYIAABQCAAAEAAAACYAAAAIAAAA//////////8="/>
+                <pr:smNativeData xmlns:pr="smNativeData" xmlns:p14="http://schemas.microsoft.com/office/powerpoint/2010/main" xmlns="" val="SMDATA_13_aDXlXhMAAAAlAAAAZAAAAA0AAAAAjgAAAEcAAACOAAAARwAAAAAAAAAAAAAAAAAAAAEAAABQAAAAAAAAAAAA4D8AAAAAAADgPwAAAAAAAOA/AAAAAAAA4D8AAAAAAADgPwAAAAAAAOA/AAAAAAAA4D8AAAAAAADgPwAAAAAAAOA/AAAAAAAA4D8CAAAAjAAAAAEAAAAAAAAA////AP///wgAAAAAAAAAAAAAAAAAAAAAAAAAAAAAAAAAAAAAeAAAAAEAAABAAAAAAAAAAAAAAABaAAAAAAAAAAAAAAAAAAAAAAAAAAAAAAAAAAAAAAAAAAAAAAAAAAAAAAAAAAAAAAAAAAAAAAAAAAAAAAAAAAAAAAAAAAAAAAAAAAAAFAAAADwAAAAAAAAAAAAAAAAAAAkUAAAAAQAAABQAAAAUAAAAFAAAAAEAAAAAAAAAZAAAAGQAAAAAAAAAZAAAAGQAAAAVAAAAYAAAAAAAAAAAAAAADwAAACADAAAAAAAAAAAAAAEAAACgMgAAVgcAAKr4//8BAAAAf39/AAEAAABkAAAAAAAAABQAAABAHwAAAAAAACYAAAAAAAAAwOD//wAAAAAmAAAAZAAAABYAAABMAAAAAAAAAAAAAAAEAAAAAAAAAAEAAADu7OEKAAAAACgAAAAoAAAAZAAAAGQAAAAAAAAAzMzMAAAAAABQAAAAUAAAAGQAAABkAAAAAAAAABcAAAAUAAAAAAAAAAAAAAD/fwAA/38AAAAAAAAJAAAABAAAAAAAAAAMAAAAEAAAAAAAAAAAAAAAAAAAAAAAAAAeAAAAaAAAAAAAAAAAAAAAAAAAAAAAAAAAAAAAECcAABAnAAAAAAAAAAAAAAAAAAAAAAAAAAAAAAAAAAAAAAAAAAAAABQAAAAAAAAAwMD/AAAAAABkAAAAMgAAAAAAAABkAAAAAAAAAH9/fwAKAAAAHwAAAFQAAAD///8A////AQAAAAAAAAAAAAAAAAAAAAAAAAAAAAAAAAAAAAAAAAAAAAAAAn9/fwDu7OEDzMzMAMDA/wB/f38AAAAAAAAAAAAAAAAAAAAAAAAAAAAhAAAAGAAAABQAAAAAAAAA8AAAAOYIAABQCAAAEAAAACYAAAAIAAAA//////////8="/>
               </a:ext>
             </a:extLst>
           </p:cNvSpPr>
@@ -2874,7 +2874,7 @@
           <p:cNvPicPr>
             <a:extLst>
               <a:ext uri="smNativeData">
-                <pr:smNativeData xmlns="" xmlns:p14="http://schemas.microsoft.com/office/powerpoint/2010/main" xmlns:pr="smNativeData" val="SMDATA_15_aDXlXhMAAAAlAAAAEQAAAA0AAAAAkAAAAEgAAACQAAAASAAAAAAAAAAAAAAAAAAAAAEAAABQAAAAAAAAAAAA4D8AAAAAAADgPwAAAAAAAOA/AAAAAAAA4D8AAAAAAADgPwAAAAAAAOA/AAAAAAAA4D8AAAAAAADgPwAAAAAAAOA/AAAAAAAA4D8CAAAAjAAAAAAAAAAAAAAAT4G9DP///wgAAAAAAAAAAAAAAAAAAAAAAAAAAAAAAAAAAAAAZAAAAAEAAABAAAAAAAAAAAAAAAAAAAAAAAAAAAAAAAAAAAAAAAAAAAAAAAAAAAAAAAAAAAAAAAAAAAAAAAAAAAAAAAAAAAAAAAAAAAAAAAAAAAAAAAAAAAAAAAAAAAAAFAAAADwAAAAAAAAAAAAAAAAAAAkUAAAAAQAAABQAAAAUAAAAFAAAAAEAAAAAAAAAZAAAAGQAAAAAAAAAZAAAAGQAAAAVAAAAYAAAAAAAAAAAAAAADwAAACADAAAAAAAAAAAAAAEAAACgMgAAVgcAAKr4//8BAAAAf39/AAEAAABkAAAAAAAAABQAAABAHwAAAAAAACYAAAAAAAAAwOD//wAAAAAmAAAAZAAAABYAAABMAAAAAAAAAAAAAAAEAAAAAAAAAAEAAADu7OEKAAAAACgAAAAoAAAAZAAAAGQAAAAAAAAAzMzMAAAAAABQAAAAUAAAAGQAAABkAAAAAAAAAAcAAAA4AAAAAAAAAAAAAAAAAAAA////AAAAAAAAAAAAAAAAAAAAAAAAAAAAAAAAAAAAAABkAAAAZAAAAAAAAAAjAAAABAAAAGQAAAAXAAAAFAAAAAAAAAAAAAAA/38AAP9/AAAAAAAACQAAAAQAAADgHbMCDAAAABAAAAAAAAAAAAAAAAAAAAAAAAAAHgAAAGgAAAAAAAAAAAAAAAAAAAAAAAAAAAAAABAnAAAQJwAAAAAAAAAAAAAAAAAAAAAAAAAAAAAAAAAAAAAAAAAAAAAUAAAAAAAAAMDA/wAAAAAAZAAAADIAAAAAAAAAZAAAAAAAAAB/f38ACgAAAB8AAABUAAAAT4G9Bf///wEAAAAAAAAAAAAAAAAAAAAAAAAAAAAAAAAAAAAAAAAAAAAAAAJ/f38A7uzhA8zMzADAwP8Af39/AAAAAAAAAAAAAAAAAP///wAAAAAAIQAAABgAAAAUAAAAGwEAANoAAABxBgAA0wYAABAAAAAmAAAACAAAAP//////////"/>
+                <pr:smNativeData xmlns:pr="smNativeData" xmlns:p14="http://schemas.microsoft.com/office/powerpoint/2010/main" xmlns="" val="SMDATA_15_aDXlXhMAAAAlAAAAEQAAAA0AAAAAkAAAAEgAAACQAAAASAAAAAAAAAAAAAAAAAAAAAEAAABQAAAAAAAAAAAA4D8AAAAAAADgPwAAAAAAAOA/AAAAAAAA4D8AAAAAAADgPwAAAAAAAOA/AAAAAAAA4D8AAAAAAADgPwAAAAAAAOA/AAAAAAAA4D8CAAAAjAAAAAAAAAAAAAAAT4G9DP///wgAAAAAAAAAAAAAAAAAAAAAAAAAAAAAAAAAAAAAZAAAAAEAAABAAAAAAAAAAAAAAAAAAAAAAAAAAAAAAAAAAAAAAAAAAAAAAAAAAAAAAAAAAAAAAAAAAAAAAAAAAAAAAAAAAAAAAAAAAAAAAAAAAAAAAAAAAAAAAAAAAAAAFAAAADwAAAAAAAAAAAAAAAAAAAkUAAAAAQAAABQAAAAUAAAAFAAAAAEAAAAAAAAAZAAAAGQAAAAAAAAAZAAAAGQAAAAVAAAAYAAAAAAAAAAAAAAADwAAACADAAAAAAAAAAAAAAEAAACgMgAAVgcAAKr4//8BAAAAf39/AAEAAABkAAAAAAAAABQAAABAHwAAAAAAACYAAAAAAAAAwOD//wAAAAAmAAAAZAAAABYAAABMAAAAAAAAAAAAAAAEAAAAAAAAAAEAAADu7OEKAAAAACgAAAAoAAAAZAAAAGQAAAAAAAAAzMzMAAAAAABQAAAAUAAAAGQAAABkAAAAAAAAAAcAAAA4AAAAAAAAAAAAAAAAAAAA////AAAAAAAAAAAAAAAAAAAAAAAAAAAAAAAAAAAAAABkAAAAZAAAAAAAAAAjAAAABAAAAGQAAAAXAAAAFAAAAAAAAAAAAAAA/38AAP9/AAAAAAAACQAAAAQAAADgHbMCDAAAABAAAAAAAAAAAAAAAAAAAAAAAAAAHgAAAGgAAAAAAAAAAAAAAAAAAAAAAAAAAAAAABAnAAAQJwAAAAAAAAAAAAAAAAAAAAAAAAAAAAAAAAAAAAAAAAAAAAAUAAAAAAAAAMDA/wAAAAAAZAAAADIAAAAAAAAAZAAAAAAAAAB/f38ACgAAAB8AAABUAAAAT4G9Bf///wEAAAAAAAAAAAAAAAAAAAAAAAAAAAAAAAAAAAAAAAAAAAAAAAJ/f38A7uzhA8zMzADAwP8Af39/AAAAAAAAAAAAAAAAAP///wAAAAAAIQAAABgAAAAUAAAAGwEAANoAAABxBgAA0wYAABAAAAAmAAAACAAAAP//////////"/>
               </a:ext>
             </a:extLst>
           </p:cNvPicPr>
@@ -2907,7 +2907,7 @@
           <p:cNvPicPr>
             <a:extLst>
               <a:ext uri="smNativeData">
-                <pr:smNativeData xmlns="" xmlns:p14="http://schemas.microsoft.com/office/powerpoint/2010/main" xmlns:pr="smNativeData" val="SMDATA_15_aDXlXhMAAAAlAAAAEQAAAA0AAAAAkAAAAEgAAACQAAAASAAAAAAAAAAAAAAAAAAAAAEAAABQAAAAAAAAAAAA4D8AAAAAAADgPwAAAAAAAOA/AAAAAAAA4D8AAAAAAADgPwAAAAAAAOA/AAAAAAAA4D8AAAAAAADgPwAAAAAAAOA/AAAAAAAA4D8CAAAAjAAAAAAAAAAAAAAAT4G9DP///wgAAAAAAAAAAAAAAAAAAAAAAAAAAAAAAAAAAAAAZAAAAAEAAABAAAAAAAAAAAAAAAAAAAAAAAAAAAAAAAAAAAAAAAAAAAAAAAAAAAAAAAAAAAAAAAAAAAAAAAAAAAAAAAAAAAAAAAAAAAAAAAAAAAAAAAAAAAAAAAAAAAAAFAAAADwAAAAAAAAAAAAAAAAAAAkUAAAAAQAAABQAAAAUAAAAFAAAAAEAAAAAAAAAZAAAAGQAAAAAAAAAZAAAAGQAAAAVAAAAYAAAAAAAAAAAAAAADwAAACADAAAAAAAAAAAAAAEAAACgMgAAVgcAAKr4//8BAAAAf39/AAEAAABkAAAAAAAAABQAAABAHwAAAAAAACYAAAAAAAAAwOD//wAAAAAmAAAAZAAAABYAAABMAAAAAAAAAAAAAAAEAAAAAAAAAAEAAADu7OEKAAAAACgAAAAoAAAAZAAAAGQAAAAAAAAAzMzMAAAAAABQAAAAUAAAAGQAAABkAAAAAAAAAAcAAAA4AAAAAAAAAAAAAAAAAAAA////AAAAAAAAAAAAAAAAAAAAAAAAAAAAAAAAAAAAAABkAAAAZAAAAAAAAAAjAAAABAAAAGQAAAAXAAAAFAAAAAAAAAAAAAAA/38AAP9/AAAAAAAACQAAAAQAAAAAAAAADAAAABAAAAAAAAAAAAAAAAAAAAAAAAAAHgAAAGgAAAAAAAAAAAAAAAAAAAAAAAAAAAAAABAnAAAQJwAAAAAAAAAAAAAAAAAAAAAAAAAAAAAAAAAAAAAAAAAAAAAUAAAAAAAAAMDA/wAAAAAAZAAAADIAAAAAAAAAZAAAAAAAAAB/f38ACgAAAB8AAABUAAAAT4G9Bf///wEAAAAAAAAAAAAAAAAAAAAAAAAAAAAAAAAAAAAAAAAAAAAAAAJ/f38A7uzhA8zMzADAwP8Af39/AAAAAAAAAAAAAAAAAP///wAAAAAAIQAAABgAAAAUAAAAoBAAAKMAAACXGgAAuQYAABAAAAAmAAAACAAAAP//////////"/>
+                <pr:smNativeData xmlns:pr="smNativeData" xmlns:p14="http://schemas.microsoft.com/office/powerpoint/2010/main" xmlns="" val="SMDATA_15_aDXlXhMAAAAlAAAAEQAAAA0AAAAAkAAAAEgAAACQAAAASAAAAAAAAAAAAAAAAAAAAAEAAABQAAAAAAAAAAAA4D8AAAAAAADgPwAAAAAAAOA/AAAAAAAA4D8AAAAAAADgPwAAAAAAAOA/AAAAAAAA4D8AAAAAAADgPwAAAAAAAOA/AAAAAAAA4D8CAAAAjAAAAAAAAAAAAAAAT4G9DP///wgAAAAAAAAAAAAAAAAAAAAAAAAAAAAAAAAAAAAAZAAAAAEAAABAAAAAAAAAAAAAAAAAAAAAAAAAAAAAAAAAAAAAAAAAAAAAAAAAAAAAAAAAAAAAAAAAAAAAAAAAAAAAAAAAAAAAAAAAAAAAAAAAAAAAAAAAAAAAAAAAAAAAFAAAADwAAAAAAAAAAAAAAAAAAAkUAAAAAQAAABQAAAAUAAAAFAAAAAEAAAAAAAAAZAAAAGQAAAAAAAAAZAAAAGQAAAAVAAAAYAAAAAAAAAAAAAAADwAAACADAAAAAAAAAAAAAAEAAACgMgAAVgcAAKr4//8BAAAAf39/AAEAAABkAAAAAAAAABQAAABAHwAAAAAAACYAAAAAAAAAwOD//wAAAAAmAAAAZAAAABYAAABMAAAAAAAAAAAAAAAEAAAAAAAAAAEAAADu7OEKAAAAACgAAAAoAAAAZAAAAGQAAAAAAAAAzMzMAAAAAABQAAAAUAAAAGQAAABkAAAAAAAAAAcAAAA4AAAAAAAAAAAAAAAAAAAA////AAAAAAAAAAAAAAAAAAAAAAAAAAAAAAAAAAAAAABkAAAAZAAAAAAAAAAjAAAABAAAAGQAAAAXAAAAFAAAAAAAAAAAAAAA/38AAP9/AAAAAAAACQAAAAQAAAAAAAAADAAAABAAAAAAAAAAAAAAAAAAAAAAAAAAHgAAAGgAAAAAAAAAAAAAAAAAAAAAAAAAAAAAABAnAAAQJwAAAAAAAAAAAAAAAAAAAAAAAAAAAAAAAAAAAAAAAAAAAAAUAAAAAAAAAMDA/wAAAAAAZAAAADIAAAAAAAAAZAAAAAAAAAB/f38ACgAAAB8AAABUAAAAT4G9Bf///wEAAAAAAAAAAAAAAAAAAAAAAAAAAAAAAAAAAAAAAAAAAAAAAAJ/f38A7uzhA8zMzADAwP8Af39/AAAAAAAAAAAAAAAAAP///wAAAAAAIQAAABgAAAAUAAAAoBAAAKMAAACXGgAAuQYAABAAAAAmAAAACAAAAP//////////"/>
               </a:ext>
             </a:extLst>
           </p:cNvPicPr>
@@ -2940,7 +2940,7 @@
           <p:cNvPicPr>
             <a:extLst>
               <a:ext uri="smNativeData">
-                <pr:smNativeData xmlns="" xmlns:p14="http://schemas.microsoft.com/office/powerpoint/2010/main" xmlns:pr="smNativeData" val="SMDATA_15_aDXlXhMAAAAlAAAAEQAAAA0AAAAAkAAAAEgAAACQAAAASAAAAAAAAAAAAAAAAAAAAAEAAABQAAAAAAAAAAAA4D8AAAAAAADgPwAAAAAAAOA/AAAAAAAA4D8AAAAAAADgPwAAAAAAAOA/AAAAAAAA4D8AAAAAAADgPwAAAAAAAOA/AAAAAAAA4D8CAAAAjAAAAAAAAAAAAAAAT4G9DP///wgAAAAAAAAAAAAAAAAAAAAAAAAAAAAAAAAAAAAAZAAAAAEAAABAAAAAAAAAAAAAAAAAAAAAAAAAAAAAAAAAAAAAAAAAAAAAAAAAAAAAAAAAAAAAAAAAAAAAAAAAAAAAAAAAAAAAAAAAAAAAAAAAAAAAAAAAAAAAAAAAAAAAFAAAADwAAAAAAAAAAAAAAAAAAAkUAAAAAQAAABQAAAAUAAAAFAAAAAEAAAAAAAAAZAAAAGQAAAAAAAAAZAAAAGQAAAAVAAAAYAAAAAAAAAAAAAAADwAAACADAAAAAAAAAAAAAAEAAACgMgAAVgcAAKr4//8BAAAAf39/AAEAAABkAAAAAAAAABQAAABAHwAAAAAAACYAAAAAAAAAwOD//wAAAAAmAAAAZAAAABYAAABMAAAAAAAAAAAAAAAEAAAAAAAAAAEAAADu7OEKAAAAACgAAAAoAAAAZAAAAGQAAAAAAAAAzMzMAAAAAABQAAAAUAAAAGQAAABkAAAAAAAAAAcAAAA4AAAAAAAAAAAAAAAAAAAA////AAAAAAAAAAAAAAAAAAAAAAAAAAAAAAAAAAAAAABkAAAAZAAAAAAAAAAjAAAABAAAAGQAAAAXAAAAFAAAAAAAAAAAAAAA/38AAP9/AAAAAAAACQAAAAQAAAAAAAAADAAAABAAAAAAAAAAAAAAAAAAAAAAAAAAHgAAAGgAAAAAAAAAAAAAAAAAAAAAAAAAAAAAABAnAAAQJwAAAAAAAAAAAAAAAAAAAAAAAAAAAAAAAAAAAAAAAAAAAAAUAAAAAAAAAMDA/wAAAAAAZAAAADIAAAAAAAAAZAAAAAAAAAB/f38ACgAAAB8AAABUAAAAT4G9Bf///wEAAAAAAAAAAAAAAAAAAAAAAAAAAAAAAAAAAAAAAAAAAAAAAAJ/f38A7uzhA8zMzADAwP8Af39/AAAAAAAAAAAAAAAAAP///wAAAAAAIQAAABgAAAAUAAAAmRoAAKgAAACOJAAAuwYAABAAAAAmAAAACAAAAP//////////"/>
+                <pr:smNativeData xmlns:pr="smNativeData" xmlns:p14="http://schemas.microsoft.com/office/powerpoint/2010/main" xmlns="" val="SMDATA_15_aDXlXhMAAAAlAAAAEQAAAA0AAAAAkAAAAEgAAACQAAAASAAAAAAAAAAAAAAAAAAAAAEAAABQAAAAAAAAAAAA4D8AAAAAAADgPwAAAAAAAOA/AAAAAAAA4D8AAAAAAADgPwAAAAAAAOA/AAAAAAAA4D8AAAAAAADgPwAAAAAAAOA/AAAAAAAA4D8CAAAAjAAAAAAAAAAAAAAAT4G9DP///wgAAAAAAAAAAAAAAAAAAAAAAAAAAAAAAAAAAAAAZAAAAAEAAABAAAAAAAAAAAAAAAAAAAAAAAAAAAAAAAAAAAAAAAAAAAAAAAAAAAAAAAAAAAAAAAAAAAAAAAAAAAAAAAAAAAAAAAAAAAAAAAAAAAAAAAAAAAAAAAAAAAAAFAAAADwAAAAAAAAAAAAAAAAAAAkUAAAAAQAAABQAAAAUAAAAFAAAAAEAAAAAAAAAZAAAAGQAAAAAAAAAZAAAAGQAAAAVAAAAYAAAAAAAAAAAAAAADwAAACADAAAAAAAAAAAAAAEAAACgMgAAVgcAAKr4//8BAAAAf39/AAEAAABkAAAAAAAAABQAAABAHwAAAAAAACYAAAAAAAAAwOD//wAAAAAmAAAAZAAAABYAAABMAAAAAAAAAAAAAAAEAAAAAAAAAAEAAADu7OEKAAAAACgAAAAoAAAAZAAAAGQAAAAAAAAAzMzMAAAAAABQAAAAUAAAAGQAAABkAAAAAAAAAAcAAAA4AAAAAAAAAAAAAAAAAAAA////AAAAAAAAAAAAAAAAAAAAAAAAAAAAAAAAAAAAAABkAAAAZAAAAAAAAAAjAAAABAAAAGQAAAAXAAAAFAAAAAAAAAAAAAAA/38AAP9/AAAAAAAACQAAAAQAAAAAAAAADAAAABAAAAAAAAAAAAAAAAAAAAAAAAAAHgAAAGgAAAAAAAAAAAAAAAAAAAAAAAAAAAAAABAnAAAQJwAAAAAAAAAAAAAAAAAAAAAAAAAAAAAAAAAAAAAAAAAAAAAUAAAAAAAAAMDA/wAAAAAAZAAAADIAAAAAAAAAZAAAAAAAAAB/f38ACgAAAB8AAABUAAAAT4G9Bf///wEAAAAAAAAAAAAAAAAAAAAAAAAAAAAAAAAAAAAAAAAAAAAAAAJ/f38A7uzhA8zMzADAwP8Af39/AAAAAAAAAAAAAAAAAP///wAAAAAAIQAAABgAAAAUAAAAmRoAAKgAAACOJAAAuwYAABAAAAAmAAAACAAAAP//////////"/>
               </a:ext>
             </a:extLst>
           </p:cNvPicPr>
@@ -2973,7 +2973,7 @@
           <p:cNvPicPr>
             <a:extLst>
               <a:ext uri="smNativeData">
-                <pr:smNativeData xmlns="" xmlns:p14="http://schemas.microsoft.com/office/powerpoint/2010/main" xmlns:pr="smNativeData" val="SMDATA_15_aDXlXhMAAAAlAAAAEQAAAA0AAAAAkAAAAEgAAACQAAAASAAAAAAAAAAAAAAAAAAAAAEAAABQAAAAAAAAAAAA4D8AAAAAAADgPwAAAAAAAOA/AAAAAAAA4D8AAAAAAADgPwAAAAAAAOA/AAAAAAAA4D8AAAAAAADgPwAAAAAAAOA/AAAAAAAA4D8CAAAAjAAAAAAAAAAAAAAAT4G9DP///wgAAAAAAAAAAAAAAAAAAAAAAAAAAAAAAAAAAAAAZAAAAAEAAABAAAAAAAAAAAAAAAAAAAAAAAAAAAAAAAAAAAAAAAAAAAAAAAAAAAAAAAAAAAAAAAAAAAAAAAAAAAAAAAAAAAAAAAAAAAAAAAAAAAAAAAAAAAAAAAAAAAAAFAAAADwAAAAAAAAAAAAAAAAAAAkUAAAAAQAAABQAAAAUAAAAFAAAAAEAAAAAAAAAZAAAAGQAAAAAAAAAZAAAAGQAAAAVAAAAYAAAAAAAAAAAAAAADwAAACADAAAAAAAAAAAAAAEAAACgMgAAVgcAAKr4//8BAAAAf39/AAEAAABkAAAAAAAAABQAAABAHwAAAAAAACYAAAAAAAAAwOD//wAAAAAmAAAAZAAAABYAAABMAAAAAAAAAAAAAAAEAAAAAAAAAAEAAADu7OEKAAAAACgAAAAoAAAAZAAAAGQAAAAAAAAAzMzMAAAAAABQAAAAUAAAAGQAAABkAAAAAAAAAAcAAAA4AAAAAAAAAAAAAAAAAAAA////AAAAAAAAAAAAAAAAAAAAAAAAAAAAAAAAAAAAAABkAAAAZAAAAAAAAAAjAAAABAAAAGQAAAAXAAAAFAAAAAAAAAAAAAAA/38AAP9/AAAAAAAACQAAAAQAAAAAAAAADAAAABAAAAAAAAAAAAAAAAAAAAAAAAAAHgAAAGgAAAAAAAAAAAAAAAAAAAAAAAAAAAAAABAnAAAQJwAAAAAAAAAAAAAAAAAAAAAAAAAAAAAAAAAAAAAAAAAAAAAUAAAAAAAAAMDA/wAAAAAAZAAAADIAAAAAAAAAZAAAAAAAAAB/f38ACgAAAB8AAABUAAAAT4G9Bf///wEAAAAAAAAAAAAAAAAAAAAAAAAAAAAAAAAAAAAAAAAAAAAAAAJ/f38A7uzhA8zMzADAwP8Af39/AAAAAAAAAAAAAAAAAP///wAAAAAAIQAAABgAAAAUAAAAcSQAALgAAABmLgAAzgYAABAAAAAmAAAACAAAAP//////////"/>
+                <pr:smNativeData xmlns:pr="smNativeData" xmlns:p14="http://schemas.microsoft.com/office/powerpoint/2010/main" xmlns="" val="SMDATA_15_aDXlXhMAAAAlAAAAEQAAAA0AAAAAkAAAAEgAAACQAAAASAAAAAAAAAAAAAAAAAAAAAEAAABQAAAAAAAAAAAA4D8AAAAAAADgPwAAAAAAAOA/AAAAAAAA4D8AAAAAAADgPwAAAAAAAOA/AAAAAAAA4D8AAAAAAADgPwAAAAAAAOA/AAAAAAAA4D8CAAAAjAAAAAAAAAAAAAAAT4G9DP///wgAAAAAAAAAAAAAAAAAAAAAAAAAAAAAAAAAAAAAZAAAAAEAAABAAAAAAAAAAAAAAAAAAAAAAAAAAAAAAAAAAAAAAAAAAAAAAAAAAAAAAAAAAAAAAAAAAAAAAAAAAAAAAAAAAAAAAAAAAAAAAAAAAAAAAAAAAAAAAAAAAAAAFAAAADwAAAAAAAAAAAAAAAAAAAkUAAAAAQAAABQAAAAUAAAAFAAAAAEAAAAAAAAAZAAAAGQAAAAAAAAAZAAAAGQAAAAVAAAAYAAAAAAAAAAAAAAADwAAACADAAAAAAAAAAAAAAEAAACgMgAAVgcAAKr4//8BAAAAf39/AAEAAABkAAAAAAAAABQAAABAHwAAAAAAACYAAAAAAAAAwOD//wAAAAAmAAAAZAAAABYAAABMAAAAAAAAAAAAAAAEAAAAAAAAAAEAAADu7OEKAAAAACgAAAAoAAAAZAAAAGQAAAAAAAAAzMzMAAAAAABQAAAAUAAAAGQAAABkAAAAAAAAAAcAAAA4AAAAAAAAAAAAAAAAAAAA////AAAAAAAAAAAAAAAAAAAAAAAAAAAAAAAAAAAAAABkAAAAZAAAAAAAAAAjAAAABAAAAGQAAAAXAAAAFAAAAAAAAAAAAAAA/38AAP9/AAAAAAAACQAAAAQAAAAAAAAADAAAABAAAAAAAAAAAAAAAAAAAAAAAAAAHgAAAGgAAAAAAAAAAAAAAAAAAAAAAAAAAAAAABAnAAAQJwAAAAAAAAAAAAAAAAAAAAAAAAAAAAAAAAAAAAAAAAAAAAAUAAAAAAAAAMDA/wAAAAAAZAAAADIAAAAAAAAAZAAAAAAAAAB/f38ACgAAAB8AAABUAAAAT4G9Bf///wEAAAAAAAAAAAAAAAAAAAAAAAAAAAAAAAAAAAAAAAAAAAAAAAJ/f38A7uzhA8zMzADAwP8Af39/AAAAAAAAAAAAAAAAAP///wAAAAAAIQAAABgAAAAUAAAAcSQAALgAAABmLgAAzgYAABAAAAAmAAAACAAAAP//////////"/>
               </a:ext>
             </a:extLst>
           </p:cNvPicPr>
@@ -3006,7 +3006,7 @@
           <p:cNvPicPr>
             <a:extLst>
               <a:ext uri="smNativeData">
-                <pr:smNativeData xmlns="" xmlns:p14="http://schemas.microsoft.com/office/powerpoint/2010/main" xmlns:pr="smNativeData" val="SMDATA_15_aDXlXhMAAAAlAAAAEQAAAA0AAAAAkAAAAEgAAACQAAAASAAAAAAAAAAAAAAAAAAAAAEAAABQAAAAAAAAAAAA4D8AAAAAAADgPwAAAAAAAOA/AAAAAAAA4D8AAAAAAADgPwAAAAAAAOA/AAAAAAAA4D8AAAAAAADgPwAAAAAAAOA/AAAAAAAA4D8CAAAAjAAAAAAAAAAAAAAAT4G9DP///wgAAAAAAAAAAAAAAAAAAAAAAAAAAAAAAAAAAAAAZAAAAAEAAABAAAAAAAAAAAAAAAAAAAAAAAAAAAAAAAAAAAAAAAAAAAAAAAAAAAAAAAAAAAAAAAAAAAAAAAAAAAAAAAAAAAAAAAAAAAAAAAAAAAAAAAAAAAAAAAAAAAAAFAAAADwAAAAAAAAAAAAAAAAAAAkUAAAAAQAAABQAAAAUAAAAFAAAAAEAAAAAAAAAZAAAAGQAAAAAAAAAZAAAAGQAAAAVAAAAYAAAAAAAAAAAAAAADwAAACADAAAAAAAAAAAAAAEAAACgMgAAVgcAAKr4//8BAAAAf39/AAEAAABkAAAAAAAAABQAAABAHwAAAAAAACYAAAAAAAAAwOD//wAAAAAmAAAAZAAAABYAAABMAAAAAAAAAAAAAAAEAAAAAAAAAAEAAADu7OEKAAAAACgAAAAoAAAAZAAAAGQAAAAAAAAAzMzMAAAAAABQAAAAUAAAAGQAAABkAAAAAAAAAAcAAAA4AAAAAAAAAAAAAAAAAAAA////AAAAAAAAAAAAAAAAAAAAAAAAAAAAAAAAAAAAAABkAAAAZAAAAAAAAAAjAAAABAAAAGQAAAAXAAAAFAAAAAAAAAAAAAAA/38AAP9/AAAAAAAACQAAAAQAAAAAAAAADAAAABAAAAAAAAAAAAAAAAAAAAAAAAAAHgAAAGgAAAAAAAAAAAAAAAAAAAAAAAAAAAAAABAnAAAQJwAAAAAAAAAAAAAAAAAAAAAAAAAAAAAAAAAAAAAAAAAAAAAUAAAAAAAAAMDA/wAAAAAAZAAAADIAAAAAAAAAZAAAAAAAAAB/f38ACgAAAB8AAABUAAAAT4G9Bf///wEAAAAAAAAAAAAAAAAAAAAAAAAAAAAAAAAAAAAAAAAAAAAAAAJ/f38A7uzhA8zMzADAwP8Af39/AAAAAAAAAAAAAAAAAP///wAAAAAAIQAAABgAAAAUAAAASS4AALAAAAA+OAAAxgYAABAAAAAmAAAACAAAAP//////////"/>
+                <pr:smNativeData xmlns:pr="smNativeData" xmlns:p14="http://schemas.microsoft.com/office/powerpoint/2010/main" xmlns="" val="SMDATA_15_aDXlXhMAAAAlAAAAEQAAAA0AAAAAkAAAAEgAAACQAAAASAAAAAAAAAAAAAAAAAAAAAEAAABQAAAAAAAAAAAA4D8AAAAAAADgPwAAAAAAAOA/AAAAAAAA4D8AAAAAAADgPwAAAAAAAOA/AAAAAAAA4D8AAAAAAADgPwAAAAAAAOA/AAAAAAAA4D8CAAAAjAAAAAAAAAAAAAAAT4G9DP///wgAAAAAAAAAAAAAAAAAAAAAAAAAAAAAAAAAAAAAZAAAAAEAAABAAAAAAAAAAAAAAAAAAAAAAAAAAAAAAAAAAAAAAAAAAAAAAAAAAAAAAAAAAAAAAAAAAAAAAAAAAAAAAAAAAAAAAAAAAAAAAAAAAAAAAAAAAAAAAAAAAAAAFAAAADwAAAAAAAAAAAAAAAAAAAkUAAAAAQAAABQAAAAUAAAAFAAAAAEAAAAAAAAAZAAAAGQAAAAAAAAAZAAAAGQAAAAVAAAAYAAAAAAAAAAAAAAADwAAACADAAAAAAAAAAAAAAEAAACgMgAAVgcAAKr4//8BAAAAf39/AAEAAABkAAAAAAAAABQAAABAHwAAAAAAACYAAAAAAAAAwOD//wAAAAAmAAAAZAAAABYAAABMAAAAAAAAAAAAAAAEAAAAAAAAAAEAAADu7OEKAAAAACgAAAAoAAAAZAAAAGQAAAAAAAAAzMzMAAAAAABQAAAAUAAAAGQAAABkAAAAAAAAAAcAAAA4AAAAAAAAAAAAAAAAAAAA////AAAAAAAAAAAAAAAAAAAAAAAAAAAAAAAAAAAAAABkAAAAZAAAAAAAAAAjAAAABAAAAGQAAAAXAAAAFAAAAAAAAAAAAAAA/38AAP9/AAAAAAAACQAAAAQAAAAAAAAADAAAABAAAAAAAAAAAAAAAAAAAAAAAAAAHgAAAGgAAAAAAAAAAAAAAAAAAAAAAAAAAAAAABAnAAAQJwAAAAAAAAAAAAAAAAAAAAAAAAAAAAAAAAAAAAAAAAAAAAAUAAAAAAAAAMDA/wAAAAAAZAAAADIAAAAAAAAAZAAAAAAAAAB/f38ACgAAAB8AAABUAAAAT4G9Bf///wEAAAAAAAAAAAAAAAAAAAAAAAAAAAAAAAAAAAAAAAAAAAAAAAJ/f38A7uzhA8zMzADAwP8Af39/AAAAAAAAAAAAAAAAAP///wAAAAAAIQAAABgAAAAUAAAASS4AALAAAAA+OAAAxgYAABAAAAAmAAAACAAAAP//////////"/>
               </a:ext>
             </a:extLst>
           </p:cNvPicPr>
@@ -3039,7 +3039,7 @@
           <p:cNvPicPr>
             <a:extLst>
               <a:ext uri="smNativeData">
-                <pr:smNativeData xmlns="" xmlns:p14="http://schemas.microsoft.com/office/powerpoint/2010/main" xmlns:pr="smNativeData" val="SMDATA_15_aDXlXhMAAAAlAAAAEQAAAA0AAAAAkAAAAEgAAACQAAAASAAAAAAAAAAAAAAAAAAAAAEAAABQAAAAAAAAAAAA4D8AAAAAAADgPwAAAAAAAOA/AAAAAAAA4D8AAAAAAADgPwAAAAAAAOA/AAAAAAAA4D8AAAAAAADgPwAAAAAAAOA/AAAAAAAA4D8CAAAAjAAAAAAAAAAAAAAAT4G9DP///wgAAAAAAAAAAAAAAAAAAAAAAAAAAAAAAAAAAAAAZAAAAAEAAABAAAAAAAAAAAAAAAAAAAAAAAAAAAAAAAAAAAAAAAAAAAAAAAAAAAAAAAAAAAAAAAAAAAAAAAAAAAAAAAAAAAAAAAAAAAAAAAAAAAAAAAAAAAAAAAAAAAAAFAAAADwAAAAAAAAAAAAAAAAAAAkUAAAAAQAAABQAAAAUAAAAFAAAAAEAAAAAAAAAZAAAAGQAAAAAAAAAZAAAAGQAAAAVAAAAYAAAAAAAAAAAAAAADwAAACADAAAAAAAAAAAAAAEAAACgMgAAVgcAAKr4//8BAAAAf39/AAEAAABkAAAAAAAAABQAAABAHwAAAAAAACYAAAAAAAAAwOD//wAAAAAmAAAAZAAAABYAAABMAAAAAAAAAAAAAAAEAAAAAAAAAAEAAADu7OEKAAAAACgAAAAoAAAAZAAAAGQAAAAAAAAAzMzMAAAAAABQAAAAUAAAAGQAAABkAAAAAAAAAAcAAAA4AAAAAAAAAAAAAAAAAAAA////AAAAAAAAAAAAAAAAAAAAAAAAAAAAAAAAAAAAAABkAAAAZAAAAAAAAAAjAAAABAAAAGQAAAAXAAAAFAAAAAAAAAAAAAAA/38AAP9/AAAAAAAACQAAAAQAAAAAAAAADAAAABAAAAAAAAAAAAAAAAAAAAAAAAAAHgAAAGgAAAAAAAAAAAAAAAAAAAAAAAAAAAAAABAnAAAQJwAAAAAAAAAAAAAAAAAAAAAAAAAAAAAAAAAAAAAAAAAAAAAUAAAAAAAAAMDA/wAAAAAAZAAAADIAAAAAAAAAZAAAAAAAAAB/f38ACgAAAB8AAABUAAAAT4G9Bf///wEAAAAAAAAAAAAAAAAAAAAAAAAAAAAAAAAAAAAAAAAAAAAAAAJ/f38A7uzhA8zMzADAwP8Af39/AAAAAAAAAAAAAAAAAP///wAAAAAAIQAAABgAAAAUAAAAgAcAAKEAAAB2EQAAtgYAABAAAAAmAAAACAAAAP//////////"/>
+                <pr:smNativeData xmlns:pr="smNativeData" xmlns:p14="http://schemas.microsoft.com/office/powerpoint/2010/main" xmlns="" val="SMDATA_15_aDXlXhMAAAAlAAAAEQAAAA0AAAAAkAAAAEgAAACQAAAASAAAAAAAAAAAAAAAAAAAAAEAAABQAAAAAAAAAAAA4D8AAAAAAADgPwAAAAAAAOA/AAAAAAAA4D8AAAAAAADgPwAAAAAAAOA/AAAAAAAA4D8AAAAAAADgPwAAAAAAAOA/AAAAAAAA4D8CAAAAjAAAAAAAAAAAAAAAT4G9DP///wgAAAAAAAAAAAAAAAAAAAAAAAAAAAAAAAAAAAAAZAAAAAEAAABAAAAAAAAAAAAAAAAAAAAAAAAAAAAAAAAAAAAAAAAAAAAAAAAAAAAAAAAAAAAAAAAAAAAAAAAAAAAAAAAAAAAAAAAAAAAAAAAAAAAAAAAAAAAAAAAAAAAAFAAAADwAAAAAAAAAAAAAAAAAAAkUAAAAAQAAABQAAAAUAAAAFAAAAAEAAAAAAAAAZAAAAGQAAAAAAAAAZAAAAGQAAAAVAAAAYAAAAAAAAAAAAAAADwAAACADAAAAAAAAAAAAAAEAAACgMgAAVgcAAKr4//8BAAAAf39/AAEAAABkAAAAAAAAABQAAABAHwAAAAAAACYAAAAAAAAAwOD//wAAAAAmAAAAZAAAABYAAABMAAAAAAAAAAAAAAAEAAAAAAAAAAEAAADu7OEKAAAAACgAAAAoAAAAZAAAAGQAAAAAAAAAzMzMAAAAAABQAAAAUAAAAGQAAABkAAAAAAAAAAcAAAA4AAAAAAAAAAAAAAAAAAAA////AAAAAAAAAAAAAAAAAAAAAAAAAAAAAAAAAAAAAABkAAAAZAAAAAAAAAAjAAAABAAAAGQAAAAXAAAAFAAAAAAAAAAAAAAA/38AAP9/AAAAAAAACQAAAAQAAAAAAAAADAAAABAAAAAAAAAAAAAAAAAAAAAAAAAAHgAAAGgAAAAAAAAAAAAAAAAAAAAAAAAAAAAAABAnAAAQJwAAAAAAAAAAAAAAAAAAAAAAAAAAAAAAAAAAAAAAAAAAAAAUAAAAAAAAAMDA/wAAAAAAZAAAADIAAAAAAAAAZAAAAAAAAAB/f38ACgAAAB8AAABUAAAAT4G9Bf///wEAAAAAAAAAAAAAAAAAAAAAAAAAAAAAAAAAAAAAAAAAAAAAAAJ/f38A7uzhA8zMzADAwP8Af39/AAAAAAAAAAAAAAAAAP///wAAAAAAIQAAABgAAAAUAAAAgAcAAKEAAAB2EQAAtgYAABAAAAAmAAAACAAAAP//////////"/>
               </a:ext>
             </a:extLst>
           </p:cNvPicPr>
@@ -3072,7 +3072,7 @@
           <p:cNvPicPr>
             <a:extLst>
               <a:ext uri="smNativeData">
-                <pr:smNativeData xmlns="" xmlns:p14="http://schemas.microsoft.com/office/powerpoint/2010/main" xmlns:pr="smNativeData" val="SMDATA_15_aDXlXhMAAAAlAAAAEQAAAA0AAAAAkAAAAEgAAACQAAAASAAAAAAAAAAAAAAAAAAAAAEAAABQAAAAAAAAAAAA4D8AAAAAAADgPwAAAAAAAOA/AAAAAAAA4D8AAAAAAADgPwAAAAAAAOA/AAAAAAAA4D8AAAAAAADgPwAAAAAAAOA/AAAAAAAA4D8CAAAAjAAAAAAAAAAAAAAAT4G9DP///wgAAAAAAAAAAAAAAAAAAAAAAAAAAAAAAAAAAAAAZAAAAAEAAABAAAAAAAAAAAAAAAAAAAAAAAAAAAAAAAAAAAAAAAAAAAAAAAAAAAAAAAAAAAAAAAAAAAAAAAAAAAAAAAAAAAAAAAAAAAAAAAAAAAAAAAAAAAAAAAAAAAAAFAAAADwAAAAAAAAAAAAAAAAAAAkUAAAAAQAAABQAAAAUAAAAFAAAAAEAAAAAAAAAZAAAAGQAAAAAAAAAZAAAAGQAAAAVAAAAYAAAAAAAAAAAAAAADwAAACADAAAAAAAAAAAAAAEAAACgMgAAVgcAAKr4//8BAAAAf39/AAEAAABkAAAAAAAAABQAAABAHwAAAAAAACYAAAAAAAAAwOD//wAAAAAmAAAAZAAAABYAAABMAAAAAAAAAAAAAAAEAAAAAAAAAAEAAADu7OEKAAAAACgAAAAoAAAAZAAAAGQAAAAAAAAAzMzMAAAAAABQAAAAUAAAAGQAAABkAAAAAAAAAAcAAAA4AAAAAAAAAAAAAAAAAAAA////AAAAAAAAAAAAAAAAAAAAAAAAAAAAAAAAAAAAAABkAAAAZAAAAAAAAAAjAAAABAAAAGQAAAAXAAAAFAAAAAAAAAAAAAAA/38AAP9/AAAAAAAACQAAAAQAAAAAAAAADAAAABAAAAAAAAAAAAAAAAAAAAAAAAAAHgAAAGgAAAAAAAAAAAAAAAAAAAAAAAAAAAAAABAnAAAQJwAAAAAAAAAAAAAAAAAAAAAAAAAAAAAAAAAAAAAAAAAAAAAUAAAAAAAAAMDA/wAAAAAAZAAAADIAAAAAAAAAZAAAAAAAAAB/f38ACgAAAB8AAABUAAAAT4G9Bf///wEAAAAAAAAAAAAAAAAAAAAAAAAAAAAAAAAAAAAAAAAAAAAAAAJ/f38A7uzhA8zMzADAwP8Af39/AAAAAAAAAAAAAAAAAP///wAAAAAAIQAAABgAAAAUAAAAUi4AANgJAAApOAAAYSkAABAAAAAmAAAACAAAAP//////////"/>
+                <pr:smNativeData xmlns:pr="smNativeData" xmlns:p14="http://schemas.microsoft.com/office/powerpoint/2010/main" xmlns="" val="SMDATA_15_aDXlXhMAAAAlAAAAEQAAAA0AAAAAkAAAAEgAAACQAAAASAAAAAAAAAAAAAAAAAAAAAEAAABQAAAAAAAAAAAA4D8AAAAAAADgPwAAAAAAAOA/AAAAAAAA4D8AAAAAAADgPwAAAAAAAOA/AAAAAAAA4D8AAAAAAADgPwAAAAAAAOA/AAAAAAAA4D8CAAAAjAAAAAAAAAAAAAAAT4G9DP///wgAAAAAAAAAAAAAAAAAAAAAAAAAAAAAAAAAAAAAZAAAAAEAAABAAAAAAAAAAAAAAAAAAAAAAAAAAAAAAAAAAAAAAAAAAAAAAAAAAAAAAAAAAAAAAAAAAAAAAAAAAAAAAAAAAAAAAAAAAAAAAAAAAAAAAAAAAAAAAAAAAAAAFAAAADwAAAAAAAAAAAAAAAAAAAkUAAAAAQAAABQAAAAUAAAAFAAAAAEAAAAAAAAAZAAAAGQAAAAAAAAAZAAAAGQAAAAVAAAAYAAAAAAAAAAAAAAADwAAACADAAAAAAAAAAAAAAEAAACgMgAAVgcAAKr4//8BAAAAf39/AAEAAABkAAAAAAAAABQAAABAHwAAAAAAACYAAAAAAAAAwOD//wAAAAAmAAAAZAAAABYAAABMAAAAAAAAAAAAAAAEAAAAAAAAAAEAAADu7OEKAAAAACgAAAAoAAAAZAAAAGQAAAAAAAAAzMzMAAAAAABQAAAAUAAAAGQAAABkAAAAAAAAAAcAAAA4AAAAAAAAAAAAAAAAAAAA////AAAAAAAAAAAAAAAAAAAAAAAAAAAAAAAAAAAAAABkAAAAZAAAAAAAAAAjAAAABAAAAGQAAAAXAAAAFAAAAAAAAAAAAAAA/38AAP9/AAAAAAAACQAAAAQAAAAAAAAADAAAABAAAAAAAAAAAAAAAAAAAAAAAAAAHgAAAGgAAAAAAAAAAAAAAAAAAAAAAAAAAAAAABAnAAAQJwAAAAAAAAAAAAAAAAAAAAAAAAAAAAAAAAAAAAAAAAAAAAAUAAAAAAAAAMDA/wAAAAAAZAAAADIAAAAAAAAAZAAAAAAAAAB/f38ACgAAAB8AAABUAAAAT4G9Bf///wEAAAAAAAAAAAAAAAAAAAAAAAAAAAAAAAAAAAAAAAAAAAAAAAJ/f38A7uzhA8zMzADAwP8Af39/AAAAAAAAAAAAAAAAAP///wAAAAAAIQAAABgAAAAUAAAAUi4AANgJAAApOAAAYSkAABAAAAAmAAAACAAAAP//////////"/>
               </a:ext>
             </a:extLst>
           </p:cNvPicPr>
@@ -3106,7 +3106,7 @@
             <a:spLocks noGrp="1" noChangeArrowheads="1"/>
             <a:extLst>
               <a:ext uri="smNativeData">
-                <pr:smNativeData xmlns="" xmlns:p14="http://schemas.microsoft.com/office/powerpoint/2010/main" xmlns:pr="smNativeData" val="SMDATA_13_aDXlXhMAAAAlAAAAZAAAAA0AAAAAAAAAAAAAAAAAAAAAAAAAAAAAAAABAAAAAAAAAAEAAABQAAAAAAAAAAAA4D8AAAAAAADgPwAAAAAAAOA/AAAAAAAA4D8AAAAAAADgPwAAAAAAAOA/AAAAAAAA4D8AAAAAAADgPwAAAAAAAOA/AAAAAAAA4D8CAAAAjAAAAAAAAAAAAAAA////AP///wgAAAAAAAAAAAAAAAAAAAAAAAAAAAAAAAAAAAAAeAAAAAEAAABAAAAAAAAAAAAAAABaAAAAAAAAAAAAAAAAAAAAAAAAAAAAAAAAAAAAAAAAAAAAAAAAAAAAAAAAAAAAAAAAAAAAAAAAAAAAAAAAAAAAAAAAAAAAAAAAAAAAFAAAADwAAAAAAAAAAAAAAAAAAAAPAAAAAQAAACMAAAAjAAAAIwAAAB4AAAAAAAAAZAAAAGQAAAAAAAAAZAAAAGQAAAAVAAAAYAAAAAAAAAAAAAAADwAAACADAAAAAAAAAAAAAAEAAACgMgAAVgcAAKr4//8BAAAAf39/AAEAAABkAAAAAAAAABQAAABAHwAAAAAAACYAAAAAAAAAwOD//wAAAAAmAAAAZAAAABYAAABMAAAAAAAAAAAAAAAEAAAAAAAAAAEAAADu7OEKAAAAACgAAAAoAAAAZAAAAGQAAAAAAAAAzMzMAAAAAABQAAAAUAAAAGQAAABkAAAAAAAAABcAAAAUAAAAAAAAAAAAAAD/fwAA/38AAAAAAAAJAAAABAAAAAAAAAAMAAAAEAAAAAAAAAAAAAAAAAAAAAAAAAAeAAAAaAAAAAAAAAAAAAAAAAAAAAAAAAAAAAAAECcAABAnAAAAAAAAAAAAAAAAAAAAAAAAAAAAAAAAAAAAAAAAAAAAABQAAAAAAAAAwMD/AAAAAABkAAAAMgAAAAAAAABkAAAAAAAAAH9/fwAKAAAAHwAAAFQAAAD///8AAAAAAQAAAAAAAAAAAAAAAAAAAAAAAAAAAAAAAAAAAAAAAAAAAAAAAH9/fwAAAAADzMzMAMDA/wB/f38AAAAAAAAAAAAAAAAAAAAAAAAAAAAhAAAAGAAAABQAAADQAgAArwEAAG81AAC6CAAAEAAAACYAAAAIAAAAvQ8AAP8fAAA="/>
+                <pr:smNativeData xmlns:pr="smNativeData" xmlns:p14="http://schemas.microsoft.com/office/powerpoint/2010/main" xmlns="" val="SMDATA_13_aDXlXhMAAAAlAAAAZAAAAA0AAAAAAAAAAAAAAAAAAAAAAAAAAAAAAAABAAAAAAAAAAEAAABQAAAAAAAAAAAA4D8AAAAAAADgPwAAAAAAAOA/AAAAAAAA4D8AAAAAAADgPwAAAAAAAOA/AAAAAAAA4D8AAAAAAADgPwAAAAAAAOA/AAAAAAAA4D8CAAAAjAAAAAAAAAAAAAAA////AP///wgAAAAAAAAAAAAAAAAAAAAAAAAAAAAAAAAAAAAAeAAAAAEAAABAAAAAAAAAAAAAAABaAAAAAAAAAAAAAAAAAAAAAAAAAAAAAAAAAAAAAAAAAAAAAAAAAAAAAAAAAAAAAAAAAAAAAAAAAAAAAAAAAAAAAAAAAAAAAAAAAAAAFAAAADwAAAAAAAAAAAAAAAAAAAAPAAAAAQAAACMAAAAjAAAAIwAAAB4AAAAAAAAAZAAAAGQAAAAAAAAAZAAAAGQAAAAVAAAAYAAAAAAAAAAAAAAADwAAACADAAAAAAAAAAAAAAEAAACgMgAAVgcAAKr4//8BAAAAf39/AAEAAABkAAAAAAAAABQAAABAHwAAAAAAACYAAAAAAAAAwOD//wAAAAAmAAAAZAAAABYAAABMAAAAAAAAAAAAAAAEAAAAAAAAAAEAAADu7OEKAAAAACgAAAAoAAAAZAAAAGQAAAAAAAAAzMzMAAAAAABQAAAAUAAAAGQAAABkAAAAAAAAABcAAAAUAAAAAAAAAAAAAAD/fwAA/38AAAAAAAAJAAAABAAAAAAAAAAMAAAAEAAAAAAAAAAAAAAAAAAAAAAAAAAeAAAAaAAAAAAAAAAAAAAAAAAAAAAAAAAAAAAAECcAABAnAAAAAAAAAAAAAAAAAAAAAAAAAAAAAAAAAAAAAAAAAAAAABQAAAAAAAAAwMD/AAAAAABkAAAAMgAAAAAAAABkAAAAAAAAAH9/fwAKAAAAHwAAAFQAAAD///8AAAAAAQAAAAAAAAAAAAAAAAAAAAAAAAAAAAAAAAAAAAAAAAAAAAAAAH9/fwAAAAADzMzMAMDA/wB/f38AAAAAAAAAAAAAAAAAAAAAAAAAAAAhAAAAGAAAABQAAADQAgAArwEAAG81AAC6CAAAEAAAACYAAAAIAAAAvQ8AAP8fAAA="/>
               </a:ext>
             </a:extLst>
           </p:cNvSpPr>
@@ -3151,7 +3151,7 @@
             <a:spLocks noGrp="1" noChangeArrowheads="1"/>
             <a:extLst>
               <a:ext uri="smNativeData">
-                <pr:smNativeData xmlns="" xmlns:p14="http://schemas.microsoft.com/office/powerpoint/2010/main" xmlns:pr="smNativeData" val="SMDATA_13_aDXlXhMAAAAlAAAAZAAAAA0AAAAAAAAAAAAAAAAAAAAAAAAAAAAAAAAAAAAAAAAAAAEAAABQAAAAAAAAAAAA4D8AAAAAAADgPwAAAAAAAOA/AAAAAAAA4D8AAAAAAADgPwAAAAAAAOA/AAAAAAAA4D8AAAAAAADgPwAAAAAAAOA/AAAAAAAA4D8CAAAAjAAAAAAAAAAAAAAA////AP///wgAAAAAAAAAAAAAAAAAAAAAAAAAAAAAAAAAAAAAeAAAAAEAAABAAAAAAAAAAAAAAABaAAAAAAAAAAAAAAAAAAAAAAAAAAAAAAAAAAAAAAAAAAAAAAAAAAAAAAAAAAAAAAAAAAAAAAAAAAAAAAAAAAAAAAAAAAAAAAAAAAAAFAAAADwAAAAAAAAAAAAAAAAAAAAPAAAAAQAAACMAAAAjAAAAIwAAAB4AAAAAAAAAZAAAAGQAAAAAAAAAZAAAAGQAAAAVAAAAYAAAAAAAAAAAAAAADwAAACADAAAAAAAAAAAAAAEAAACgMgAAVgcAAKr4//8BAAAAf39/AAEAAABkAAAAAAAAABQAAABAHwAAAAAAACYAAAAAAAAAwOD//wAAAAAmAAAAZAAAABYAAABMAAAAAAAAAAAAAAAEAAAAAAAAAAEAAADu7OEKAAAAACgAAAAoAAAAZAAAAGQAAAAAAAAAzMzMAAAAAABQAAAAUAAAAGQAAABkAAAAAAAAABcAAAAUAAAAAAAAAAAAAAD/fwAA/38AAAAAAAAJAAAABAAAAAAAAAAMAAAAEAAAAAAAAAAAAAAAAAAAAAAAAAAeAAAAaAAAAAAAAAAAAAAAAAAAAAAAAAAAAAAAECcAABAnAAAAAAAAAAAAAAAAAAAAAAAAAAAAAAAAAAAAAAAAAAAAABQAAAAAAAAAwMD/AAAAAABkAAAAMgAAAAAAAABkAAAAAAAAAH9/fwAKAAAAHwAAAFQAAAD///8AAAAAAQAAAAAAAAAAAAAAAAAAAAAAAAAAAAAAAAAAAAAAAAAAAAAAAH9/fwAAAAADzMzMAMDA/wB/f38AAAAAAAAAAAAAAAAAAAAAAAAAAAAhAAAAGAAAABQAAADQAgAA3wkAAG81AABWIgAAEAAAACYAAAAIAAAAPQ8AAP8fAAA="/>
+                <pr:smNativeData xmlns:pr="smNativeData" xmlns:p14="http://schemas.microsoft.com/office/powerpoint/2010/main" xmlns="" val="SMDATA_13_aDXlXhMAAAAlAAAAZAAAAA0AAAAAAAAAAAAAAAAAAAAAAAAAAAAAAAAAAAAAAAAAAAEAAABQAAAAAAAAAAAA4D8AAAAAAADgPwAAAAAAAOA/AAAAAAAA4D8AAAAAAADgPwAAAAAAAOA/AAAAAAAA4D8AAAAAAADgPwAAAAAAAOA/AAAAAAAA4D8CAAAAjAAAAAAAAAAAAAAA////AP///wgAAAAAAAAAAAAAAAAAAAAAAAAAAAAAAAAAAAAAeAAAAAEAAABAAAAAAAAAAAAAAABaAAAAAAAAAAAAAAAAAAAAAAAAAAAAAAAAAAAAAAAAAAAAAAAAAAAAAAAAAAAAAAAAAAAAAAAAAAAAAAAAAAAAAAAAAAAAAAAAAAAAFAAAADwAAAAAAAAAAAAAAAAAAAAPAAAAAQAAACMAAAAjAAAAIwAAAB4AAAAAAAAAZAAAAGQAAAAAAAAAZAAAAGQAAAAVAAAAYAAAAAAAAAAAAAAADwAAACADAAAAAAAAAAAAAAEAAACgMgAAVgcAAKr4//8BAAAAf39/AAEAAABkAAAAAAAAABQAAABAHwAAAAAAACYAAAAAAAAAwOD//wAAAAAmAAAAZAAAABYAAABMAAAAAAAAAAAAAAAEAAAAAAAAAAEAAADu7OEKAAAAACgAAAAoAAAAZAAAAGQAAAAAAAAAzMzMAAAAAABQAAAAUAAAAGQAAABkAAAAAAAAABcAAAAUAAAAAAAAAAAAAAD/fwAA/38AAAAAAAAJAAAABAAAAAAAAAAMAAAAEAAAAAAAAAAAAAAAAAAAAAAAAAAeAAAAaAAAAAAAAAAAAAAAAAAAAAAAAAAAAAAAECcAABAnAAAAAAAAAAAAAAAAAAAAAAAAAAAAAAAAAAAAAAAAAAAAABQAAAAAAAAAwMD/AAAAAABkAAAAMgAAAAAAAABkAAAAAAAAAH9/fwAKAAAAHwAAAFQAAAD///8AAAAAAQAAAAAAAAAAAAAAAAAAAAAAAAAAAAAAAAAAAAAAAAAAAAAAAH9/fwAAAAADzMzMAMDA/wB/f38AAAAAAAAAAAAAAAAAAAAAAAAAAAAhAAAAGAAAABQAAADQAgAA3wkAAG81AABWIgAAEAAAACYAAAAIAAAAPQ8AAP8fAAA="/>
               </a:ext>
             </a:extLst>
           </p:cNvSpPr>
@@ -3910,7 +3910,7 @@
           <p:cNvSpPr>
             <a:extLst>
               <a:ext uri="smNativeData">
-                <pr:smNativeData xmlns="" xmlns:p14="http://schemas.microsoft.com/office/powerpoint/2010/main" xmlns:pr="smNativeData" val="SMDATA_13_aDXlXhMAAAAlAAAAZAAAAA0AAAAAjgAAAEcAAACOAAAARwAAAAAAAAAAAAAAAAAAAAEAAABQAAAAAAAAAAAA4D8AAAAAAADgPwAAAAAAAOA/AAAAAAAA4D8AAAAAAADgPwAAAAAAAOA/AAAAAAAA4D8AAAAAAADgPwAAAAAAAOA/AAAAAAAA4D8CAAAAjAAAAAAAAAAAAAAAT4G9DP///wgAAAAAAAAAAAAAAAAAAAAAAAAAAAAAAAAAAAAAZAAAAAEAAABAAAAAAAAAAAAAAAAAAAAAAAAAAAAAAAAAAAAAAAAAAAAAAAAAAAAAAAAAAAAAAAAAAAAAAAAAAAAAAAAAAAAAAAAAAAAAAAAAAAAAAAAAAAAAAAAAAAAAFAAAADwAAAAAAAAAAAAAAAAAAAkUAAAAAQAAABQAAAAUAAAAFAAAAAEAAAAAAAAAZAAAAGQAAAAAAAAAZAAAAGQAAAAVAAAAYAAAAAAAAAAAAAAADwAAACADAAAAAAAAAAAAAAEAAACgMgAAVgcAAKr4//8BAAAAf39/AAEAAABkAAAAAAAAABQAAABAHwAAAAAAACYAAAAAAAAAwOD//wAAAAAmAAAAZAAAABYAAABMAAAAAAAAAAAAAAAEAAAAAAAAAAEAAADu7OEKAAAAACgAAAAoAAAAZAAAAGQAAAAAAAAAzMzMAAAAAABQAAAAUAAAAGQAAABkAAAAAAAAABcAAAAUAAAAAAAAAAAAAAD/fwAA/38AAAAAAAAJAAAABAAAAFQibAUMAAAAEAAAAAAAAAAAAAAAAAAAAAAAAAAeAAAAaAAAAAAAAAAAAAAAAAAAAAAAAAAAAAAAECcAABAnAAAAAAAAAAAAAAAAAAAAAAAAAAAAAAAAAAAAAAAAAAAAABQAAAAAAAAAwMD/AAAAAABkAAAAMgAAAAAAAABkAAAAAAAAAH9/fwAKAAAAHwAAAFQAAABPgb0F////AQAAAAAAAAAAAAAAAAAAAAAAAAAAAAAAAAAAAAAAAAAAAAAAAn9/fwDu7OEDzMzMAMDA/wB/f38AAAAAAAAAAAAAAAAAAAAAAAAAAAAhAAAAGAAAABQAAAClAQAAowsAALQ0AACZEgAAEAAAACYAAAAIAAAA//////////8="/>
+                <pr:smNativeData xmlns:pr="smNativeData" xmlns:p14="http://schemas.microsoft.com/office/powerpoint/2010/main" xmlns="" val="SMDATA_13_aDXlXhMAAAAlAAAAZAAAAA0AAAAAjgAAAEcAAACOAAAARwAAAAAAAAAAAAAAAAAAAAEAAABQAAAAAAAAAAAA4D8AAAAAAADgPwAAAAAAAOA/AAAAAAAA4D8AAAAAAADgPwAAAAAAAOA/AAAAAAAA4D8AAAAAAADgPwAAAAAAAOA/AAAAAAAA4D8CAAAAjAAAAAAAAAAAAAAAT4G9DP///wgAAAAAAAAAAAAAAAAAAAAAAAAAAAAAAAAAAAAAZAAAAAEAAABAAAAAAAAAAAAAAAAAAAAAAAAAAAAAAAAAAAAAAAAAAAAAAAAAAAAAAAAAAAAAAAAAAAAAAAAAAAAAAAAAAAAAAAAAAAAAAAAAAAAAAAAAAAAAAAAAAAAAFAAAADwAAAAAAAAAAAAAAAAAAAkUAAAAAQAAABQAAAAUAAAAFAAAAAEAAAAAAAAAZAAAAGQAAAAAAAAAZAAAAGQAAAAVAAAAYAAAAAAAAAAAAAAADwAAACADAAAAAAAAAAAAAAEAAACgMgAAVgcAAKr4//8BAAAAf39/AAEAAABkAAAAAAAAABQAAABAHwAAAAAAACYAAAAAAAAAwOD//wAAAAAmAAAAZAAAABYAAABMAAAAAAAAAAAAAAAEAAAAAAAAAAEAAADu7OEKAAAAACgAAAAoAAAAZAAAAGQAAAAAAAAAzMzMAAAAAABQAAAAUAAAAGQAAABkAAAAAAAAABcAAAAUAAAAAAAAAAAAAAD/fwAA/38AAAAAAAAJAAAABAAAAFQibAUMAAAAEAAAAAAAAAAAAAAAAAAAAAAAAAAeAAAAaAAAAAAAAAAAAAAAAAAAAAAAAAAAAAAAECcAABAnAAAAAAAAAAAAAAAAAAAAAAAAAAAAAAAAAAAAAAAAAAAAABQAAAAAAAAAwMD/AAAAAABkAAAAMgAAAAAAAABkAAAAAAAAAH9/fwAKAAAAHwAAAFQAAABPgb0F////AQAAAAAAAAAAAAAAAAAAAAAAAAAAAAAAAAAAAAAAAAAAAAAAAn9/fwDu7OEDzMzMAMDA/wB/f38AAAAAAAAAAAAAAAAAAAAAAAAAAAAhAAAAGAAAABQAAAClAQAAowsAALQ0AACZEgAAEAAAACYAAAAIAAAA//////////8="/>
               </a:ext>
             </a:extLst>
           </p:cNvSpPr>
@@ -4003,7 +4003,7 @@
           <p:cNvSpPr>
             <a:extLst>
               <a:ext uri="smNativeData">
-                <pr:smNativeData xmlns="" xmlns:p14="http://schemas.microsoft.com/office/powerpoint/2010/main" xmlns:pr="smNativeData" val="SMDATA_13_aDXlXhMAAAAlAAAAZAAAAA0AAAAAjgAAAEcAAACOAAAARwAAAAAAAAAAAAAAAAAAAAEAAABQAAAAAAAAAAAA4D8AAAAAAADgPwAAAAAAAOA/AAAAAAAA4D8AAAAAAADgPwAAAAAAAOA/AAAAAAAA4D8AAAAAAADgPwAAAAAAAOA/AAAAAAAA4D8CAAAAjAAAAAAAAAAAAAAAT4G9DP///wgAAAAAAAAAAAAAAAAAAAAAAAAAAAAAAAAAAAAAZAAAAAEAAABAAAAAAAAAAAAAAAAAAAAAAAAAAAAAAAAAAAAAAAAAAAAAAAAAAAAAAAAAAAAAAAAAAAAAAAAAAAAAAAAAAAAAAAAAAAAAAAAAAAAAAAAAAAAAAAAAAAAAFAAAADwAAAAAAAAAAAAAAAAAAAkUAAAAAQAAABQAAAAUAAAAFAAAAAEAAAAAAAAAZAAAAGQAAAAAAAAAZAAAAGQAAAAVAAAAYAAAAAAAAAAAAAAADwAAACADAAAAAAAAAAAAAAEAAACgMgAAVgcAAKr4//8BAAAAf39/AAEAAABkAAAAAAAAABQAAABAHwAAAAAAACYAAAAAAAAAwOD//wAAAAAmAAAAZAAAABYAAABMAAAAAAAAAAAAAAAEAAAAAAAAAAEAAADu7OEKAAAAACgAAAAoAAAAZAAAAGQAAAAAAAAAzMzMAAAAAABQAAAAUAAAAGQAAABkAAAAAAAAABcAAAAUAAAAAAAAAAAAAAD/fwAA/38AAAAAAAAJAAAABAAAAEwbVmwMAAAAEAAAAAAAAAAAAAAAAAAAAAAAAAAeAAAAaAAAAAAAAAAAAAAAAAAAAAAAAAAAAAAAECcAABAnAAAAAAAAAAAAAAAAAAAAAAAAAAAAAAAAAAAAAAAAAAAAABQAAAAAAAAAwMD/AAAAAABkAAAAMgAAAAAAAABkAAAAAAAAAH9/fwAKAAAAHwAAAFQAAABPgb0F////AQAAAAAAAAAAAAAAAAAAAAAAAAAAAAAAAAAAAAAAAAAAAAAAAn9/fwDu7OEDzMzMAMDA/wB/f38AAAAAAAAAAAAAAAAAAAAAAAAAAAAhAAAAGAAAABQAAACIAgAAtBUAAI42AACnIgAAAAAAACYAAAAIAAAA//////////8="/>
+                <pr:smNativeData xmlns:pr="smNativeData" xmlns:p14="http://schemas.microsoft.com/office/powerpoint/2010/main" xmlns="" val="SMDATA_13_aDXlXhMAAAAlAAAAZAAAAA0AAAAAjgAAAEcAAACOAAAARwAAAAAAAAAAAAAAAAAAAAEAAABQAAAAAAAAAAAA4D8AAAAAAADgPwAAAAAAAOA/AAAAAAAA4D8AAAAAAADgPwAAAAAAAOA/AAAAAAAA4D8AAAAAAADgPwAAAAAAAOA/AAAAAAAA4D8CAAAAjAAAAAAAAAAAAAAAT4G9DP///wgAAAAAAAAAAAAAAAAAAAAAAAAAAAAAAAAAAAAAZAAAAAEAAABAAAAAAAAAAAAAAAAAAAAAAAAAAAAAAAAAAAAAAAAAAAAAAAAAAAAAAAAAAAAAAAAAAAAAAAAAAAAAAAAAAAAAAAAAAAAAAAAAAAAAAAAAAAAAAAAAAAAAFAAAADwAAAAAAAAAAAAAAAAAAAkUAAAAAQAAABQAAAAUAAAAFAAAAAEAAAAAAAAAZAAAAGQAAAAAAAAAZAAAAGQAAAAVAAAAYAAAAAAAAAAAAAAADwAAACADAAAAAAAAAAAAAAEAAACgMgAAVgcAAKr4//8BAAAAf39/AAEAAABkAAAAAAAAABQAAABAHwAAAAAAACYAAAAAAAAAwOD//wAAAAAmAAAAZAAAABYAAABMAAAAAAAAAAAAAAAEAAAAAAAAAAEAAADu7OEKAAAAACgAAAAoAAAAZAAAAGQAAAAAAAAAzMzMAAAAAABQAAAAUAAAAGQAAABkAAAAAAAAABcAAAAUAAAAAAAAAAAAAAD/fwAA/38AAAAAAAAJAAAABAAAAEwbVmwMAAAAEAAAAAAAAAAAAAAAAAAAAAAAAAAeAAAAaAAAAAAAAAAAAAAAAAAAAAAAAAAAAAAAECcAABAnAAAAAAAAAAAAAAAAAAAAAAAAAAAAAAAAAAAAAAAAAAAAABQAAAAAAAAAwMD/AAAAAABkAAAAMgAAAAAAAABkAAAAAAAAAH9/fwAKAAAAHwAAAFQAAABPgb0F////AQAAAAAAAAAAAAAAAAAAAAAAAAAAAAAAAAAAAAAAAAAAAAAAAn9/fwDu7OEDzMzMAMDA/wB/f38AAAAAAAAAAAAAAAAAAAAAAAAAAAAhAAAAGAAAABQAAACIAgAAtBUAAI42AACnIgAAAAAAACYAAAAIAAAA//////////8="/>
               </a:ext>
             </a:extLst>
           </p:cNvSpPr>
@@ -4410,7 +4410,7 @@
           <p:cNvSpPr>
             <a:extLst>
               <a:ext uri="smNativeData">
-                <pr:smNativeData xmlns="" xmlns:p14="http://schemas.microsoft.com/office/powerpoint/2010/main" xmlns:pr="smNativeData" val="SMDATA_13_aDXlXhMAAAAlAAAAZAAAAA0AAAAAkAAAAEgAAACQAAAASAAAAAAAAAAAAAAAAAAAAAEAAABQAAAAAAAAAAAA4D8AAAAAAADgPwAAAAAAAOA/AAAAAAAA4D8AAAAAAADgPwAAAAAAAOA/AAAAAAAA4D8AAAAAAADgPwAAAAAAAOA/AAAAAAAA4D8CAAAAjAAAAAEAAAAAAAAAM8zMAP///wgAAAAAAAAAAAAAAAAAAAAAAAAAAAAAAAAAAAAAeAAAAAEAAABAAAAAAAAAAAAAAABaAAAAAAAAAAAAAAAAAAAAAAAAAAAAAAAAAAAAAAAAAAAAAAAAAAAAAAAAAAAAAAAAAAAAAAAAAAAAAAAAAAAAAAAAAAAAAAAAAAAAFAAAADwAAAAAAAAAAAAAAAAAAAkUAAAAAQAAABQAAAAUAAAAFAAAAAEAAAAAAAAAZAAAAGQAAAAAAAAAZAAAAGQAAAAVAAAAYAAAAAAAAAAAAAAADwAAACADAAAAAAAAAAAAAAEAAACgMgAAVgcAAKr4//8BAAAAf39/AAEAAABkAAAAAAAAABQAAABAHwAAAAAAACYAAAAAAAAAwOD//wAAAAAmAAAAZAAAABYAAABMAAAAAAAAAAAAAAAEAAAAAAAAAAEAAADu7OEKAAAAACgAAAAoAAAAZAAAAGQAAAAAAAAAzMzMAAAAAABQAAAAUAAAAGQAAABkAAAAAAAAABcAAAAUAAAAAAAAAAAAAAD/fwAA/38AAAAAAAAJAAAABAAAAAAAAAAMAAAAEAAAAAAAAAAAAAAAAAAAAAAAAAAeAAAAaAAAAAAAAAAAAAAAAAAAAAAAAAAAAAAAECcAABAnAAAAAAAAAAAAAAAAAAAAAAAAAAAAAAAAAAAAAAAAAAAAABQAAAAAAAAAwMD/AAAAAABkAAAAMgAAAAAAAABkAAAAAAAAAH9/fwAKAAAAHwAAAFQAAAAzzMwA////AQAAAAAAAAAAAAAAAAAAAAAAAAAAAAAAAAAAAAAAAAAAAAAAAn9/fwDu7OEDzMzMAMDA/wB/f38AAAAAAAAAAAAAAAAAAAAAAAAAAAAhAAAAGAAAABQAAABgCQAAugkAAD44AADyCQAAEAAAACYAAAAIAAAA//////////8="/>
+                <pr:smNativeData xmlns:pr="smNativeData" xmlns:p14="http://schemas.microsoft.com/office/powerpoint/2010/main" xmlns="" val="SMDATA_13_aDXlXhMAAAAlAAAAZAAAAA0AAAAAkAAAAEgAAACQAAAASAAAAAAAAAAAAAAAAAAAAAEAAABQAAAAAAAAAAAA4D8AAAAAAADgPwAAAAAAAOA/AAAAAAAA4D8AAAAAAADgPwAAAAAAAOA/AAAAAAAA4D8AAAAAAADgPwAAAAAAAOA/AAAAAAAA4D8CAAAAjAAAAAEAAAAAAAAAM8zMAP///wgAAAAAAAAAAAAAAAAAAAAAAAAAAAAAAAAAAAAAeAAAAAEAAABAAAAAAAAAAAAAAABaAAAAAAAAAAAAAAAAAAAAAAAAAAAAAAAAAAAAAAAAAAAAAAAAAAAAAAAAAAAAAAAAAAAAAAAAAAAAAAAAAAAAAAAAAAAAAAAAAAAAFAAAADwAAAAAAAAAAAAAAAAAAAkUAAAAAQAAABQAAAAUAAAAFAAAAAEAAAAAAAAAZAAAAGQAAAAAAAAAZAAAAGQAAAAVAAAAYAAAAAAAAAAAAAAADwAAACADAAAAAAAAAAAAAAEAAACgMgAAVgcAAKr4//8BAAAAf39/AAEAAABkAAAAAAAAABQAAABAHwAAAAAAACYAAAAAAAAAwOD//wAAAAAmAAAAZAAAABYAAABMAAAAAAAAAAAAAAAEAAAAAAAAAAEAAADu7OEKAAAAACgAAAAoAAAAZAAAAGQAAAAAAAAAzMzMAAAAAABQAAAAUAAAAGQAAABkAAAAAAAAABcAAAAUAAAAAAAAAAAAAAD/fwAA/38AAAAAAAAJAAAABAAAAAAAAAAMAAAAEAAAAAAAAAAAAAAAAAAAAAAAAAAeAAAAaAAAAAAAAAAAAAAAAAAAAAAAAAAAAAAAECcAABAnAAAAAAAAAAAAAAAAAAAAAAAAAAAAAAAAAAAAAAAAAAAAABQAAAAAAAAAwMD/AAAAAABkAAAAMgAAAAAAAABkAAAAAAAAAH9/fwAKAAAAHwAAAFQAAAAzzMwA////AQAAAAAAAAAAAAAAAAAAAAAAAAAAAAAAAAAAAAAAAAAAAAAAAn9/fwDu7OEDzMzMAMDA/wB/f38AAAAAAAAAAAAAAAAAAAAAAAAAAAAhAAAAGAAAABQAAABgCQAAugkAAD44AADyCQAAEAAAACYAAAAIAAAA//////////8="/>
               </a:ext>
             </a:extLst>
           </p:cNvSpPr>
@@ -4439,7 +4439,7 @@
           <p:cNvSpPr>
             <a:extLst>
               <a:ext uri="smNativeData">
-                <pr:smNativeData xmlns="" xmlns:p14="http://schemas.microsoft.com/office/powerpoint/2010/main" xmlns:pr="smNativeData" val="SMDATA_13_aDXlXhMAAAAlAAAAZAAAAA0AAAAAjgAAAEcAAACOAAAARwAAAAAAAAAAAAAAAAAAAAEAAABQAAAAAAAAAAAA4D8AAAAAAADgPwAAAAAAAOA/AAAAAAAA4D8AAAAAAADgPwAAAAAAAOA/AAAAAAAA4D8AAAAAAADgPwAAAAAAAOA/AAAAAAAA4D8CAAAAjAAAAAAAAAAAAAAAT4G9DP///wgAAAAAAAAAAAAAAAAAAAAAAAAAAAAAAAAAAAAAZAAAAAEAAABAAAAAAAAAAAAAAAAAAAAAAAAAAAAAAAAAAAAAAAAAAAAAAAAAAAAAAAAAAAAAAAAAAAAAAAAAAAAAAAAAAAAAAAAAAAAAAAAAAAAAAAAAAAAAAAAAAAAAFAAAADwAAAAAAAAAAAAAAAAAAAkUAAAAAQAAABQAAAAUAAAAFAAAAAEAAAAAAAAAZAAAAGQAAAAAAAAAZAAAAGQAAAAVAAAAYAAAAAAAAAAAAAAADwAAACADAAAAAAAAAAAAAAEAAACgMgAAVgcAAKr4//8BAAAAf39/AAEAAABkAAAAAAAAABQAAABAHwAAAAAAACYAAAAAAAAAwOD//wAAAAAmAAAAZAAAABYAAABMAAAAAAAAAAAAAAAEAAAAAAAAAAEAAADu7OEKAAAAACgAAAAoAAAAZAAAAGQAAAAAAAAAzMzMAAAAAABQAAAAUAAAAGQAAABkAAAAAAAAABcAAAAUAAAAAAAAAAAAAAD/fwAA/38AAAAAAAAJAAAABAAAAAAAAAAMAAAAEAAAAAAAAAAAAAAAAAAAAAAAAAAeAAAAaAAAAAAAAAAAAAAAAAAAAAAAAAAAAAAAECcAABAnAAAAAAAAAAAAAAAAAAAAAAAAAAAAAAAAAAAAAAAAAAAAABQAAAAAAAAAwMD/AAAAAABkAAAAMgAAAAAAAABkAAAAAAAAAH9/fwAKAAAAHwAAAFQAAABPgb0F////AQAAAAAAAAAAAAAAAAAAAAAAAAAAAAAAAAAAAAAAAAAAAAAAAn9/fwDu7OEDzMzMAMDA/wB/f38AAAAAAAAAAAAAAAAAAAAAAAAAAAAhAAAAGAAAABQAAABwCAAACAcAAD44AADeCQAAEAAAACYAAAAIAAAA//////////8="/>
+                <pr:smNativeData xmlns:pr="smNativeData" xmlns:p14="http://schemas.microsoft.com/office/powerpoint/2010/main" xmlns="" val="SMDATA_13_aDXlXhMAAAAlAAAAZAAAAA0AAAAAjgAAAEcAAACOAAAARwAAAAAAAAAAAAAAAAAAAAEAAABQAAAAAAAAAAAA4D8AAAAAAADgPwAAAAAAAOA/AAAAAAAA4D8AAAAAAADgPwAAAAAAAOA/AAAAAAAA4D8AAAAAAADgPwAAAAAAAOA/AAAAAAAA4D8CAAAAjAAAAAAAAAAAAAAAT4G9DP///wgAAAAAAAAAAAAAAAAAAAAAAAAAAAAAAAAAAAAAZAAAAAEAAABAAAAAAAAAAAAAAAAAAAAAAAAAAAAAAAAAAAAAAAAAAAAAAAAAAAAAAAAAAAAAAAAAAAAAAAAAAAAAAAAAAAAAAAAAAAAAAAAAAAAAAAAAAAAAAAAAAAAAFAAAADwAAAAAAAAAAAAAAAAAAAkUAAAAAQAAABQAAAAUAAAAFAAAAAEAAAAAAAAAZAAAAGQAAAAAAAAAZAAAAGQAAAAVAAAAYAAAAAAAAAAAAAAADwAAACADAAAAAAAAAAAAAAEAAACgMgAAVgcAAKr4//8BAAAAf39/AAEAAABkAAAAAAAAABQAAABAHwAAAAAAACYAAAAAAAAAwOD//wAAAAAmAAAAZAAAABYAAABMAAAAAAAAAAAAAAAEAAAAAAAAAAEAAADu7OEKAAAAACgAAAAoAAAAZAAAAGQAAAAAAAAAzMzMAAAAAABQAAAAUAAAAGQAAABkAAAAAAAAABcAAAAUAAAAAAAAAAAAAAD/fwAA/38AAAAAAAAJAAAABAAAAAAAAAAMAAAAEAAAAAAAAAAAAAAAAAAAAAAAAAAeAAAAaAAAAAAAAAAAAAAAAAAAAAAAAAAAAAAAECcAABAnAAAAAAAAAAAAAAAAAAAAAAAAAAAAAAAAAAAAAAAAAAAAABQAAAAAAAAAwMD/AAAAAABkAAAAMgAAAAAAAABkAAAAAAAAAH9/fwAKAAAAHwAAAFQAAABPgb0F////AQAAAAAAAAAAAAAAAAAAAAAAAAAAAAAAAAAAAAAAAAAAAAAAAn9/fwDu7OEDzMzMAMDA/wB/f38AAAAAAAAAAAAAAAAAAAAAAAAAAAAhAAAAGAAAABQAAABwCAAACAcAAD44AADeCQAAEAAAACYAAAAIAAAA//////////8="/>
               </a:ext>
             </a:extLst>
           </p:cNvSpPr>
@@ -4593,7 +4593,7 @@
           <p:cNvSpPr>
             <a:extLst>
               <a:ext uri="smNativeData">
-                <pr:smNativeData xmlns="" xmlns:p14="http://schemas.microsoft.com/office/powerpoint/2010/main" xmlns:pr="smNativeData" val="SMDATA_13_aDXlXhMAAAAlAAAAZAAAAA0AAAAAkAAAAEgAAACQAAAASAAAAAAAAAAAAAAAAAAAAAEAAABQAAAAAAAAAAAA4D8AAAAAAADgPwAAAAAAAOA/AAAAAAAA4D8AAAAAAADgPwAAAAAAAOA/AAAAAAAA4D8AAAAAAADgPwAAAAAAAOA/AAAAAAAA4D8CAAAAjAAAAAEAAAAAAAAAM8zMAP///wgAAAAAAAAAAAAAAAAAAAAAAAAAAAAAAAAAAAAAeAAAAAEAAABAAAAAAAAAAAAAAABaAAAAAAAAAAAAAAAAAAAAAAAAAAAAAAAAAAAAAAAAAAAAAAAAAAAAAAAAAAAAAAAAAAAAAAAAAAAAAAAAAAAAAAAAAAAAAAAAAAAAFAAAADwAAAAAAAAAAAAAAAAAAAkUAAAAAQAAABQAAAAUAAAAFAAAAAEAAAAAAAAAZAAAAGQAAAAAAAAAZAAAAGQAAAAVAAAAYAAAAAAAAAAAAAAADwAAACADAAAAAAAAAAAAAAEAAACgMgAAVgcAAKr4//8BAAAAf39/AAEAAABkAAAAAAAAABQAAABAHwAAAAAAACYAAAAAAAAAwOD//wAAAAAmAAAAZAAAABYAAABMAAAAAAAAAAAAAAAEAAAAAAAAAAEAAADu7OEKAAAAACgAAAAoAAAAZAAAAGQAAAAAAAAAzMzMAAAAAABQAAAAUAAAAGQAAABkAAAAAAAAABcAAAAUAAAAAAAAAAAAAAD/fwAA/38AAAAAAAAJAAAABAAAAAAAAAAMAAAAEAAAAAAAAAAAAAAAAAAAAAAAAAAeAAAAaAAAAAAAAAAAAAAAAAAAAAAAAAAAAAAAECcAABAnAAAAAAAAAAAAAAAAAAAAAAAAAAAAAAAAAAAAAAAAAAAAABQAAAAAAAAAwMD/AAAAAABkAAAAMgAAAAAAAABkAAAAAAAAAH9/fwAKAAAAHwAAAFQAAAAzzMwA////AQAAAAAAAAAAAAAAAAAAAAAAAAAAAAAAAAAAAAAAAAAAAAAAAn9/fwDu7OEDzMzMAMDA/wB/f38AAAAAAAAAAAAAAAAAAAAAAAAAAAAhAAAAGAAAABQAAABgCQAAugkAAD44AADyCQAAEAAAACYAAAAIAAAA//////////8="/>
+                <pr:smNativeData xmlns:pr="smNativeData" xmlns:p14="http://schemas.microsoft.com/office/powerpoint/2010/main" xmlns="" val="SMDATA_13_aDXlXhMAAAAlAAAAZAAAAA0AAAAAkAAAAEgAAACQAAAASAAAAAAAAAAAAAAAAAAAAAEAAABQAAAAAAAAAAAA4D8AAAAAAADgPwAAAAAAAOA/AAAAAAAA4D8AAAAAAADgPwAAAAAAAOA/AAAAAAAA4D8AAAAAAADgPwAAAAAAAOA/AAAAAAAA4D8CAAAAjAAAAAEAAAAAAAAAM8zMAP///wgAAAAAAAAAAAAAAAAAAAAAAAAAAAAAAAAAAAAAeAAAAAEAAABAAAAAAAAAAAAAAABaAAAAAAAAAAAAAAAAAAAAAAAAAAAAAAAAAAAAAAAAAAAAAAAAAAAAAAAAAAAAAAAAAAAAAAAAAAAAAAAAAAAAAAAAAAAAAAAAAAAAFAAAADwAAAAAAAAAAAAAAAAAAAkUAAAAAQAAABQAAAAUAAAAFAAAAAEAAAAAAAAAZAAAAGQAAAAAAAAAZAAAAGQAAAAVAAAAYAAAAAAAAAAAAAAADwAAACADAAAAAAAAAAAAAAEAAACgMgAAVgcAAKr4//8BAAAAf39/AAEAAABkAAAAAAAAABQAAABAHwAAAAAAACYAAAAAAAAAwOD//wAAAAAmAAAAZAAAABYAAABMAAAAAAAAAAAAAAAEAAAAAAAAAAEAAADu7OEKAAAAACgAAAAoAAAAZAAAAGQAAAAAAAAAzMzMAAAAAABQAAAAUAAAAGQAAABkAAAAAAAAABcAAAAUAAAAAAAAAAAAAAD/fwAA/38AAAAAAAAJAAAABAAAAAAAAAAMAAAAEAAAAAAAAAAAAAAAAAAAAAAAAAAeAAAAaAAAAAAAAAAAAAAAAAAAAAAAAAAAAAAAECcAABAnAAAAAAAAAAAAAAAAAAAAAAAAAAAAAAAAAAAAAAAAAAAAABQAAAAAAAAAwMD/AAAAAABkAAAAMgAAAAAAAABkAAAAAAAAAH9/fwAKAAAAHwAAAFQAAAAzzMwA////AQAAAAAAAAAAAAAAAAAAAAAAAAAAAAAAAAAAAAAAAAAAAAAAAn9/fwDu7OEDzMzMAMDA/wB/f38AAAAAAAAAAAAAAAAAAAAAAAAAAAAhAAAAGAAAABQAAABgCQAAugkAAD44AADyCQAAEAAAACYAAAAIAAAA//////////8="/>
               </a:ext>
             </a:extLst>
           </p:cNvSpPr>
@@ -4622,7 +4622,7 @@
           <p:cNvSpPr>
             <a:extLst>
               <a:ext uri="smNativeData">
-                <pr:smNativeData xmlns="" xmlns:p14="http://schemas.microsoft.com/office/powerpoint/2010/main" xmlns:pr="smNativeData" val="SMDATA_13_aDXlXhMAAAAlAAAAZAAAAA0AAAAAjgAAAEcAAACOAAAARwAAAAAAAAAAAAAAAAAAAAEAAABQAAAAAAAAAAAA4D8AAAAAAADgPwAAAAAAAOA/AAAAAAAA4D8AAAAAAADgPwAAAAAAAOA/AAAAAAAA4D8AAAAAAADgPwAAAAAAAOA/AAAAAAAA4D8CAAAAjAAAAAAAAAAAAAAAT4G9DP///wgAAAAAAAAAAAAAAAAAAAAAAAAAAAAAAAAAAAAAZAAAAAEAAABAAAAAAAAAAAAAAAAAAAAAAAAAAAAAAAAAAAAAAAAAAAAAAAAAAAAAAAAAAAAAAAAAAAAAAAAAAAAAAAAAAAAAAAAAAAAAAAAAAAAAAAAAAAAAAAAAAAAAFAAAADwAAAAAAAAAAAAAAAAAAAkUAAAAAQAAABQAAAAUAAAAFAAAAAEAAAAAAAAAZAAAAGQAAAAAAAAAZAAAAGQAAAAVAAAAYAAAAAAAAAAAAAAADwAAACADAAAAAAAAAAAAAAEAAACgMgAAVgcAAKr4//8BAAAAf39/AAEAAABkAAAAAAAAABQAAABAHwAAAAAAACYAAAAAAAAAwOD//wAAAAAmAAAAZAAAABYAAABMAAAAAAAAAAAAAAAEAAAAAAAAAAEAAADu7OEKAAAAACgAAAAoAAAAZAAAAGQAAAAAAAAAzMzMAAAAAABQAAAAUAAAAGQAAABkAAAAAAAAABcAAAAUAAAAAAAAAAAAAAD/fwAA/38AAAAAAAAJAAAABAAAAAAAAAAMAAAAEAAAAAAAAAAAAAAAAAAAAAAAAAAeAAAAaAAAAAAAAAAAAAAAAAAAAAAAAAAAAAAAECcAABAnAAAAAAAAAAAAAAAAAAAAAAAAAAAAAAAAAAAAAAAAAAAAABQAAAAAAAAAwMD/AAAAAABkAAAAMgAAAAAAAABkAAAAAAAAAH9/fwAKAAAAHwAAAFQAAABPgb0F////AQAAAAAAAAAAAAAAAAAAAAAAAAAAAAAAAAAAAAAAAAAAAAAAAn9/fwDu7OEDzMzMAMDA/wB/f38AAAAAAAAAAAAAAAAAAAAAAAAAAAAhAAAAGAAAABQAAABwCAAACAcAAD44AADeCQAAEAAAACYAAAAIAAAA//////////8="/>
+                <pr:smNativeData xmlns:pr="smNativeData" xmlns:p14="http://schemas.microsoft.com/office/powerpoint/2010/main" xmlns="" val="SMDATA_13_aDXlXhMAAAAlAAAAZAAAAA0AAAAAjgAAAEcAAACOAAAARwAAAAAAAAAAAAAAAAAAAAEAAABQAAAAAAAAAAAA4D8AAAAAAADgPwAAAAAAAOA/AAAAAAAA4D8AAAAAAADgPwAAAAAAAOA/AAAAAAAA4D8AAAAAAADgPwAAAAAAAOA/AAAAAAAA4D8CAAAAjAAAAAAAAAAAAAAAT4G9DP///wgAAAAAAAAAAAAAAAAAAAAAAAAAAAAAAAAAAAAAZAAAAAEAAABAAAAAAAAAAAAAAAAAAAAAAAAAAAAAAAAAAAAAAAAAAAAAAAAAAAAAAAAAAAAAAAAAAAAAAAAAAAAAAAAAAAAAAAAAAAAAAAAAAAAAAAAAAAAAAAAAAAAAFAAAADwAAAAAAAAAAAAAAAAAAAkUAAAAAQAAABQAAAAUAAAAFAAAAAEAAAAAAAAAZAAAAGQAAAAAAAAAZAAAAGQAAAAVAAAAYAAAAAAAAAAAAAAADwAAACADAAAAAAAAAAAAAAEAAACgMgAAVgcAAKr4//8BAAAAf39/AAEAAABkAAAAAAAAABQAAABAHwAAAAAAACYAAAAAAAAAwOD//wAAAAAmAAAAZAAAABYAAABMAAAAAAAAAAAAAAAEAAAAAAAAAAEAAADu7OEKAAAAACgAAAAoAAAAZAAAAGQAAAAAAAAAzMzMAAAAAABQAAAAUAAAAGQAAABkAAAAAAAAABcAAAAUAAAAAAAAAAAAAAD/fwAA/38AAAAAAAAJAAAABAAAAAAAAAAMAAAAEAAAAAAAAAAAAAAAAAAAAAAAAAAeAAAAaAAAAAAAAAAAAAAAAAAAAAAAAAAAAAAAECcAABAnAAAAAAAAAAAAAAAAAAAAAAAAAAAAAAAAAAAAAAAAAAAAABQAAAAAAAAAwMD/AAAAAABkAAAAMgAAAAAAAABkAAAAAAAAAH9/fwAKAAAAHwAAAFQAAABPgb0F////AQAAAAAAAAAAAAAAAAAAAAAAAAAAAAAAAAAAAAAAAAAAAAAAAn9/fwDu7OEDzMzMAMDA/wB/f38AAAAAAAAAAAAAAAAAAAAAAAAAAAAhAAAAGAAAABQAAABwCAAACAcAAD44AADeCQAAEAAAACYAAAAIAAAA//////////8="/>
               </a:ext>
             </a:extLst>
           </p:cNvSpPr>
@@ -4776,7 +4776,7 @@
           <p:cNvSpPr>
             <a:extLst>
               <a:ext uri="smNativeData">
-                <pr:smNativeData xmlns="" xmlns:p14="http://schemas.microsoft.com/office/powerpoint/2010/main" xmlns:pr="smNativeData" val="SMDATA_13_aDXlXhMAAAAlAAAAZAAAAA0AAAAAkAAAAEgAAACQAAAASAAAAAAAAAAAAAAAAAAAAAEAAABQAAAAAAAAAAAA4D8AAAAAAADgPwAAAAAAAOA/AAAAAAAA4D8AAAAAAADgPwAAAAAAAOA/AAAAAAAA4D8AAAAAAADgPwAAAAAAAOA/AAAAAAAA4D8CAAAAjAAAAAEAAAAAAAAAM8zMAP///wgAAAAAAAAAAAAAAAAAAAAAAAAAAAAAAAAAAAAAeAAAAAEAAABAAAAAAAAAAAAAAABaAAAAAAAAAAAAAAAAAAAAAAAAAAAAAAAAAAAAAAAAAAAAAAAAAAAAAAAAAAAAAAAAAAAAAAAAAAAAAAAAAAAAAAAAAAAAAAAAAAAAFAAAADwAAAAAAAAAAAAAAAAAAAkUAAAAAQAAABQAAAAUAAAAFAAAAAEAAAAAAAAAZAAAAGQAAAAAAAAAZAAAAGQAAAAVAAAAYAAAAAAAAAAAAAAADwAAACADAAAAAAAAAAAAAAEAAACgMgAAVgcAAKr4//8BAAAAf39/AAEAAABkAAAAAAAAABQAAABAHwAAAAAAACYAAAAAAAAAwOD//wAAAAAmAAAAZAAAABYAAABMAAAAAAAAAAAAAAAEAAAAAAAAAAEAAADu7OEKAAAAACgAAAAoAAAAZAAAAGQAAAAAAAAAzMzMAAAAAABQAAAAUAAAAGQAAABkAAAAAAAAABcAAAAUAAAAAAAAAAAAAAD/fwAA/38AAAAAAAAJAAAABAAAAAAAAAAMAAAAEAAAAAAAAAAAAAAAAAAAAAAAAAAeAAAAaAAAAAAAAAAAAAAAAAAAAAAAAAAAAAAAECcAABAnAAAAAAAAAAAAAAAAAAAAAAAAAAAAAAAAAAAAAAAAAAAAABQAAAAAAAAAwMD/AAAAAABkAAAAMgAAAAAAAABkAAAAAAAAAH9/fwAKAAAAHwAAAFQAAAAzzMwA////AQAAAAAAAAAAAAAAAAAAAAAAAAAAAAAAAAAAAAAAAAAAAAAAAn9/fwDu7OEDzMzMAMDA/wB/f38AAAAAAAAAAAAAAAAAAAAAAAAAAAAhAAAAGAAAABQAAABgCQAAugkAAD44AADyCQAAEAAAACYAAAAIAAAA//////////8="/>
+                <pr:smNativeData xmlns:pr="smNativeData" xmlns:p14="http://schemas.microsoft.com/office/powerpoint/2010/main" xmlns="" val="SMDATA_13_aDXlXhMAAAAlAAAAZAAAAA0AAAAAkAAAAEgAAACQAAAASAAAAAAAAAAAAAAAAAAAAAEAAABQAAAAAAAAAAAA4D8AAAAAAADgPwAAAAAAAOA/AAAAAAAA4D8AAAAAAADgPwAAAAAAAOA/AAAAAAAA4D8AAAAAAADgPwAAAAAAAOA/AAAAAAAA4D8CAAAAjAAAAAEAAAAAAAAAM8zMAP///wgAAAAAAAAAAAAAAAAAAAAAAAAAAAAAAAAAAAAAeAAAAAEAAABAAAAAAAAAAAAAAABaAAAAAAAAAAAAAAAAAAAAAAAAAAAAAAAAAAAAAAAAAAAAAAAAAAAAAAAAAAAAAAAAAAAAAAAAAAAAAAAAAAAAAAAAAAAAAAAAAAAAFAAAADwAAAAAAAAAAAAAAAAAAAkUAAAAAQAAABQAAAAUAAAAFAAAAAEAAAAAAAAAZAAAAGQAAAAAAAAAZAAAAGQAAAAVAAAAYAAAAAAAAAAAAAAADwAAACADAAAAAAAAAAAAAAEAAACgMgAAVgcAAKr4//8BAAAAf39/AAEAAABkAAAAAAAAABQAAABAHwAAAAAAACYAAAAAAAAAwOD//wAAAAAmAAAAZAAAABYAAABMAAAAAAAAAAAAAAAEAAAAAAAAAAEAAADu7OEKAAAAACgAAAAoAAAAZAAAAGQAAAAAAAAAzMzMAAAAAABQAAAAUAAAAGQAAABkAAAAAAAAABcAAAAUAAAAAAAAAAAAAAD/fwAA/38AAAAAAAAJAAAABAAAAAAAAAAMAAAAEAAAAAAAAAAAAAAAAAAAAAAAAAAeAAAAaAAAAAAAAAAAAAAAAAAAAAAAAAAAAAAAECcAABAnAAAAAAAAAAAAAAAAAAAAAAAAAAAAAAAAAAAAAAAAAAAAABQAAAAAAAAAwMD/AAAAAABkAAAAMgAAAAAAAABkAAAAAAAAAH9/fwAKAAAAHwAAAFQAAAAzzMwA////AQAAAAAAAAAAAAAAAAAAAAAAAAAAAAAAAAAAAAAAAAAAAAAAAn9/fwDu7OEDzMzMAMDA/wB/f38AAAAAAAAAAAAAAAAAAAAAAAAAAAAhAAAAGAAAABQAAABgCQAAugkAAD44AADyCQAAEAAAACYAAAAIAAAA//////////8="/>
               </a:ext>
             </a:extLst>
           </p:cNvSpPr>
@@ -4805,7 +4805,7 @@
           <p:cNvSpPr>
             <a:extLst>
               <a:ext uri="smNativeData">
-                <pr:smNativeData xmlns="" xmlns:p14="http://schemas.microsoft.com/office/powerpoint/2010/main" xmlns:pr="smNativeData" val="SMDATA_13_aDXlXhMAAAAlAAAAZAAAAA0AAAAAjgAAAEcAAACOAAAARwAAAAAAAAAAAAAAAAAAAAEAAABQAAAAAAAAAAAA4D8AAAAAAADgPwAAAAAAAOA/AAAAAAAA4D8AAAAAAADgPwAAAAAAAOA/AAAAAAAA4D8AAAAAAADgPwAAAAAAAOA/AAAAAAAA4D8CAAAAjAAAAAAAAAAAAAAAT4G9DP///wgAAAAAAAAAAAAAAAAAAAAAAAAAAAAAAAAAAAAAZAAAAAEAAABAAAAAAAAAAAAAAAAAAAAAAAAAAAAAAAAAAAAAAAAAAAAAAAAAAAAAAAAAAAAAAAAAAAAAAAAAAAAAAAAAAAAAAAAAAAAAAAAAAAAAAAAAAAAAAAAAAAAAFAAAADwAAAAAAAAAAAAAAAAAAAkUAAAAAQAAABQAAAAUAAAAFAAAAAEAAAAAAAAAZAAAAGQAAAAAAAAAZAAAAGQAAAAVAAAAYAAAAAAAAAAAAAAADwAAACADAAAAAAAAAAAAAAEAAACgMgAAVgcAAKr4//8BAAAAf39/AAEAAABkAAAAAAAAABQAAABAHwAAAAAAACYAAAAAAAAAwOD//wAAAAAmAAAAZAAAABYAAABMAAAAAAAAAAAAAAAEAAAAAAAAAAEAAADu7OEKAAAAACgAAAAoAAAAZAAAAGQAAAAAAAAAzMzMAAAAAABQAAAAUAAAAGQAAABkAAAAAAAAABcAAAAUAAAAAAAAAAAAAAD/fwAA/38AAAAAAAAJAAAABAAAAAAAAAAMAAAAEAAAAAAAAAAAAAAAAAAAAAAAAAAeAAAAaAAAAAAAAAAAAAAAAAAAAAAAAAAAAAAAECcAABAnAAAAAAAAAAAAAAAAAAAAAAAAAAAAAAAAAAAAAAAAAAAAABQAAAAAAAAAwMD/AAAAAABkAAAAMgAAAAAAAABkAAAAAAAAAH9/fwAKAAAAHwAAAFQAAABPgb0F////AQAAAAAAAAAAAAAAAAAAAAAAAAAAAAAAAAAAAAAAAAAAAAAAAn9/fwDu7OEDzMzMAMDA/wB/f38AAAAAAAAAAAAAAAAAAAAAAAAAAAAhAAAAGAAAABQAAABwCAAACAcAAD44AADeCQAAEAAAACYAAAAIAAAA//////////8="/>
+                <pr:smNativeData xmlns:pr="smNativeData" xmlns:p14="http://schemas.microsoft.com/office/powerpoint/2010/main" xmlns="" val="SMDATA_13_aDXlXhMAAAAlAAAAZAAAAA0AAAAAjgAAAEcAAACOAAAARwAAAAAAAAAAAAAAAAAAAAEAAABQAAAAAAAAAAAA4D8AAAAAAADgPwAAAAAAAOA/AAAAAAAA4D8AAAAAAADgPwAAAAAAAOA/AAAAAAAA4D8AAAAAAADgPwAAAAAAAOA/AAAAAAAA4D8CAAAAjAAAAAAAAAAAAAAAT4G9DP///wgAAAAAAAAAAAAAAAAAAAAAAAAAAAAAAAAAAAAAZAAAAAEAAABAAAAAAAAAAAAAAAAAAAAAAAAAAAAAAAAAAAAAAAAAAAAAAAAAAAAAAAAAAAAAAAAAAAAAAAAAAAAAAAAAAAAAAAAAAAAAAAAAAAAAAAAAAAAAAAAAAAAAFAAAADwAAAAAAAAAAAAAAAAAAAkUAAAAAQAAABQAAAAUAAAAFAAAAAEAAAAAAAAAZAAAAGQAAAAAAAAAZAAAAGQAAAAVAAAAYAAAAAAAAAAAAAAADwAAACADAAAAAAAAAAAAAAEAAACgMgAAVgcAAKr4//8BAAAAf39/AAEAAABkAAAAAAAAABQAAABAHwAAAAAAACYAAAAAAAAAwOD//wAAAAAmAAAAZAAAABYAAABMAAAAAAAAAAAAAAAEAAAAAAAAAAEAAADu7OEKAAAAACgAAAAoAAAAZAAAAGQAAAAAAAAAzMzMAAAAAABQAAAAUAAAAGQAAABkAAAAAAAAABcAAAAUAAAAAAAAAAAAAAD/fwAA/38AAAAAAAAJAAAABAAAAAAAAAAMAAAAEAAAAAAAAAAAAAAAAAAAAAAAAAAeAAAAaAAAAAAAAAAAAAAAAAAAAAAAAAAAAAAAECcAABAnAAAAAAAAAAAAAAAAAAAAAAAAAAAAAAAAAAAAAAAAAAAAABQAAAAAAAAAwMD/AAAAAABkAAAAMgAAAAAAAABkAAAAAAAAAH9/fwAKAAAAHwAAAFQAAABPgb0F////AQAAAAAAAAAAAAAAAAAAAAAAAAAAAAAAAAAAAAAAAAAAAAAAAn9/fwDu7OEDzMzMAMDA/wB/f38AAAAAAAAAAAAAAAAAAAAAAAAAAAAhAAAAGAAAABQAAABwCAAACAcAAD44AADeCQAAEAAAACYAAAAIAAAA//////////8="/>
               </a:ext>
             </a:extLst>
           </p:cNvSpPr>
@@ -4855,7 +4855,7 @@
           <p:cNvSpPr>
             <a:extLst>
               <a:ext uri="smNativeData">
-                <pr:smNativeData xmlns="" xmlns:p14="http://schemas.microsoft.com/office/powerpoint/2010/main" xmlns:pr="smNativeData" val="SMDATA_13_aDXlXhMAAAAlAAAAZAAAAA0AAAAAjgAAAEcAAACOAAAARwAAAAAAAAABAAAAAAAAAAEAAABQAAAAAAAAAAAA4D8AAAAAAADgPwAAAAAAAOA/AAAAAAAA4D8AAAAAAADgPwAAAAAAAOA/AAAAAAAA4D8AAAAAAADgPwAAAAAAAOA/AAAAAAAA4D8CAAAAjAAAAAAAAAAAAAAAT4G9DP///wgAAAAAAAAAAAAAAAAAAAAAAAAAAAAAAAAAAAAAZAAAAAEAAABAAAAAAAAAAAAAAAAAAAAAAAAAAAAAAAAAAAAAAAAAAAAAAAAAAAAAAAAAAAAAAAAAAAAAAAAAAAAAAAAAAAAAAAAAAAAAAAAAAAAAAAAAAAAAAAAAAAAAFAAAADwAAAAAAAAAAAAAAAAAAAkUAAAAAQAAABQAAAAUAAAAFAAAAAEAAAAAAAAAZAAAAGQAAAAAAAAAZAAAAGQAAAAVAAAAYAAAAAAAAAAAAAAADwAAACADAAAAAAAAAAAAAAEAAACgMgAAVgcAAKr4//8BAAAAf39/AAEAAABkAAAAAAAAABQAAABAHwAAAAAAACYAAAAAAAAAwOD//wAAAAAmAAAAZAAAABYAAABMAAAAAAAAAAAAAAAEAAAAAAAAAAEAAADu7OEKAAAAACgAAAAoAAAAZAAAAGQAAAAAAAAAzMzMAAAAAABQAAAAUAAAAGQAAABkAAAAAAAAABcAAAAUAAAAAAAAAAAAAAD/fwAA/38AAAAAAAAJAAAABAAAAAAAAAAMAAAAEAAAAAAAAAAAAAAAAAAAAAAAAAAeAAAAaAAAAAAAAAAAAAAAAAAAAAAAAAAAAAAAECcAABAnAAAAAAAAAAAAAAAAAAAAAAAAAAAAAAAAAAAAAAAAAAAAABQAAAAAAAAAwMD/AAAAAABkAAAAMgAAAAAAAABkAAAAAAAAAH9/fwAKAAAAHwAAAFQAAABPgb0F////AQAAAAAAAAAAAAAAAAAAAAAAAAAAAAAAAAAAAAAAAAAAAAAAAn9/fwDu7OEDzMzMAMDA/wB/f38AAAAAAAAAAAAAAAAAAAAAAAAAAAAhAAAAGAAAABQAAAAwAwAAQAsAAGgtAABOKAAAEAAAACYAAAAIAAAA//////////8="/>
+                <pr:smNativeData xmlns:pr="smNativeData" xmlns:p14="http://schemas.microsoft.com/office/powerpoint/2010/main" xmlns="" val="SMDATA_13_aDXlXhMAAAAlAAAAZAAAAA0AAAAAjgAAAEcAAACOAAAARwAAAAAAAAABAAAAAAAAAAEAAABQAAAAAAAAAAAA4D8AAAAAAADgPwAAAAAAAOA/AAAAAAAA4D8AAAAAAADgPwAAAAAAAOA/AAAAAAAA4D8AAAAAAADgPwAAAAAAAOA/AAAAAAAA4D8CAAAAjAAAAAAAAAAAAAAAT4G9DP///wgAAAAAAAAAAAAAAAAAAAAAAAAAAAAAAAAAAAAAZAAAAAEAAABAAAAAAAAAAAAAAAAAAAAAAAAAAAAAAAAAAAAAAAAAAAAAAAAAAAAAAAAAAAAAAAAAAAAAAAAAAAAAAAAAAAAAAAAAAAAAAAAAAAAAAAAAAAAAAAAAAAAAFAAAADwAAAAAAAAAAAAAAAAAAAkUAAAAAQAAABQAAAAUAAAAFAAAAAEAAAAAAAAAZAAAAGQAAAAAAAAAZAAAAGQAAAAVAAAAYAAAAAAAAAAAAAAADwAAACADAAAAAAAAAAAAAAEAAACgMgAAVgcAAKr4//8BAAAAf39/AAEAAABkAAAAAAAAABQAAABAHwAAAAAAACYAAAAAAAAAwOD//wAAAAAmAAAAZAAAABYAAABMAAAAAAAAAAAAAAAEAAAAAAAAAAEAAADu7OEKAAAAACgAAAAoAAAAZAAAAGQAAAAAAAAAzMzMAAAAAABQAAAAUAAAAGQAAABkAAAAAAAAABcAAAAUAAAAAAAAAAAAAAD/fwAA/38AAAAAAAAJAAAABAAAAAAAAAAMAAAAEAAAAAAAAAAAAAAAAAAAAAAAAAAeAAAAaAAAAAAAAAAAAAAAAAAAAAAAAAAAAAAAECcAABAnAAAAAAAAAAAAAAAAAAAAAAAAAAAAAAAAAAAAAAAAAAAAABQAAAAAAAAAwMD/AAAAAABkAAAAMgAAAAAAAABkAAAAAAAAAH9/fwAKAAAAHwAAAFQAAABPgb0F////AQAAAAAAAAAAAAAAAAAAAAAAAAAAAAAAAAAAAAAAAAAAAAAAAn9/fwDu7OEDzMzMAMDA/wB/f38AAAAAAAAAAAAAAAAAAAAAAAAAAAAhAAAAGAAAABQAAAAwAwAAQAsAAGgtAABOKAAAEAAAACYAAAAIAAAA//////////8="/>
               </a:ext>
             </a:extLst>
           </p:cNvSpPr>
@@ -5108,7 +5108,7 @@
           <p:cNvSpPr>
             <a:extLst>
               <a:ext uri="smNativeData">
-                <pr:smNativeData xmlns="" xmlns:p14="http://schemas.microsoft.com/office/powerpoint/2010/main" xmlns:pr="smNativeData" val="SMDATA_13_aDXlXhMAAAAlAAAAZAAAAA0AAAAAkAAAAEgAAACQAAAASAAAAAAAAAAAAAAAAAAAAAEAAABQAAAAAAAAAAAA4D8AAAAAAADgPwAAAAAAAOA/AAAAAAAA4D8AAAAAAADgPwAAAAAAAOA/AAAAAAAA4D8AAAAAAADgPwAAAAAAAOA/AAAAAAAA4D8CAAAAjAAAAAEAAAAAAAAAM8zMAP///wgAAAAAAAAAAAAAAAAAAAAAAAAAAAAAAAAAAAAAeAAAAAEAAABAAAAAAAAAAAAAAABaAAAAAAAAAAAAAAAAAAAAAAAAAAAAAAAAAAAAAAAAAAAAAAAAAAAAAAAAAAAAAAAAAAAAAAAAAAAAAAAAAAAAAAAAAAAAAAAAAAAAFAAAADwAAAAAAAAAAAAAAAAAAAkUAAAAAQAAABQAAAAUAAAAFAAAAAEAAAAAAAAAZAAAAGQAAAAAAAAAZAAAAGQAAAAVAAAAYAAAAAAAAAAAAAAADwAAACADAAAAAAAAAAAAAAEAAACgMgAAVgcAAKr4//8BAAAAf39/AAEAAABkAAAAAAAAABQAAABAHwAAAAAAACYAAAAAAAAAwOD//wAAAAAmAAAAZAAAABYAAABMAAAAAAAAAAAAAAAEAAAAAAAAAAEAAADu7OEKAAAAACgAAAAoAAAAZAAAAGQAAAAAAAAAzMzMAAAAAABQAAAAUAAAAGQAAABkAAAAAAAAABcAAAAUAAAAAAAAAAAAAAD/fwAA/38AAAAAAAAJAAAABAAAAAAAAAAMAAAAEAAAAAAAAAAAAAAAAAAAAAAAAAAeAAAAaAAAAAAAAAAAAAAAAAAAAAAAAAAAAAAAECcAABAnAAAAAAAAAAAAAAAAAAAAAAAAAAAAAAAAAAAAAAAAAAAAABQAAAAAAAAAwMD/AAAAAABkAAAAMgAAAAAAAABkAAAAAAAAAH9/fwAKAAAAHwAAAFQAAAAzzMwA////AQAAAAAAAAAAAAAAAAAAAAAAAAAAAAAAAAAAAAAAAAAAAAAAAn9/fwDu7OEDzMzMAMDA/wB/f38AAAAAAAAAAAAAAAAAAAAAAAAAAAAhAAAAGAAAABQAAABgCQAAugkAAD44AADyCQAAEAAAACYAAAAIAAAA//////////8="/>
+                <pr:smNativeData xmlns:pr="smNativeData" xmlns:p14="http://schemas.microsoft.com/office/powerpoint/2010/main" xmlns="" val="SMDATA_13_aDXlXhMAAAAlAAAAZAAAAA0AAAAAkAAAAEgAAACQAAAASAAAAAAAAAAAAAAAAAAAAAEAAABQAAAAAAAAAAAA4D8AAAAAAADgPwAAAAAAAOA/AAAAAAAA4D8AAAAAAADgPwAAAAAAAOA/AAAAAAAA4D8AAAAAAADgPwAAAAAAAOA/AAAAAAAA4D8CAAAAjAAAAAEAAAAAAAAAM8zMAP///wgAAAAAAAAAAAAAAAAAAAAAAAAAAAAAAAAAAAAAeAAAAAEAAABAAAAAAAAAAAAAAABaAAAAAAAAAAAAAAAAAAAAAAAAAAAAAAAAAAAAAAAAAAAAAAAAAAAAAAAAAAAAAAAAAAAAAAAAAAAAAAAAAAAAAAAAAAAAAAAAAAAAFAAAADwAAAAAAAAAAAAAAAAAAAkUAAAAAQAAABQAAAAUAAAAFAAAAAEAAAAAAAAAZAAAAGQAAAAAAAAAZAAAAGQAAAAVAAAAYAAAAAAAAAAAAAAADwAAACADAAAAAAAAAAAAAAEAAACgMgAAVgcAAKr4//8BAAAAf39/AAEAAABkAAAAAAAAABQAAABAHwAAAAAAACYAAAAAAAAAwOD//wAAAAAmAAAAZAAAABYAAABMAAAAAAAAAAAAAAAEAAAAAAAAAAEAAADu7OEKAAAAACgAAAAoAAAAZAAAAGQAAAAAAAAAzMzMAAAAAABQAAAAUAAAAGQAAABkAAAAAAAAABcAAAAUAAAAAAAAAAAAAAD/fwAA/38AAAAAAAAJAAAABAAAAAAAAAAMAAAAEAAAAAAAAAAAAAAAAAAAAAAAAAAeAAAAaAAAAAAAAAAAAAAAAAAAAAAAAAAAAAAAECcAABAnAAAAAAAAAAAAAAAAAAAAAAAAAAAAAAAAAAAAAAAAAAAAABQAAAAAAAAAwMD/AAAAAABkAAAAMgAAAAAAAABkAAAAAAAAAH9/fwAKAAAAHwAAAFQAAAAzzMwA////AQAAAAAAAAAAAAAAAAAAAAAAAAAAAAAAAAAAAAAAAAAAAAAAAn9/fwDu7OEDzMzMAMDA/wB/f38AAAAAAAAAAAAAAAAAAAAAAAAAAAAhAAAAGAAAABQAAABgCQAAugkAAD44AADyCQAAEAAAACYAAAAIAAAA//////////8="/>
               </a:ext>
             </a:extLst>
           </p:cNvSpPr>
@@ -5137,7 +5137,7 @@
           <p:cNvSpPr>
             <a:extLst>
               <a:ext uri="smNativeData">
-                <pr:smNativeData xmlns="" xmlns:p14="http://schemas.microsoft.com/office/powerpoint/2010/main" xmlns:pr="smNativeData" val="SMDATA_13_aDXlXhMAAAAlAAAAZAAAAA0AAAAAjgAAAEcAAACOAAAARwAAAAAAAAAAAAAAAAAAAAEAAABQAAAAAAAAAAAA4D8AAAAAAADgPwAAAAAAAOA/AAAAAAAA4D8AAAAAAADgPwAAAAAAAOA/AAAAAAAA4D8AAAAAAADgPwAAAAAAAOA/AAAAAAAA4D8CAAAAjAAAAAAAAAAAAAAAT4G9DP///wgAAAAAAAAAAAAAAAAAAAAAAAAAAAAAAAAAAAAAZAAAAAEAAABAAAAAAAAAAAAAAAAAAAAAAAAAAAAAAAAAAAAAAAAAAAAAAAAAAAAAAAAAAAAAAAAAAAAAAAAAAAAAAAAAAAAAAAAAAAAAAAAAAAAAAAAAAAAAAAAAAAAAFAAAADwAAAAAAAAAAAAAAAAAAAkUAAAAAQAAABQAAAAUAAAAFAAAAAEAAAAAAAAAZAAAAGQAAAAAAAAAZAAAAGQAAAAVAAAAYAAAAAAAAAAAAAAADwAAACADAAAAAAAAAAAAAAEAAACgMgAAVgcAAKr4//8BAAAAf39/AAEAAABkAAAAAAAAABQAAABAHwAAAAAAACYAAAAAAAAAwOD//wAAAAAmAAAAZAAAABYAAABMAAAAAAAAAAAAAAAEAAAAAAAAAAEAAADu7OEKAAAAACgAAAAoAAAAZAAAAGQAAAAAAAAAzMzMAAAAAABQAAAAUAAAAGQAAABkAAAAAAAAABcAAAAUAAAAAAAAAAAAAAD/fwAA/38AAAAAAAAJAAAABAAAAAAAAAAMAAAAEAAAAAAAAAAAAAAAAAAAAAAAAAAeAAAAaAAAAAAAAAAAAAAAAAAAAAAAAAAAAAAAECcAABAnAAAAAAAAAAAAAAAAAAAAAAAAAAAAAAAAAAAAAAAAAAAAABQAAAAAAAAAwMD/AAAAAABkAAAAMgAAAAAAAABkAAAAAAAAAH9/fwAKAAAAHwAAAFQAAABPgb0F////AQAAAAAAAAAAAAAAAAAAAAAAAAAAAAAAAAAAAAAAAAAAAAAAAn9/fwDu7OEDzMzMAMDA/wB/f38AAAAAAAAAAAAAAAAAAAAAAAAAAAAhAAAAGAAAABQAAABwCAAACAcAAD44AADeCQAAEAAAACYAAAAIAAAA//////////8="/>
+                <pr:smNativeData xmlns:pr="smNativeData" xmlns:p14="http://schemas.microsoft.com/office/powerpoint/2010/main" xmlns="" val="SMDATA_13_aDXlXhMAAAAlAAAAZAAAAA0AAAAAjgAAAEcAAACOAAAARwAAAAAAAAAAAAAAAAAAAAEAAABQAAAAAAAAAAAA4D8AAAAAAADgPwAAAAAAAOA/AAAAAAAA4D8AAAAAAADgPwAAAAAAAOA/AAAAAAAA4D8AAAAAAADgPwAAAAAAAOA/AAAAAAAA4D8CAAAAjAAAAAAAAAAAAAAAT4G9DP///wgAAAAAAAAAAAAAAAAAAAAAAAAAAAAAAAAAAAAAZAAAAAEAAABAAAAAAAAAAAAAAAAAAAAAAAAAAAAAAAAAAAAAAAAAAAAAAAAAAAAAAAAAAAAAAAAAAAAAAAAAAAAAAAAAAAAAAAAAAAAAAAAAAAAAAAAAAAAAAAAAAAAAFAAAADwAAAAAAAAAAAAAAAAAAAkUAAAAAQAAABQAAAAUAAAAFAAAAAEAAAAAAAAAZAAAAGQAAAAAAAAAZAAAAGQAAAAVAAAAYAAAAAAAAAAAAAAADwAAACADAAAAAAAAAAAAAAEAAACgMgAAVgcAAKr4//8BAAAAf39/AAEAAABkAAAAAAAAABQAAABAHwAAAAAAACYAAAAAAAAAwOD//wAAAAAmAAAAZAAAABYAAABMAAAAAAAAAAAAAAAEAAAAAAAAAAEAAADu7OEKAAAAACgAAAAoAAAAZAAAAGQAAAAAAAAAzMzMAAAAAABQAAAAUAAAAGQAAABkAAAAAAAAABcAAAAUAAAAAAAAAAAAAAD/fwAA/38AAAAAAAAJAAAABAAAAAAAAAAMAAAAEAAAAAAAAAAAAAAAAAAAAAAAAAAeAAAAaAAAAAAAAAAAAAAAAAAAAAAAAAAAAAAAECcAABAnAAAAAAAAAAAAAAAAAAAAAAAAAAAAAAAAAAAAAAAAAAAAABQAAAAAAAAAwMD/AAAAAABkAAAAMgAAAAAAAABkAAAAAAAAAH9/fwAKAAAAHwAAAFQAAABPgb0F////AQAAAAAAAAAAAAAAAAAAAAAAAAAAAAAAAAAAAAAAAAAAAAAAAn9/fwDu7OEDzMzMAMDA/wB/f38AAAAAAAAAAAAAAAAAAAAAAAAAAAAhAAAAGAAAABQAAABwCAAACAcAAD44AADeCQAAEAAAACYAAAAIAAAA//////////8="/>
               </a:ext>
             </a:extLst>
           </p:cNvSpPr>
@@ -5258,7 +5258,7 @@
           <p:cNvSpPr>
             <a:extLst>
               <a:ext uri="smNativeData">
-                <pr:smNativeData xmlns="" xmlns:p14="http://schemas.microsoft.com/office/powerpoint/2010/main" xmlns:pr="smNativeData" val="SMDATA_13_aDXlXhMAAAAlAAAAZAAAAA0AAAAAkAAAAEgAAACQAAAASAAAAAAAAAAAAAAAAAAAAAEAAABQAAAAAAAAAAAA4D8AAAAAAADgPwAAAAAAAOA/AAAAAAAA4D8AAAAAAADgPwAAAAAAAOA/AAAAAAAA4D8AAAAAAADgPwAAAAAAAOA/AAAAAAAA4D8CAAAAjAAAAAEAAAAAAAAAM8zMAP///wgAAAAAAAAAAAAAAAAAAAAAAAAAAAAAAAAAAAAAeAAAAAEAAABAAAAAAAAAAAAAAABaAAAAAAAAAAAAAAAAAAAAAAAAAAAAAAAAAAAAAAAAAAAAAAAAAAAAAAAAAAAAAAAAAAAAAAAAAAAAAAAAAAAAAAAAAAAAAAAAAAAAFAAAADwAAAAAAAAAAAAAAAAAAAkUAAAAAQAAABQAAAAUAAAAFAAAAAEAAAAAAAAAZAAAAGQAAAAAAAAAZAAAAGQAAAAVAAAAYAAAAAAAAAAAAAAADwAAACADAAAAAAAAAAAAAAEAAACgMgAAVgcAAKr4//8BAAAAf39/AAEAAABkAAAAAAAAABQAAABAHwAAAAAAACYAAAAAAAAAwOD//wAAAAAmAAAAZAAAABYAAABMAAAAAAAAAAAAAAAEAAAAAAAAAAEAAADu7OEKAAAAACgAAAAoAAAAZAAAAGQAAAAAAAAAzMzMAAAAAABQAAAAUAAAAGQAAABkAAAAAAAAABcAAAAUAAAAAAAAAAAAAAD/fwAA/38AAAAAAAAJAAAABAAAAAAAAAAMAAAAEAAAAAAAAAAAAAAAAAAAAAAAAAAeAAAAaAAAAAAAAAAAAAAAAAAAAAAAAAAAAAAAECcAABAnAAAAAAAAAAAAAAAAAAAAAAAAAAAAAAAAAAAAAAAAAAAAABQAAAAAAAAAwMD/AAAAAABkAAAAMgAAAAAAAABkAAAAAAAAAH9/fwAKAAAAHwAAAFQAAAAzzMwA////AQAAAAAAAAAAAAAAAAAAAAAAAAAAAAAAAAAAAAAAAAAAAAAAAn9/fwDu7OEDzMzMAMDA/wB/f38AAAAAAAAAAAAAAAAAAAAAAAAAAAAhAAAAGAAAABQAAABgCQAAugkAAD44AADyCQAAEAAAACYAAAAIAAAA//////////8="/>
+                <pr:smNativeData xmlns:pr="smNativeData" xmlns:p14="http://schemas.microsoft.com/office/powerpoint/2010/main" xmlns="" val="SMDATA_13_aDXlXhMAAAAlAAAAZAAAAA0AAAAAkAAAAEgAAACQAAAASAAAAAAAAAAAAAAAAAAAAAEAAABQAAAAAAAAAAAA4D8AAAAAAADgPwAAAAAAAOA/AAAAAAAA4D8AAAAAAADgPwAAAAAAAOA/AAAAAAAA4D8AAAAAAADgPwAAAAAAAOA/AAAAAAAA4D8CAAAAjAAAAAEAAAAAAAAAM8zMAP///wgAAAAAAAAAAAAAAAAAAAAAAAAAAAAAAAAAAAAAeAAAAAEAAABAAAAAAAAAAAAAAABaAAAAAAAAAAAAAAAAAAAAAAAAAAAAAAAAAAAAAAAAAAAAAAAAAAAAAAAAAAAAAAAAAAAAAAAAAAAAAAAAAAAAAAAAAAAAAAAAAAAAFAAAADwAAAAAAAAAAAAAAAAAAAkUAAAAAQAAABQAAAAUAAAAFAAAAAEAAAAAAAAAZAAAAGQAAAAAAAAAZAAAAGQAAAAVAAAAYAAAAAAAAAAAAAAADwAAACADAAAAAAAAAAAAAAEAAACgMgAAVgcAAKr4//8BAAAAf39/AAEAAABkAAAAAAAAABQAAABAHwAAAAAAACYAAAAAAAAAwOD//wAAAAAmAAAAZAAAABYAAABMAAAAAAAAAAAAAAAEAAAAAAAAAAEAAADu7OEKAAAAACgAAAAoAAAAZAAAAGQAAAAAAAAAzMzMAAAAAABQAAAAUAAAAGQAAABkAAAAAAAAABcAAAAUAAAAAAAAAAAAAAD/fwAA/38AAAAAAAAJAAAABAAAAAAAAAAMAAAAEAAAAAAAAAAAAAAAAAAAAAAAAAAeAAAAaAAAAAAAAAAAAAAAAAAAAAAAAAAAAAAAECcAABAnAAAAAAAAAAAAAAAAAAAAAAAAAAAAAAAAAAAAAAAAAAAAABQAAAAAAAAAwMD/AAAAAABkAAAAMgAAAAAAAABkAAAAAAAAAH9/fwAKAAAAHwAAAFQAAAAzzMwA////AQAAAAAAAAAAAAAAAAAAAAAAAAAAAAAAAAAAAAAAAAAAAAAAAn9/fwDu7OEDzMzMAMDA/wB/f38AAAAAAAAAAAAAAAAAAAAAAAAAAAAhAAAAGAAAABQAAABgCQAAugkAAD44AADyCQAAEAAAACYAAAAIAAAA//////////8="/>
               </a:ext>
             </a:extLst>
           </p:cNvSpPr>
@@ -5287,7 +5287,7 @@
           <p:cNvSpPr>
             <a:extLst>
               <a:ext uri="smNativeData">
-                <pr:smNativeData xmlns="" xmlns:p14="http://schemas.microsoft.com/office/powerpoint/2010/main" xmlns:pr="smNativeData" val="SMDATA_13_aDXlXhMAAAAlAAAAZAAAAA0AAAAAjgAAAEcAAACOAAAARwAAAAAAAAAAAAAAAAAAAAEAAABQAAAAAAAAAAAA4D8AAAAAAADgPwAAAAAAAOA/AAAAAAAA4D8AAAAAAADgPwAAAAAAAOA/AAAAAAAA4D8AAAAAAADgPwAAAAAAAOA/AAAAAAAA4D8CAAAAjAAAAAAAAAAAAAAAT4G9DP///wgAAAAAAAAAAAAAAAAAAAAAAAAAAAAAAAAAAAAAZAAAAAEAAABAAAAAAAAAAAAAAAAAAAAAAAAAAAAAAAAAAAAAAAAAAAAAAAAAAAAAAAAAAAAAAAAAAAAAAAAAAAAAAAAAAAAAAAAAAAAAAAAAAAAAAAAAAAAAAAAAAAAAFAAAADwAAAAAAAAAAAAAAAAAAAkUAAAAAQAAABQAAAAUAAAAFAAAAAEAAAAAAAAAZAAAAGQAAAAAAAAAZAAAAGQAAAAVAAAAYAAAAAAAAAAAAAAADwAAACADAAAAAAAAAAAAAAEAAACgMgAAVgcAAKr4//8BAAAAf39/AAEAAABkAAAAAAAAABQAAABAHwAAAAAAACYAAAAAAAAAwOD//wAAAAAmAAAAZAAAABYAAABMAAAAAAAAAAAAAAAEAAAAAAAAAAEAAADu7OEKAAAAACgAAAAoAAAAZAAAAGQAAAAAAAAAzMzMAAAAAABQAAAAUAAAAGQAAABkAAAAAAAAABcAAAAUAAAAAAAAAAAAAAD/fwAA/38AAAAAAAAJAAAABAAAAAAAAAAMAAAAEAAAAAAAAAAAAAAAAAAAAAAAAAAeAAAAaAAAAAAAAAAAAAAAAAAAAAAAAAAAAAAAECcAABAnAAAAAAAAAAAAAAAAAAAAAAAAAAAAAAAAAAAAAAAAAAAAABQAAAAAAAAAwMD/AAAAAABkAAAAMgAAAAAAAABkAAAAAAAAAH9/fwAKAAAAHwAAAFQAAABPgb0F////AQAAAAAAAAAAAAAAAAAAAAAAAAAAAAAAAAAAAAAAAAAAAAAAAn9/fwDu7OEDzMzMAMDA/wB/f38AAAAAAAAAAAAAAAAAAAAAAAAAAAAhAAAAGAAAABQAAABwCAAACAcAAD44AADeCQAAEAAAACYAAAAIAAAA//////////8="/>
+                <pr:smNativeData xmlns:pr="smNativeData" xmlns:p14="http://schemas.microsoft.com/office/powerpoint/2010/main" xmlns="" val="SMDATA_13_aDXlXhMAAAAlAAAAZAAAAA0AAAAAjgAAAEcAAACOAAAARwAAAAAAAAAAAAAAAAAAAAEAAABQAAAAAAAAAAAA4D8AAAAAAADgPwAAAAAAAOA/AAAAAAAA4D8AAAAAAADgPwAAAAAAAOA/AAAAAAAA4D8AAAAAAADgPwAAAAAAAOA/AAAAAAAA4D8CAAAAjAAAAAAAAAAAAAAAT4G9DP///wgAAAAAAAAAAAAAAAAAAAAAAAAAAAAAAAAAAAAAZAAAAAEAAABAAAAAAAAAAAAAAAAAAAAAAAAAAAAAAAAAAAAAAAAAAAAAAAAAAAAAAAAAAAAAAAAAAAAAAAAAAAAAAAAAAAAAAAAAAAAAAAAAAAAAAAAAAAAAAAAAAAAAFAAAADwAAAAAAAAAAAAAAAAAAAkUAAAAAQAAABQAAAAUAAAAFAAAAAEAAAAAAAAAZAAAAGQAAAAAAAAAZAAAAGQAAAAVAAAAYAAAAAAAAAAAAAAADwAAACADAAAAAAAAAAAAAAEAAACgMgAAVgcAAKr4//8BAAAAf39/AAEAAABkAAAAAAAAABQAAABAHwAAAAAAACYAAAAAAAAAwOD//wAAAAAmAAAAZAAAABYAAABMAAAAAAAAAAAAAAAEAAAAAAAAAAEAAADu7OEKAAAAACgAAAAoAAAAZAAAAGQAAAAAAAAAzMzMAAAAAABQAAAAUAAAAGQAAABkAAAAAAAAABcAAAAUAAAAAAAAAAAAAAD/fwAA/38AAAAAAAAJAAAABAAAAAAAAAAMAAAAEAAAAAAAAAAAAAAAAAAAAAAAAAAeAAAAaAAAAAAAAAAAAAAAAAAAAAAAAAAAAAAAECcAABAnAAAAAAAAAAAAAAAAAAAAAAAAAAAAAAAAAAAAAAAAAAAAABQAAAAAAAAAwMD/AAAAAABkAAAAMgAAAAAAAABkAAAAAAAAAH9/fwAKAAAAHwAAAFQAAABPgb0F////AQAAAAAAAAAAAAAAAAAAAAAAAAAAAAAAAAAAAAAAAAAAAAAAAn9/fwDu7OEDzMzMAMDA/wB/f38AAAAAAAAAAAAAAAAAAAAAAAAAAAAhAAAAGAAAABQAAABwCAAACAcAAD44AADeCQAAEAAAACYAAAAIAAAA//////////8="/>
               </a:ext>
             </a:extLst>
           </p:cNvSpPr>
@@ -5388,7 +5388,7 @@
           <p:cNvSpPr>
             <a:extLst>
               <a:ext uri="smNativeData">
-                <pr:smNativeData xmlns="" xmlns:p14="http://schemas.microsoft.com/office/powerpoint/2010/main" xmlns:pr="smNativeData" val="SMDATA_13_aDXlXhMAAAAlAAAAZAAAAA0AAAAAkAAAAEgAAACQAAAASAAAAAAAAAAAAAAAAAAAAAEAAABQAAAAAAAAAAAA4D8AAAAAAADgPwAAAAAAAOA/AAAAAAAA4D8AAAAAAADgPwAAAAAAAOA/AAAAAAAA4D8AAAAAAADgPwAAAAAAAOA/AAAAAAAA4D8CAAAAjAAAAAEAAAAAAAAAM8zMAP///wgAAAAAAAAAAAAAAAAAAAAAAAAAAAAAAAAAAAAAeAAAAAEAAABAAAAAAAAAAAAAAABaAAAAAAAAAAAAAAAAAAAAAAAAAAAAAAAAAAAAAAAAAAAAAAAAAAAAAAAAAAAAAAAAAAAAAAAAAAAAAAAAAAAAAAAAAAAAAAAAAAAAFAAAADwAAAAAAAAAAAAAAAAAAAkUAAAAAQAAABQAAAAUAAAAFAAAAAEAAAAAAAAAZAAAAGQAAAAAAAAAZAAAAGQAAAAVAAAAYAAAAAAAAAAAAAAADwAAACADAAAAAAAAAAAAAAEAAACgMgAAVgcAAKr4//8BAAAAf39/AAEAAABkAAAAAAAAABQAAABAHwAAAAAAACYAAAAAAAAAwOD//wAAAAAmAAAAZAAAABYAAABMAAAAAAAAAAAAAAAEAAAAAAAAAAEAAADu7OEKAAAAACgAAAAoAAAAZAAAAGQAAAAAAAAAzMzMAAAAAABQAAAAUAAAAGQAAABkAAAAAAAAABcAAAAUAAAAAAAAAAAAAAD/fwAA/38AAAAAAAAJAAAABAAAAAAAAAAMAAAAEAAAAAAAAAAAAAAAAAAAAAAAAAAeAAAAaAAAAAAAAAAAAAAAAAAAAAAAAAAAAAAAECcAABAnAAAAAAAAAAAAAAAAAAAAAAAAAAAAAAAAAAAAAAAAAAAAABQAAAAAAAAAwMD/AAAAAABkAAAAMgAAAAAAAABkAAAAAAAAAH9/fwAKAAAAHwAAAFQAAAAzzMwA////AQAAAAAAAAAAAAAAAAAAAAAAAAAAAAAAAAAAAAAAAAAAAAAAAn9/fwDu7OEDzMzMAMDA/wB/f38AAAAAAAAAAAAAAAAAAAAAAAAAAAAhAAAAGAAAABQAAABgCQAAugkAAD44AADyCQAAEAAAACYAAAAIAAAA//////////8="/>
+                <pr:smNativeData xmlns:pr="smNativeData" xmlns:p14="http://schemas.microsoft.com/office/powerpoint/2010/main" xmlns="" val="SMDATA_13_aDXlXhMAAAAlAAAAZAAAAA0AAAAAkAAAAEgAAACQAAAASAAAAAAAAAAAAAAAAAAAAAEAAABQAAAAAAAAAAAA4D8AAAAAAADgPwAAAAAAAOA/AAAAAAAA4D8AAAAAAADgPwAAAAAAAOA/AAAAAAAA4D8AAAAAAADgPwAAAAAAAOA/AAAAAAAA4D8CAAAAjAAAAAEAAAAAAAAAM8zMAP///wgAAAAAAAAAAAAAAAAAAAAAAAAAAAAAAAAAAAAAeAAAAAEAAABAAAAAAAAAAAAAAABaAAAAAAAAAAAAAAAAAAAAAAAAAAAAAAAAAAAAAAAAAAAAAAAAAAAAAAAAAAAAAAAAAAAAAAAAAAAAAAAAAAAAAAAAAAAAAAAAAAAAFAAAADwAAAAAAAAAAAAAAAAAAAkUAAAAAQAAABQAAAAUAAAAFAAAAAEAAAAAAAAAZAAAAGQAAAAAAAAAZAAAAGQAAAAVAAAAYAAAAAAAAAAAAAAADwAAACADAAAAAAAAAAAAAAEAAACgMgAAVgcAAKr4//8BAAAAf39/AAEAAABkAAAAAAAAABQAAABAHwAAAAAAACYAAAAAAAAAwOD//wAAAAAmAAAAZAAAABYAAABMAAAAAAAAAAAAAAAEAAAAAAAAAAEAAADu7OEKAAAAACgAAAAoAAAAZAAAAGQAAAAAAAAAzMzMAAAAAABQAAAAUAAAAGQAAABkAAAAAAAAABcAAAAUAAAAAAAAAAAAAAD/fwAA/38AAAAAAAAJAAAABAAAAAAAAAAMAAAAEAAAAAAAAAAAAAAAAAAAAAAAAAAeAAAAaAAAAAAAAAAAAAAAAAAAAAAAAAAAAAAAECcAABAnAAAAAAAAAAAAAAAAAAAAAAAAAAAAAAAAAAAAAAAAAAAAABQAAAAAAAAAwMD/AAAAAABkAAAAMgAAAAAAAABkAAAAAAAAAH9/fwAKAAAAHwAAAFQAAAAzzMwA////AQAAAAAAAAAAAAAAAAAAAAAAAAAAAAAAAAAAAAAAAAAAAAAAAn9/fwDu7OEDzMzMAMDA/wB/f38AAAAAAAAAAAAAAAAAAAAAAAAAAAAhAAAAGAAAABQAAABgCQAAugkAAD44AADyCQAAEAAAACYAAAAIAAAA//////////8="/>
               </a:ext>
             </a:extLst>
           </p:cNvSpPr>
@@ -5417,7 +5417,7 @@
           <p:cNvSpPr>
             <a:extLst>
               <a:ext uri="smNativeData">
-                <pr:smNativeData xmlns="" xmlns:p14="http://schemas.microsoft.com/office/powerpoint/2010/main" xmlns:pr="smNativeData" val="SMDATA_13_aDXlXhMAAAAlAAAAZAAAAA0AAAAAjgAAAEcAAACOAAAARwAAAAAAAAAAAAAAAAAAAAEAAABQAAAAAAAAAAAA4D8AAAAAAADgPwAAAAAAAOA/AAAAAAAA4D8AAAAAAADgPwAAAAAAAOA/AAAAAAAA4D8AAAAAAADgPwAAAAAAAOA/AAAAAAAA4D8CAAAAjAAAAAAAAAAAAAAAT4G9DP///wgAAAAAAAAAAAAAAAAAAAAAAAAAAAAAAAAAAAAAZAAAAAEAAABAAAAAAAAAAAAAAAAAAAAAAAAAAAAAAAAAAAAAAAAAAAAAAAAAAAAAAAAAAAAAAAAAAAAAAAAAAAAAAAAAAAAAAAAAAAAAAAAAAAAAAAAAAAAAAAAAAAAAFAAAADwAAAAAAAAAAAAAAAAAAAkUAAAAAQAAABQAAAAUAAAAFAAAAAEAAAAAAAAAZAAAAGQAAAAAAAAAZAAAAGQAAAAVAAAAYAAAAAAAAAAAAAAADwAAACADAAAAAAAAAAAAAAEAAACgMgAAVgcAAKr4//8BAAAAf39/AAEAAABkAAAAAAAAABQAAABAHwAAAAAAACYAAAAAAAAAwOD//wAAAAAmAAAAZAAAABYAAABMAAAAAAAAAAAAAAAEAAAAAAAAAAEAAADu7OEKAAAAACgAAAAoAAAAZAAAAGQAAAAAAAAAzMzMAAAAAABQAAAAUAAAAGQAAABkAAAAAAAAABcAAAAUAAAAAAAAAAAAAAD/fwAA/38AAAAAAAAJAAAABAAAADYDAAAMAAAAEAAAAAAAAAAAAAAAAAAAAAAAAAAeAAAAaAAAAAAAAAAAAAAAAAAAAAAAAAAAAAAAECcAABAnAAAAAAAAAAAAAAAAAAAAAAAAAAAAAAAAAAAAAAAAAAAAABQAAAAAAAAAwMD/AAAAAABkAAAAMgAAAAAAAABkAAAAAAAAAH9/fwAKAAAAHwAAAFQAAABPgb0F////AQAAAAAAAAAAAAAAAAAAAAAAAAAAAAAAAAAAAAAAAAAAAAAAAn9/fwDu7OEDzMzMAMDA/wB/f38AAAAAAAAAAAAAAAAAAAAAAAAAAAAhAAAAGAAAABQAAABwCAAACAcAAD44AADeCQAAEAAAACYAAAAIAAAA//////////8="/>
+                <pr:smNativeData xmlns:pr="smNativeData" xmlns:p14="http://schemas.microsoft.com/office/powerpoint/2010/main" xmlns="" val="SMDATA_13_aDXlXhMAAAAlAAAAZAAAAA0AAAAAjgAAAEcAAACOAAAARwAAAAAAAAAAAAAAAAAAAAEAAABQAAAAAAAAAAAA4D8AAAAAAADgPwAAAAAAAOA/AAAAAAAA4D8AAAAAAADgPwAAAAAAAOA/AAAAAAAA4D8AAAAAAADgPwAAAAAAAOA/AAAAAAAA4D8CAAAAjAAAAAAAAAAAAAAAT4G9DP///wgAAAAAAAAAAAAAAAAAAAAAAAAAAAAAAAAAAAAAZAAAAAEAAABAAAAAAAAAAAAAAAAAAAAAAAAAAAAAAAAAAAAAAAAAAAAAAAAAAAAAAAAAAAAAAAAAAAAAAAAAAAAAAAAAAAAAAAAAAAAAAAAAAAAAAAAAAAAAAAAAAAAAFAAAADwAAAAAAAAAAAAAAAAAAAkUAAAAAQAAABQAAAAUAAAAFAAAAAEAAAAAAAAAZAAAAGQAAAAAAAAAZAAAAGQAAAAVAAAAYAAAAAAAAAAAAAAADwAAACADAAAAAAAAAAAAAAEAAACgMgAAVgcAAKr4//8BAAAAf39/AAEAAABkAAAAAAAAABQAAABAHwAAAAAAACYAAAAAAAAAwOD//wAAAAAmAAAAZAAAABYAAABMAAAAAAAAAAAAAAAEAAAAAAAAAAEAAADu7OEKAAAAACgAAAAoAAAAZAAAAGQAAAAAAAAAzMzMAAAAAABQAAAAUAAAAGQAAABkAAAAAAAAABcAAAAUAAAAAAAAAAAAAAD/fwAA/38AAAAAAAAJAAAABAAAADYDAAAMAAAAEAAAAAAAAAAAAAAAAAAAAAAAAAAeAAAAaAAAAAAAAAAAAAAAAAAAAAAAAAAAAAAAECcAABAnAAAAAAAAAAAAAAAAAAAAAAAAAAAAAAAAAAAAAAAAAAAAABQAAAAAAAAAwMD/AAAAAABkAAAAMgAAAAAAAABkAAAAAAAAAH9/fwAKAAAAHwAAAFQAAABPgb0F////AQAAAAAAAAAAAAAAAAAAAAAAAAAAAAAAAAAAAAAAAAAAAAAAAn9/fwDu7OEDzMzMAMDA/wB/f38AAAAAAAAAAAAAAAAAAAAAAAAAAAAhAAAAGAAAABQAAABwCAAACAcAAD44AADeCQAAEAAAACYAAAAIAAAA//////////8="/>
               </a:ext>
             </a:extLst>
           </p:cNvSpPr>
@@ -5548,7 +5548,7 @@
           <p:cNvSpPr>
             <a:extLst>
               <a:ext uri="smNativeData">
-                <pr:smNativeData xmlns="" xmlns:p14="http://schemas.microsoft.com/office/powerpoint/2010/main" xmlns:pr="smNativeData" val="SMDATA_13_aDXlXhMAAAAlAAAAZAAAAA0AAAAAkAAAAEgAAACQAAAASAAAAAAAAAAAAAAAAAAAAAEAAABQAAAAAAAAAAAA4D8AAAAAAADgPwAAAAAAAOA/AAAAAAAA4D8AAAAAAADgPwAAAAAAAOA/AAAAAAAA4D8AAAAAAADgPwAAAAAAAOA/AAAAAAAA4D8CAAAAjAAAAAEAAAAAAAAAM8zMAP///wgAAAAAAAAAAAAAAAAAAAAAAAAAAAAAAAAAAAAAeAAAAAEAAABAAAAAAAAAAAAAAABaAAAAAAAAAAAAAAAAAAAAAAAAAAAAAAAAAAAAAAAAAAAAAAAAAAAAAAAAAAAAAAAAAAAAAAAAAAAAAAAAAAAAAAAAAAAAAAAAAAAAFAAAADwAAAAAAAAAAAAAAAAAAAkUAAAAAQAAABQAAAAUAAAAFAAAAAEAAAAAAAAAZAAAAGQAAAAAAAAAZAAAAGQAAAAVAAAAYAAAAAAAAAAAAAAADwAAACADAAAAAAAAAAAAAAEAAACgMgAAVgcAAKr4//8BAAAAf39/AAEAAABkAAAAAAAAABQAAABAHwAAAAAAACYAAAAAAAAAwOD//wAAAAAmAAAAZAAAABYAAABMAAAAAAAAAAAAAAAEAAAAAAAAAAEAAADu7OEKAAAAACgAAAAoAAAAZAAAAGQAAAAAAAAAzMzMAAAAAABQAAAAUAAAAGQAAABkAAAAAAAAABcAAAAUAAAAAAAAAAAAAAD/fwAA/38AAAAAAAAJAAAABAAAAAAAAAAMAAAAEAAAAAAAAAAAAAAAAAAAAAAAAAAeAAAAaAAAAAAAAAAAAAAAAAAAAAAAAAAAAAAAECcAABAnAAAAAAAAAAAAAAAAAAAAAAAAAAAAAAAAAAAAAAAAAAAAABQAAAAAAAAAwMD/AAAAAABkAAAAMgAAAAAAAABkAAAAAAAAAH9/fwAKAAAAHwAAAFQAAAAzzMwA////AQAAAAAAAAAAAAAAAAAAAAAAAAAAAAAAAAAAAAAAAAAAAAAAAn9/fwDu7OEDzMzMAMDA/wB/f38AAAAAAAAAAAAAAAAAAAAAAAAAAAAhAAAAGAAAABQAAABgCQAAugkAAD44AADyCQAAEAAAACYAAAAIAAAA//////////8="/>
+                <pr:smNativeData xmlns:pr="smNativeData" xmlns:p14="http://schemas.microsoft.com/office/powerpoint/2010/main" xmlns="" val="SMDATA_13_aDXlXhMAAAAlAAAAZAAAAA0AAAAAkAAAAEgAAACQAAAASAAAAAAAAAAAAAAAAAAAAAEAAABQAAAAAAAAAAAA4D8AAAAAAADgPwAAAAAAAOA/AAAAAAAA4D8AAAAAAADgPwAAAAAAAOA/AAAAAAAA4D8AAAAAAADgPwAAAAAAAOA/AAAAAAAA4D8CAAAAjAAAAAEAAAAAAAAAM8zMAP///wgAAAAAAAAAAAAAAAAAAAAAAAAAAAAAAAAAAAAAeAAAAAEAAABAAAAAAAAAAAAAAABaAAAAAAAAAAAAAAAAAAAAAAAAAAAAAAAAAAAAAAAAAAAAAAAAAAAAAAAAAAAAAAAAAAAAAAAAAAAAAAAAAAAAAAAAAAAAAAAAAAAAFAAAADwAAAAAAAAAAAAAAAAAAAkUAAAAAQAAABQAAAAUAAAAFAAAAAEAAAAAAAAAZAAAAGQAAAAAAAAAZAAAAGQAAAAVAAAAYAAAAAAAAAAAAAAADwAAACADAAAAAAAAAAAAAAEAAACgMgAAVgcAAKr4//8BAAAAf39/AAEAAABkAAAAAAAAABQAAABAHwAAAAAAACYAAAAAAAAAwOD//wAAAAAmAAAAZAAAABYAAABMAAAAAAAAAAAAAAAEAAAAAAAAAAEAAADu7OEKAAAAACgAAAAoAAAAZAAAAGQAAAAAAAAAzMzMAAAAAABQAAAAUAAAAGQAAABkAAAAAAAAABcAAAAUAAAAAAAAAAAAAAD/fwAA/38AAAAAAAAJAAAABAAAAAAAAAAMAAAAEAAAAAAAAAAAAAAAAAAAAAAAAAAeAAAAaAAAAAAAAAAAAAAAAAAAAAAAAAAAAAAAECcAABAnAAAAAAAAAAAAAAAAAAAAAAAAAAAAAAAAAAAAAAAAAAAAABQAAAAAAAAAwMD/AAAAAABkAAAAMgAAAAAAAABkAAAAAAAAAH9/fwAKAAAAHwAAAFQAAAAzzMwA////AQAAAAAAAAAAAAAAAAAAAAAAAAAAAAAAAAAAAAAAAAAAAAAAAn9/fwDu7OEDzMzMAMDA/wB/f38AAAAAAAAAAAAAAAAAAAAAAAAAAAAhAAAAGAAAABQAAABgCQAAugkAAD44AADyCQAAEAAAACYAAAAIAAAA//////////8="/>
               </a:ext>
             </a:extLst>
           </p:cNvSpPr>
@@ -5577,7 +5577,7 @@
           <p:cNvSpPr>
             <a:extLst>
               <a:ext uri="smNativeData">
-                <pr:smNativeData xmlns="" xmlns:p14="http://schemas.microsoft.com/office/powerpoint/2010/main" xmlns:pr="smNativeData" val="SMDATA_13_aDXlXhMAAAAlAAAAZAAAAA0AAAAAjgAAAEcAAACOAAAARwAAAAAAAAAAAAAAAAAAAAEAAABQAAAAAAAAAAAA4D8AAAAAAADgPwAAAAAAAOA/AAAAAAAA4D8AAAAAAADgPwAAAAAAAOA/AAAAAAAA4D8AAAAAAADgPwAAAAAAAOA/AAAAAAAA4D8CAAAAjAAAAAAAAAAAAAAAT4G9DP///wgAAAAAAAAAAAAAAAAAAAAAAAAAAAAAAAAAAAAAZAAAAAEAAABAAAAAAAAAAAAAAAAAAAAAAAAAAAAAAAAAAAAAAAAAAAAAAAAAAAAAAAAAAAAAAAAAAAAAAAAAAAAAAAAAAAAAAAAAAAAAAAAAAAAAAAAAAAAAAAAAAAAAFAAAADwAAAAAAAAAAAAAAAAAAAkUAAAAAQAAABQAAAAUAAAAFAAAAAEAAAAAAAAAZAAAAGQAAAAAAAAAZAAAAGQAAAAVAAAAYAAAAAAAAAAAAAAADwAAACADAAAAAAAAAAAAAAEAAACgMgAAVgcAAKr4//8BAAAAf39/AAEAAABkAAAAAAAAABQAAABAHwAAAAAAACYAAAAAAAAAwOD//wAAAAAmAAAAZAAAABYAAABMAAAAAAAAAAAAAAAEAAAAAAAAAAEAAADu7OEKAAAAACgAAAAoAAAAZAAAAGQAAAAAAAAAzMzMAAAAAABQAAAAUAAAAGQAAABkAAAAAAAAABcAAAAUAAAAAAAAAAAAAAD/fwAA/38AAAAAAAAJAAAABAAAADYDAAAMAAAAEAAAAAAAAAAAAAAAAAAAAAAAAAAeAAAAaAAAAAAAAAAAAAAAAAAAAAAAAAAAAAAAECcAABAnAAAAAAAAAAAAAAAAAAAAAAAAAAAAAAAAAAAAAAAAAAAAABQAAAAAAAAAwMD/AAAAAABkAAAAMgAAAAAAAABkAAAAAAAAAH9/fwAKAAAAHwAAAFQAAABPgb0F////AQAAAAAAAAAAAAAAAAAAAAAAAAAAAAAAAAAAAAAAAAAAAAAAAn9/fwDu7OEDzMzMAMDA/wB/f38AAAAAAAAAAAAAAAAAAAAAAAAAAAAhAAAAGAAAABQAAABwCAAACAcAAD44AADeCQAAEAAAACYAAAAIAAAA//////////8="/>
+                <pr:smNativeData xmlns:pr="smNativeData" xmlns:p14="http://schemas.microsoft.com/office/powerpoint/2010/main" xmlns="" val="SMDATA_13_aDXlXhMAAAAlAAAAZAAAAA0AAAAAjgAAAEcAAACOAAAARwAAAAAAAAAAAAAAAAAAAAEAAABQAAAAAAAAAAAA4D8AAAAAAADgPwAAAAAAAOA/AAAAAAAA4D8AAAAAAADgPwAAAAAAAOA/AAAAAAAA4D8AAAAAAADgPwAAAAAAAOA/AAAAAAAA4D8CAAAAjAAAAAAAAAAAAAAAT4G9DP///wgAAAAAAAAAAAAAAAAAAAAAAAAAAAAAAAAAAAAAZAAAAAEAAABAAAAAAAAAAAAAAAAAAAAAAAAAAAAAAAAAAAAAAAAAAAAAAAAAAAAAAAAAAAAAAAAAAAAAAAAAAAAAAAAAAAAAAAAAAAAAAAAAAAAAAAAAAAAAAAAAAAAAFAAAADwAAAAAAAAAAAAAAAAAAAkUAAAAAQAAABQAAAAUAAAAFAAAAAEAAAAAAAAAZAAAAGQAAAAAAAAAZAAAAGQAAAAVAAAAYAAAAAAAAAAAAAAADwAAACADAAAAAAAAAAAAAAEAAACgMgAAVgcAAKr4//8BAAAAf39/AAEAAABkAAAAAAAAABQAAABAHwAAAAAAACYAAAAAAAAAwOD//wAAAAAmAAAAZAAAABYAAABMAAAAAAAAAAAAAAAEAAAAAAAAAAEAAADu7OEKAAAAACgAAAAoAAAAZAAAAGQAAAAAAAAAzMzMAAAAAABQAAAAUAAAAGQAAABkAAAAAAAAABcAAAAUAAAAAAAAAAAAAAD/fwAA/38AAAAAAAAJAAAABAAAADYDAAAMAAAAEAAAAAAAAAAAAAAAAAAAAAAAAAAeAAAAaAAAAAAAAAAAAAAAAAAAAAAAAAAAAAAAECcAABAnAAAAAAAAAAAAAAAAAAAAAAAAAAAAAAAAAAAAAAAAAAAAABQAAAAAAAAAwMD/AAAAAABkAAAAMgAAAAAAAABkAAAAAAAAAH9/fwAKAAAAHwAAAFQAAABPgb0F////AQAAAAAAAAAAAAAAAAAAAAAAAAAAAAAAAAAAAAAAAAAAAAAAAn9/fwDu7OEDzMzMAMDA/wB/f38AAAAAAAAAAAAAAAAAAAAAAAAAAAAhAAAAGAAAABQAAABwCAAACAcAAD44AADeCQAAEAAAACYAAAAIAAAA//////////8="/>
               </a:ext>
             </a:extLst>
           </p:cNvSpPr>
@@ -5822,7 +5822,7 @@
           <p:cNvSpPr>
             <a:extLst>
               <a:ext uri="smNativeData">
-                <pr:smNativeData xmlns="" xmlns:p14="http://schemas.microsoft.com/office/powerpoint/2010/main" xmlns:pr="smNativeData" val="SMDATA_13_aDXlXhMAAAAlAAAAZAAAAA0AAAAAkAAAAEgAAACQAAAASAAAAAAAAAAAAAAAAAAAAAEAAABQAAAAAAAAAAAA4D8AAAAAAADgPwAAAAAAAOA/AAAAAAAA4D8AAAAAAADgPwAAAAAAAOA/AAAAAAAA4D8AAAAAAADgPwAAAAAAAOA/AAAAAAAA4D8CAAAAjAAAAAEAAAAAAAAAM8zMAP///wgAAAAAAAAAAAAAAAAAAAAAAAAAAAAAAAAAAAAAeAAAAAEAAABAAAAAAAAAAAAAAABaAAAAAAAAAAAAAAAAAAAAAAAAAAAAAAAAAAAAAAAAAAAAAAAAAAAAAAAAAAAAAAAAAAAAAAAAAAAAAAAAAAAAAAAAAAAAAAAAAAAAFAAAADwAAAAAAAAAAAAAAAAAAAkUAAAAAQAAABQAAAAUAAAAFAAAAAEAAAAAAAAAZAAAAGQAAAAAAAAAZAAAAGQAAAAVAAAAYAAAAAAAAAAAAAAADwAAACADAAAAAAAAAAAAAAEAAACgMgAAVgcAAKr4//8BAAAAf39/AAEAAABkAAAAAAAAABQAAABAHwAAAAAAACYAAAAAAAAAwOD//wAAAAAmAAAAZAAAABYAAABMAAAAAAAAAAAAAAAEAAAAAAAAAAEAAADu7OEKAAAAACgAAAAoAAAAZAAAAGQAAAAAAAAAzMzMAAAAAABQAAAAUAAAAGQAAABkAAAAAAAAABcAAAAUAAAAAAAAAAAAAAD/fwAA/38AAAAAAAAJAAAABAAAAAAAAAAMAAAAEAAAAAAAAAAAAAAAAAAAAAAAAAAeAAAAaAAAAAAAAAAAAAAAAAAAAAAAAAAAAAAAECcAABAnAAAAAAAAAAAAAAAAAAAAAAAAAAAAAAAAAAAAAAAAAAAAABQAAAAAAAAAwMD/AAAAAABkAAAAMgAAAAAAAABkAAAAAAAAAH9/fwAKAAAAHwAAAFQAAAAzzMwA////AQAAAAAAAAAAAAAAAAAAAAAAAAAAAAAAAAAAAAAAAAAAAAAAAn9/fwDu7OEDzMzMAMDA/wB/f38AAAAAAAAAAAAAAAAAAAAAAAAAAAAhAAAAGAAAABQAAABgCQAAugkAAD44AADyCQAAEAAAACYAAAAIAAAA//////////8="/>
+                <pr:smNativeData xmlns:pr="smNativeData" xmlns:p14="http://schemas.microsoft.com/office/powerpoint/2010/main" xmlns="" val="SMDATA_13_aDXlXhMAAAAlAAAAZAAAAA0AAAAAkAAAAEgAAACQAAAASAAAAAAAAAAAAAAAAAAAAAEAAABQAAAAAAAAAAAA4D8AAAAAAADgPwAAAAAAAOA/AAAAAAAA4D8AAAAAAADgPwAAAAAAAOA/AAAAAAAA4D8AAAAAAADgPwAAAAAAAOA/AAAAAAAA4D8CAAAAjAAAAAEAAAAAAAAAM8zMAP///wgAAAAAAAAAAAAAAAAAAAAAAAAAAAAAAAAAAAAAeAAAAAEAAABAAAAAAAAAAAAAAABaAAAAAAAAAAAAAAAAAAAAAAAAAAAAAAAAAAAAAAAAAAAAAAAAAAAAAAAAAAAAAAAAAAAAAAAAAAAAAAAAAAAAAAAAAAAAAAAAAAAAFAAAADwAAAAAAAAAAAAAAAAAAAkUAAAAAQAAABQAAAAUAAAAFAAAAAEAAAAAAAAAZAAAAGQAAAAAAAAAZAAAAGQAAAAVAAAAYAAAAAAAAAAAAAAADwAAACADAAAAAAAAAAAAAAEAAACgMgAAVgcAAKr4//8BAAAAf39/AAEAAABkAAAAAAAAABQAAABAHwAAAAAAACYAAAAAAAAAwOD//wAAAAAmAAAAZAAAABYAAABMAAAAAAAAAAAAAAAEAAAAAAAAAAEAAADu7OEKAAAAACgAAAAoAAAAZAAAAGQAAAAAAAAAzMzMAAAAAABQAAAAUAAAAGQAAABkAAAAAAAAABcAAAAUAAAAAAAAAAAAAAD/fwAA/38AAAAAAAAJAAAABAAAAAAAAAAMAAAAEAAAAAAAAAAAAAAAAAAAAAAAAAAeAAAAaAAAAAAAAAAAAAAAAAAAAAAAAAAAAAAAECcAABAnAAAAAAAAAAAAAAAAAAAAAAAAAAAAAAAAAAAAAAAAAAAAABQAAAAAAAAAwMD/AAAAAABkAAAAMgAAAAAAAABkAAAAAAAAAH9/fwAKAAAAHwAAAFQAAAAzzMwA////AQAAAAAAAAAAAAAAAAAAAAAAAAAAAAAAAAAAAAAAAAAAAAAAAn9/fwDu7OEDzMzMAMDA/wB/f38AAAAAAAAAAAAAAAAAAAAAAAAAAAAhAAAAGAAAABQAAABgCQAAugkAAD44AADyCQAAEAAAACYAAAAIAAAA//////////8="/>
               </a:ext>
             </a:extLst>
           </p:cNvSpPr>
@@ -5851,7 +5851,7 @@
           <p:cNvSpPr>
             <a:extLst>
               <a:ext uri="smNativeData">
-                <pr:smNativeData xmlns="" xmlns:p14="http://schemas.microsoft.com/office/powerpoint/2010/main" xmlns:pr="smNativeData" val="SMDATA_13_aDXlXhMAAAAlAAAAZAAAAA0AAAAAjgAAAEcAAACOAAAARwAAAAAAAAAAAAAAAAAAAAEAAABQAAAAAAAAAAAA4D8AAAAAAADgPwAAAAAAAOA/AAAAAAAA4D8AAAAAAADgPwAAAAAAAOA/AAAAAAAA4D8AAAAAAADgPwAAAAAAAOA/AAAAAAAA4D8CAAAAjAAAAAAAAAAAAAAAT4G9DP///wgAAAAAAAAAAAAAAAAAAAAAAAAAAAAAAAAAAAAAZAAAAAEAAABAAAAAAAAAAAAAAAAAAAAAAAAAAAAAAAAAAAAAAAAAAAAAAAAAAAAAAAAAAAAAAAAAAAAAAAAAAAAAAAAAAAAAAAAAAAAAAAAAAAAAAAAAAAAAAAAAAAAAFAAAADwAAAAAAAAAAAAAAAAAAAkUAAAAAQAAABQAAAAUAAAAFAAAAAEAAAAAAAAAZAAAAGQAAAAAAAAAZAAAAGQAAAAVAAAAYAAAAAAAAAAAAAAADwAAACADAAAAAAAAAAAAAAEAAACgMgAAVgcAAKr4//8BAAAAf39/AAEAAABkAAAAAAAAABQAAABAHwAAAAAAACYAAAAAAAAAwOD//wAAAAAmAAAAZAAAABYAAABMAAAAAAAAAAAAAAAEAAAAAAAAAAEAAADu7OEKAAAAACgAAAAoAAAAZAAAAGQAAAAAAAAAzMzMAAAAAABQAAAAUAAAAGQAAABkAAAAAAAAABcAAAAUAAAAAAAAAAAAAAD/fwAA/38AAAAAAAAJAAAABAAAADYDAAAMAAAAEAAAAAAAAAAAAAAAAAAAAAAAAAAeAAAAaAAAAAAAAAAAAAAAAAAAAAAAAAAAAAAAECcAABAnAAAAAAAAAAAAAAAAAAAAAAAAAAAAAAAAAAAAAAAAAAAAABQAAAAAAAAAwMD/AAAAAABkAAAAMgAAAAAAAABkAAAAAAAAAH9/fwAKAAAAHwAAAFQAAABPgb0F////AQAAAAAAAAAAAAAAAAAAAAAAAAAAAAAAAAAAAAAAAAAAAAAAAn9/fwDu7OEDzMzMAMDA/wB/f38AAAAAAAAAAAAAAAAAAAAAAAAAAAAhAAAAGAAAABQAAABwCAAACAcAAD44AADeCQAAEAAAACYAAAAIAAAA//////////8="/>
+                <pr:smNativeData xmlns:pr="smNativeData" xmlns:p14="http://schemas.microsoft.com/office/powerpoint/2010/main" xmlns="" val="SMDATA_13_aDXlXhMAAAAlAAAAZAAAAA0AAAAAjgAAAEcAAACOAAAARwAAAAAAAAAAAAAAAAAAAAEAAABQAAAAAAAAAAAA4D8AAAAAAADgPwAAAAAAAOA/AAAAAAAA4D8AAAAAAADgPwAAAAAAAOA/AAAAAAAA4D8AAAAAAADgPwAAAAAAAOA/AAAAAAAA4D8CAAAAjAAAAAAAAAAAAAAAT4G9DP///wgAAAAAAAAAAAAAAAAAAAAAAAAAAAAAAAAAAAAAZAAAAAEAAABAAAAAAAAAAAAAAAAAAAAAAAAAAAAAAAAAAAAAAAAAAAAAAAAAAAAAAAAAAAAAAAAAAAAAAAAAAAAAAAAAAAAAAAAAAAAAAAAAAAAAAAAAAAAAAAAAAAAAFAAAADwAAAAAAAAAAAAAAAAAAAkUAAAAAQAAABQAAAAUAAAAFAAAAAEAAAAAAAAAZAAAAGQAAAAAAAAAZAAAAGQAAAAVAAAAYAAAAAAAAAAAAAAADwAAACADAAAAAAAAAAAAAAEAAACgMgAAVgcAAKr4//8BAAAAf39/AAEAAABkAAAAAAAAABQAAABAHwAAAAAAACYAAAAAAAAAwOD//wAAAAAmAAAAZAAAABYAAABMAAAAAAAAAAAAAAAEAAAAAAAAAAEAAADu7OEKAAAAACgAAAAoAAAAZAAAAGQAAAAAAAAAzMzMAAAAAABQAAAAUAAAAGQAAABkAAAAAAAAABcAAAAUAAAAAAAAAAAAAAD/fwAA/38AAAAAAAAJAAAABAAAADYDAAAMAAAAEAAAAAAAAAAAAAAAAAAAAAAAAAAeAAAAaAAAAAAAAAAAAAAAAAAAAAAAAAAAAAAAECcAABAnAAAAAAAAAAAAAAAAAAAAAAAAAAAAAAAAAAAAAAAAAAAAABQAAAAAAAAAwMD/AAAAAABkAAAAMgAAAAAAAABkAAAAAAAAAH9/fwAKAAAAHwAAAFQAAABPgb0F////AQAAAAAAAAAAAAAAAAAAAAAAAAAAAAAAAAAAAAAAAAAAAAAAAn9/fwDu7OEDzMzMAMDA/wB/f38AAAAAAAAAAAAAAAAAAAAAAAAAAAAhAAAAGAAAABQAAABwCAAACAcAAD44AADeCQAAEAAAACYAAAAIAAAA//////////8="/>
               </a:ext>
             </a:extLst>
           </p:cNvSpPr>
@@ -6018,7 +6018,7 @@
           <p:cNvSpPr>
             <a:extLst>
               <a:ext uri="smNativeData">
-                <pr:smNativeData xmlns="" xmlns:p14="http://schemas.microsoft.com/office/powerpoint/2010/main" xmlns:pr="smNativeData" val="SMDATA_13_aDXlXhMAAAAlAAAAZAAAAA0AAAAAjgAAAEcAAACOAAAARwAAAAAAAAAAAAAAAAAAAAEAAABQAAAAAAAAAAAA4D8AAAAAAADgPwAAAAAAAOA/AAAAAAAA4D8AAAAAAADgPwAAAAAAAOA/AAAAAAAA4D8AAAAAAADgPwAAAAAAAOA/AAAAAAAA4D8CAAAAjAAAAAAAAAAAAAAAT4G9DP///wgAAAAAAAAAAAAAAAAAAAAAAAAAAAAAAAAAAAAAZAAAAAEAAABAAAAAAAAAAAAAAAAAAAAAAAAAAAAAAAAAAAAAAAAAAAAAAAAAAAAAAAAAAAAAAAAAAAAAAAAAAAAAAAAAAAAAAAAAAAAAAAAAAAAAAAAAAAAAAAAAAAAAFAAAADwAAAAAAAAAAAAAAAAAAAkUAAAAAQAAABQAAAAUAAAAFAAAAAEAAAAAAAAAZAAAAGQAAAAAAAAAZAAAAGQAAAAVAAAAYAAAAAAAAAAAAAAADwAAACADAAAAAAAAAAAAAAEAAACgMgAAVgcAAKr4//8BAAAAf39/AAEAAABkAAAAAAAAABQAAABAHwAAAAAAACYAAAAAAAAAwOD//wAAAAAmAAAAZAAAABYAAABMAAAAAAAAAAAAAAAEAAAAAAAAAAEAAADu7OEKAAAAACgAAAAoAAAAZAAAAGQAAAAAAAAAzMzMAAAAAABQAAAAUAAAAGQAAABkAAAAAAAAABcAAAAUAAAAAAAAAAAAAAD/fwAA/38AAAAAAAAJAAAABAAAAIAeAAAMAAAAEAAAAAAAAAAAAAAAAAAAAAAAAAAeAAAAaAAAAAAAAAAAAAAAAAAAAAAAAAAAAAAAECcAABAnAAAAAAAAAAAAAAAAAAAAAAAAAAAAAAAAAAAAAAAAAAAAABQAAAAAAAAAwMD/AAAAAABkAAAAMgAAAAAAAABkAAAAAAAAAH9/fwAKAAAAHwAAAFQAAABPgb0F////AQAAAAAAAAAAAAAAAAAAAAAAAAAAAAAAAAAAAAAAAAAAAAAAAn9/fwDu7OEDzMzMAMDA/wB/f38AAAAAAAAAAAAAAAAAAAAAAAAAAAAhAAAAGAAAABQAAACEEQAAoBQAAH8jAAD5GAAAEAAAACYAAAAIAAAA//////////8="/>
+                <pr:smNativeData xmlns:pr="smNativeData" xmlns:p14="http://schemas.microsoft.com/office/powerpoint/2010/main" xmlns="" val="SMDATA_13_aDXlXhMAAAAlAAAAZAAAAA0AAAAAjgAAAEcAAACOAAAARwAAAAAAAAAAAAAAAAAAAAEAAABQAAAAAAAAAAAA4D8AAAAAAADgPwAAAAAAAOA/AAAAAAAA4D8AAAAAAADgPwAAAAAAAOA/AAAAAAAA4D8AAAAAAADgPwAAAAAAAOA/AAAAAAAA4D8CAAAAjAAAAAAAAAAAAAAAT4G9DP///wgAAAAAAAAAAAAAAAAAAAAAAAAAAAAAAAAAAAAAZAAAAAEAAABAAAAAAAAAAAAAAAAAAAAAAAAAAAAAAAAAAAAAAAAAAAAAAAAAAAAAAAAAAAAAAAAAAAAAAAAAAAAAAAAAAAAAAAAAAAAAAAAAAAAAAAAAAAAAAAAAAAAAFAAAADwAAAAAAAAAAAAAAAAAAAkUAAAAAQAAABQAAAAUAAAAFAAAAAEAAAAAAAAAZAAAAGQAAAAAAAAAZAAAAGQAAAAVAAAAYAAAAAAAAAAAAAAADwAAACADAAAAAAAAAAAAAAEAAACgMgAAVgcAAKr4//8BAAAAf39/AAEAAABkAAAAAAAAABQAAABAHwAAAAAAACYAAAAAAAAAwOD//wAAAAAmAAAAZAAAABYAAABMAAAAAAAAAAAAAAAEAAAAAAAAAAEAAADu7OEKAAAAACgAAAAoAAAAZAAAAGQAAAAAAAAAzMzMAAAAAABQAAAAUAAAAGQAAABkAAAAAAAAABcAAAAUAAAAAAAAAAAAAAD/fwAA/38AAAAAAAAJAAAABAAAAIAeAAAMAAAAEAAAAAAAAAAAAAAAAAAAAAAAAAAeAAAAaAAAAAAAAAAAAAAAAAAAAAAAAAAAAAAAECcAABAnAAAAAAAAAAAAAAAAAAAAAAAAAAAAAAAAAAAAAAAAAAAAABQAAAAAAAAAwMD/AAAAAABkAAAAMgAAAAAAAABkAAAAAAAAAH9/fwAKAAAAHwAAAFQAAABPgb0F////AQAAAAAAAAAAAAAAAAAAAAAAAAAAAAAAAAAAAAAAAAAAAAAAAn9/fwDu7OEDzMzMAMDA/wB/f38AAAAAAAAAAAAAAAAAAAAAAAAAAAAhAAAAGAAAABQAAACEEQAAoBQAAH8jAAD5GAAAEAAAACYAAAAIAAAA//////////8="/>
               </a:ext>
             </a:extLst>
           </p:cNvSpPr>
@@ -6026,7 +6026,7 @@
         </p:nvSpPr>
         <p:spPr>
           <a:xfrm>
-            <a:off x="2847340" y="3352800"/>
+            <a:off x="2958177" y="2493818"/>
             <a:ext cx="2922905" cy="706755"/>
           </a:xfrm>
           <a:prstGeom prst="rect">
@@ -6049,7 +6049,7 @@
               <a:defRPr lang="en-us"/>
             </a:pPr>
             <a:r>
-              <a:rPr lang="en-in" sz="4000">
+              <a:rPr lang="en-in" sz="4000" dirty="0">
                 <a:solidFill>
                   <a:srgbClr val="FF0000"/>
                 </a:solidFill>
@@ -6057,8 +6057,61 @@
                 <a:ea typeface="Trebuchet MS" charset="0"/>
                 <a:cs typeface="DejaVu Sans" pitchFamily="1" charset="0"/>
               </a:rPr>
-              <a:t>Thank You</a:t>
-            </a:r>
+              <a:t>Thank </a:t>
+            </a:r>
+            <a:r>
+              <a:rPr lang="en-in" sz="4000" dirty="0" smtClean="0">
+                <a:solidFill>
+                  <a:srgbClr val="FF0000"/>
+                </a:solidFill>
+                <a:latin typeface="Trebuchet MS" charset="0"/>
+                <a:ea typeface="Trebuchet MS" charset="0"/>
+                <a:cs typeface="DejaVu Sans" pitchFamily="1" charset="0"/>
+              </a:rPr>
+              <a:t>You</a:t>
+            </a:r>
+          </a:p>
+          <a:p>
+            <a:pPr algn="ctr">
+              <a:lnSpc>
+                <a:spcPct val="100000"/>
+              </a:lnSpc>
+              <a:defRPr lang="en-us"/>
+            </a:pPr>
+            <a:endParaRPr lang="en-IN" sz="4000" dirty="0">
+              <a:solidFill>
+                <a:srgbClr val="FF0000"/>
+              </a:solidFill>
+              <a:latin typeface="Trebuchet MS" charset="0"/>
+              <a:ea typeface="Trebuchet MS" charset="0"/>
+            </a:endParaRPr>
+          </a:p>
+          <a:p>
+            <a:pPr algn="ctr">
+              <a:lnSpc>
+                <a:spcPct val="100000"/>
+              </a:lnSpc>
+              <a:defRPr lang="en-us"/>
+            </a:pPr>
+            <a:r>
+              <a:rPr lang="en-IN" sz="4000" dirty="0" smtClean="0">
+                <a:solidFill>
+                  <a:srgbClr val="FF0000"/>
+                </a:solidFill>
+                <a:latin typeface="Trebuchet MS" charset="0"/>
+                <a:ea typeface="Trebuchet MS" charset="0"/>
+                <a:cs typeface="DejaVu Sans" pitchFamily="1" charset="0"/>
+              </a:rPr>
+              <a:t>Any Questions?</a:t>
+            </a:r>
+            <a:endParaRPr lang="en-in" sz="4000" dirty="0">
+              <a:solidFill>
+                <a:srgbClr val="FF0000"/>
+              </a:solidFill>
+              <a:latin typeface="Trebuchet MS" charset="0"/>
+              <a:ea typeface="Trebuchet MS" charset="0"/>
+              <a:cs typeface="DejaVu Sans" pitchFamily="1" charset="0"/>
+            </a:endParaRPr>
           </a:p>
         </p:txBody>
       </p:sp>
@@ -6106,7 +6159,7 @@
           <p:cNvSpPr>
             <a:extLst>
               <a:ext uri="smNativeData">
-                <pr:smNativeData xmlns="" xmlns:p14="http://schemas.microsoft.com/office/powerpoint/2010/main" xmlns:pr="smNativeData" val="SMDATA_13_aDXlXhMAAAAlAAAAZAAAAA0AAAAAkAAAAEgAAACQAAAASAAAAAAAAAAAAAAAAAAAAAEAAABQAAAAAAAAAAAA4D8AAAAAAADgPwAAAAAAAOA/AAAAAAAA4D8AAAAAAADgPwAAAAAAAOA/AAAAAAAA4D8AAAAAAADgPwAAAAAAAOA/AAAAAAAA4D8CAAAAjAAAAAEAAAAAAAAAM8zMAP///wgAAAAAAAAAAAAAAAAAAAAAAAAAAAAAAAAAAAAAeAAAAAEAAABAAAAAAAAAAAAAAABaAAAAAAAAAAAAAAAAAAAAAAAAAAAAAAAAAAAAAAAAAAAAAAAAAAAAAAAAAAAAAAAAAAAAAAAAAAAAAAAAAAAAAAAAAAAAAAAAAAAAFAAAADwAAAAAAAAAAAAAAAAAAAkUAAAAAQAAABQAAAAUAAAAFAAAAAEAAAAAAAAAZAAAAGQAAAAAAAAAZAAAAGQAAAAVAAAAYAAAAAAAAAAAAAAADwAAACADAAAAAAAAAAAAAAEAAACgMgAAVgcAAKr4//8BAAAAf39/AAEAAABkAAAAAAAAABQAAABAHwAAAAAAACYAAAAAAAAAwOD//wAAAAAmAAAAZAAAABYAAABMAAAAAAAAAAAAAAAEAAAAAAAAAAEAAADu7OEKAAAAACgAAAAoAAAAZAAAAGQAAAAAAAAAzMzMAAAAAABQAAAAUAAAAGQAAABkAAAAAAAAABcAAAAUAAAAAAAAAAAAAAD/fwAA/38AAAAAAAAJAAAABAAAAAAAAAAMAAAAEAAAAAAAAAAAAAAAAAAAAAAAAAAeAAAAaAAAAAAAAAAAAAAAAAAAAAAAAAAAAAAAECcAABAnAAAAAAAAAAAAAAAAAAAAAAAAAAAAAAAAAAAAAAAAAAAAABQAAAAAAAAAwMD/AAAAAABkAAAAMgAAAAAAAABkAAAAAAAAAH9/fwAKAAAAHwAAAFQAAAAzzMwA////AQAAAAAAAAAAAAAAAAAAAAAAAAAAAAAAAAAAAAAAAAAAAAAAAn9/fwDu7OEDzMzMAMDA/wB/f38AAAAAAAAAAAAAAAAAAAAAAAAAAAAhAAAAGAAAABQAAABgCQAAugkAAD44AADyCQAAEAAAACYAAAAIAAAA//////////8="/>
+                <pr:smNativeData xmlns:pr="smNativeData" xmlns:p14="http://schemas.microsoft.com/office/powerpoint/2010/main" xmlns="" val="SMDATA_13_aDXlXhMAAAAlAAAAZAAAAA0AAAAAkAAAAEgAAACQAAAASAAAAAAAAAAAAAAAAAAAAAEAAABQAAAAAAAAAAAA4D8AAAAAAADgPwAAAAAAAOA/AAAAAAAA4D8AAAAAAADgPwAAAAAAAOA/AAAAAAAA4D8AAAAAAADgPwAAAAAAAOA/AAAAAAAA4D8CAAAAjAAAAAEAAAAAAAAAM8zMAP///wgAAAAAAAAAAAAAAAAAAAAAAAAAAAAAAAAAAAAAeAAAAAEAAABAAAAAAAAAAAAAAABaAAAAAAAAAAAAAAAAAAAAAAAAAAAAAAAAAAAAAAAAAAAAAAAAAAAAAAAAAAAAAAAAAAAAAAAAAAAAAAAAAAAAAAAAAAAAAAAAAAAAFAAAADwAAAAAAAAAAAAAAAAAAAkUAAAAAQAAABQAAAAUAAAAFAAAAAEAAAAAAAAAZAAAAGQAAAAAAAAAZAAAAGQAAAAVAAAAYAAAAAAAAAAAAAAADwAAACADAAAAAAAAAAAAAAEAAACgMgAAVgcAAKr4//8BAAAAf39/AAEAAABkAAAAAAAAABQAAABAHwAAAAAAACYAAAAAAAAAwOD//wAAAAAmAAAAZAAAABYAAABMAAAAAAAAAAAAAAAEAAAAAAAAAAEAAADu7OEKAAAAACgAAAAoAAAAZAAAAGQAAAAAAAAAzMzMAAAAAABQAAAAUAAAAGQAAABkAAAAAAAAABcAAAAUAAAAAAAAAAAAAAD/fwAA/38AAAAAAAAJAAAABAAAAAAAAAAMAAAAEAAAAAAAAAAAAAAAAAAAAAAAAAAeAAAAaAAAAAAAAAAAAAAAAAAAAAAAAAAAAAAAECcAABAnAAAAAAAAAAAAAAAAAAAAAAAAAAAAAAAAAAAAAAAAAAAAABQAAAAAAAAAwMD/AAAAAABkAAAAMgAAAAAAAABkAAAAAAAAAH9/fwAKAAAAHwAAAFQAAAAzzMwA////AQAAAAAAAAAAAAAAAAAAAAAAAAAAAAAAAAAAAAAAAAAAAAAAAn9/fwDu7OEDzMzMAMDA/wB/f38AAAAAAAAAAAAAAAAAAAAAAAAAAAAhAAAAGAAAABQAAABgCQAAugkAAD44AADyCQAAEAAAACYAAAAIAAAA//////////8="/>
               </a:ext>
             </a:extLst>
           </p:cNvSpPr>
@@ -6135,7 +6188,7 @@
           <p:cNvSpPr>
             <a:extLst>
               <a:ext uri="smNativeData">
-                <pr:smNativeData xmlns="" xmlns:p14="http://schemas.microsoft.com/office/powerpoint/2010/main" xmlns:pr="smNativeData" val="SMDATA_13_aDXlXhMAAAAlAAAAZAAAAA0AAAAAjgAAAEcAAACOAAAARwAAAAAAAAAAAAAAAAAAAAEAAABQAAAAAAAAAAAA4D8AAAAAAADgPwAAAAAAAOA/AAAAAAAA4D8AAAAAAADgPwAAAAAAAOA/AAAAAAAA4D8AAAAAAADgPwAAAAAAAOA/AAAAAAAA4D8CAAAAjAAAAAAAAAAAAAAAT4G9DP///wgAAAAAAAAAAAAAAAAAAAAAAAAAAAAAAAAAAAAAZAAAAAEAAABAAAAAAAAAAAAAAAAAAAAAAAAAAAAAAAAAAAAAAAAAAAAAAAAAAAAAAAAAAAAAAAAAAAAAAAAAAAAAAAAAAAAAAAAAAAAAAAAAAAAAAAAAAAAAAAAAAAAAFAAAADwAAAAAAAAAAAAAAAAAAAkUAAAAAQAAABQAAAAUAAAAFAAAAAEAAAAAAAAAZAAAAGQAAAAAAAAAZAAAAGQAAAAVAAAAYAAAAAAAAAAAAAAADwAAACADAAAAAAAAAAAAAAEAAACgMgAAVgcAAKr4//8BAAAAf39/AAEAAABkAAAAAAAAABQAAABAHwAAAAAAACYAAAAAAAAAwOD//wAAAAAmAAAAZAAAABYAAABMAAAAAAAAAAAAAAAEAAAAAAAAAAEAAADu7OEKAAAAACgAAAAoAAAAZAAAAGQAAAAAAAAAzMzMAAAAAABQAAAAUAAAAGQAAABkAAAAAAAAABcAAAAUAAAAAAAAAAAAAAD/fwAA/38AAAAAAAAJAAAABAAAAAAAAAAMAAAAEAAAAAAAAAAAAAAAAAAAAAAAAAAeAAAAaAAAAAAAAAAAAAAAAAAAAAAAAAAAAAAAECcAABAnAAAAAAAAAAAAAAAAAAAAAAAAAAAAAAAAAAAAAAAAAAAAABQAAAAAAAAAwMD/AAAAAABkAAAAMgAAAAAAAABkAAAAAAAAAH9/fwAKAAAAHwAAAFQAAABPgb0F////AQAAAAAAAAAAAAAAAAAAAAAAAAAAAAAAAAAAAAAAAAAAAAAAAn9/fwDu7OEDzMzMAMDA/wB/f38AAAAAAAAAAAAAAAAAAAAAAAAAAAAhAAAAGAAAABQAAABoEAAACAcAAD44AADdCQAAEAAAACYAAAAIAAAA//////////8="/>
+                <pr:smNativeData xmlns:pr="smNativeData" xmlns:p14="http://schemas.microsoft.com/office/powerpoint/2010/main" xmlns="" val="SMDATA_13_aDXlXhMAAAAlAAAAZAAAAA0AAAAAjgAAAEcAAACOAAAARwAAAAAAAAAAAAAAAAAAAAEAAABQAAAAAAAAAAAA4D8AAAAAAADgPwAAAAAAAOA/AAAAAAAA4D8AAAAAAADgPwAAAAAAAOA/AAAAAAAA4D8AAAAAAADgPwAAAAAAAOA/AAAAAAAA4D8CAAAAjAAAAAAAAAAAAAAAT4G9DP///wgAAAAAAAAAAAAAAAAAAAAAAAAAAAAAAAAAAAAAZAAAAAEAAABAAAAAAAAAAAAAAAAAAAAAAAAAAAAAAAAAAAAAAAAAAAAAAAAAAAAAAAAAAAAAAAAAAAAAAAAAAAAAAAAAAAAAAAAAAAAAAAAAAAAAAAAAAAAAAAAAAAAAFAAAADwAAAAAAAAAAAAAAAAAAAkUAAAAAQAAABQAAAAUAAAAFAAAAAEAAAAAAAAAZAAAAGQAAAAAAAAAZAAAAGQAAAAVAAAAYAAAAAAAAAAAAAAADwAAACADAAAAAAAAAAAAAAEAAACgMgAAVgcAAKr4//8BAAAAf39/AAEAAABkAAAAAAAAABQAAABAHwAAAAAAACYAAAAAAAAAwOD//wAAAAAmAAAAZAAAABYAAABMAAAAAAAAAAAAAAAEAAAAAAAAAAEAAADu7OEKAAAAACgAAAAoAAAAZAAAAGQAAAAAAAAAzMzMAAAAAABQAAAAUAAAAGQAAABkAAAAAAAAABcAAAAUAAAAAAAAAAAAAAD/fwAA/38AAAAAAAAJAAAABAAAAAAAAAAMAAAAEAAAAAAAAAAAAAAAAAAAAAAAAAAeAAAAaAAAAAAAAAAAAAAAAAAAAAAAAAAAAAAAECcAABAnAAAAAAAAAAAAAAAAAAAAAAAAAAAAAAAAAAAAAAAAAAAAABQAAAAAAAAAwMD/AAAAAABkAAAAMgAAAAAAAABkAAAAAAAAAH9/fwAKAAAAHwAAAFQAAABPgb0F////AQAAAAAAAAAAAAAAAAAAAAAAAAAAAAAAAAAAAAAAAAAAAAAAAn9/fwDu7OEDzMzMAMDA/wB/f38AAAAAAAAAAAAAAAAAAAAAAAAAAAAhAAAAGAAAABQAAABoEAAACAcAAD44AADdCQAAEAAAACYAAAAIAAAA//////////8="/>
               </a:ext>
             </a:extLst>
           </p:cNvSpPr>
@@ -6185,7 +6238,7 @@
           <p:cNvSpPr>
             <a:extLst>
               <a:ext uri="smNativeData">
-                <pr:smNativeData xmlns="" xmlns:p14="http://schemas.microsoft.com/office/powerpoint/2010/main" xmlns:pr="smNativeData" val="SMDATA_13_aDXlXhMAAAAlAAAAZAAAAA0AAAAAjgAAAEcAAACOAAAARwAAAAAAAAABAAAAAAAAAAEAAABQAAAAAAAAAAAA4D8AAAAAAADgPwAAAAAAAOA/AAAAAAAA4D8AAAAAAADgPwAAAAAAAOA/AAAAAAAA4D8AAAAAAADgPwAAAAAAAOA/AAAAAAAA4D8CAAAAjAAAAAAAAAAAAAAAT4G9DP///wgAAAAAAAAAAAAAAAAAAAAAAAAAAAAAAAAAAAAAZAAAAAEAAABAAAAAAAAAAAAAAAAAAAAAAAAAAAAAAAAAAAAAAAAAAAAAAAAAAAAAAAAAAAAAAAAAAAAAAAAAAAAAAAAAAAAAAAAAAAAAAAAAAAAAAAAAAAAAAAAAAAAAFAAAADwAAAAAAAAAAAAAAAAAAAkUAAAAAQAAABQAAAAUAAAAFAAAAAEAAAAAAAAAZAAAAGQAAAAAAAAAZAAAAGQAAAAVAAAAYAAAAAAAAAAAAAAADwAAACADAAAAAAAAAAAAAAEAAACgMgAAVgcAAKr4//8BAAAAf39/AAEAAABkAAAAAAAAABQAAABAHwAAAAAAACYAAAAAAAAAwOD//wAAAAAmAAAAZAAAABYAAABMAAAAAAAAAAAAAAAEAAAAAAAAAAEAAADu7OEKAAAAACgAAAAoAAAAZAAAAGQAAAAAAAAAzMzMAAAAAABQAAAAUAAAAGQAAABkAAAAAAAAABcAAAAUAAAAAAAAAAAAAAD/fwAA/38AAAAAAAAJAAAABAAAAAAAAAAMAAAAEAAAAAAAAAAAAAAAAAAAAAAAAAAeAAAAaAAAAAAAAAAAAAAAAAAAAAAAAAAAAAAAECcAABAnAAAAAAAAAAAAAAAAAAAAAAAAAAAAAAAAAAAAAAAAAAAAABQAAAAAAAAAwMD/AAAAAABkAAAAMgAAAAAAAABkAAAAAAAAAH9/fwAKAAAAHwAAAFQAAABPgb0F////AQAAAAAAAAAAAAAAAAAAAAAAAAAAAAAAAAAAAAAAAAAAAAAAAn9/fwDu7OEDzMzMAMDA/wB/f38AAAAAAAAAAAAAAAAAAAAAAAAAAAAhAAAAGAAAABQAAAAAAAAA9AkAAFwtAAACJwAAEAAAACYAAAAIAAAA//////////8="/>
+                <pr:smNativeData xmlns:pr="smNativeData" xmlns:p14="http://schemas.microsoft.com/office/powerpoint/2010/main" xmlns="" val="SMDATA_13_aDXlXhMAAAAlAAAAZAAAAA0AAAAAjgAAAEcAAACOAAAARwAAAAAAAAABAAAAAAAAAAEAAABQAAAAAAAAAAAA4D8AAAAAAADgPwAAAAAAAOA/AAAAAAAA4D8AAAAAAADgPwAAAAAAAOA/AAAAAAAA4D8AAAAAAADgPwAAAAAAAOA/AAAAAAAA4D8CAAAAjAAAAAAAAAAAAAAAT4G9DP///wgAAAAAAAAAAAAAAAAAAAAAAAAAAAAAAAAAAAAAZAAAAAEAAABAAAAAAAAAAAAAAAAAAAAAAAAAAAAAAAAAAAAAAAAAAAAAAAAAAAAAAAAAAAAAAAAAAAAAAAAAAAAAAAAAAAAAAAAAAAAAAAAAAAAAAAAAAAAAAAAAAAAAFAAAADwAAAAAAAAAAAAAAAAAAAkUAAAAAQAAABQAAAAUAAAAFAAAAAEAAAAAAAAAZAAAAGQAAAAAAAAAZAAAAGQAAAAVAAAAYAAAAAAAAAAAAAAADwAAACADAAAAAAAAAAAAAAEAAACgMgAAVgcAAKr4//8BAAAAf39/AAEAAABkAAAAAAAAABQAAABAHwAAAAAAACYAAAAAAAAAwOD//wAAAAAmAAAAZAAAABYAAABMAAAAAAAAAAAAAAAEAAAAAAAAAAEAAADu7OEKAAAAACgAAAAoAAAAZAAAAGQAAAAAAAAAzMzMAAAAAABQAAAAUAAAAGQAAABkAAAAAAAAABcAAAAUAAAAAAAAAAAAAAD/fwAA/38AAAAAAAAJAAAABAAAAAAAAAAMAAAAEAAAAAAAAAAAAAAAAAAAAAAAAAAeAAAAaAAAAAAAAAAAAAAAAAAAAAAAAAAAAAAAECcAABAnAAAAAAAAAAAAAAAAAAAAAAAAAAAAAAAAAAAAAAAAAAAAABQAAAAAAAAAwMD/AAAAAABkAAAAMgAAAAAAAABkAAAAAAAAAH9/fwAKAAAAHwAAAFQAAABPgb0F////AQAAAAAAAAAAAAAAAAAAAAAAAAAAAAAAAAAAAAAAAAAAAAAAAn9/fwDu7OEDzMzMAMDA/wB/f38AAAAAAAAAAAAAAAAAAAAAAAAAAAAhAAAAGAAAABQAAAAAAAAA9AkAAFwtAAACJwAAEAAAACYAAAAIAAAA//////////8="/>
               </a:ext>
             </a:extLst>
           </p:cNvSpPr>
@@ -6328,7 +6381,7 @@
           <p:cNvSpPr>
             <a:extLst>
               <a:ext uri="smNativeData">
-                <pr:smNativeData xmlns="" xmlns:p14="http://schemas.microsoft.com/office/powerpoint/2010/main" xmlns:pr="smNativeData" val="SMDATA_13_aDXlXhMAAAAlAAAAZAAAAA0AAAAAkAAAAEgAAACQAAAASAAAAAAAAAAAAAAAAAAAAAEAAABQAAAAAAAAAAAA4D8AAAAAAADgPwAAAAAAAOA/AAAAAAAA4D8AAAAAAADgPwAAAAAAAOA/AAAAAAAA4D8AAAAAAADgPwAAAAAAAOA/AAAAAAAA4D8CAAAAjAAAAAEAAAAAAAAAM8zMAP///wgAAAAAAAAAAAAAAAAAAAAAAAAAAAAAAAAAAAAAeAAAAAEAAABAAAAAAAAAAAAAAABaAAAAAAAAAAAAAAAAAAAAAAAAAAAAAAAAAAAAAAAAAAAAAAAAAAAAAAAAAAAAAAAAAAAAAAAAAAAAAAAAAAAAAAAAAAAAAAAAAAAAFAAAADwAAAAAAAAAAAAAAAAAAAkUAAAAAQAAABQAAAAUAAAAFAAAAAEAAAAAAAAAZAAAAGQAAAAAAAAAZAAAAGQAAAAVAAAAYAAAAAAAAAAAAAAADwAAACADAAAAAAAAAAAAAAEAAACgMgAAVgcAAKr4//8BAAAAf39/AAEAAABkAAAAAAAAABQAAABAHwAAAAAAACYAAAAAAAAAwOD//wAAAAAmAAAAZAAAABYAAABMAAAAAAAAAAAAAAAEAAAAAAAAAAEAAADu7OEKAAAAACgAAAAoAAAAZAAAAGQAAAAAAAAAzMzMAAAAAABQAAAAUAAAAGQAAABkAAAAAAAAABcAAAAUAAAAAAAAAAAAAAD/fwAA/38AAAAAAAAJAAAABAAAAAAAAAAMAAAAEAAAAAAAAAAAAAAAAAAAAAAAAAAeAAAAaAAAAAAAAAAAAAAAAAAAAAAAAAAAAAAAECcAABAnAAAAAAAAAAAAAAAAAAAAAAAAAAAAAAAAAAAAAAAAAAAAABQAAAAAAAAAwMD/AAAAAABkAAAAMgAAAAAAAABkAAAAAAAAAH9/fwAKAAAAHwAAAFQAAAAzzMwA////AQAAAAAAAAAAAAAAAAAAAAAAAAAAAAAAAAAAAAAAAAAAAAAAAn9/fwDu7OEDzMzMAMDA/wB/f38AAAAAAAAAAAAAAAAAAAAAAAAAAAAhAAAAGAAAABQAAABgCQAAugkAAD44AADyCQAAEAAAACYAAAAIAAAA//////////8="/>
+                <pr:smNativeData xmlns:pr="smNativeData" xmlns:p14="http://schemas.microsoft.com/office/powerpoint/2010/main" xmlns="" val="SMDATA_13_aDXlXhMAAAAlAAAAZAAAAA0AAAAAkAAAAEgAAACQAAAASAAAAAAAAAAAAAAAAAAAAAEAAABQAAAAAAAAAAAA4D8AAAAAAADgPwAAAAAAAOA/AAAAAAAA4D8AAAAAAADgPwAAAAAAAOA/AAAAAAAA4D8AAAAAAADgPwAAAAAAAOA/AAAAAAAA4D8CAAAAjAAAAAEAAAAAAAAAM8zMAP///wgAAAAAAAAAAAAAAAAAAAAAAAAAAAAAAAAAAAAAeAAAAAEAAABAAAAAAAAAAAAAAABaAAAAAAAAAAAAAAAAAAAAAAAAAAAAAAAAAAAAAAAAAAAAAAAAAAAAAAAAAAAAAAAAAAAAAAAAAAAAAAAAAAAAAAAAAAAAAAAAAAAAFAAAADwAAAAAAAAAAAAAAAAAAAkUAAAAAQAAABQAAAAUAAAAFAAAAAEAAAAAAAAAZAAAAGQAAAAAAAAAZAAAAGQAAAAVAAAAYAAAAAAAAAAAAAAADwAAACADAAAAAAAAAAAAAAEAAACgMgAAVgcAAKr4//8BAAAAf39/AAEAAABkAAAAAAAAABQAAABAHwAAAAAAACYAAAAAAAAAwOD//wAAAAAmAAAAZAAAABYAAABMAAAAAAAAAAAAAAAEAAAAAAAAAAEAAADu7OEKAAAAACgAAAAoAAAAZAAAAGQAAAAAAAAAzMzMAAAAAABQAAAAUAAAAGQAAABkAAAAAAAAABcAAAAUAAAAAAAAAAAAAAD/fwAA/38AAAAAAAAJAAAABAAAAAAAAAAMAAAAEAAAAAAAAAAAAAAAAAAAAAAAAAAeAAAAaAAAAAAAAAAAAAAAAAAAAAAAAAAAAAAAECcAABAnAAAAAAAAAAAAAAAAAAAAAAAAAAAAAAAAAAAAAAAAAAAAABQAAAAAAAAAwMD/AAAAAABkAAAAMgAAAAAAAABkAAAAAAAAAH9/fwAKAAAAHwAAAFQAAAAzzMwA////AQAAAAAAAAAAAAAAAAAAAAAAAAAAAAAAAAAAAAAAAAAAAAAAAn9/fwDu7OEDzMzMAMDA/wB/f38AAAAAAAAAAAAAAAAAAAAAAAAAAAAhAAAAGAAAABQAAABgCQAAugkAAD44AADyCQAAEAAAACYAAAAIAAAA//////////8="/>
               </a:ext>
             </a:extLst>
           </p:cNvSpPr>
@@ -6357,7 +6410,7 @@
           <p:cNvSpPr>
             <a:extLst>
               <a:ext uri="smNativeData">
-                <pr:smNativeData xmlns="" xmlns:p14="http://schemas.microsoft.com/office/powerpoint/2010/main" xmlns:pr="smNativeData" val="SMDATA_13_aDXlXhMAAAAlAAAAZAAAAA0AAAAAjgAAAEcAAACOAAAARwAAAAAAAAAAAAAAAAAAAAEAAABQAAAAAAAAAAAA4D8AAAAAAADgPwAAAAAAAOA/AAAAAAAA4D8AAAAAAADgPwAAAAAAAOA/AAAAAAAA4D8AAAAAAADgPwAAAAAAAOA/AAAAAAAA4D8CAAAAjAAAAAAAAAAAAAAAT4G9DP///wgAAAAAAAAAAAAAAAAAAAAAAAAAAAAAAAAAAAAAZAAAAAEAAABAAAAAAAAAAAAAAAAAAAAAAAAAAAAAAAAAAAAAAAAAAAAAAAAAAAAAAAAAAAAAAAAAAAAAAAAAAAAAAAAAAAAAAAAAAAAAAAAAAAAAAAAAAAAAAAAAAAAAFAAAADwAAAAAAAAAAAAAAAAAAAkUAAAAAQAAABQAAAAUAAAAFAAAAAEAAAAAAAAAZAAAAGQAAAAAAAAAZAAAAGQAAAAVAAAAYAAAAAAAAAAAAAAADwAAACADAAAAAAAAAAAAAAEAAACgMgAAVgcAAKr4//8BAAAAf39/AAEAAABkAAAAAAAAABQAAABAHwAAAAAAACYAAAAAAAAAwOD//wAAAAAmAAAAZAAAABYAAABMAAAAAAAAAAAAAAAEAAAAAAAAAAEAAADu7OEKAAAAACgAAAAoAAAAZAAAAGQAAAAAAAAAzMzMAAAAAABQAAAAUAAAAGQAAABkAAAAAAAAABcAAAAUAAAAAAAAAAAAAAD/fwAA/38AAAAAAAAJAAAABAAAAAAAAAAMAAAAEAAAAAAAAAAAAAAAAAAAAAAAAAAeAAAAaAAAAAAAAAAAAAAAAAAAAAAAAAAAAAAAECcAABAnAAAAAAAAAAAAAAAAAAAAAAAAAAAAAAAAAAAAAAAAAAAAABQAAAAAAAAAwMD/AAAAAABkAAAAMgAAAAAAAABkAAAAAAAAAH9/fwAKAAAAHwAAAFQAAABPgb0F////AQAAAAAAAAAAAAAAAAAAAAAAAAAAAAAAAAAAAAAAAAAAAAAAAn9/fwDu7OEDzMzMAMDA/wB/f38AAAAAAAAAAAAAAAAAAAAAAAAAAAAhAAAAGAAAABQAAABoEAAACAcAAD44AADdCQAAEAAAACYAAAAIAAAA//////////8="/>
+                <pr:smNativeData xmlns:pr="smNativeData" xmlns:p14="http://schemas.microsoft.com/office/powerpoint/2010/main" xmlns="" val="SMDATA_13_aDXlXhMAAAAlAAAAZAAAAA0AAAAAjgAAAEcAAACOAAAARwAAAAAAAAAAAAAAAAAAAAEAAABQAAAAAAAAAAAA4D8AAAAAAADgPwAAAAAAAOA/AAAAAAAA4D8AAAAAAADgPwAAAAAAAOA/AAAAAAAA4D8AAAAAAADgPwAAAAAAAOA/AAAAAAAA4D8CAAAAjAAAAAAAAAAAAAAAT4G9DP///wgAAAAAAAAAAAAAAAAAAAAAAAAAAAAAAAAAAAAAZAAAAAEAAABAAAAAAAAAAAAAAAAAAAAAAAAAAAAAAAAAAAAAAAAAAAAAAAAAAAAAAAAAAAAAAAAAAAAAAAAAAAAAAAAAAAAAAAAAAAAAAAAAAAAAAAAAAAAAAAAAAAAAFAAAADwAAAAAAAAAAAAAAAAAAAkUAAAAAQAAABQAAAAUAAAAFAAAAAEAAAAAAAAAZAAAAGQAAAAAAAAAZAAAAGQAAAAVAAAAYAAAAAAAAAAAAAAADwAAACADAAAAAAAAAAAAAAEAAACgMgAAVgcAAKr4//8BAAAAf39/AAEAAABkAAAAAAAAABQAAABAHwAAAAAAACYAAAAAAAAAwOD//wAAAAAmAAAAZAAAABYAAABMAAAAAAAAAAAAAAAEAAAAAAAAAAEAAADu7OEKAAAAACgAAAAoAAAAZAAAAGQAAAAAAAAAzMzMAAAAAABQAAAAUAAAAGQAAABkAAAAAAAAABcAAAAUAAAAAAAAAAAAAAD/fwAA/38AAAAAAAAJAAAABAAAAAAAAAAMAAAAEAAAAAAAAAAAAAAAAAAAAAAAAAAeAAAAaAAAAAAAAAAAAAAAAAAAAAAAAAAAAAAAECcAABAnAAAAAAAAAAAAAAAAAAAAAAAAAAAAAAAAAAAAAAAAAAAAABQAAAAAAAAAwMD/AAAAAABkAAAAMgAAAAAAAABkAAAAAAAAAH9/fwAKAAAAHwAAAFQAAABPgb0F////AQAAAAAAAAAAAAAAAAAAAAAAAAAAAAAAAAAAAAAAAAAAAAAAAn9/fwDu7OEDzMzMAMDA/wB/f38AAAAAAAAAAAAAAAAAAAAAAAAAAAAhAAAAGAAAABQAAABoEAAACAcAAD44AADdCQAAEAAAACYAAAAIAAAA//////////8="/>
               </a:ext>
             </a:extLst>
           </p:cNvSpPr>
@@ -6407,7 +6460,7 @@
           <p:cNvSpPr>
             <a:extLst>
               <a:ext uri="smNativeData">
-                <pr:smNativeData xmlns="" xmlns:p14="http://schemas.microsoft.com/office/powerpoint/2010/main" xmlns:pr="smNativeData" val="SMDATA_13_aDXlXhMAAAAlAAAAZAAAAA0AAAAAjgAAAEcAAACOAAAARwAAAAAAAAABAAAAAAAAAAEAAABQAAAAAAAAAAAA4D8AAAAAAADgPwAAAAAAAOA/AAAAAAAA4D8AAAAAAADgPwAAAAAAAOA/AAAAAAAA4D8AAAAAAADgPwAAAAAAAOA/AAAAAAAA4D8CAAAAjAAAAAAAAAAAAAAAT4G9DP///wgAAAAAAAAAAAAAAAAAAAAAAAAAAAAAAAAAAAAAZAAAAAEAAABAAAAAAAAAAAAAAAAAAAAAAAAAAAAAAAAAAAAAAAAAAAAAAAAAAAAAAAAAAAAAAAAAAAAAAAAAAAAAAAAAAAAAAAAAAAAAAAAAAAAAAAAAAAAAAAAAAAAAFAAAADwAAAAAAAAAAAAAAAAAAAkUAAAAAQAAABQAAAAUAAAAFAAAAAEAAAAAAAAAZAAAAGQAAAAAAAAAZAAAAGQAAAAVAAAAYAAAAAAAAAAAAAAADwAAACADAAAAAAAAAAAAAAEAAACgMgAAVgcAAKr4//8BAAAAf39/AAEAAABkAAAAAAAAABQAAABAHwAAAAAAACYAAAAAAAAAwOD//wAAAAAmAAAAZAAAABYAAABMAAAAAAAAAAAAAAAEAAAAAAAAAAEAAADu7OEKAAAAACgAAAAoAAAAZAAAAGQAAAAAAAAAzMzMAAAAAABQAAAAUAAAAGQAAABkAAAAAAAAABcAAAAUAAAAAAAAAAAAAAD/fwAA/38AAAAAAAAJAAAABAAAAAAAAAAMAAAAEAAAAAAAAAAAAAAAAAAAAAAAAAAeAAAAaAAAAAAAAAAAAAAAAAAAAAAAAAAAAAAAECcAABAnAAAAAAAAAAAAAAAAAAAAAAAAAAAAAAAAAAAAAAAAAAAAABQAAAAAAAAAwMD/AAAAAABkAAAAMgAAAAAAAABkAAAAAAAAAH9/fwAKAAAAHwAAAFQAAABPgb0F////AQAAAAAAAAAAAAAAAAAAAAAAAAAAAAAAAAAAAAAAAAAAAAAAAn9/fwDu7OEDzMzMAMDA/wB/f38AAAAAAAAAAAAAAAAAAAAAAAAAAAAhAAAAGAAAABQAAAAAAAAA9AkAAFwtAAACJwAAEAAAACYAAAAIAAAA//////////8="/>
+                <pr:smNativeData xmlns:pr="smNativeData" xmlns:p14="http://schemas.microsoft.com/office/powerpoint/2010/main" xmlns="" val="SMDATA_13_aDXlXhMAAAAlAAAAZAAAAA0AAAAAjgAAAEcAAACOAAAARwAAAAAAAAABAAAAAAAAAAEAAABQAAAAAAAAAAAA4D8AAAAAAADgPwAAAAAAAOA/AAAAAAAA4D8AAAAAAADgPwAAAAAAAOA/AAAAAAAA4D8AAAAAAADgPwAAAAAAAOA/AAAAAAAA4D8CAAAAjAAAAAAAAAAAAAAAT4G9DP///wgAAAAAAAAAAAAAAAAAAAAAAAAAAAAAAAAAAAAAZAAAAAEAAABAAAAAAAAAAAAAAAAAAAAAAAAAAAAAAAAAAAAAAAAAAAAAAAAAAAAAAAAAAAAAAAAAAAAAAAAAAAAAAAAAAAAAAAAAAAAAAAAAAAAAAAAAAAAAAAAAAAAAFAAAADwAAAAAAAAAAAAAAAAAAAkUAAAAAQAAABQAAAAUAAAAFAAAAAEAAAAAAAAAZAAAAGQAAAAAAAAAZAAAAGQAAAAVAAAAYAAAAAAAAAAAAAAADwAAACADAAAAAAAAAAAAAAEAAACgMgAAVgcAAKr4//8BAAAAf39/AAEAAABkAAAAAAAAABQAAABAHwAAAAAAACYAAAAAAAAAwOD//wAAAAAmAAAAZAAAABYAAABMAAAAAAAAAAAAAAAEAAAAAAAAAAEAAADu7OEKAAAAACgAAAAoAAAAZAAAAGQAAAAAAAAAzMzMAAAAAABQAAAAUAAAAGQAAABkAAAAAAAAABcAAAAUAAAAAAAAAAAAAAD/fwAA/38AAAAAAAAJAAAABAAAAAAAAAAMAAAAEAAAAAAAAAAAAAAAAAAAAAAAAAAeAAAAaAAAAAAAAAAAAAAAAAAAAAAAAAAAAAAAECcAABAnAAAAAAAAAAAAAAAAAAAAAAAAAAAAAAAAAAAAAAAAAAAAABQAAAAAAAAAwMD/AAAAAABkAAAAMgAAAAAAAABkAAAAAAAAAH9/fwAKAAAAHwAAAFQAAABPgb0F////AQAAAAAAAAAAAAAAAAAAAAAAAAAAAAAAAAAAAAAAAAAAAAAAAn9/fwDu7OEDzMzMAMDA/wB/f38AAAAAAAAAAAAAAAAAAAAAAAAAAAAhAAAAGAAAABQAAAAAAAAA9AkAAFwtAAACJwAAEAAAACYAAAAIAAAA//////////8="/>
               </a:ext>
             </a:extLst>
           </p:cNvSpPr>
@@ -6620,7 +6673,7 @@
           <p:cNvSpPr>
             <a:extLst>
               <a:ext uri="smNativeData">
-                <pr:smNativeData xmlns="" xmlns:p14="http://schemas.microsoft.com/office/powerpoint/2010/main" xmlns:pr="smNativeData" val="SMDATA_13_aDXlXhMAAAAlAAAAZAAAAA0AAAAAkAAAAEgAAACQAAAASAAAAAAAAAAAAAAAAAAAAAEAAABQAAAAAAAAAAAA4D8AAAAAAADgPwAAAAAAAOA/AAAAAAAA4D8AAAAAAADgPwAAAAAAAOA/AAAAAAAA4D8AAAAAAADgPwAAAAAAAOA/AAAAAAAA4D8CAAAAjAAAAAEAAAAAAAAAM8zMAP///wgAAAAAAAAAAAAAAAAAAAAAAAAAAAAAAAAAAAAAeAAAAAEAAABAAAAAAAAAAAAAAABaAAAAAAAAAAAAAAAAAAAAAAAAAAAAAAAAAAAAAAAAAAAAAAAAAAAAAAAAAAAAAAAAAAAAAAAAAAAAAAAAAAAAAAAAAAAAAAAAAAAAFAAAADwAAAAAAAAAAAAAAAAAAAkUAAAAAQAAABQAAAAUAAAAFAAAAAEAAAAAAAAAZAAAAGQAAAAAAAAAZAAAAGQAAAAVAAAAYAAAAAAAAAAAAAAADwAAACADAAAAAAAAAAAAAAEAAACgMgAAVgcAAKr4//8BAAAAf39/AAEAAABkAAAAAAAAABQAAABAHwAAAAAAACYAAAAAAAAAwOD//wAAAAAmAAAAZAAAABYAAABMAAAAAAAAAAAAAAAEAAAAAAAAAAEAAADu7OEKAAAAACgAAAAoAAAAZAAAAGQAAAAAAAAAzMzMAAAAAABQAAAAUAAAAGQAAABkAAAAAAAAABcAAAAUAAAAAAAAAAAAAAD/fwAA/38AAAAAAAAJAAAABAAAAAAAAAAMAAAAEAAAAAAAAAAAAAAAAAAAAAAAAAAeAAAAaAAAAAAAAAAAAAAAAAAAAAAAAAAAAAAAECcAABAnAAAAAAAAAAAAAAAAAAAAAAAAAAAAAAAAAAAAAAAAAAAAABQAAAAAAAAAwMD/AAAAAABkAAAAMgAAAAAAAABkAAAAAAAAAH9/fwAKAAAAHwAAAFQAAAAzzMwA////AQAAAAAAAAAAAAAAAAAAAAAAAAAAAAAAAAAAAAAAAAAAAAAAAn9/fwDu7OEDzMzMAMDA/wB/f38AAAAAAAAAAAAAAAAAAAAAAAAAAAAhAAAAGAAAABQAAABgCQAAugkAAD44AADyCQAAEAAAACYAAAAIAAAA//////////8="/>
+                <pr:smNativeData xmlns:pr="smNativeData" xmlns:p14="http://schemas.microsoft.com/office/powerpoint/2010/main" xmlns="" val="SMDATA_13_aDXlXhMAAAAlAAAAZAAAAA0AAAAAkAAAAEgAAACQAAAASAAAAAAAAAAAAAAAAAAAAAEAAABQAAAAAAAAAAAA4D8AAAAAAADgPwAAAAAAAOA/AAAAAAAA4D8AAAAAAADgPwAAAAAAAOA/AAAAAAAA4D8AAAAAAADgPwAAAAAAAOA/AAAAAAAA4D8CAAAAjAAAAAEAAAAAAAAAM8zMAP///wgAAAAAAAAAAAAAAAAAAAAAAAAAAAAAAAAAAAAAeAAAAAEAAABAAAAAAAAAAAAAAABaAAAAAAAAAAAAAAAAAAAAAAAAAAAAAAAAAAAAAAAAAAAAAAAAAAAAAAAAAAAAAAAAAAAAAAAAAAAAAAAAAAAAAAAAAAAAAAAAAAAAFAAAADwAAAAAAAAAAAAAAAAAAAkUAAAAAQAAABQAAAAUAAAAFAAAAAEAAAAAAAAAZAAAAGQAAAAAAAAAZAAAAGQAAAAVAAAAYAAAAAAAAAAAAAAADwAAACADAAAAAAAAAAAAAAEAAACgMgAAVgcAAKr4//8BAAAAf39/AAEAAABkAAAAAAAAABQAAABAHwAAAAAAACYAAAAAAAAAwOD//wAAAAAmAAAAZAAAABYAAABMAAAAAAAAAAAAAAAEAAAAAAAAAAEAAADu7OEKAAAAACgAAAAoAAAAZAAAAGQAAAAAAAAAzMzMAAAAAABQAAAAUAAAAGQAAABkAAAAAAAAABcAAAAUAAAAAAAAAAAAAAD/fwAA/38AAAAAAAAJAAAABAAAAAAAAAAMAAAAEAAAAAAAAAAAAAAAAAAAAAAAAAAeAAAAaAAAAAAAAAAAAAAAAAAAAAAAAAAAAAAAECcAABAnAAAAAAAAAAAAAAAAAAAAAAAAAAAAAAAAAAAAAAAAAAAAABQAAAAAAAAAwMD/AAAAAABkAAAAMgAAAAAAAABkAAAAAAAAAH9/fwAKAAAAHwAAAFQAAAAzzMwA////AQAAAAAAAAAAAAAAAAAAAAAAAAAAAAAAAAAAAAAAAAAAAAAAAn9/fwDu7OEDzMzMAMDA/wB/f38AAAAAAAAAAAAAAAAAAAAAAAAAAAAhAAAAGAAAABQAAABgCQAAugkAAD44AADyCQAAEAAAACYAAAAIAAAA//////////8="/>
               </a:ext>
             </a:extLst>
           </p:cNvSpPr>
@@ -6649,7 +6702,7 @@
           <p:cNvSpPr>
             <a:extLst>
               <a:ext uri="smNativeData">
-                <pr:smNativeData xmlns="" xmlns:p14="http://schemas.microsoft.com/office/powerpoint/2010/main" xmlns:pr="smNativeData" val="SMDATA_13_aDXlXhMAAAAlAAAAZAAAAA0AAAAAjgAAAEcAAACOAAAARwAAAAAAAAAAAAAAAAAAAAEAAABQAAAAAAAAAAAA4D8AAAAAAADgPwAAAAAAAOA/AAAAAAAA4D8AAAAAAADgPwAAAAAAAOA/AAAAAAAA4D8AAAAAAADgPwAAAAAAAOA/AAAAAAAA4D8CAAAAjAAAAAAAAAAAAAAAT4G9DP///wgAAAAAAAAAAAAAAAAAAAAAAAAAAAAAAAAAAAAAZAAAAAEAAABAAAAAAAAAAAAAAAAAAAAAAAAAAAAAAAAAAAAAAAAAAAAAAAAAAAAAAAAAAAAAAAAAAAAAAAAAAAAAAAAAAAAAAAAAAAAAAAAAAAAAAAAAAAAAAAAAAAAAFAAAADwAAAAAAAAAAAAAAAAAAAkUAAAAAQAAABQAAAAUAAAAFAAAAAEAAAAAAAAAZAAAAGQAAAAAAAAAZAAAAGQAAAAVAAAAYAAAAAAAAAAAAAAADwAAACADAAAAAAAAAAAAAAEAAACgMgAAVgcAAKr4//8BAAAAf39/AAEAAABkAAAAAAAAABQAAABAHwAAAAAAACYAAAAAAAAAwOD//wAAAAAmAAAAZAAAABYAAABMAAAAAAAAAAAAAAAEAAAAAAAAAAEAAADu7OEKAAAAACgAAAAoAAAAZAAAAGQAAAAAAAAAzMzMAAAAAABQAAAAUAAAAGQAAABkAAAAAAAAABcAAAAUAAAAAAAAAAAAAAD/fwAA/38AAAAAAAAJAAAABAAAAAAAAAAMAAAAEAAAAAAAAAAAAAAAAAAAAAAAAAAeAAAAaAAAAAAAAAAAAAAAAAAAAAAAAAAAAAAAECcAABAnAAAAAAAAAAAAAAAAAAAAAAAAAAAAAAAAAAAAAAAAAAAAABQAAAAAAAAAwMD/AAAAAABkAAAAMgAAAAAAAABkAAAAAAAAAH9/fwAKAAAAHwAAAFQAAABPgb0F////AQAAAAAAAAAAAAAAAAAAAAAAAAAAAAAAAAAAAAAAAAAAAAAAAn9/fwDu7OEDzMzMAMDA/wB/f38AAAAAAAAAAAAAAAAAAAAAAAAAAAAhAAAAGAAAABQAAABJBwAACAcAAD44AADeCQAAEAAAACYAAAAIAAAA//////////8="/>
+                <pr:smNativeData xmlns:pr="smNativeData" xmlns:p14="http://schemas.microsoft.com/office/powerpoint/2010/main" xmlns="" val="SMDATA_13_aDXlXhMAAAAlAAAAZAAAAA0AAAAAjgAAAEcAAACOAAAARwAAAAAAAAAAAAAAAAAAAAEAAABQAAAAAAAAAAAA4D8AAAAAAADgPwAAAAAAAOA/AAAAAAAA4D8AAAAAAADgPwAAAAAAAOA/AAAAAAAA4D8AAAAAAADgPwAAAAAAAOA/AAAAAAAA4D8CAAAAjAAAAAAAAAAAAAAAT4G9DP///wgAAAAAAAAAAAAAAAAAAAAAAAAAAAAAAAAAAAAAZAAAAAEAAABAAAAAAAAAAAAAAAAAAAAAAAAAAAAAAAAAAAAAAAAAAAAAAAAAAAAAAAAAAAAAAAAAAAAAAAAAAAAAAAAAAAAAAAAAAAAAAAAAAAAAAAAAAAAAAAAAAAAAFAAAADwAAAAAAAAAAAAAAAAAAAkUAAAAAQAAABQAAAAUAAAAFAAAAAEAAAAAAAAAZAAAAGQAAAAAAAAAZAAAAGQAAAAVAAAAYAAAAAAAAAAAAAAADwAAACADAAAAAAAAAAAAAAEAAACgMgAAVgcAAKr4//8BAAAAf39/AAEAAABkAAAAAAAAABQAAABAHwAAAAAAACYAAAAAAAAAwOD//wAAAAAmAAAAZAAAABYAAABMAAAAAAAAAAAAAAAEAAAAAAAAAAEAAADu7OEKAAAAACgAAAAoAAAAZAAAAGQAAAAAAAAAzMzMAAAAAABQAAAAUAAAAGQAAABkAAAAAAAAABcAAAAUAAAAAAAAAAAAAAD/fwAA/38AAAAAAAAJAAAABAAAAAAAAAAMAAAAEAAAAAAAAAAAAAAAAAAAAAAAAAAeAAAAaAAAAAAAAAAAAAAAAAAAAAAAAAAAAAAAECcAABAnAAAAAAAAAAAAAAAAAAAAAAAAAAAAAAAAAAAAAAAAAAAAABQAAAAAAAAAwMD/AAAAAABkAAAAMgAAAAAAAABkAAAAAAAAAH9/fwAKAAAAHwAAAFQAAABPgb0F////AQAAAAAAAAAAAAAAAAAAAAAAAAAAAAAAAAAAAAAAAAAAAAAAAn9/fwDu7OEDzMzMAMDA/wB/f38AAAAAAAAAAAAAAAAAAAAAAAAAAAAhAAAAGAAAABQAAABJBwAACAcAAD44AADeCQAAEAAAACYAAAAIAAAA//////////8="/>
               </a:ext>
             </a:extLst>
           </p:cNvSpPr>
@@ -6699,7 +6752,7 @@
           <p:cNvSpPr>
             <a:extLst>
               <a:ext uri="smNativeData">
-                <pr:smNativeData xmlns="" xmlns:p14="http://schemas.microsoft.com/office/powerpoint/2010/main" xmlns:pr="smNativeData" val="SMDATA_13_aDXlXhMAAAAlAAAAZAAAAA0AAAAAjgAAAEcAAACOAAAARwAAAAAAAAABAAAAAAAAAAEAAABQAAAAAAAAAAAA4D8AAAAAAADgPwAAAAAAAOA/AAAAAAAA4D8AAAAAAADgPwAAAAAAAOA/AAAAAAAA4D8AAAAAAADgPwAAAAAAAOA/AAAAAAAA4D8CAAAAjAAAAAAAAAAAAAAAT4G9DP///wgAAAAAAAAAAAAAAAAAAAAAAAAAAAAAAAAAAAAAZAAAAAEAAABAAAAAAAAAAAAAAAAAAAAAAAAAAAAAAAAAAAAAAAAAAAAAAAAAAAAAAAAAAAAAAAAAAAAAAAAAAAAAAAAAAAAAAAAAAAAAAAAAAAAAAAAAAAAAAAAAAAAAFAAAADwAAAAAAAAAAAAAAAAAAAkUAAAAAQAAABQAAAAUAAAAFAAAAAEAAAAAAAAAZAAAAGQAAAAAAAAAZAAAAGQAAAAVAAAAYAAAAAAAAAAAAAAADwAAACADAAAAAAAAAAAAAAEAAACgMgAAVgcAAKr4//8BAAAAf39/AAEAAABkAAAAAAAAABQAAABAHwAAAAAAACYAAAAAAAAAwOD//wAAAAAmAAAAZAAAABYAAABMAAAAAAAAAAAAAAAEAAAAAAAAAAEAAADu7OEKAAAAACgAAAAoAAAAZAAAAGQAAAAAAAAAzMzMAAAAAABQAAAAUAAAAGQAAABkAAAAAAAAABcAAAAUAAAAAAAAAAAAAAD/fwAA/38AAAAAAAAJAAAABAAAAOXl5f8MAAAAEAAAAAAAAAAAAAAAAAAAAAAAAAAeAAAAaAAAAAAAAAAAAAAAAAAAAAAAAAAAAAAAECcAABAnAAAAAAAAAAAAAAAAAAAAAAAAAAAAAAAAAAAAAAAAAAAAABQAAAAAAAAAwMD/AAAAAABkAAAAMgAAAAAAAABkAAAAAAAAAH9/fwAKAAAAHwAAAFQAAABPgb0F////AQAAAAAAAAAAAAAAAAAAAAAAAAAAAAAAAAAAAAAAAAAAAAAAAn9/fwDu7OEDzMzMAMDA/wB/f38AAAAAAAAAAAAAAAAAAAAAAAAAAAAhAAAAGAAAABQAAAAAAAAA9AkAAFwtAAACJwAAEAAAACYAAAAIAAAA//////////8="/>
+                <pr:smNativeData xmlns:pr="smNativeData" xmlns:p14="http://schemas.microsoft.com/office/powerpoint/2010/main" xmlns="" val="SMDATA_13_aDXlXhMAAAAlAAAAZAAAAA0AAAAAjgAAAEcAAACOAAAARwAAAAAAAAABAAAAAAAAAAEAAABQAAAAAAAAAAAA4D8AAAAAAADgPwAAAAAAAOA/AAAAAAAA4D8AAAAAAADgPwAAAAAAAOA/AAAAAAAA4D8AAAAAAADgPwAAAAAAAOA/AAAAAAAA4D8CAAAAjAAAAAAAAAAAAAAAT4G9DP///wgAAAAAAAAAAAAAAAAAAAAAAAAAAAAAAAAAAAAAZAAAAAEAAABAAAAAAAAAAAAAAAAAAAAAAAAAAAAAAAAAAAAAAAAAAAAAAAAAAAAAAAAAAAAAAAAAAAAAAAAAAAAAAAAAAAAAAAAAAAAAAAAAAAAAAAAAAAAAAAAAAAAAFAAAADwAAAAAAAAAAAAAAAAAAAkUAAAAAQAAABQAAAAUAAAAFAAAAAEAAAAAAAAAZAAAAGQAAAAAAAAAZAAAAGQAAAAVAAAAYAAAAAAAAAAAAAAADwAAACADAAAAAAAAAAAAAAEAAACgMgAAVgcAAKr4//8BAAAAf39/AAEAAABkAAAAAAAAABQAAABAHwAAAAAAACYAAAAAAAAAwOD//wAAAAAmAAAAZAAAABYAAABMAAAAAAAAAAAAAAAEAAAAAAAAAAEAAADu7OEKAAAAACgAAAAoAAAAZAAAAGQAAAAAAAAAzMzMAAAAAABQAAAAUAAAAGQAAABkAAAAAAAAABcAAAAUAAAAAAAAAAAAAAD/fwAA/38AAAAAAAAJAAAABAAAAOXl5f8MAAAAEAAAAAAAAAAAAAAAAAAAAAAAAAAeAAAAaAAAAAAAAAAAAAAAAAAAAAAAAAAAAAAAECcAABAnAAAAAAAAAAAAAAAAAAAAAAAAAAAAAAAAAAAAAAAAAAAAABQAAAAAAAAAwMD/AAAAAABkAAAAMgAAAAAAAABkAAAAAAAAAH9/fwAKAAAAHwAAAFQAAABPgb0F////AQAAAAAAAAAAAAAAAAAAAAAAAAAAAAAAAAAAAAAAAAAAAAAAAn9/fwDu7OEDzMzMAMDA/wB/f38AAAAAAAAAAAAAAAAAAAAAAAAAAAAhAAAAGAAAABQAAAAAAAAA9AkAAFwtAAACJwAAEAAAACYAAAAIAAAA//////////8="/>
               </a:ext>
             </a:extLst>
           </p:cNvSpPr>
@@ -6829,40 +6882,7 @@
                 <a:ea typeface="Trebuchet MS" charset="0"/>
                 <a:cs typeface="Calibri" panose="020F0502020204030204" pitchFamily="34" charset="0"/>
               </a:rPr>
-              <a:t>The values assigned to power consuming events in the simulator are assumed to be close to real world values.</a:t>
-            </a:r>
-          </a:p>
-          <a:p>
-            <a:pPr marL="285750" indent="-285750">
-              <a:lnSpc>
-                <a:spcPct val="100000"/>
-              </a:lnSpc>
-              <a:buFont typeface="Arial" panose="020B0604020202020204" pitchFamily="34" charset="0"/>
-              <a:buChar char="•"/>
-              <a:defRPr lang="en-us"/>
-            </a:pPr>
-            <a:endParaRPr lang="en-IN" sz="2000" dirty="0">
-              <a:latin typeface="Calibri" panose="020F0502020204030204" pitchFamily="34" charset="0"/>
-              <a:ea typeface="Trebuchet MS" charset="0"/>
-              <a:cs typeface="Calibri" panose="020F0502020204030204" pitchFamily="34" charset="0"/>
-            </a:endParaRPr>
-          </a:p>
-          <a:p>
-            <a:pPr marL="285750" indent="-285750">
-              <a:lnSpc>
-                <a:spcPct val="100000"/>
-              </a:lnSpc>
-              <a:buFont typeface="Arial" panose="020B0604020202020204" pitchFamily="34" charset="0"/>
-              <a:buChar char="•"/>
-              <a:defRPr lang="en-us"/>
-            </a:pPr>
-            <a:r>
-              <a:rPr lang="en-in" sz="2000" dirty="0" smtClean="0">
-                <a:latin typeface="Calibri" panose="020F0502020204030204" pitchFamily="34" charset="0"/>
-                <a:ea typeface="Trebuchet MS" charset="0"/>
-                <a:cs typeface="Calibri" panose="020F0502020204030204" pitchFamily="34" charset="0"/>
-              </a:rPr>
-              <a:t>The design of the cus</a:t>
+              <a:t>The values assigned to power consuming events in the simulator are assumed to be close to real world values</a:t>
             </a:r>
             <a:r>
               <a:rPr lang="en-IN" sz="2000" dirty="0" smtClean="0">
@@ -6870,17 +6890,9 @@
                 <a:ea typeface="Trebuchet MS" charset="0"/>
                 <a:cs typeface="Calibri" panose="020F0502020204030204" pitchFamily="34" charset="0"/>
               </a:rPr>
-              <a:t>to</a:t>
-            </a:r>
-            <a:r>
-              <a:rPr lang="en-in" sz="2000" dirty="0" smtClean="0">
-                <a:latin typeface="Calibri" panose="020F0502020204030204" pitchFamily="34" charset="0"/>
-                <a:ea typeface="Trebuchet MS" charset="0"/>
-                <a:cs typeface="Calibri" panose="020F0502020204030204" pitchFamily="34" charset="0"/>
-              </a:rPr>
-              <a:t>m zone layout is based on the properties of the memory storage devices i.e. SSDs and HDDs.</a:t>
-            </a:r>
-            <a:endParaRPr lang="en-in" sz="2000" dirty="0">
+              <a:t>.</a:t>
+            </a:r>
+            <a:endParaRPr lang="en-IN" sz="2000" dirty="0" smtClean="0">
               <a:latin typeface="Calibri" panose="020F0502020204030204" pitchFamily="34" charset="0"/>
               <a:ea typeface="Trebuchet MS" charset="0"/>
               <a:cs typeface="Calibri" panose="020F0502020204030204" pitchFamily="34" charset="0"/>
@@ -6932,7 +6944,7 @@
           <p:cNvSpPr>
             <a:extLst>
               <a:ext uri="smNativeData">
-                <pr:smNativeData xmlns="" xmlns:p14="http://schemas.microsoft.com/office/powerpoint/2010/main" xmlns:pr="smNativeData" val="SMDATA_13_aDXlXhMAAAAlAAAAZAAAAA0AAAAAkAAAAEgAAACQAAAASAAAAAAAAAAAAAAAAAAAAAEAAABQAAAAAAAAAAAA4D8AAAAAAADgPwAAAAAAAOA/AAAAAAAA4D8AAAAAAADgPwAAAAAAAOA/AAAAAAAA4D8AAAAAAADgPwAAAAAAAOA/AAAAAAAA4D8CAAAAjAAAAAEAAAAAAAAAM8zMAP///wgAAAAAAAAAAAAAAAAAAAAAAAAAAAAAAAAAAAAAeAAAAAEAAABAAAAAAAAAAAAAAABaAAAAAAAAAAAAAAAAAAAAAAAAAAAAAAAAAAAAAAAAAAAAAAAAAAAAAAAAAAAAAAAAAAAAAAAAAAAAAAAAAAAAAAAAAAAAAAAAAAAAFAAAADwAAAAAAAAAAAAAAAAAAAkUAAAAAQAAABQAAAAUAAAAFAAAAAEAAAAAAAAAZAAAAGQAAAAAAAAAZAAAAGQAAAAVAAAAYAAAAAAAAAAAAAAADwAAACADAAAAAAAAAAAAAAEAAACgMgAAVgcAAKr4//8BAAAAf39/AAEAAABkAAAAAAAAABQAAABAHwAAAAAAACYAAAAAAAAAwOD//wAAAAAmAAAAZAAAABYAAABMAAAAAAAAAAAAAAAEAAAAAAAAAAEAAADu7OEKAAAAACgAAAAoAAAAZAAAAGQAAAAAAAAAzMzMAAAAAABQAAAAUAAAAGQAAABkAAAAAAAAABcAAAAUAAAAAAAAAAAAAAD/fwAA/38AAAAAAAAJAAAABAAAAAAAAAAMAAAAEAAAAAAAAAAAAAAAAAAAAAAAAAAeAAAAaAAAAAAAAAAAAAAAAAAAAAAAAAAAAAAAECcAABAnAAAAAAAAAAAAAAAAAAAAAAAAAAAAAAAAAAAAAAAAAAAAABQAAAAAAAAAwMD/AAAAAABkAAAAMgAAAAAAAABkAAAAAAAAAH9/fwAKAAAAHwAAAFQAAAAzzMwA////AQAAAAAAAAAAAAAAAAAAAAAAAAAAAAAAAAAAAAAAAAAAAAAAAn9/fwDu7OEDzMzMAMDA/wB/f38AAAAAAAAAAAAAAAAAAAAAAAAAAAAhAAAAGAAAABQAAABgCQAAugkAAD44AADyCQAAEAAAACYAAAAIAAAA//////////8="/>
+                <pr:smNativeData xmlns:pr="smNativeData" xmlns:p14="http://schemas.microsoft.com/office/powerpoint/2010/main" xmlns="" val="SMDATA_13_aDXlXhMAAAAlAAAAZAAAAA0AAAAAkAAAAEgAAACQAAAASAAAAAAAAAAAAAAAAAAAAAEAAABQAAAAAAAAAAAA4D8AAAAAAADgPwAAAAAAAOA/AAAAAAAA4D8AAAAAAADgPwAAAAAAAOA/AAAAAAAA4D8AAAAAAADgPwAAAAAAAOA/AAAAAAAA4D8CAAAAjAAAAAEAAAAAAAAAM8zMAP///wgAAAAAAAAAAAAAAAAAAAAAAAAAAAAAAAAAAAAAeAAAAAEAAABAAAAAAAAAAAAAAABaAAAAAAAAAAAAAAAAAAAAAAAAAAAAAAAAAAAAAAAAAAAAAAAAAAAAAAAAAAAAAAAAAAAAAAAAAAAAAAAAAAAAAAAAAAAAAAAAAAAAFAAAADwAAAAAAAAAAAAAAAAAAAkUAAAAAQAAABQAAAAUAAAAFAAAAAEAAAAAAAAAZAAAAGQAAAAAAAAAZAAAAGQAAAAVAAAAYAAAAAAAAAAAAAAADwAAACADAAAAAAAAAAAAAAEAAACgMgAAVgcAAKr4//8BAAAAf39/AAEAAABkAAAAAAAAABQAAABAHwAAAAAAACYAAAAAAAAAwOD//wAAAAAmAAAAZAAAABYAAABMAAAAAAAAAAAAAAAEAAAAAAAAAAEAAADu7OEKAAAAACgAAAAoAAAAZAAAAGQAAAAAAAAAzMzMAAAAAABQAAAAUAAAAGQAAABkAAAAAAAAABcAAAAUAAAAAAAAAAAAAAD/fwAA/38AAAAAAAAJAAAABAAAAAAAAAAMAAAAEAAAAAAAAAAAAAAAAAAAAAAAAAAeAAAAaAAAAAAAAAAAAAAAAAAAAAAAAAAAAAAAECcAABAnAAAAAAAAAAAAAAAAAAAAAAAAAAAAAAAAAAAAAAAAAAAAABQAAAAAAAAAwMD/AAAAAABkAAAAMgAAAAAAAABkAAAAAAAAAH9/fwAKAAAAHwAAAFQAAAAzzMwA////AQAAAAAAAAAAAAAAAAAAAAAAAAAAAAAAAAAAAAAAAAAAAAAAAn9/fwDu7OEDzMzMAMDA/wB/f38AAAAAAAAAAAAAAAAAAAAAAAAAAAAhAAAAGAAAABQAAABgCQAAugkAAD44AADyCQAAEAAAACYAAAAIAAAA//////////8="/>
               </a:ext>
             </a:extLst>
           </p:cNvSpPr>
@@ -6961,7 +6973,7 @@
           <p:cNvSpPr>
             <a:extLst>
               <a:ext uri="smNativeData">
-                <pr:smNativeData xmlns="" xmlns:p14="http://schemas.microsoft.com/office/powerpoint/2010/main" xmlns:pr="smNativeData" val="SMDATA_13_aDXlXhMAAAAlAAAAZAAAAA0AAAAAjgAAAEcAAACOAAAARwAAAAAAAAAAAAAAAAAAAAEAAABQAAAAAAAAAAAA4D8AAAAAAADgPwAAAAAAAOA/AAAAAAAA4D8AAAAAAADgPwAAAAAAAOA/AAAAAAAA4D8AAAAAAADgPwAAAAAAAOA/AAAAAAAA4D8CAAAAjAAAAAAAAAAAAAAAT4G9DP///wgAAAAAAAAAAAAAAAAAAAAAAAAAAAAAAAAAAAAAZAAAAAEAAABAAAAAAAAAAAAAAAAAAAAAAAAAAAAAAAAAAAAAAAAAAAAAAAAAAAAAAAAAAAAAAAAAAAAAAAAAAAAAAAAAAAAAAAAAAAAAAAAAAAAAAAAAAAAAAAAAAAAAFAAAADwAAAAAAAAAAAAAAAAAAAkUAAAAAQAAABQAAAAUAAAAFAAAAAEAAAAAAAAAZAAAAGQAAAAAAAAAZAAAAGQAAAAVAAAAYAAAAAAAAAAAAAAADwAAACADAAAAAAAAAAAAAAEAAACgMgAAVgcAAKr4//8BAAAAf39/AAEAAABkAAAAAAAAABQAAABAHwAAAAAAACYAAAAAAAAAwOD//wAAAAAmAAAAZAAAABYAAABMAAAAAAAAAAAAAAAEAAAAAAAAAAEAAADu7OEKAAAAACgAAAAoAAAAZAAAAGQAAAAAAAAAzMzMAAAAAABQAAAAUAAAAGQAAABkAAAAAAAAABcAAAAUAAAAAAAAAAAAAAD/fwAA/38AAAAAAAAJAAAABAAAAAAAAAAMAAAAEAAAAAAAAAAAAAAAAAAAAAAAAAAeAAAAaAAAAAAAAAAAAAAAAAAAAAAAAAAAAAAAECcAABAnAAAAAAAAAAAAAAAAAAAAAAAAAAAAAAAAAAAAAAAAAAAAABQAAAAAAAAAwMD/AAAAAABkAAAAMgAAAAAAAABkAAAAAAAAAH9/fwAKAAAAHwAAAFQAAABPgb0F////AQAAAAAAAAAAAAAAAAAAAAAAAAAAAAAAAAAAAAAAAAAAAAAAAn9/fwDu7OEDzMzMAMDA/wB/f38AAAAAAAAAAAAAAAAAAAAAAAAAAAAhAAAAGAAAABQAAABwCAAACAcAAD44AADeCQAAEAAAACYAAAAIAAAA//////////8="/>
+                <pr:smNativeData xmlns:pr="smNativeData" xmlns:p14="http://schemas.microsoft.com/office/powerpoint/2010/main" xmlns="" val="SMDATA_13_aDXlXhMAAAAlAAAAZAAAAA0AAAAAjgAAAEcAAACOAAAARwAAAAAAAAAAAAAAAAAAAAEAAABQAAAAAAAAAAAA4D8AAAAAAADgPwAAAAAAAOA/AAAAAAAA4D8AAAAAAADgPwAAAAAAAOA/AAAAAAAA4D8AAAAAAADgPwAAAAAAAOA/AAAAAAAA4D8CAAAAjAAAAAAAAAAAAAAAT4G9DP///wgAAAAAAAAAAAAAAAAAAAAAAAAAAAAAAAAAAAAAZAAAAAEAAABAAAAAAAAAAAAAAAAAAAAAAAAAAAAAAAAAAAAAAAAAAAAAAAAAAAAAAAAAAAAAAAAAAAAAAAAAAAAAAAAAAAAAAAAAAAAAAAAAAAAAAAAAAAAAAAAAAAAAFAAAADwAAAAAAAAAAAAAAAAAAAkUAAAAAQAAABQAAAAUAAAAFAAAAAEAAAAAAAAAZAAAAGQAAAAAAAAAZAAAAGQAAAAVAAAAYAAAAAAAAAAAAAAADwAAACADAAAAAAAAAAAAAAEAAACgMgAAVgcAAKr4//8BAAAAf39/AAEAAABkAAAAAAAAABQAAABAHwAAAAAAACYAAAAAAAAAwOD//wAAAAAmAAAAZAAAABYAAABMAAAAAAAAAAAAAAAEAAAAAAAAAAEAAADu7OEKAAAAACgAAAAoAAAAZAAAAGQAAAAAAAAAzMzMAAAAAABQAAAAUAAAAGQAAABkAAAAAAAAABcAAAAUAAAAAAAAAAAAAAD/fwAA/38AAAAAAAAJAAAABAAAAAAAAAAMAAAAEAAAAAAAAAAAAAAAAAAAAAAAAAAeAAAAaAAAAAAAAAAAAAAAAAAAAAAAAAAAAAAAECcAABAnAAAAAAAAAAAAAAAAAAAAAAAAAAAAAAAAAAAAAAAAAAAAABQAAAAAAAAAwMD/AAAAAABkAAAAMgAAAAAAAABkAAAAAAAAAH9/fwAKAAAAHwAAAFQAAABPgb0F////AQAAAAAAAAAAAAAAAAAAAAAAAAAAAAAAAAAAAAAAAAAAAAAAAn9/fwDu7OEDzMzMAMDA/wB/f38AAAAAAAAAAAAAAAAAAAAAAAAAAAAhAAAAGAAAABQAAABwCAAACAcAAD44AADeCQAAEAAAACYAAAAIAAAA//////////8="/>
               </a:ext>
             </a:extLst>
           </p:cNvSpPr>
@@ -7068,7 +7080,7 @@
           <p:cNvSpPr>
             <a:extLst>
               <a:ext uri="smNativeData">
-                <pr:smNativeData xmlns="" xmlns:p14="http://schemas.microsoft.com/office/powerpoint/2010/main" xmlns:pr="smNativeData" val="SMDATA_13_aDXlXhMAAAAlAAAAZAAAAA0AAAAAkAAAAEgAAACQAAAASAAAAAAAAAAAAAAAAAAAAAEAAABQAAAAAAAAAAAA4D8AAAAAAADgPwAAAAAAAOA/AAAAAAAA4D8AAAAAAADgPwAAAAAAAOA/AAAAAAAA4D8AAAAAAADgPwAAAAAAAOA/AAAAAAAA4D8CAAAAjAAAAAEAAAAAAAAAM8zMAP///wgAAAAAAAAAAAAAAAAAAAAAAAAAAAAAAAAAAAAAeAAAAAEAAABAAAAAAAAAAAAAAABaAAAAAAAAAAAAAAAAAAAAAAAAAAAAAAAAAAAAAAAAAAAAAAAAAAAAAAAAAAAAAAAAAAAAAAAAAAAAAAAAAAAAAAAAAAAAAAAAAAAAFAAAADwAAAAAAAAAAAAAAAAAAAkUAAAAAQAAABQAAAAUAAAAFAAAAAEAAAAAAAAAZAAAAGQAAAAAAAAAZAAAAGQAAAAVAAAAYAAAAAAAAAAAAAAADwAAACADAAAAAAAAAAAAAAEAAACgMgAAVgcAAKr4//8BAAAAf39/AAEAAABkAAAAAAAAABQAAABAHwAAAAAAACYAAAAAAAAAwOD//wAAAAAmAAAAZAAAABYAAABMAAAAAAAAAAAAAAAEAAAAAAAAAAEAAADu7OEKAAAAACgAAAAoAAAAZAAAAGQAAAAAAAAAzMzMAAAAAABQAAAAUAAAAGQAAABkAAAAAAAAABcAAAAUAAAAAAAAAAAAAAD/fwAA/38AAAAAAAAJAAAABAAAAAAAAAAMAAAAEAAAAAAAAAAAAAAAAAAAAAAAAAAeAAAAaAAAAAAAAAAAAAAAAAAAAAAAAAAAAAAAECcAABAnAAAAAAAAAAAAAAAAAAAAAAAAAAAAAAAAAAAAAAAAAAAAABQAAAAAAAAAwMD/AAAAAABkAAAAMgAAAAAAAABkAAAAAAAAAH9/fwAKAAAAHwAAAFQAAAAzzMwA////AQAAAAAAAAAAAAAAAAAAAAAAAAAAAAAAAAAAAAAAAAAAAAAAAn9/fwDu7OEDzMzMAMDA/wB/f38AAAAAAAAAAAAAAAAAAAAAAAAAAAAhAAAAGAAAABQAAABgCQAAugkAAD44AADyCQAAEAAAACYAAAAIAAAA//////////8="/>
+                <pr:smNativeData xmlns:pr="smNativeData" xmlns:p14="http://schemas.microsoft.com/office/powerpoint/2010/main" xmlns="" val="SMDATA_13_aDXlXhMAAAAlAAAAZAAAAA0AAAAAkAAAAEgAAACQAAAASAAAAAAAAAAAAAAAAAAAAAEAAABQAAAAAAAAAAAA4D8AAAAAAADgPwAAAAAAAOA/AAAAAAAA4D8AAAAAAADgPwAAAAAAAOA/AAAAAAAA4D8AAAAAAADgPwAAAAAAAOA/AAAAAAAA4D8CAAAAjAAAAAEAAAAAAAAAM8zMAP///wgAAAAAAAAAAAAAAAAAAAAAAAAAAAAAAAAAAAAAeAAAAAEAAABAAAAAAAAAAAAAAABaAAAAAAAAAAAAAAAAAAAAAAAAAAAAAAAAAAAAAAAAAAAAAAAAAAAAAAAAAAAAAAAAAAAAAAAAAAAAAAAAAAAAAAAAAAAAAAAAAAAAFAAAADwAAAAAAAAAAAAAAAAAAAkUAAAAAQAAABQAAAAUAAAAFAAAAAEAAAAAAAAAZAAAAGQAAAAAAAAAZAAAAGQAAAAVAAAAYAAAAAAAAAAAAAAADwAAACADAAAAAAAAAAAAAAEAAACgMgAAVgcAAKr4//8BAAAAf39/AAEAAABkAAAAAAAAABQAAABAHwAAAAAAACYAAAAAAAAAwOD//wAAAAAmAAAAZAAAABYAAABMAAAAAAAAAAAAAAAEAAAAAAAAAAEAAADu7OEKAAAAACgAAAAoAAAAZAAAAGQAAAAAAAAAzMzMAAAAAABQAAAAUAAAAGQAAABkAAAAAAAAABcAAAAUAAAAAAAAAAAAAAD/fwAA/38AAAAAAAAJAAAABAAAAAAAAAAMAAAAEAAAAAAAAAAAAAAAAAAAAAAAAAAeAAAAaAAAAAAAAAAAAAAAAAAAAAAAAAAAAAAAECcAABAnAAAAAAAAAAAAAAAAAAAAAAAAAAAAAAAAAAAAAAAAAAAAABQAAAAAAAAAwMD/AAAAAABkAAAAMgAAAAAAAABkAAAAAAAAAH9/fwAKAAAAHwAAAFQAAAAzzMwA////AQAAAAAAAAAAAAAAAAAAAAAAAAAAAAAAAAAAAAAAAAAAAAAAAn9/fwDu7OEDzMzMAMDA/wB/f38AAAAAAAAAAAAAAAAAAAAAAAAAAAAhAAAAGAAAABQAAABgCQAAugkAAD44AADyCQAAEAAAACYAAAAIAAAA//////////8="/>
               </a:ext>
             </a:extLst>
           </p:cNvSpPr>
@@ -7097,7 +7109,7 @@
           <p:cNvSpPr>
             <a:extLst>
               <a:ext uri="smNativeData">
-                <pr:smNativeData xmlns="" xmlns:p14="http://schemas.microsoft.com/office/powerpoint/2010/main" xmlns:pr="smNativeData" val="SMDATA_13_aDXlXhMAAAAlAAAAZAAAAA0AAAAAjgAAAEcAAACOAAAARwAAAAAAAAAAAAAAAAAAAAEAAABQAAAAAAAAAAAA4D8AAAAAAADgPwAAAAAAAOA/AAAAAAAA4D8AAAAAAADgPwAAAAAAAOA/AAAAAAAA4D8AAAAAAADgPwAAAAAAAOA/AAAAAAAA4D8CAAAAjAAAAAAAAAAAAAAAT4G9DP///wgAAAAAAAAAAAAAAAAAAAAAAAAAAAAAAAAAAAAAZAAAAAEAAABAAAAAAAAAAAAAAAAAAAAAAAAAAAAAAAAAAAAAAAAAAAAAAAAAAAAAAAAAAAAAAAAAAAAAAAAAAAAAAAAAAAAAAAAAAAAAAAAAAAAAAAAAAAAAAAAAAAAAFAAAADwAAAAAAAAAAAAAAAAAAAkUAAAAAQAAABQAAAAUAAAAFAAAAAEAAAAAAAAAZAAAAGQAAAAAAAAAZAAAAGQAAAAVAAAAYAAAAAAAAAAAAAAADwAAACADAAAAAAAAAAAAAAEAAACgMgAAVgcAAKr4//8BAAAAf39/AAEAAABkAAAAAAAAABQAAABAHwAAAAAAACYAAAAAAAAAwOD//wAAAAAmAAAAZAAAABYAAABMAAAAAAAAAAAAAAAEAAAAAAAAAAEAAADu7OEKAAAAACgAAAAoAAAAZAAAAGQAAAAAAAAAzMzMAAAAAABQAAAAUAAAAGQAAABkAAAAAAAAABcAAAAUAAAAAAAAAAAAAAD/fwAA/38AAAAAAAAJAAAABAAAAAAAAAAMAAAAEAAAAAAAAAAAAAAAAAAAAAAAAAAeAAAAaAAAAAAAAAAAAAAAAAAAAAAAAAAAAAAAECcAABAnAAAAAAAAAAAAAAAAAAAAAAAAAAAAAAAAAAAAAAAAAAAAABQAAAAAAAAAwMD/AAAAAABkAAAAMgAAAAAAAABkAAAAAAAAAH9/fwAKAAAAHwAAAFQAAABPgb0F////AQAAAAAAAAAAAAAAAAAAAAAAAAAAAAAAAAAAAAAAAAAAAAAAAn9/fwDu7OEDzMzMAMDA/wB/f38AAAAAAAAAAAAAAAAAAAAAAAAAAAAhAAAAGAAAABQAAABwCAAACAcAAD44AADeCQAAEAAAACYAAAAIAAAA//////////8="/>
+                <pr:smNativeData xmlns:pr="smNativeData" xmlns:p14="http://schemas.microsoft.com/office/powerpoint/2010/main" xmlns="" val="SMDATA_13_aDXlXhMAAAAlAAAAZAAAAA0AAAAAjgAAAEcAAACOAAAARwAAAAAAAAAAAAAAAAAAAAEAAABQAAAAAAAAAAAA4D8AAAAAAADgPwAAAAAAAOA/AAAAAAAA4D8AAAAAAADgPwAAAAAAAOA/AAAAAAAA4D8AAAAAAADgPwAAAAAAAOA/AAAAAAAA4D8CAAAAjAAAAAAAAAAAAAAAT4G9DP///wgAAAAAAAAAAAAAAAAAAAAAAAAAAAAAAAAAAAAAZAAAAAEAAABAAAAAAAAAAAAAAAAAAAAAAAAAAAAAAAAAAAAAAAAAAAAAAAAAAAAAAAAAAAAAAAAAAAAAAAAAAAAAAAAAAAAAAAAAAAAAAAAAAAAAAAAAAAAAAAAAAAAAFAAAADwAAAAAAAAAAAAAAAAAAAkUAAAAAQAAABQAAAAUAAAAFAAAAAEAAAAAAAAAZAAAAGQAAAAAAAAAZAAAAGQAAAAVAAAAYAAAAAAAAAAAAAAADwAAACADAAAAAAAAAAAAAAEAAACgMgAAVgcAAKr4//8BAAAAf39/AAEAAABkAAAAAAAAABQAAABAHwAAAAAAACYAAAAAAAAAwOD//wAAAAAmAAAAZAAAABYAAABMAAAAAAAAAAAAAAAEAAAAAAAAAAEAAADu7OEKAAAAACgAAAAoAAAAZAAAAGQAAAAAAAAAzMzMAAAAAABQAAAAUAAAAGQAAABkAAAAAAAAABcAAAAUAAAAAAAAAAAAAAD/fwAA/38AAAAAAAAJAAAABAAAAAAAAAAMAAAAEAAAAAAAAAAAAAAAAAAAAAAAAAAeAAAAaAAAAAAAAAAAAAAAAAAAAAAAAAAAAAAAECcAABAnAAAAAAAAAAAAAAAAAAAAAAAAAAAAAAAAAAAAAAAAAAAAABQAAAAAAAAAwMD/AAAAAABkAAAAMgAAAAAAAABkAAAAAAAAAH9/fwAKAAAAHwAAAFQAAABPgb0F////AQAAAAAAAAAAAAAAAAAAAAAAAAAAAAAAAAAAAAAAAAAAAAAAAn9/fwDu7OEDzMzMAMDA/wB/f38AAAAAAAAAAAAAAAAAAAAAAAAAAAAhAAAAGAAAABQAAABwCAAACAcAAD44AADeCQAAEAAAACYAAAAIAAAA//////////8="/>
               </a:ext>
             </a:extLst>
           </p:cNvSpPr>
@@ -7155,7 +7167,7 @@
           <p:cNvSpPr>
             <a:extLst>
               <a:ext uri="smNativeData">
-                <pr:smNativeData xmlns="" xmlns:p14="http://schemas.microsoft.com/office/powerpoint/2010/main" xmlns:pr="smNativeData" val="SMDATA_13_aDXlXhMAAAAlAAAAZAAAAA0AAAAAjgAAAEcAAACOAAAARwAAAAAAAAABAAAAAAAAAAEAAABQAAAAAAAAAAAA4D8AAAAAAADgPwAAAAAAAOA/AAAAAAAA4D8AAAAAAADgPwAAAAAAAOA/AAAAAAAA4D8AAAAAAADgPwAAAAAAAOA/AAAAAAAA4D8CAAAAjAAAAAAAAAAAAAAAT4G9DP///wgAAAAAAAAAAAAAAAAAAAAAAAAAAAAAAAAAAAAAZAAAAAEAAABAAAAAAAAAAAAAAAAAAAAAAAAAAAAAAAAAAAAAAAAAAAAAAAAAAAAAAAAAAAAAAAAAAAAAAAAAAAAAAAAAAAAAAAAAAAAAAAAAAAAAAAAAAAAAAAAAAAAAFAAAADwAAAAAAAAAAAAAAAAAAAkUAAAAAQAAABQAAAAUAAAAFAAAAAEAAAAAAAAAZAAAAGQAAAAAAAAAZAAAAGQAAAAVAAAAYAAAAAAAAAAAAAAADwAAACADAAAAAAAAAAAAAAEAAACgMgAAVgcAAKr4//8BAAAAf39/AAEAAABkAAAAAAAAABQAAABAHwAAAAAAACYAAAAAAAAAwOD//wAAAAAmAAAAZAAAABYAAABMAAAAAAAAAAAAAAAEAAAAAAAAAAEAAADu7OEKAAAAACgAAAAoAAAAZAAAAGQAAAAAAAAAzMzMAAAAAABQAAAAUAAAAGQAAABkAAAAAAAAABcAAAAUAAAAAAAAAAAAAAD/fwAA/38AAAAAAAAJAAAABAAAAAAAAAAMAAAAEAAAAAAAAAAAAAAAAAAAAAAAAAAeAAAAaAAAAAAAAAAAAAAAAAAAAAAAAAAAAAAAECcAABAnAAAAAAAAAAAAAAAAAAAAAAAAAAAAAAAAAAAAAAAAAAAAABQAAAAAAAAAwMD/AAAAAABkAAAAMgAAAAAAAABkAAAAAAAAAH9/fwAKAAAAHwAAAFQAAABPgb0F////AQAAAAAAAAAAAAAAAAAAAAAAAAAAAAAAAAAAAAAAAAAAAAAAAn9/fwDu7OEDzMzMAMDA/wB/f38AAAAAAAAAAAAAAAAAAAAAAAAAAAAhAAAAGAAAABQAAAAuAwAAIA0AAEUuAAAWJAAAEAAAACYAAAAIAAAA//////////8="/>
+                <pr:smNativeData xmlns:pr="smNativeData" xmlns:p14="http://schemas.microsoft.com/office/powerpoint/2010/main" xmlns="" val="SMDATA_13_aDXlXhMAAAAlAAAAZAAAAA0AAAAAjgAAAEcAAACOAAAARwAAAAAAAAABAAAAAAAAAAEAAABQAAAAAAAAAAAA4D8AAAAAAADgPwAAAAAAAOA/AAAAAAAA4D8AAAAAAADgPwAAAAAAAOA/AAAAAAAA4D8AAAAAAADgPwAAAAAAAOA/AAAAAAAA4D8CAAAAjAAAAAAAAAAAAAAAT4G9DP///wgAAAAAAAAAAAAAAAAAAAAAAAAAAAAAAAAAAAAAZAAAAAEAAABAAAAAAAAAAAAAAAAAAAAAAAAAAAAAAAAAAAAAAAAAAAAAAAAAAAAAAAAAAAAAAAAAAAAAAAAAAAAAAAAAAAAAAAAAAAAAAAAAAAAAAAAAAAAAAAAAAAAAFAAAADwAAAAAAAAAAAAAAAAAAAkUAAAAAQAAABQAAAAUAAAAFAAAAAEAAAAAAAAAZAAAAGQAAAAAAAAAZAAAAGQAAAAVAAAAYAAAAAAAAAAAAAAADwAAACADAAAAAAAAAAAAAAEAAACgMgAAVgcAAKr4//8BAAAAf39/AAEAAABkAAAAAAAAABQAAABAHwAAAAAAACYAAAAAAAAAwOD//wAAAAAmAAAAZAAAABYAAABMAAAAAAAAAAAAAAAEAAAAAAAAAAEAAADu7OEKAAAAACgAAAAoAAAAZAAAAGQAAAAAAAAAzMzMAAAAAABQAAAAUAAAAGQAAABkAAAAAAAAABcAAAAUAAAAAAAAAAAAAAD/fwAA/38AAAAAAAAJAAAABAAAAAAAAAAMAAAAEAAAAAAAAAAAAAAAAAAAAAAAAAAeAAAAaAAAAAAAAAAAAAAAAAAAAAAAAAAAAAAAECcAABAnAAAAAAAAAAAAAAAAAAAAAAAAAAAAAAAAAAAAAAAAAAAAABQAAAAAAAAAwMD/AAAAAABkAAAAMgAAAAAAAABkAAAAAAAAAH9/fwAKAAAAHwAAAFQAAABPgb0F////AQAAAAAAAAAAAAAAAAAAAAAAAAAAAAAAAAAAAAAAAAAAAAAAAn9/fwDu7OEDzMzMAMDA/wB/f38AAAAAAAAAAAAAAAAAAAAAAAAAAAAhAAAAGAAAABQAAAAuAwAAIA0AAEUuAAAWJAAAEAAAACYAAAAIAAAA//////////8="/>
               </a:ext>
             </a:extLst>
           </p:cNvSpPr>
@@ -7406,7 +7418,7 @@
           <p:cNvSpPr>
             <a:extLst>
               <a:ext uri="smNativeData">
-                <pr:smNativeData xmlns="" xmlns:p14="http://schemas.microsoft.com/office/powerpoint/2010/main" xmlns:pr="smNativeData" val="SMDATA_13_aDXlXhMAAAAlAAAAZAAAAA0AAAAAkAAAAEgAAACQAAAASAAAAAAAAAAAAAAAAAAAAAEAAABQAAAAAAAAAAAA4D8AAAAAAADgPwAAAAAAAOA/AAAAAAAA4D8AAAAAAADgPwAAAAAAAOA/AAAAAAAA4D8AAAAAAADgPwAAAAAAAOA/AAAAAAAA4D8CAAAAjAAAAAEAAAAAAAAAM8zMAP///wgAAAAAAAAAAAAAAAAAAAAAAAAAAAAAAAAAAAAAeAAAAAEAAABAAAAAAAAAAAAAAABaAAAAAAAAAAAAAAAAAAAAAAAAAAAAAAAAAAAAAAAAAAAAAAAAAAAAAAAAAAAAAAAAAAAAAAAAAAAAAAAAAAAAAAAAAAAAAAAAAAAAFAAAADwAAAAAAAAAAAAAAAAAAAkUAAAAAQAAABQAAAAUAAAAFAAAAAEAAAAAAAAAZAAAAGQAAAAAAAAAZAAAAGQAAAAVAAAAYAAAAAAAAAAAAAAADwAAACADAAAAAAAAAAAAAAEAAACgMgAAVgcAAKr4//8BAAAAf39/AAEAAABkAAAAAAAAABQAAABAHwAAAAAAACYAAAAAAAAAwOD//wAAAAAmAAAAZAAAABYAAABMAAAAAAAAAAAAAAAEAAAAAAAAAAEAAADu7OEKAAAAACgAAAAoAAAAZAAAAGQAAAAAAAAAzMzMAAAAAABQAAAAUAAAAGQAAABkAAAAAAAAABcAAAAUAAAAAAAAAAAAAAD/fwAA/38AAAAAAAAJAAAABAAAAAAAAAAMAAAAEAAAAAAAAAAAAAAAAAAAAAAAAAAeAAAAaAAAAAAAAAAAAAAAAAAAAAAAAAAAAAAAECcAABAnAAAAAAAAAAAAAAAAAAAAAAAAAAAAAAAAAAAAAAAAAAAAABQAAAAAAAAAwMD/AAAAAABkAAAAMgAAAAAAAABkAAAAAAAAAH9/fwAKAAAAHwAAAFQAAAAzzMwA////AQAAAAAAAAAAAAAAAAAAAAAAAAAAAAAAAAAAAAAAAAAAAAAAAn9/fwDu7OEDzMzMAMDA/wB/f38AAAAAAAAAAAAAAAAAAAAAAAAAAAAhAAAAGAAAABQAAABgCQAAugkAAD44AADyCQAAEAAAACYAAAAIAAAA//////////8="/>
+                <pr:smNativeData xmlns:pr="smNativeData" xmlns:p14="http://schemas.microsoft.com/office/powerpoint/2010/main" xmlns="" val="SMDATA_13_aDXlXhMAAAAlAAAAZAAAAA0AAAAAkAAAAEgAAACQAAAASAAAAAAAAAAAAAAAAAAAAAEAAABQAAAAAAAAAAAA4D8AAAAAAADgPwAAAAAAAOA/AAAAAAAA4D8AAAAAAADgPwAAAAAAAOA/AAAAAAAA4D8AAAAAAADgPwAAAAAAAOA/AAAAAAAA4D8CAAAAjAAAAAEAAAAAAAAAM8zMAP///wgAAAAAAAAAAAAAAAAAAAAAAAAAAAAAAAAAAAAAeAAAAAEAAABAAAAAAAAAAAAAAABaAAAAAAAAAAAAAAAAAAAAAAAAAAAAAAAAAAAAAAAAAAAAAAAAAAAAAAAAAAAAAAAAAAAAAAAAAAAAAAAAAAAAAAAAAAAAAAAAAAAAFAAAADwAAAAAAAAAAAAAAAAAAAkUAAAAAQAAABQAAAAUAAAAFAAAAAEAAAAAAAAAZAAAAGQAAAAAAAAAZAAAAGQAAAAVAAAAYAAAAAAAAAAAAAAADwAAACADAAAAAAAAAAAAAAEAAACgMgAAVgcAAKr4//8BAAAAf39/AAEAAABkAAAAAAAAABQAAABAHwAAAAAAACYAAAAAAAAAwOD//wAAAAAmAAAAZAAAABYAAABMAAAAAAAAAAAAAAAEAAAAAAAAAAEAAADu7OEKAAAAACgAAAAoAAAAZAAAAGQAAAAAAAAAzMzMAAAAAABQAAAAUAAAAGQAAABkAAAAAAAAABcAAAAUAAAAAAAAAAAAAAD/fwAA/38AAAAAAAAJAAAABAAAAAAAAAAMAAAAEAAAAAAAAAAAAAAAAAAAAAAAAAAeAAAAaAAAAAAAAAAAAAAAAAAAAAAAAAAAAAAAECcAABAnAAAAAAAAAAAAAAAAAAAAAAAAAAAAAAAAAAAAAAAAAAAAABQAAAAAAAAAwMD/AAAAAABkAAAAMgAAAAAAAABkAAAAAAAAAH9/fwAKAAAAHwAAAFQAAAAzzMwA////AQAAAAAAAAAAAAAAAAAAAAAAAAAAAAAAAAAAAAAAAAAAAAAAAn9/fwDu7OEDzMzMAMDA/wB/f38AAAAAAAAAAAAAAAAAAAAAAAAAAAAhAAAAGAAAABQAAABgCQAAugkAAD44AADyCQAAEAAAACYAAAAIAAAA//////////8="/>
               </a:ext>
             </a:extLst>
           </p:cNvSpPr>
@@ -7435,7 +7447,7 @@
           <p:cNvSpPr>
             <a:extLst>
               <a:ext uri="smNativeData">
-                <pr:smNativeData xmlns="" xmlns:p14="http://schemas.microsoft.com/office/powerpoint/2010/main" xmlns:pr="smNativeData" val="SMDATA_13_aDXlXhMAAAAlAAAAZAAAAA0AAAAAjgAAAEcAAACOAAAARwAAAAAAAAAAAAAAAAAAAAEAAABQAAAAAAAAAAAA4D8AAAAAAADgPwAAAAAAAOA/AAAAAAAA4D8AAAAAAADgPwAAAAAAAOA/AAAAAAAA4D8AAAAAAADgPwAAAAAAAOA/AAAAAAAA4D8CAAAAjAAAAAAAAAAAAAAAT4G9DP///wgAAAAAAAAAAAAAAAAAAAAAAAAAAAAAAAAAAAAAZAAAAAEAAABAAAAAAAAAAAAAAAAAAAAAAAAAAAAAAAAAAAAAAAAAAAAAAAAAAAAAAAAAAAAAAAAAAAAAAAAAAAAAAAAAAAAAAAAAAAAAAAAAAAAAAAAAAAAAAAAAAAAAFAAAADwAAAAAAAAAAAAAAAAAAAkUAAAAAQAAABQAAAAUAAAAFAAAAAEAAAAAAAAAZAAAAGQAAAAAAAAAZAAAAGQAAAAVAAAAYAAAAAAAAAAAAAAADwAAACADAAAAAAAAAAAAAAEAAACgMgAAVgcAAKr4//8BAAAAf39/AAEAAABkAAAAAAAAABQAAABAHwAAAAAAACYAAAAAAAAAwOD//wAAAAAmAAAAZAAAABYAAABMAAAAAAAAAAAAAAAEAAAAAAAAAAEAAADu7OEKAAAAACgAAAAoAAAAZAAAAGQAAAAAAAAAzMzMAAAAAABQAAAAUAAAAGQAAABkAAAAAAAAABcAAAAUAAAAAAAAAAAAAAD/fwAA/38AAAAAAAAJAAAABAAAAAAAAAAMAAAAEAAAAAAAAAAAAAAAAAAAAAAAAAAeAAAAaAAAAAAAAAAAAAAAAAAAAAAAAAAAAAAAECcAABAnAAAAAAAAAAAAAAAAAAAAAAAAAAAAAAAAAAAAAAAAAAAAABQAAAAAAAAAwMD/AAAAAABkAAAAMgAAAAAAAABkAAAAAAAAAH9/fwAKAAAAHwAAAFQAAABPgb0F////AQAAAAAAAAAAAAAAAAAAAAAAAAAAAAAAAAAAAAAAAAAAAAAAAn9/fwDu7OEDzMzMAMDA/wB/f38AAAAAAAAAAAAAAAAAAAAAAAAAAAAhAAAAGAAAABQAAABwCAAACAcAAD44AADeCQAAEAAAACYAAAAIAAAA//////////8="/>
+                <pr:smNativeData xmlns:pr="smNativeData" xmlns:p14="http://schemas.microsoft.com/office/powerpoint/2010/main" xmlns="" val="SMDATA_13_aDXlXhMAAAAlAAAAZAAAAA0AAAAAjgAAAEcAAACOAAAARwAAAAAAAAAAAAAAAAAAAAEAAABQAAAAAAAAAAAA4D8AAAAAAADgPwAAAAAAAOA/AAAAAAAA4D8AAAAAAADgPwAAAAAAAOA/AAAAAAAA4D8AAAAAAADgPwAAAAAAAOA/AAAAAAAA4D8CAAAAjAAAAAAAAAAAAAAAT4G9DP///wgAAAAAAAAAAAAAAAAAAAAAAAAAAAAAAAAAAAAAZAAAAAEAAABAAAAAAAAAAAAAAAAAAAAAAAAAAAAAAAAAAAAAAAAAAAAAAAAAAAAAAAAAAAAAAAAAAAAAAAAAAAAAAAAAAAAAAAAAAAAAAAAAAAAAAAAAAAAAAAAAAAAAFAAAADwAAAAAAAAAAAAAAAAAAAkUAAAAAQAAABQAAAAUAAAAFAAAAAEAAAAAAAAAZAAAAGQAAAAAAAAAZAAAAGQAAAAVAAAAYAAAAAAAAAAAAAAADwAAACADAAAAAAAAAAAAAAEAAACgMgAAVgcAAKr4//8BAAAAf39/AAEAAABkAAAAAAAAABQAAABAHwAAAAAAACYAAAAAAAAAwOD//wAAAAAmAAAAZAAAABYAAABMAAAAAAAAAAAAAAAEAAAAAAAAAAEAAADu7OEKAAAAACgAAAAoAAAAZAAAAGQAAAAAAAAAzMzMAAAAAABQAAAAUAAAAGQAAABkAAAAAAAAABcAAAAUAAAAAAAAAAAAAAD/fwAA/38AAAAAAAAJAAAABAAAAAAAAAAMAAAAEAAAAAAAAAAAAAAAAAAAAAAAAAAeAAAAaAAAAAAAAAAAAAAAAAAAAAAAAAAAAAAAECcAABAnAAAAAAAAAAAAAAAAAAAAAAAAAAAAAAAAAAAAAAAAAAAAABQAAAAAAAAAwMD/AAAAAABkAAAAMgAAAAAAAABkAAAAAAAAAH9/fwAKAAAAHwAAAFQAAABPgb0F////AQAAAAAAAAAAAAAAAAAAAAAAAAAAAAAAAAAAAAAAAAAAAAAAAn9/fwDu7OEDzMzMAMDA/wB/f38AAAAAAAAAAAAAAAAAAAAAAAAAAAAhAAAAGAAAABQAAABwCAAACAcAAD44AADeCQAAEAAAACYAAAAIAAAA//////////8="/>
               </a:ext>
             </a:extLst>
           </p:cNvSpPr>
@@ -7589,7 +7601,7 @@
           <p:cNvSpPr>
             <a:extLst>
               <a:ext uri="smNativeData">
-                <pr:smNativeData xmlns="" xmlns:p14="http://schemas.microsoft.com/office/powerpoint/2010/main" xmlns:pr="smNativeData" val="SMDATA_13_aDXlXhMAAAAlAAAAZAAAAA0AAAAAkAAAAEgAAACQAAAASAAAAAAAAAAAAAAAAAAAAAEAAABQAAAAAAAAAAAA4D8AAAAAAADgPwAAAAAAAOA/AAAAAAAA4D8AAAAAAADgPwAAAAAAAOA/AAAAAAAA4D8AAAAAAADgPwAAAAAAAOA/AAAAAAAA4D8CAAAAjAAAAAEAAAAAAAAAM8zMAP///wgAAAAAAAAAAAAAAAAAAAAAAAAAAAAAAAAAAAAAeAAAAAEAAABAAAAAAAAAAAAAAABaAAAAAAAAAAAAAAAAAAAAAAAAAAAAAAAAAAAAAAAAAAAAAAAAAAAAAAAAAAAAAAAAAAAAAAAAAAAAAAAAAAAAAAAAAAAAAAAAAAAAFAAAADwAAAAAAAAAAAAAAAAAAAkUAAAAAQAAABQAAAAUAAAAFAAAAAEAAAAAAAAAZAAAAGQAAAAAAAAAZAAAAGQAAAAVAAAAYAAAAAAAAAAAAAAADwAAACADAAAAAAAAAAAAAAEAAACgMgAAVgcAAKr4//8BAAAAf39/AAEAAABkAAAAAAAAABQAAABAHwAAAAAAACYAAAAAAAAAwOD//wAAAAAmAAAAZAAAABYAAABMAAAAAAAAAAAAAAAEAAAAAAAAAAEAAADu7OEKAAAAACgAAAAoAAAAZAAAAGQAAAAAAAAAzMzMAAAAAABQAAAAUAAAAGQAAABkAAAAAAAAABcAAAAUAAAAAAAAAAAAAAD/fwAA/38AAAAAAAAJAAAABAAAAAAAAAAMAAAAEAAAAAAAAAAAAAAAAAAAAAAAAAAeAAAAaAAAAAAAAAAAAAAAAAAAAAAAAAAAAAAAECcAABAnAAAAAAAAAAAAAAAAAAAAAAAAAAAAAAAAAAAAAAAAAAAAABQAAAAAAAAAwMD/AAAAAABkAAAAMgAAAAAAAABkAAAAAAAAAH9/fwAKAAAAHwAAAFQAAAAzzMwA////AQAAAAAAAAAAAAAAAAAAAAAAAAAAAAAAAAAAAAAAAAAAAAAAAn9/fwDu7OEDzMzMAMDA/wB/f38AAAAAAAAAAAAAAAAAAAAAAAAAAAAhAAAAGAAAABQAAABgCQAAugkAAD44AADyCQAAEAAAACYAAAAIAAAA//////////8="/>
+                <pr:smNativeData xmlns:pr="smNativeData" xmlns:p14="http://schemas.microsoft.com/office/powerpoint/2010/main" xmlns="" val="SMDATA_13_aDXlXhMAAAAlAAAAZAAAAA0AAAAAkAAAAEgAAACQAAAASAAAAAAAAAAAAAAAAAAAAAEAAABQAAAAAAAAAAAA4D8AAAAAAADgPwAAAAAAAOA/AAAAAAAA4D8AAAAAAADgPwAAAAAAAOA/AAAAAAAA4D8AAAAAAADgPwAAAAAAAOA/AAAAAAAA4D8CAAAAjAAAAAEAAAAAAAAAM8zMAP///wgAAAAAAAAAAAAAAAAAAAAAAAAAAAAAAAAAAAAAeAAAAAEAAABAAAAAAAAAAAAAAABaAAAAAAAAAAAAAAAAAAAAAAAAAAAAAAAAAAAAAAAAAAAAAAAAAAAAAAAAAAAAAAAAAAAAAAAAAAAAAAAAAAAAAAAAAAAAAAAAAAAAFAAAADwAAAAAAAAAAAAAAAAAAAkUAAAAAQAAABQAAAAUAAAAFAAAAAEAAAAAAAAAZAAAAGQAAAAAAAAAZAAAAGQAAAAVAAAAYAAAAAAAAAAAAAAADwAAACADAAAAAAAAAAAAAAEAAACgMgAAVgcAAKr4//8BAAAAf39/AAEAAABkAAAAAAAAABQAAABAHwAAAAAAACYAAAAAAAAAwOD//wAAAAAmAAAAZAAAABYAAABMAAAAAAAAAAAAAAAEAAAAAAAAAAEAAADu7OEKAAAAACgAAAAoAAAAZAAAAGQAAAAAAAAAzMzMAAAAAABQAAAAUAAAAGQAAABkAAAAAAAAABcAAAAUAAAAAAAAAAAAAAD/fwAA/38AAAAAAAAJAAAABAAAAAAAAAAMAAAAEAAAAAAAAAAAAAAAAAAAAAAAAAAeAAAAaAAAAAAAAAAAAAAAAAAAAAAAAAAAAAAAECcAABAnAAAAAAAAAAAAAAAAAAAAAAAAAAAAAAAAAAAAAAAAAAAAABQAAAAAAAAAwMD/AAAAAABkAAAAMgAAAAAAAABkAAAAAAAAAH9/fwAKAAAAHwAAAFQAAAAzzMwA////AQAAAAAAAAAAAAAAAAAAAAAAAAAAAAAAAAAAAAAAAAAAAAAAAn9/fwDu7OEDzMzMAMDA/wB/f38AAAAAAAAAAAAAAAAAAAAAAAAAAAAhAAAAGAAAABQAAABgCQAAugkAAD44AADyCQAAEAAAACYAAAAIAAAA//////////8="/>
               </a:ext>
             </a:extLst>
           </p:cNvSpPr>
@@ -7618,7 +7630,7 @@
           <p:cNvSpPr>
             <a:extLst>
               <a:ext uri="smNativeData">
-                <pr:smNativeData xmlns="" xmlns:p14="http://schemas.microsoft.com/office/powerpoint/2010/main" xmlns:pr="smNativeData" val="SMDATA_13_aDXlXhMAAAAlAAAAZAAAAA0AAAAAjgAAAEcAAACOAAAARwAAAAAAAAAAAAAAAAAAAAEAAABQAAAAAAAAAAAA4D8AAAAAAADgPwAAAAAAAOA/AAAAAAAA4D8AAAAAAADgPwAAAAAAAOA/AAAAAAAA4D8AAAAAAADgPwAAAAAAAOA/AAAAAAAA4D8CAAAAjAAAAAAAAAAAAAAAT4G9DP///wgAAAAAAAAAAAAAAAAAAAAAAAAAAAAAAAAAAAAAZAAAAAEAAABAAAAAAAAAAAAAAAAAAAAAAAAAAAAAAAAAAAAAAAAAAAAAAAAAAAAAAAAAAAAAAAAAAAAAAAAAAAAAAAAAAAAAAAAAAAAAAAAAAAAAAAAAAAAAAAAAAAAAFAAAADwAAAAAAAAAAAAAAAAAAAkUAAAAAQAAABQAAAAUAAAAFAAAAAEAAAAAAAAAZAAAAGQAAAAAAAAAZAAAAGQAAAAVAAAAYAAAAAAAAAAAAAAADwAAACADAAAAAAAAAAAAAAEAAACgMgAAVgcAAKr4//8BAAAAf39/AAEAAABkAAAAAAAAABQAAABAHwAAAAAAACYAAAAAAAAAwOD//wAAAAAmAAAAZAAAABYAAABMAAAAAAAAAAAAAAAEAAAAAAAAAAEAAADu7OEKAAAAACgAAAAoAAAAZAAAAGQAAAAAAAAAzMzMAAAAAABQAAAAUAAAAGQAAABkAAAAAAAAABcAAAAUAAAAAAAAAAAAAAD/fwAA/38AAAAAAAAJAAAABAAAAAAAAAAMAAAAEAAAAAAAAAAAAAAAAAAAAAAAAAAeAAAAaAAAAAAAAAAAAAAAAAAAAAAAAAAAAAAAECcAABAnAAAAAAAAAAAAAAAAAAAAAAAAAAAAAAAAAAAAAAAAAAAAABQAAAAAAAAAwMD/AAAAAABkAAAAMgAAAAAAAABkAAAAAAAAAH9/fwAKAAAAHwAAAFQAAABPgb0F////AQAAAAAAAAAAAAAAAAAAAAAAAAAAAAAAAAAAAAAAAAAAAAAAAn9/fwDu7OEDzMzMAMDA/wB/f38AAAAAAAAAAAAAAAAAAAAAAAAAAAAhAAAAGAAAABQAAABwCAAACAcAAD44AADeCQAAEAAAACYAAAAIAAAA//////////8="/>
+                <pr:smNativeData xmlns:pr="smNativeData" xmlns:p14="http://schemas.microsoft.com/office/powerpoint/2010/main" xmlns="" val="SMDATA_13_aDXlXhMAAAAlAAAAZAAAAA0AAAAAjgAAAEcAAACOAAAARwAAAAAAAAAAAAAAAAAAAAEAAABQAAAAAAAAAAAA4D8AAAAAAADgPwAAAAAAAOA/AAAAAAAA4D8AAAAAAADgPwAAAAAAAOA/AAAAAAAA4D8AAAAAAADgPwAAAAAAAOA/AAAAAAAA4D8CAAAAjAAAAAAAAAAAAAAAT4G9DP///wgAAAAAAAAAAAAAAAAAAAAAAAAAAAAAAAAAAAAAZAAAAAEAAABAAAAAAAAAAAAAAAAAAAAAAAAAAAAAAAAAAAAAAAAAAAAAAAAAAAAAAAAAAAAAAAAAAAAAAAAAAAAAAAAAAAAAAAAAAAAAAAAAAAAAAAAAAAAAAAAAAAAAFAAAADwAAAAAAAAAAAAAAAAAAAkUAAAAAQAAABQAAAAUAAAAFAAAAAEAAAAAAAAAZAAAAGQAAAAAAAAAZAAAAGQAAAAVAAAAYAAAAAAAAAAAAAAADwAAACADAAAAAAAAAAAAAAEAAACgMgAAVgcAAKr4//8BAAAAf39/AAEAAABkAAAAAAAAABQAAABAHwAAAAAAACYAAAAAAAAAwOD//wAAAAAmAAAAZAAAABYAAABMAAAAAAAAAAAAAAAEAAAAAAAAAAEAAADu7OEKAAAAACgAAAAoAAAAZAAAAGQAAAAAAAAAzMzMAAAAAABQAAAAUAAAAGQAAABkAAAAAAAAABcAAAAUAAAAAAAAAAAAAAD/fwAA/38AAAAAAAAJAAAABAAAAAAAAAAMAAAAEAAAAAAAAAAAAAAAAAAAAAAAAAAeAAAAaAAAAAAAAAAAAAAAAAAAAAAAAAAAAAAAECcAABAnAAAAAAAAAAAAAAAAAAAAAAAAAAAAAAAAAAAAAAAAAAAAABQAAAAAAAAAwMD/AAAAAABkAAAAMgAAAAAAAABkAAAAAAAAAH9/fwAKAAAAHwAAAFQAAABPgb0F////AQAAAAAAAAAAAAAAAAAAAAAAAAAAAAAAAAAAAAAAAAAAAAAAAn9/fwDu7OEDzMzMAMDA/wB/f38AAAAAAAAAAAAAAAAAAAAAAAAAAAAhAAAAGAAAABQAAABwCAAACAcAAD44AADeCQAAEAAAACYAAAAIAAAA//////////8="/>
               </a:ext>
             </a:extLst>
           </p:cNvSpPr>
@@ -7676,7 +7688,7 @@
           <p:cNvSpPr>
             <a:extLst>
               <a:ext uri="smNativeData">
-                <pr:smNativeData xmlns="" xmlns:p14="http://schemas.microsoft.com/office/powerpoint/2010/main" xmlns:pr="smNativeData" val="SMDATA_13_aDXlXhMAAAAlAAAAZAAAAA0AAAAAjgAAAEcAAACOAAAARwAAAAAAAAABAAAAAAAAAAEAAABQAAAAAAAAAAAA4D8AAAAAAADgPwAAAAAAAOA/AAAAAAAA4D8AAAAAAADgPwAAAAAAAOA/AAAAAAAA4D8AAAAAAADgPwAAAAAAAOA/AAAAAAAA4D8CAAAAjAAAAAAAAAAAAAAAT4G9DP///wgAAAAAAAAAAAAAAAAAAAAAAAAAAAAAAAAAAAAAZAAAAAEAAABAAAAAAAAAAAAAAAAAAAAAAAAAAAAAAAAAAAAAAAAAAAAAAAAAAAAAAAAAAAAAAAAAAAAAAAAAAAAAAAAAAAAAAAAAAAAAAAAAAAAAAAAAAAAAAAAAAAAAFAAAADwAAAAAAAAAAAAAAAAAAAkUAAAAAQAAABQAAAAUAAAAFAAAAAEAAAAAAAAAZAAAAGQAAAAAAAAAZAAAAGQAAAAVAAAAYAAAAAAAAAAAAAAADwAAACADAAAAAAAAAAAAAAEAAACgMgAAVgcAAKr4//8BAAAAf39/AAEAAABkAAAAAAAAABQAAABAHwAAAAAAACYAAAAAAAAAwOD//wAAAAAmAAAAZAAAABYAAABMAAAAAAAAAAAAAAAEAAAAAAAAAAEAAADu7OEKAAAAACgAAAAoAAAAZAAAAGQAAAAAAAAAzMzMAAAAAABQAAAAUAAAAGQAAABkAAAAAAAAABcAAAAUAAAAAAAAAAAAAAD/fwAA/38AAAAAAAAJAAAABAAAAAAAAAAMAAAAEAAAAAAAAAAAAAAAAAAAAAAAAAAeAAAAaAAAAAAAAAAAAAAAAAAAAAAAAAAAAAAAECcAABAnAAAAAAAAAAAAAAAAAAAAAAAAAAAAAAAAAAAAAAAAAAAAABQAAAAAAAAAwMD/AAAAAABkAAAAMgAAAAAAAABkAAAAAAAAAH9/fwAKAAAAHwAAAFQAAABPgb0F////AQAAAAAAAAAAAAAAAAAAAAAAAAAAAAAAAAAAAAAAAAAAAAAAAn9/fwDu7OEDzMzMAMDA/wB/f38AAAAAAAAAAAAAAAAAAAAAAAAAAAAhAAAAGAAAABQAAAAuAwAAIA0AAEUuAAAWJAAAEAAAACYAAAAIAAAA//////////8="/>
+                <pr:smNativeData xmlns:pr="smNativeData" xmlns:p14="http://schemas.microsoft.com/office/powerpoint/2010/main" xmlns="" val="SMDATA_13_aDXlXhMAAAAlAAAAZAAAAA0AAAAAjgAAAEcAAACOAAAARwAAAAAAAAABAAAAAAAAAAEAAABQAAAAAAAAAAAA4D8AAAAAAADgPwAAAAAAAOA/AAAAAAAA4D8AAAAAAADgPwAAAAAAAOA/AAAAAAAA4D8AAAAAAADgPwAAAAAAAOA/AAAAAAAA4D8CAAAAjAAAAAAAAAAAAAAAT4G9DP///wgAAAAAAAAAAAAAAAAAAAAAAAAAAAAAAAAAAAAAZAAAAAEAAABAAAAAAAAAAAAAAAAAAAAAAAAAAAAAAAAAAAAAAAAAAAAAAAAAAAAAAAAAAAAAAAAAAAAAAAAAAAAAAAAAAAAAAAAAAAAAAAAAAAAAAAAAAAAAAAAAAAAAFAAAADwAAAAAAAAAAAAAAAAAAAkUAAAAAQAAABQAAAAUAAAAFAAAAAEAAAAAAAAAZAAAAGQAAAAAAAAAZAAAAGQAAAAVAAAAYAAAAAAAAAAAAAAADwAAACADAAAAAAAAAAAAAAEAAACgMgAAVgcAAKr4//8BAAAAf39/AAEAAABkAAAAAAAAABQAAABAHwAAAAAAACYAAAAAAAAAwOD//wAAAAAmAAAAZAAAABYAAABMAAAAAAAAAAAAAAAEAAAAAAAAAAEAAADu7OEKAAAAACgAAAAoAAAAZAAAAGQAAAAAAAAAzMzMAAAAAABQAAAAUAAAAGQAAABkAAAAAAAAABcAAAAUAAAAAAAAAAAAAAD/fwAA/38AAAAAAAAJAAAABAAAAAAAAAAMAAAAEAAAAAAAAAAAAAAAAAAAAAAAAAAeAAAAaAAAAAAAAAAAAAAAAAAAAAAAAAAAAAAAECcAABAnAAAAAAAAAAAAAAAAAAAAAAAAAAAAAAAAAAAAAAAAAAAAABQAAAAAAAAAwMD/AAAAAABkAAAAMgAAAAAAAABkAAAAAAAAAH9/fwAKAAAAHwAAAFQAAABPgb0F////AQAAAAAAAAAAAAAAAAAAAAAAAAAAAAAAAAAAAAAAAAAAAAAAAn9/fwDu7OEDzMzMAMDA/wB/f38AAAAAAAAAAAAAAAAAAAAAAAAAAAAhAAAAGAAAABQAAAAuAwAAIA0AAEUuAAAWJAAAEAAAACYAAAAIAAAA//////////8="/>
               </a:ext>
             </a:extLst>
           </p:cNvSpPr>
@@ -7903,7 +7915,7 @@
           <p:cNvSpPr>
             <a:extLst>
               <a:ext uri="smNativeData">
-                <pr:smNativeData xmlns="" xmlns:p14="http://schemas.microsoft.com/office/powerpoint/2010/main" xmlns:pr="smNativeData" val="SMDATA_13_aDXlXhMAAAAlAAAAZAAAAA0AAAAAkAAAAEgAAACQAAAASAAAAAAAAAAAAAAAAAAAAAEAAABQAAAAAAAAAAAA4D8AAAAAAADgPwAAAAAAAOA/AAAAAAAA4D8AAAAAAADgPwAAAAAAAOA/AAAAAAAA4D8AAAAAAADgPwAAAAAAAOA/AAAAAAAA4D8CAAAAjAAAAAEAAAAAAAAAM8zMAP///wgAAAAAAAAAAAAAAAAAAAAAAAAAAAAAAAAAAAAAeAAAAAEAAABAAAAAAAAAAAAAAABaAAAAAAAAAAAAAAAAAAAAAAAAAAAAAAAAAAAAAAAAAAAAAAAAAAAAAAAAAAAAAAAAAAAAAAAAAAAAAAAAAAAAAAAAAAAAAAAAAAAAFAAAADwAAAAAAAAAAAAAAAAAAAkUAAAAAQAAABQAAAAUAAAAFAAAAAEAAAAAAAAAZAAAAGQAAAAAAAAAZAAAAGQAAAAVAAAAYAAAAAAAAAAAAAAADwAAACADAAAAAAAAAAAAAAEAAACgMgAAVgcAAKr4//8BAAAAf39/AAEAAABkAAAAAAAAABQAAABAHwAAAAAAACYAAAAAAAAAwOD//wAAAAAmAAAAZAAAABYAAABMAAAAAAAAAAAAAAAEAAAAAAAAAAEAAADu7OEKAAAAACgAAAAoAAAAZAAAAGQAAAAAAAAAzMzMAAAAAABQAAAAUAAAAGQAAABkAAAAAAAAABcAAAAUAAAAAAAAAAAAAAD/fwAA/38AAAAAAAAJAAAABAAAAAAAAAAMAAAAEAAAAAAAAAAAAAAAAAAAAAAAAAAeAAAAaAAAAAAAAAAAAAAAAAAAAAAAAAAAAAAAECcAABAnAAAAAAAAAAAAAAAAAAAAAAAAAAAAAAAAAAAAAAAAAAAAABQAAAAAAAAAwMD/AAAAAABkAAAAMgAAAAAAAABkAAAAAAAAAH9/fwAKAAAAHwAAAFQAAAAzzMwA////AQAAAAAAAAAAAAAAAAAAAAAAAAAAAAAAAAAAAAAAAAAAAAAAAn9/fwDu7OEDzMzMAMDA/wB/f38AAAAAAAAAAAAAAAAAAAAAAAAAAAAhAAAAGAAAABQAAABgCQAAugkAAD44AADyCQAAEAAAACYAAAAIAAAA//////////8="/>
+                <pr:smNativeData xmlns:pr="smNativeData" xmlns:p14="http://schemas.microsoft.com/office/powerpoint/2010/main" xmlns="" val="SMDATA_13_aDXlXhMAAAAlAAAAZAAAAA0AAAAAkAAAAEgAAACQAAAASAAAAAAAAAAAAAAAAAAAAAEAAABQAAAAAAAAAAAA4D8AAAAAAADgPwAAAAAAAOA/AAAAAAAA4D8AAAAAAADgPwAAAAAAAOA/AAAAAAAA4D8AAAAAAADgPwAAAAAAAOA/AAAAAAAA4D8CAAAAjAAAAAEAAAAAAAAAM8zMAP///wgAAAAAAAAAAAAAAAAAAAAAAAAAAAAAAAAAAAAAeAAAAAEAAABAAAAAAAAAAAAAAABaAAAAAAAAAAAAAAAAAAAAAAAAAAAAAAAAAAAAAAAAAAAAAAAAAAAAAAAAAAAAAAAAAAAAAAAAAAAAAAAAAAAAAAAAAAAAAAAAAAAAFAAAADwAAAAAAAAAAAAAAAAAAAkUAAAAAQAAABQAAAAUAAAAFAAAAAEAAAAAAAAAZAAAAGQAAAAAAAAAZAAAAGQAAAAVAAAAYAAAAAAAAAAAAAAADwAAACADAAAAAAAAAAAAAAEAAACgMgAAVgcAAKr4//8BAAAAf39/AAEAAABkAAAAAAAAABQAAABAHwAAAAAAACYAAAAAAAAAwOD//wAAAAAmAAAAZAAAABYAAABMAAAAAAAAAAAAAAAEAAAAAAAAAAEAAADu7OEKAAAAACgAAAAoAAAAZAAAAGQAAAAAAAAAzMzMAAAAAABQAAAAUAAAAGQAAABkAAAAAAAAABcAAAAUAAAAAAAAAAAAAAD/fwAA/38AAAAAAAAJAAAABAAAAAAAAAAMAAAAEAAAAAAAAAAAAAAAAAAAAAAAAAAeAAAAaAAAAAAAAAAAAAAAAAAAAAAAAAAAAAAAECcAABAnAAAAAAAAAAAAAAAAAAAAAAAAAAAAAAAAAAAAAAAAAAAAABQAAAAAAAAAwMD/AAAAAABkAAAAMgAAAAAAAABkAAAAAAAAAH9/fwAKAAAAHwAAAFQAAAAzzMwA////AQAAAAAAAAAAAAAAAAAAAAAAAAAAAAAAAAAAAAAAAAAAAAAAAn9/fwDu7OEDzMzMAMDA/wB/f38AAAAAAAAAAAAAAAAAAAAAAAAAAAAhAAAAGAAAABQAAABgCQAAugkAAD44AADyCQAAEAAAACYAAAAIAAAA//////////8="/>
               </a:ext>
             </a:extLst>
           </p:cNvSpPr>
@@ -7932,7 +7944,7 @@
           <p:cNvSpPr>
             <a:extLst>
               <a:ext uri="smNativeData">
-                <pr:smNativeData xmlns="" xmlns:p14="http://schemas.microsoft.com/office/powerpoint/2010/main" xmlns:pr="smNativeData" val="SMDATA_13_aDXlXhMAAAAlAAAAZAAAAA0AAAAAjgAAAEcAAACOAAAARwAAAAAAAAAAAAAAAAAAAAEAAABQAAAAAAAAAAAA4D8AAAAAAADgPwAAAAAAAOA/AAAAAAAA4D8AAAAAAADgPwAAAAAAAOA/AAAAAAAA4D8AAAAAAADgPwAAAAAAAOA/AAAAAAAA4D8CAAAAjAAAAAAAAAAAAAAAT4G9DP///wgAAAAAAAAAAAAAAAAAAAAAAAAAAAAAAAAAAAAAZAAAAAEAAABAAAAAAAAAAAAAAAAAAAAAAAAAAAAAAAAAAAAAAAAAAAAAAAAAAAAAAAAAAAAAAAAAAAAAAAAAAAAAAAAAAAAAAAAAAAAAAAAAAAAAAAAAAAAAAAAAAAAAFAAAADwAAAAAAAAAAAAAAAAAAAkUAAAAAQAAABQAAAAUAAAAFAAAAAEAAAAAAAAAZAAAAGQAAAAAAAAAZAAAAGQAAAAVAAAAYAAAAAAAAAAAAAAADwAAACADAAAAAAAAAAAAAAEAAACgMgAAVgcAAKr4//8BAAAAf39/AAEAAABkAAAAAAAAABQAAABAHwAAAAAAACYAAAAAAAAAwOD//wAAAAAmAAAAZAAAABYAAABMAAAAAAAAAAAAAAAEAAAAAAAAAAEAAADu7OEKAAAAACgAAAAoAAAAZAAAAGQAAAAAAAAAzMzMAAAAAABQAAAAUAAAAGQAAABkAAAAAAAAABcAAAAUAAAAAAAAAAAAAAD/fwAA/38AAAAAAAAJAAAABAAAAAAAAAAMAAAAEAAAAAAAAAAAAAAAAAAAAAAAAAAeAAAAaAAAAAAAAAAAAAAAAAAAAAAAAAAAAAAAECcAABAnAAAAAAAAAAAAAAAAAAAAAAAAAAAAAAAAAAAAAAAAAAAAABQAAAAAAAAAwMD/AAAAAABkAAAAMgAAAAAAAABkAAAAAAAAAH9/fwAKAAAAHwAAAFQAAABPgb0F////AQAAAAAAAAAAAAAAAAAAAAAAAAAAAAAAAAAAAAAAAAAAAAAAAn9/fwDu7OEDzMzMAMDA/wB/f38AAAAAAAAAAAAAAAAAAAAAAAAAAAAhAAAAGAAAABQAAABwCAAACAcAAD44AADeCQAAEAAAACYAAAAIAAAA//////////8="/>
+                <pr:smNativeData xmlns:pr="smNativeData" xmlns:p14="http://schemas.microsoft.com/office/powerpoint/2010/main" xmlns="" val="SMDATA_13_aDXlXhMAAAAlAAAAZAAAAA0AAAAAjgAAAEcAAACOAAAARwAAAAAAAAAAAAAAAAAAAAEAAABQAAAAAAAAAAAA4D8AAAAAAADgPwAAAAAAAOA/AAAAAAAA4D8AAAAAAADgPwAAAAAAAOA/AAAAAAAA4D8AAAAAAADgPwAAAAAAAOA/AAAAAAAA4D8CAAAAjAAAAAAAAAAAAAAAT4G9DP///wgAAAAAAAAAAAAAAAAAAAAAAAAAAAAAAAAAAAAAZAAAAAEAAABAAAAAAAAAAAAAAAAAAAAAAAAAAAAAAAAAAAAAAAAAAAAAAAAAAAAAAAAAAAAAAAAAAAAAAAAAAAAAAAAAAAAAAAAAAAAAAAAAAAAAAAAAAAAAAAAAAAAAFAAAADwAAAAAAAAAAAAAAAAAAAkUAAAAAQAAABQAAAAUAAAAFAAAAAEAAAAAAAAAZAAAAGQAAAAAAAAAZAAAAGQAAAAVAAAAYAAAAAAAAAAAAAAADwAAACADAAAAAAAAAAAAAAEAAACgMgAAVgcAAKr4//8BAAAAf39/AAEAAABkAAAAAAAAABQAAABAHwAAAAAAACYAAAAAAAAAwOD//wAAAAAmAAAAZAAAABYAAABMAAAAAAAAAAAAAAAEAAAAAAAAAAEAAADu7OEKAAAAACgAAAAoAAAAZAAAAGQAAAAAAAAAzMzMAAAAAABQAAAAUAAAAGQAAABkAAAAAAAAABcAAAAUAAAAAAAAAAAAAAD/fwAA/38AAAAAAAAJAAAABAAAAAAAAAAMAAAAEAAAAAAAAAAAAAAAAAAAAAAAAAAeAAAAaAAAAAAAAAAAAAAAAAAAAAAAAAAAAAAAECcAABAnAAAAAAAAAAAAAAAAAAAAAAAAAAAAAAAAAAAAAAAAAAAAABQAAAAAAAAAwMD/AAAAAABkAAAAMgAAAAAAAABkAAAAAAAAAH9/fwAKAAAAHwAAAFQAAABPgb0F////AQAAAAAAAAAAAAAAAAAAAAAAAAAAAAAAAAAAAAAAAAAAAAAAAn9/fwDu7OEDzMzMAMDA/wB/f38AAAAAAAAAAAAAAAAAAAAAAAAAAAAhAAAAGAAAABQAAABwCAAACAcAAD44AADeCQAAEAAAACYAAAAIAAAA//////////8="/>
               </a:ext>
             </a:extLst>
           </p:cNvSpPr>
@@ -7990,7 +8002,7 @@
           <p:cNvSpPr>
             <a:extLst>
               <a:ext uri="smNativeData">
-                <pr:smNativeData xmlns="" xmlns:p14="http://schemas.microsoft.com/office/powerpoint/2010/main" xmlns:pr="smNativeData" val="SMDATA_13_aDXlXhMAAAAlAAAAZAAAAA0AAAAAjgAAAEcAAACOAAAARwAAAAAAAAABAAAAAAAAAAEAAABQAAAAAAAAAAAA4D8AAAAAAADgPwAAAAAAAOA/AAAAAAAA4D8AAAAAAADgPwAAAAAAAOA/AAAAAAAA4D8AAAAAAADgPwAAAAAAAOA/AAAAAAAA4D8CAAAAjAAAAAAAAAAAAAAAT4G9DP///wgAAAAAAAAAAAAAAAAAAAAAAAAAAAAAAAAAAAAAZAAAAAEAAABAAAAAAAAAAAAAAAAAAAAAAAAAAAAAAAAAAAAAAAAAAAAAAAAAAAAAAAAAAAAAAAAAAAAAAAAAAAAAAAAAAAAAAAAAAAAAAAAAAAAAAAAAAAAAAAAAAAAAFAAAADwAAAAAAAAAAAAAAAAAAAkUAAAAAQAAABQAAAAUAAAAFAAAAAEAAAAAAAAAZAAAAGQAAAAAAAAAZAAAAGQAAAAVAAAAYAAAAAAAAAAAAAAADwAAACADAAAAAAAAAAAAAAEAAACgMgAAVgcAAKr4//8BAAAAf39/AAEAAABkAAAAAAAAABQAAABAHwAAAAAAACYAAAAAAAAAwOD//wAAAAAmAAAAZAAAABYAAABMAAAAAAAAAAAAAAAEAAAAAAAAAAEAAADu7OEKAAAAACgAAAAoAAAAZAAAAGQAAAAAAAAAzMzMAAAAAABQAAAAUAAAAGQAAABkAAAAAAAAABcAAAAUAAAAAAAAAAAAAAD/fwAA/38AAAAAAAAJAAAABAAAAAAAAAAMAAAAEAAAAAAAAAAAAAAAAAAAAAAAAAAeAAAAaAAAAAAAAAAAAAAAAAAAAAAAAAAAAAAAECcAABAnAAAAAAAAAAAAAAAAAAAAAAAAAAAAAAAAAAAAAAAAAAAAABQAAAAAAAAAwMD/AAAAAABkAAAAMgAAAAAAAABkAAAAAAAAAH9/fwAKAAAAHwAAAFQAAABPgb0F////AQAAAAAAAAAAAAAAAAAAAAAAAAAAAAAAAAAAAAAAAAAAAAAAAn9/fwDu7OEDzMzMAMDA/wB/f38AAAAAAAAAAAAAAAAAAAAAAAAAAAAhAAAAGAAAABQAAAAuAwAAIA0AAEUuAAAWJAAAEAAAACYAAAAIAAAA//////////8="/>
+                <pr:smNativeData xmlns:pr="smNativeData" xmlns:p14="http://schemas.microsoft.com/office/powerpoint/2010/main" xmlns="" val="SMDATA_13_aDXlXhMAAAAlAAAAZAAAAA0AAAAAjgAAAEcAAACOAAAARwAAAAAAAAABAAAAAAAAAAEAAABQAAAAAAAAAAAA4D8AAAAAAADgPwAAAAAAAOA/AAAAAAAA4D8AAAAAAADgPwAAAAAAAOA/AAAAAAAA4D8AAAAAAADgPwAAAAAAAOA/AAAAAAAA4D8CAAAAjAAAAAAAAAAAAAAAT4G9DP///wgAAAAAAAAAAAAAAAAAAAAAAAAAAAAAAAAAAAAAZAAAAAEAAABAAAAAAAAAAAAAAAAAAAAAAAAAAAAAAAAAAAAAAAAAAAAAAAAAAAAAAAAAAAAAAAAAAAAAAAAAAAAAAAAAAAAAAAAAAAAAAAAAAAAAAAAAAAAAAAAAAAAAFAAAADwAAAAAAAAAAAAAAAAAAAkUAAAAAQAAABQAAAAUAAAAFAAAAAEAAAAAAAAAZAAAAGQAAAAAAAAAZAAAAGQAAAAVAAAAYAAAAAAAAAAAAAAADwAAACADAAAAAAAAAAAAAAEAAACgMgAAVgcAAKr4//8BAAAAf39/AAEAAABkAAAAAAAAABQAAABAHwAAAAAAACYAAAAAAAAAwOD//wAAAAAmAAAAZAAAABYAAABMAAAAAAAAAAAAAAAEAAAAAAAAAAEAAADu7OEKAAAAACgAAAAoAAAAZAAAAGQAAAAAAAAAzMzMAAAAAABQAAAAUAAAAGQAAABkAAAAAAAAABcAAAAUAAAAAAAAAAAAAAD/fwAA/38AAAAAAAAJAAAABAAAAAAAAAAMAAAAEAAAAAAAAAAAAAAAAAAAAAAAAAAeAAAAaAAAAAAAAAAAAAAAAAAAAAAAAAAAAAAAECcAABAnAAAAAAAAAAAAAAAAAAAAAAAAAAAAAAAAAAAAAAAAAAAAABQAAAAAAAAAwMD/AAAAAABkAAAAMgAAAAAAAABkAAAAAAAAAH9/fwAKAAAAHwAAAFQAAABPgb0F////AQAAAAAAAAAAAAAAAAAAAAAAAAAAAAAAAAAAAAAAAAAAAAAAAn9/fwDu7OEDzMzMAMDA/wB/f38AAAAAAAAAAAAAAAAAAAAAAAAAAAAhAAAAGAAAABQAAAAuAwAAIA0AAEUuAAAWJAAAEAAAACYAAAAIAAAA//////////8="/>
               </a:ext>
             </a:extLst>
           </p:cNvSpPr>

</xml_diff>